<commit_message>
update method added to merchant class and passed testing
</commit_message>
<xml_diff>
--- a/Plans_Project_Management/Budget_App_Plan_08Nov2018.pptx
+++ b/Plans_Project_Management/Budget_App_Plan_08Nov2018.pptx
@@ -6,15 +6,17 @@
   </p:sldMasterIdLst>
   <p:sldIdLst>
     <p:sldId id="256" r:id="rId2"/>
-    <p:sldId id="258" r:id="rId3"/>
-    <p:sldId id="259" r:id="rId4"/>
-    <p:sldId id="260" r:id="rId5"/>
-    <p:sldId id="261" r:id="rId6"/>
-    <p:sldId id="265" r:id="rId7"/>
-    <p:sldId id="262" r:id="rId8"/>
-    <p:sldId id="263" r:id="rId9"/>
-    <p:sldId id="264" r:id="rId10"/>
-    <p:sldId id="257" r:id="rId11"/>
+    <p:sldId id="267" r:id="rId3"/>
+    <p:sldId id="258" r:id="rId4"/>
+    <p:sldId id="259" r:id="rId5"/>
+    <p:sldId id="260" r:id="rId6"/>
+    <p:sldId id="261" r:id="rId7"/>
+    <p:sldId id="265" r:id="rId8"/>
+    <p:sldId id="262" r:id="rId9"/>
+    <p:sldId id="263" r:id="rId10"/>
+    <p:sldId id="264" r:id="rId11"/>
+    <p:sldId id="257" r:id="rId12"/>
+    <p:sldId id="266" r:id="rId13"/>
   </p:sldIdLst>
   <p:sldSz cx="12192000" cy="6858000"/>
   <p:notesSz cx="6858000" cy="9144000"/>
@@ -3435,6 +3437,895 @@
           <p:cNvPr id="2" name="Title 1">
             <a:extLst>
               <a:ext uri="{FF2B5EF4-FFF2-40B4-BE49-F238E27FC236}">
+                <a16:creationId xmlns:a16="http://schemas.microsoft.com/office/drawing/2014/main" id="{A3FA626A-39B1-794F-9A3F-83D37F75B451}"/>
+              </a:ext>
+            </a:extLst>
+          </p:cNvPr>
+          <p:cNvSpPr>
+            <a:spLocks noGrp="1"/>
+          </p:cNvSpPr>
+          <p:nvPr>
+            <p:ph type="title"/>
+          </p:nvPr>
+        </p:nvSpPr>
+        <p:spPr>
+          <a:xfrm>
+            <a:off x="838200" y="55844"/>
+            <a:ext cx="10515600" cy="341095"/>
+          </a:xfrm>
+        </p:spPr>
+        <p:txBody>
+          <a:bodyPr>
+            <a:normAutofit fontScale="90000"/>
+          </a:bodyPr>
+          <a:lstStyle/>
+          <a:p>
+            <a:pPr algn="ctr"/>
+            <a:r>
+              <a:rPr lang="en-US" sz="2800" b="1" dirty="0"/>
+              <a:t>Classes</a:t>
+            </a:r>
+          </a:p>
+        </p:txBody>
+      </p:sp>
+      <p:graphicFrame>
+        <p:nvGraphicFramePr>
+          <p:cNvPr id="4" name="Table 3">
+            <a:extLst>
+              <a:ext uri="{FF2B5EF4-FFF2-40B4-BE49-F238E27FC236}">
+                <a16:creationId xmlns:a16="http://schemas.microsoft.com/office/drawing/2014/main" id="{E76B9E62-50FD-A244-A881-30CEE53BFD4C}"/>
+              </a:ext>
+            </a:extLst>
+          </p:cNvPr>
+          <p:cNvGraphicFramePr>
+            <a:graphicFrameLocks noGrp="1"/>
+          </p:cNvGraphicFramePr>
+          <p:nvPr>
+            <p:extLst>
+              <p:ext uri="{D42A27DB-BD31-4B8C-83A1-F6EECF244321}">
+                <p14:modId xmlns:p14="http://schemas.microsoft.com/office/powerpoint/2010/main" val="4229818805"/>
+              </p:ext>
+            </p:extLst>
+          </p:nvPr>
+        </p:nvGraphicFramePr>
+        <p:xfrm>
+          <a:off x="309284" y="464175"/>
+          <a:ext cx="2369671" cy="6326590"/>
+        </p:xfrm>
+        <a:graphic>
+          <a:graphicData uri="http://schemas.openxmlformats.org/drawingml/2006/table">
+            <a:tbl>
+              <a:tblPr firstRow="1" bandRow="1">
+                <a:tableStyleId>{5940675A-B579-460E-94D1-54222C63F5DA}</a:tableStyleId>
+              </a:tblPr>
+              <a:tblGrid>
+                <a:gridCol w="2369671">
+                  <a:extLst>
+                    <a:ext uri="{9D8B030D-6E8A-4147-A177-3AD203B41FA5}">
+                      <a16:colId xmlns:a16="http://schemas.microsoft.com/office/drawing/2014/main" val="4005843325"/>
+                    </a:ext>
+                  </a:extLst>
+                </a:gridCol>
+              </a:tblGrid>
+              <a:tr h="372229">
+                <a:tc>
+                  <a:txBody>
+                    <a:bodyPr/>
+                    <a:lstStyle/>
+                    <a:p>
+                      <a:pPr algn="ctr"/>
+                      <a:r>
+                        <a:rPr lang="en-US" dirty="0"/>
+                        <a:t>Merchant</a:t>
+                      </a:r>
+                    </a:p>
+                  </a:txBody>
+                  <a:tcPr anchor="ctr">
+                    <a:solidFill>
+                      <a:srgbClr val="D883FF"/>
+                    </a:solidFill>
+                  </a:tcPr>
+                </a:tc>
+                <a:extLst>
+                  <a:ext uri="{0D108BD9-81ED-4DB2-BD59-A6C34878D82A}">
+                    <a16:rowId xmlns:a16="http://schemas.microsoft.com/office/drawing/2014/main" val="4181850750"/>
+                  </a:ext>
+                </a:extLst>
+              </a:tr>
+              <a:tr h="2639671">
+                <a:tc>
+                  <a:txBody>
+                    <a:bodyPr/>
+                    <a:lstStyle/>
+                    <a:p>
+                      <a:pPr algn="l"/>
+                      <a:r>
+                        <a:rPr lang="en-US" dirty="0"/>
+                        <a:t>@id</a:t>
+                      </a:r>
+                    </a:p>
+                    <a:p>
+                      <a:pPr algn="l"/>
+                      <a:r>
+                        <a:rPr lang="en-US" dirty="0"/>
+                        <a:t>@</a:t>
+                      </a:r>
+                      <a:r>
+                        <a:rPr lang="en-US" dirty="0" err="1"/>
+                        <a:t>merchant_name</a:t>
+                      </a:r>
+                      <a:r>
+                        <a:rPr lang="en-US" dirty="0"/>
+                        <a:t>(</a:t>
+                      </a:r>
+                      <a:r>
+                        <a:rPr lang="en-US" dirty="0" err="1"/>
+                        <a:t>Str</a:t>
+                      </a:r>
+                      <a:r>
+                        <a:rPr lang="en-US" dirty="0"/>
+                        <a:t>)</a:t>
+                      </a:r>
+                    </a:p>
+                  </a:txBody>
+                  <a:tcPr anchor="ctr"/>
+                </a:tc>
+                <a:extLst>
+                  <a:ext uri="{0D108BD9-81ED-4DB2-BD59-A6C34878D82A}">
+                    <a16:rowId xmlns:a16="http://schemas.microsoft.com/office/drawing/2014/main" val="2995859431"/>
+                  </a:ext>
+                </a:extLst>
+              </a:tr>
+              <a:tr h="3314690">
+                <a:tc>
+                  <a:txBody>
+                    <a:bodyPr/>
+                    <a:lstStyle/>
+                    <a:p>
+                      <a:pPr marL="285750" indent="-285750" algn="l">
+                        <a:buFontTx/>
+                        <a:buChar char="-"/>
+                      </a:pPr>
+                      <a:r>
+                        <a:rPr lang="en-US" dirty="0"/>
+                        <a:t>Initialize</a:t>
+                      </a:r>
+                    </a:p>
+                    <a:p>
+                      <a:pPr marL="285750" indent="-285750" algn="l">
+                        <a:buFontTx/>
+                        <a:buChar char="-"/>
+                      </a:pPr>
+                      <a:r>
+                        <a:rPr lang="en-US" dirty="0"/>
+                        <a:t>Save (to database)</a:t>
+                      </a:r>
+                    </a:p>
+                    <a:p>
+                      <a:pPr marL="285750" indent="-285750" algn="l">
+                        <a:buFontTx/>
+                        <a:buChar char="-"/>
+                      </a:pPr>
+                      <a:r>
+                        <a:rPr lang="en-US" dirty="0"/>
+                        <a:t>Self find</a:t>
+                      </a:r>
+                    </a:p>
+                    <a:p>
+                      <a:pPr marL="285750" indent="-285750" algn="l">
+                        <a:buFontTx/>
+                        <a:buChar char="-"/>
+                      </a:pPr>
+                      <a:r>
+                        <a:rPr lang="en-US" dirty="0"/>
+                        <a:t>Self all</a:t>
+                      </a:r>
+                    </a:p>
+                    <a:p>
+                      <a:pPr marL="285750" indent="-285750" algn="l">
+                        <a:buFontTx/>
+                        <a:buChar char="-"/>
+                      </a:pPr>
+                      <a:r>
+                        <a:rPr lang="en-US" dirty="0"/>
+                        <a:t>Self map items</a:t>
+                      </a:r>
+                    </a:p>
+                    <a:p>
+                      <a:pPr marL="285750" indent="-285750" algn="l">
+                        <a:buFontTx/>
+                        <a:buChar char="-"/>
+                      </a:pPr>
+                      <a:r>
+                        <a:rPr lang="en-US" dirty="0"/>
+                        <a:t>delete</a:t>
+                      </a:r>
+                    </a:p>
+                  </a:txBody>
+                  <a:tcPr anchor="ctr"/>
+                </a:tc>
+                <a:extLst>
+                  <a:ext uri="{0D108BD9-81ED-4DB2-BD59-A6C34878D82A}">
+                    <a16:rowId xmlns:a16="http://schemas.microsoft.com/office/drawing/2014/main" val="2112490845"/>
+                  </a:ext>
+                </a:extLst>
+              </a:tr>
+            </a:tbl>
+          </a:graphicData>
+        </a:graphic>
+      </p:graphicFrame>
+      <p:graphicFrame>
+        <p:nvGraphicFramePr>
+          <p:cNvPr id="5" name="Table 4">
+            <a:extLst>
+              <a:ext uri="{FF2B5EF4-FFF2-40B4-BE49-F238E27FC236}">
+                <a16:creationId xmlns:a16="http://schemas.microsoft.com/office/drawing/2014/main" id="{1B86D617-CA67-D44E-9F22-CAC79CB6A2A4}"/>
+              </a:ext>
+            </a:extLst>
+          </p:cNvPr>
+          <p:cNvGraphicFramePr>
+            <a:graphicFrameLocks noGrp="1"/>
+          </p:cNvGraphicFramePr>
+          <p:nvPr>
+            <p:extLst>
+              <p:ext uri="{D42A27DB-BD31-4B8C-83A1-F6EECF244321}">
+                <p14:modId xmlns:p14="http://schemas.microsoft.com/office/powerpoint/2010/main" val="1814829198"/>
+              </p:ext>
+            </p:extLst>
+          </p:nvPr>
+        </p:nvGraphicFramePr>
+        <p:xfrm>
+          <a:off x="3074894" y="464174"/>
+          <a:ext cx="2203824" cy="6326591"/>
+        </p:xfrm>
+        <a:graphic>
+          <a:graphicData uri="http://schemas.openxmlformats.org/drawingml/2006/table">
+            <a:tbl>
+              <a:tblPr firstRow="1" bandRow="1">
+                <a:tableStyleId>{5940675A-B579-460E-94D1-54222C63F5DA}</a:tableStyleId>
+              </a:tblPr>
+              <a:tblGrid>
+                <a:gridCol w="2203824">
+                  <a:extLst>
+                    <a:ext uri="{9D8B030D-6E8A-4147-A177-3AD203B41FA5}">
+                      <a16:colId xmlns:a16="http://schemas.microsoft.com/office/drawing/2014/main" val="4005843325"/>
+                    </a:ext>
+                  </a:extLst>
+                </a:gridCol>
+              </a:tblGrid>
+              <a:tr h="454944">
+                <a:tc>
+                  <a:txBody>
+                    <a:bodyPr/>
+                    <a:lstStyle/>
+                    <a:p>
+                      <a:pPr algn="ctr"/>
+                      <a:r>
+                        <a:rPr lang="en-US" dirty="0"/>
+                        <a:t>Tags</a:t>
+                      </a:r>
+                    </a:p>
+                  </a:txBody>
+                  <a:tcPr anchor="ctr">
+                    <a:solidFill>
+                      <a:srgbClr val="D883FF"/>
+                    </a:solidFill>
+                  </a:tcPr>
+                </a:tc>
+                <a:extLst>
+                  <a:ext uri="{0D108BD9-81ED-4DB2-BD59-A6C34878D82A}">
+                    <a16:rowId xmlns:a16="http://schemas.microsoft.com/office/drawing/2014/main" val="4181850750"/>
+                  </a:ext>
+                </a:extLst>
+              </a:tr>
+              <a:tr h="2805717">
+                <a:tc>
+                  <a:txBody>
+                    <a:bodyPr/>
+                    <a:lstStyle/>
+                    <a:p>
+                      <a:pPr algn="l"/>
+                      <a:r>
+                        <a:rPr lang="en-US" dirty="0"/>
+                        <a:t>@id</a:t>
+                      </a:r>
+                    </a:p>
+                    <a:p>
+                      <a:pPr algn="l"/>
+                      <a:r>
+                        <a:rPr lang="en-US" dirty="0"/>
+                        <a:t>@</a:t>
+                      </a:r>
+                      <a:r>
+                        <a:rPr lang="en-US" dirty="0" err="1"/>
+                        <a:t>tag_name</a:t>
+                      </a:r>
+                      <a:r>
+                        <a:rPr lang="en-US" dirty="0"/>
+                        <a:t>(</a:t>
+                      </a:r>
+                      <a:r>
+                        <a:rPr lang="en-US" dirty="0" err="1"/>
+                        <a:t>Str</a:t>
+                      </a:r>
+                      <a:r>
+                        <a:rPr lang="en-US" dirty="0"/>
+                        <a:t>)</a:t>
+                      </a:r>
+                    </a:p>
+                  </a:txBody>
+                  <a:tcPr anchor="ctr"/>
+                </a:tc>
+                <a:extLst>
+                  <a:ext uri="{0D108BD9-81ED-4DB2-BD59-A6C34878D82A}">
+                    <a16:rowId xmlns:a16="http://schemas.microsoft.com/office/drawing/2014/main" val="2995859431"/>
+                  </a:ext>
+                </a:extLst>
+              </a:tr>
+              <a:tr h="3065930">
+                <a:tc>
+                  <a:txBody>
+                    <a:bodyPr/>
+                    <a:lstStyle/>
+                    <a:p>
+                      <a:pPr marL="285750" indent="-285750" algn="l">
+                        <a:buFontTx/>
+                        <a:buChar char="-"/>
+                      </a:pPr>
+                      <a:r>
+                        <a:rPr lang="en-US" dirty="0"/>
+                        <a:t>Initialize</a:t>
+                      </a:r>
+                    </a:p>
+                    <a:p>
+                      <a:pPr marL="285750" indent="-285750" algn="l">
+                        <a:buFontTx/>
+                        <a:buChar char="-"/>
+                      </a:pPr>
+                      <a:r>
+                        <a:rPr lang="en-US" dirty="0"/>
+                        <a:t>Save (to database)</a:t>
+                      </a:r>
+                    </a:p>
+                    <a:p>
+                      <a:pPr marL="285750" indent="-285750" algn="l">
+                        <a:buFontTx/>
+                        <a:buChar char="-"/>
+                      </a:pPr>
+                      <a:r>
+                        <a:rPr lang="en-US" dirty="0"/>
+                        <a:t>Self find</a:t>
+                      </a:r>
+                    </a:p>
+                    <a:p>
+                      <a:pPr marL="285750" indent="-285750" algn="l">
+                        <a:buFontTx/>
+                        <a:buChar char="-"/>
+                      </a:pPr>
+                      <a:r>
+                        <a:rPr lang="en-US" dirty="0"/>
+                        <a:t>Self all</a:t>
+                      </a:r>
+                    </a:p>
+                    <a:p>
+                      <a:pPr marL="285750" indent="-285750" algn="l">
+                        <a:buFontTx/>
+                        <a:buChar char="-"/>
+                      </a:pPr>
+                      <a:r>
+                        <a:rPr lang="en-US" dirty="0"/>
+                        <a:t>Self map items</a:t>
+                      </a:r>
+                    </a:p>
+                    <a:p>
+                      <a:pPr marL="285750" indent="-285750" algn="l">
+                        <a:buFontTx/>
+                        <a:buChar char="-"/>
+                      </a:pPr>
+                      <a:r>
+                        <a:rPr lang="en-US" dirty="0"/>
+                        <a:t>delete</a:t>
+                      </a:r>
+                    </a:p>
+                    <a:p>
+                      <a:pPr algn="ctr"/>
+                      <a:endParaRPr lang="en-US" dirty="0"/>
+                    </a:p>
+                  </a:txBody>
+                  <a:tcPr anchor="ctr"/>
+                </a:tc>
+                <a:extLst>
+                  <a:ext uri="{0D108BD9-81ED-4DB2-BD59-A6C34878D82A}">
+                    <a16:rowId xmlns:a16="http://schemas.microsoft.com/office/drawing/2014/main" val="2112490845"/>
+                  </a:ext>
+                </a:extLst>
+              </a:tr>
+            </a:tbl>
+          </a:graphicData>
+        </a:graphic>
+      </p:graphicFrame>
+      <p:graphicFrame>
+        <p:nvGraphicFramePr>
+          <p:cNvPr id="6" name="Table 5">
+            <a:extLst>
+              <a:ext uri="{FF2B5EF4-FFF2-40B4-BE49-F238E27FC236}">
+                <a16:creationId xmlns:a16="http://schemas.microsoft.com/office/drawing/2014/main" id="{E60E3F86-205D-C94E-8BFB-D187A2E5A87D}"/>
+              </a:ext>
+            </a:extLst>
+          </p:cNvPr>
+          <p:cNvGraphicFramePr>
+            <a:graphicFrameLocks noGrp="1"/>
+          </p:cNvGraphicFramePr>
+          <p:nvPr>
+            <p:extLst>
+              <p:ext uri="{D42A27DB-BD31-4B8C-83A1-F6EECF244321}">
+                <p14:modId xmlns:p14="http://schemas.microsoft.com/office/powerpoint/2010/main" val="3829048076"/>
+              </p:ext>
+            </p:extLst>
+          </p:nvPr>
+        </p:nvGraphicFramePr>
+        <p:xfrm>
+          <a:off x="5674657" y="464175"/>
+          <a:ext cx="3630706" cy="6344341"/>
+        </p:xfrm>
+        <a:graphic>
+          <a:graphicData uri="http://schemas.openxmlformats.org/drawingml/2006/table">
+            <a:tbl>
+              <a:tblPr firstRow="1" bandRow="1">
+                <a:tableStyleId>{5940675A-B579-460E-94D1-54222C63F5DA}</a:tableStyleId>
+              </a:tblPr>
+              <a:tblGrid>
+                <a:gridCol w="3630706">
+                  <a:extLst>
+                    <a:ext uri="{9D8B030D-6E8A-4147-A177-3AD203B41FA5}">
+                      <a16:colId xmlns:a16="http://schemas.microsoft.com/office/drawing/2014/main" val="4005843325"/>
+                    </a:ext>
+                  </a:extLst>
+                </a:gridCol>
+              </a:tblGrid>
+              <a:tr h="400741">
+                <a:tc>
+                  <a:txBody>
+                    <a:bodyPr/>
+                    <a:lstStyle/>
+                    <a:p>
+                      <a:pPr algn="ctr"/>
+                      <a:r>
+                        <a:rPr lang="en-US" dirty="0"/>
+                        <a:t>Transaction</a:t>
+                      </a:r>
+                    </a:p>
+                  </a:txBody>
+                  <a:tcPr anchor="ctr">
+                    <a:solidFill>
+                      <a:srgbClr val="D883FF"/>
+                    </a:solidFill>
+                  </a:tcPr>
+                </a:tc>
+                <a:extLst>
+                  <a:ext uri="{0D108BD9-81ED-4DB2-BD59-A6C34878D82A}">
+                    <a16:rowId xmlns:a16="http://schemas.microsoft.com/office/drawing/2014/main" val="4181850750"/>
+                  </a:ext>
+                </a:extLst>
+              </a:tr>
+              <a:tr h="2600733">
+                <a:tc>
+                  <a:txBody>
+                    <a:bodyPr/>
+                    <a:lstStyle/>
+                    <a:p>
+                      <a:r>
+                        <a:rPr lang="en-US" dirty="0"/>
+                        <a:t>@id</a:t>
+                      </a:r>
+                    </a:p>
+                    <a:p>
+                      <a:r>
+                        <a:rPr lang="en-US" dirty="0"/>
+                        <a:t>@amount(numeric)</a:t>
+                      </a:r>
+                    </a:p>
+                    <a:p>
+                      <a:r>
+                        <a:rPr lang="en-US" dirty="0"/>
+                        <a:t>@</a:t>
+                      </a:r>
+                      <a:r>
+                        <a:rPr lang="en-US" dirty="0" err="1"/>
+                        <a:t>merchant_id</a:t>
+                      </a:r>
+                      <a:endParaRPr lang="en-US" dirty="0"/>
+                    </a:p>
+                    <a:p>
+                      <a:r>
+                        <a:rPr lang="en-US" dirty="0"/>
+                        <a:t>@</a:t>
+                      </a:r>
+                      <a:r>
+                        <a:rPr lang="en-US" dirty="0" err="1"/>
+                        <a:t>tag_id</a:t>
+                      </a:r>
+                      <a:endParaRPr lang="en-US" dirty="0"/>
+                    </a:p>
+                    <a:p>
+                      <a:r>
+                        <a:rPr lang="en-US" dirty="0"/>
+                        <a:t>@essential(</a:t>
+                      </a:r>
+                      <a:r>
+                        <a:rPr lang="en-US" dirty="0" err="1"/>
+                        <a:t>Str</a:t>
+                      </a:r>
+                      <a:r>
+                        <a:rPr lang="en-US" dirty="0"/>
+                        <a:t>)</a:t>
+                      </a:r>
+                    </a:p>
+                    <a:p>
+                      <a:r>
+                        <a:rPr lang="en-US" dirty="0"/>
+                        <a:t>@time(numeric)</a:t>
+                      </a:r>
+                    </a:p>
+                    <a:p>
+                      <a:r>
+                        <a:rPr lang="en-US" dirty="0"/>
+                        <a:t>@day(</a:t>
+                      </a:r>
+                      <a:r>
+                        <a:rPr lang="en-US" dirty="0" err="1"/>
+                        <a:t>Int</a:t>
+                      </a:r>
+                      <a:r>
+                        <a:rPr lang="en-US" dirty="0"/>
+                        <a:t>)</a:t>
+                      </a:r>
+                    </a:p>
+                    <a:p>
+                      <a:r>
+                        <a:rPr lang="en-US" dirty="0"/>
+                        <a:t>@month(</a:t>
+                      </a:r>
+                      <a:r>
+                        <a:rPr lang="en-US" dirty="0" err="1"/>
+                        <a:t>Str</a:t>
+                      </a:r>
+                      <a:r>
+                        <a:rPr lang="en-US" dirty="0"/>
+                        <a:t>)</a:t>
+                      </a:r>
+                    </a:p>
+                    <a:p>
+                      <a:r>
+                        <a:rPr lang="en-US" dirty="0"/>
+                        <a:t>@</a:t>
+                      </a:r>
+                      <a:r>
+                        <a:rPr lang="en-US" dirty="0" err="1"/>
+                        <a:t>total_spent</a:t>
+                      </a:r>
+                      <a:r>
+                        <a:rPr lang="en-US" dirty="0"/>
+                        <a:t>(numeric)</a:t>
+                      </a:r>
+                    </a:p>
+                    <a:p>
+                      <a:r>
+                        <a:rPr lang="en-US" dirty="0"/>
+                        <a:t>@</a:t>
+                      </a:r>
+                      <a:r>
+                        <a:rPr lang="en-US" dirty="0" err="1"/>
+                        <a:t>remaining_budget</a:t>
+                      </a:r>
+                      <a:r>
+                        <a:rPr lang="en-US" dirty="0"/>
+                        <a:t>(numeric)</a:t>
+                      </a:r>
+                    </a:p>
+                  </a:txBody>
+                  <a:tcPr/>
+                </a:tc>
+                <a:extLst>
+                  <a:ext uri="{0D108BD9-81ED-4DB2-BD59-A6C34878D82A}">
+                    <a16:rowId xmlns:a16="http://schemas.microsoft.com/office/drawing/2014/main" val="2995859431"/>
+                  </a:ext>
+                </a:extLst>
+              </a:tr>
+              <a:tr h="1768047">
+                <a:tc>
+                  <a:txBody>
+                    <a:bodyPr/>
+                    <a:lstStyle/>
+                    <a:p>
+                      <a:pPr marL="285750" indent="-285750" algn="l">
+                        <a:buFontTx/>
+                        <a:buChar char="-"/>
+                      </a:pPr>
+                      <a:r>
+                        <a:rPr lang="en-US" dirty="0"/>
+                        <a:t>Initialize</a:t>
+                      </a:r>
+                    </a:p>
+                    <a:p>
+                      <a:pPr marL="285750" indent="-285750" algn="l">
+                        <a:buFontTx/>
+                        <a:buChar char="-"/>
+                      </a:pPr>
+                      <a:r>
+                        <a:rPr lang="en-US" dirty="0"/>
+                        <a:t>Get time/date now</a:t>
+                      </a:r>
+                    </a:p>
+                    <a:p>
+                      <a:pPr marL="285750" indent="-285750" algn="l">
+                        <a:buFontTx/>
+                        <a:buChar char="-"/>
+                      </a:pPr>
+                      <a:r>
+                        <a:rPr lang="en-US" dirty="0"/>
+                        <a:t>Split time/date to time/day/month</a:t>
+                      </a:r>
+                    </a:p>
+                    <a:p>
+                      <a:pPr marL="285750" indent="-285750" algn="l">
+                        <a:buFontTx/>
+                        <a:buChar char="-"/>
+                      </a:pPr>
+                      <a:r>
+                        <a:rPr lang="en-US" dirty="0"/>
+                        <a:t>Calculate total spent</a:t>
+                      </a:r>
+                    </a:p>
+                    <a:p>
+                      <a:pPr marL="285750" indent="-285750" algn="l">
+                        <a:buFontTx/>
+                        <a:buChar char="-"/>
+                      </a:pPr>
+                      <a:r>
+                        <a:rPr lang="en-US" dirty="0"/>
+                        <a:t>Calculate remaining budget</a:t>
+                      </a:r>
+                    </a:p>
+                    <a:p>
+                      <a:pPr marL="285750" indent="-285750" algn="l">
+                        <a:buFontTx/>
+                        <a:buChar char="-"/>
+                      </a:pPr>
+                      <a:r>
+                        <a:rPr lang="en-US" dirty="0"/>
+                        <a:t>Save (to database)</a:t>
+                      </a:r>
+                    </a:p>
+                    <a:p>
+                      <a:pPr marL="285750" indent="-285750" algn="l">
+                        <a:buFontTx/>
+                        <a:buChar char="-"/>
+                      </a:pPr>
+                      <a:r>
+                        <a:rPr lang="en-US" dirty="0"/>
+                        <a:t>Self find</a:t>
+                      </a:r>
+                    </a:p>
+                    <a:p>
+                      <a:pPr marL="285750" indent="-285750" algn="l">
+                        <a:buFontTx/>
+                        <a:buChar char="-"/>
+                      </a:pPr>
+                      <a:r>
+                        <a:rPr lang="en-US" dirty="0"/>
+                        <a:t>Self all</a:t>
+                      </a:r>
+                    </a:p>
+                    <a:p>
+                      <a:pPr marL="285750" indent="-285750" algn="l">
+                        <a:buFontTx/>
+                        <a:buChar char="-"/>
+                      </a:pPr>
+                      <a:r>
+                        <a:rPr lang="en-US" dirty="0"/>
+                        <a:t>Self map items</a:t>
+                      </a:r>
+                    </a:p>
+                    <a:p>
+                      <a:pPr marL="285750" indent="-285750" algn="l">
+                        <a:buFontTx/>
+                        <a:buChar char="-"/>
+                      </a:pPr>
+                      <a:r>
+                        <a:rPr lang="en-US" dirty="0"/>
+                        <a:t>delete</a:t>
+                      </a:r>
+                    </a:p>
+                  </a:txBody>
+                  <a:tcPr/>
+                </a:tc>
+                <a:extLst>
+                  <a:ext uri="{0D108BD9-81ED-4DB2-BD59-A6C34878D82A}">
+                    <a16:rowId xmlns:a16="http://schemas.microsoft.com/office/drawing/2014/main" val="2112490845"/>
+                  </a:ext>
+                </a:extLst>
+              </a:tr>
+            </a:tbl>
+          </a:graphicData>
+        </a:graphic>
+      </p:graphicFrame>
+      <p:graphicFrame>
+        <p:nvGraphicFramePr>
+          <p:cNvPr id="7" name="Table 6">
+            <a:extLst>
+              <a:ext uri="{FF2B5EF4-FFF2-40B4-BE49-F238E27FC236}">
+                <a16:creationId xmlns:a16="http://schemas.microsoft.com/office/drawing/2014/main" id="{4C2FB6E0-E161-F941-A854-5C5681E349B6}"/>
+              </a:ext>
+            </a:extLst>
+          </p:cNvPr>
+          <p:cNvGraphicFramePr>
+            <a:graphicFrameLocks noGrp="1"/>
+          </p:cNvGraphicFramePr>
+          <p:nvPr>
+            <p:extLst>
+              <p:ext uri="{D42A27DB-BD31-4B8C-83A1-F6EECF244321}">
+                <p14:modId xmlns:p14="http://schemas.microsoft.com/office/powerpoint/2010/main" val="1572713515"/>
+              </p:ext>
+            </p:extLst>
+          </p:nvPr>
+        </p:nvGraphicFramePr>
+        <p:xfrm>
+          <a:off x="9701303" y="464174"/>
+          <a:ext cx="2203824" cy="6337982"/>
+        </p:xfrm>
+        <a:graphic>
+          <a:graphicData uri="http://schemas.openxmlformats.org/drawingml/2006/table">
+            <a:tbl>
+              <a:tblPr firstRow="1" bandRow="1">
+                <a:tableStyleId>{5940675A-B579-460E-94D1-54222C63F5DA}</a:tableStyleId>
+              </a:tblPr>
+              <a:tblGrid>
+                <a:gridCol w="2203824">
+                  <a:extLst>
+                    <a:ext uri="{9D8B030D-6E8A-4147-A177-3AD203B41FA5}">
+                      <a16:colId xmlns:a16="http://schemas.microsoft.com/office/drawing/2014/main" val="4005843325"/>
+                    </a:ext>
+                  </a:extLst>
+                </a:gridCol>
+              </a:tblGrid>
+              <a:tr h="525733">
+                <a:tc>
+                  <a:txBody>
+                    <a:bodyPr/>
+                    <a:lstStyle/>
+                    <a:p>
+                      <a:pPr algn="ctr"/>
+                      <a:r>
+                        <a:rPr lang="en-US" dirty="0"/>
+                        <a:t>Budget</a:t>
+                      </a:r>
+                    </a:p>
+                  </a:txBody>
+                  <a:tcPr anchor="ctr">
+                    <a:solidFill>
+                      <a:srgbClr val="D883FF"/>
+                    </a:solidFill>
+                  </a:tcPr>
+                </a:tc>
+                <a:extLst>
+                  <a:ext uri="{0D108BD9-81ED-4DB2-BD59-A6C34878D82A}">
+                    <a16:rowId xmlns:a16="http://schemas.microsoft.com/office/drawing/2014/main" val="4181850750"/>
+                  </a:ext>
+                </a:extLst>
+              </a:tr>
+              <a:tr h="2787066">
+                <a:tc>
+                  <a:txBody>
+                    <a:bodyPr/>
+                    <a:lstStyle/>
+                    <a:p>
+                      <a:r>
+                        <a:rPr lang="en-US" dirty="0"/>
+                        <a:t>@id</a:t>
+                      </a:r>
+                    </a:p>
+                    <a:p>
+                      <a:r>
+                        <a:rPr lang="en-US" dirty="0"/>
+                        <a:t>@budget(numeric)</a:t>
+                      </a:r>
+                    </a:p>
+                  </a:txBody>
+                  <a:tcPr/>
+                </a:tc>
+                <a:extLst>
+                  <a:ext uri="{0D108BD9-81ED-4DB2-BD59-A6C34878D82A}">
+                    <a16:rowId xmlns:a16="http://schemas.microsoft.com/office/drawing/2014/main" val="2995859431"/>
+                  </a:ext>
+                </a:extLst>
+              </a:tr>
+              <a:tr h="3025183">
+                <a:tc>
+                  <a:txBody>
+                    <a:bodyPr/>
+                    <a:lstStyle/>
+                    <a:p>
+                      <a:pPr marL="285750" indent="-285750" algn="l">
+                        <a:buFontTx/>
+                        <a:buChar char="-"/>
+                      </a:pPr>
+                      <a:r>
+                        <a:rPr lang="en-US" dirty="0"/>
+                        <a:t>Initialize</a:t>
+                      </a:r>
+                    </a:p>
+                    <a:p>
+                      <a:pPr marL="285750" indent="-285750" algn="l">
+                        <a:buFontTx/>
+                        <a:buChar char="-"/>
+                      </a:pPr>
+                      <a:r>
+                        <a:rPr lang="en-US" dirty="0"/>
+                        <a:t>Edit</a:t>
+                      </a:r>
+                    </a:p>
+                    <a:p>
+                      <a:pPr marL="285750" indent="-285750" algn="l">
+                        <a:buFontTx/>
+                        <a:buChar char="-"/>
+                      </a:pPr>
+                      <a:r>
+                        <a:rPr lang="en-US" dirty="0"/>
+                        <a:t>delete</a:t>
+                      </a:r>
+                    </a:p>
+                    <a:p>
+                      <a:endParaRPr lang="en-US" dirty="0"/>
+                    </a:p>
+                  </a:txBody>
+                  <a:tcPr/>
+                </a:tc>
+                <a:extLst>
+                  <a:ext uri="{0D108BD9-81ED-4DB2-BD59-A6C34878D82A}">
+                    <a16:rowId xmlns:a16="http://schemas.microsoft.com/office/drawing/2014/main" val="2112490845"/>
+                  </a:ext>
+                </a:extLst>
+              </a:tr>
+            </a:tbl>
+          </a:graphicData>
+        </a:graphic>
+      </p:graphicFrame>
+    </p:spTree>
+    <p:extLst>
+      <p:ext uri="{BB962C8B-B14F-4D97-AF65-F5344CB8AC3E}">
+        <p14:creationId xmlns:p14="http://schemas.microsoft.com/office/powerpoint/2010/main" val="3918205902"/>
+      </p:ext>
+    </p:extLst>
+  </p:cSld>
+  <p:clrMapOvr>
+    <a:masterClrMapping/>
+  </p:clrMapOvr>
+</p:sld>
+</file>
+
+<file path=ppt/slides/slide11.xml><?xml version="1.0" encoding="utf-8"?>
+<p:sld xmlns:a="http://schemas.openxmlformats.org/drawingml/2006/main" xmlns:r="http://schemas.openxmlformats.org/officeDocument/2006/relationships" xmlns:p="http://schemas.openxmlformats.org/presentationml/2006/main">
+  <p:cSld>
+    <p:spTree>
+      <p:nvGrpSpPr>
+        <p:cNvPr id="1" name=""/>
+        <p:cNvGrpSpPr/>
+        <p:nvPr/>
+      </p:nvGrpSpPr>
+      <p:grpSpPr>
+        <a:xfrm>
+          <a:off x="0" y="0"/>
+          <a:ext cx="0" cy="0"/>
+          <a:chOff x="0" y="0"/>
+          <a:chExt cx="0" cy="0"/>
+        </a:xfrm>
+      </p:grpSpPr>
+      <p:sp>
+        <p:nvSpPr>
+          <p:cNvPr id="2" name="Title 1">
+            <a:extLst>
+              <a:ext uri="{FF2B5EF4-FFF2-40B4-BE49-F238E27FC236}">
                 <a16:creationId xmlns:a16="http://schemas.microsoft.com/office/drawing/2014/main" id="{A16D7152-63CD-AE49-A278-B4ED5AC7ED07}"/>
               </a:ext>
             </a:extLst>
@@ -4477,7 +5368,851 @@
 </p:sld>
 </file>
 
+<file path=ppt/slides/slide12.xml><?xml version="1.0" encoding="utf-8"?>
+<p:sld xmlns:a="http://schemas.openxmlformats.org/drawingml/2006/main" xmlns:r="http://schemas.openxmlformats.org/officeDocument/2006/relationships" xmlns:p="http://schemas.openxmlformats.org/presentationml/2006/main">
+  <p:cSld>
+    <p:spTree>
+      <p:nvGrpSpPr>
+        <p:cNvPr id="1" name=""/>
+        <p:cNvGrpSpPr/>
+        <p:nvPr/>
+      </p:nvGrpSpPr>
+      <p:grpSpPr>
+        <a:xfrm>
+          <a:off x="0" y="0"/>
+          <a:ext cx="0" cy="0"/>
+          <a:chOff x="0" y="0"/>
+          <a:chExt cx="0" cy="0"/>
+        </a:xfrm>
+      </p:grpSpPr>
+      <p:sp>
+        <p:nvSpPr>
+          <p:cNvPr id="2" name="Title 1">
+            <a:extLst>
+              <a:ext uri="{FF2B5EF4-FFF2-40B4-BE49-F238E27FC236}">
+                <a16:creationId xmlns:a16="http://schemas.microsoft.com/office/drawing/2014/main" id="{76D7CAB5-A4EF-7B43-BD1B-F0A73C0FAF29}"/>
+              </a:ext>
+            </a:extLst>
+          </p:cNvPr>
+          <p:cNvSpPr>
+            <a:spLocks noGrp="1"/>
+          </p:cNvSpPr>
+          <p:nvPr>
+            <p:ph type="title"/>
+          </p:nvPr>
+        </p:nvSpPr>
+        <p:spPr>
+          <a:xfrm>
+            <a:off x="838200" y="365125"/>
+            <a:ext cx="10515600" cy="266887"/>
+          </a:xfrm>
+        </p:spPr>
+        <p:txBody>
+          <a:bodyPr>
+            <a:normAutofit fontScale="90000"/>
+          </a:bodyPr>
+          <a:lstStyle/>
+          <a:p>
+            <a:pPr algn="ctr"/>
+            <a:r>
+              <a:rPr lang="en-US" sz="2800" b="1" dirty="0"/>
+              <a:t>Function rationale</a:t>
+            </a:r>
+          </a:p>
+        </p:txBody>
+      </p:sp>
+      <p:graphicFrame>
+        <p:nvGraphicFramePr>
+          <p:cNvPr id="4" name="Table 3">
+            <a:extLst>
+              <a:ext uri="{FF2B5EF4-FFF2-40B4-BE49-F238E27FC236}">
+                <a16:creationId xmlns:a16="http://schemas.microsoft.com/office/drawing/2014/main" id="{AA02A76F-4B68-E947-809B-4E0F1064ECFE}"/>
+              </a:ext>
+            </a:extLst>
+          </p:cNvPr>
+          <p:cNvGraphicFramePr>
+            <a:graphicFrameLocks noGrp="1"/>
+          </p:cNvGraphicFramePr>
+          <p:nvPr>
+            <p:extLst>
+              <p:ext uri="{D42A27DB-BD31-4B8C-83A1-F6EECF244321}">
+                <p14:modId xmlns:p14="http://schemas.microsoft.com/office/powerpoint/2010/main" val="1348953"/>
+              </p:ext>
+            </p:extLst>
+          </p:nvPr>
+        </p:nvGraphicFramePr>
+        <p:xfrm>
+          <a:off x="85165" y="765885"/>
+          <a:ext cx="12021670" cy="4226560"/>
+        </p:xfrm>
+        <a:graphic>
+          <a:graphicData uri="http://schemas.openxmlformats.org/drawingml/2006/table">
+            <a:tbl>
+              <a:tblPr firstRow="1" bandRow="1">
+                <a:tableStyleId>{5940675A-B579-460E-94D1-54222C63F5DA}</a:tableStyleId>
+              </a:tblPr>
+              <a:tblGrid>
+                <a:gridCol w="1259541">
+                  <a:extLst>
+                    <a:ext uri="{9D8B030D-6E8A-4147-A177-3AD203B41FA5}">
+                      <a16:colId xmlns:a16="http://schemas.microsoft.com/office/drawing/2014/main" val="3310124708"/>
+                    </a:ext>
+                  </a:extLst>
+                </a:gridCol>
+                <a:gridCol w="1761565">
+                  <a:extLst>
+                    <a:ext uri="{9D8B030D-6E8A-4147-A177-3AD203B41FA5}">
+                      <a16:colId xmlns:a16="http://schemas.microsoft.com/office/drawing/2014/main" val="1695059105"/>
+                    </a:ext>
+                  </a:extLst>
+                </a:gridCol>
+                <a:gridCol w="3482788">
+                  <a:extLst>
+                    <a:ext uri="{9D8B030D-6E8A-4147-A177-3AD203B41FA5}">
+                      <a16:colId xmlns:a16="http://schemas.microsoft.com/office/drawing/2014/main" val="2644020309"/>
+                    </a:ext>
+                  </a:extLst>
+                </a:gridCol>
+                <a:gridCol w="3113442">
+                  <a:extLst>
+                    <a:ext uri="{9D8B030D-6E8A-4147-A177-3AD203B41FA5}">
+                      <a16:colId xmlns:a16="http://schemas.microsoft.com/office/drawing/2014/main" val="3698080099"/>
+                    </a:ext>
+                  </a:extLst>
+                </a:gridCol>
+                <a:gridCol w="2404334">
+                  <a:extLst>
+                    <a:ext uri="{9D8B030D-6E8A-4147-A177-3AD203B41FA5}">
+                      <a16:colId xmlns:a16="http://schemas.microsoft.com/office/drawing/2014/main" val="358479963"/>
+                    </a:ext>
+                  </a:extLst>
+                </a:gridCol>
+              </a:tblGrid>
+              <a:tr h="370840">
+                <a:tc>
+                  <a:txBody>
+                    <a:bodyPr/>
+                    <a:lstStyle/>
+                    <a:p>
+                      <a:pPr algn="ctr"/>
+                      <a:r>
+                        <a:rPr lang="en-US" b="1" dirty="0"/>
+                        <a:t>Class</a:t>
+                      </a:r>
+                    </a:p>
+                  </a:txBody>
+                  <a:tcPr/>
+                </a:tc>
+                <a:tc>
+                  <a:txBody>
+                    <a:bodyPr/>
+                    <a:lstStyle/>
+                    <a:p>
+                      <a:pPr algn="ctr"/>
+                      <a:r>
+                        <a:rPr lang="en-US" b="1" dirty="0"/>
+                        <a:t>Function Name</a:t>
+                      </a:r>
+                    </a:p>
+                  </a:txBody>
+                  <a:tcPr/>
+                </a:tc>
+                <a:tc>
+                  <a:txBody>
+                    <a:bodyPr/>
+                    <a:lstStyle/>
+                    <a:p>
+                      <a:pPr algn="ctr"/>
+                      <a:r>
+                        <a:rPr lang="en-US" b="1" dirty="0"/>
+                        <a:t>Why?</a:t>
+                      </a:r>
+                    </a:p>
+                  </a:txBody>
+                  <a:tcPr/>
+                </a:tc>
+                <a:tc>
+                  <a:txBody>
+                    <a:bodyPr/>
+                    <a:lstStyle/>
+                    <a:p>
+                      <a:pPr algn="ctr"/>
+                      <a:r>
+                        <a:rPr lang="en-US" b="1" dirty="0"/>
+                        <a:t>How?</a:t>
+                      </a:r>
+                    </a:p>
+                  </a:txBody>
+                  <a:tcPr/>
+                </a:tc>
+                <a:tc>
+                  <a:txBody>
+                    <a:bodyPr/>
+                    <a:lstStyle/>
+                    <a:p>
+                      <a:pPr algn="ctr"/>
+                      <a:r>
+                        <a:rPr lang="en-US" b="1" dirty="0"/>
+                        <a:t>Returning</a:t>
+                      </a:r>
+                    </a:p>
+                  </a:txBody>
+                  <a:tcPr/>
+                </a:tc>
+                <a:extLst>
+                  <a:ext uri="{0D108BD9-81ED-4DB2-BD59-A6C34878D82A}">
+                    <a16:rowId xmlns:a16="http://schemas.microsoft.com/office/drawing/2014/main" val="4165366467"/>
+                  </a:ext>
+                </a:extLst>
+              </a:tr>
+              <a:tr h="370840">
+                <a:tc>
+                  <a:txBody>
+                    <a:bodyPr/>
+                    <a:lstStyle/>
+                    <a:p>
+                      <a:r>
+                        <a:rPr lang="en-US" dirty="0"/>
+                        <a:t>Merchant</a:t>
+                      </a:r>
+                    </a:p>
+                  </a:txBody>
+                  <a:tcPr anchor="ctr"/>
+                </a:tc>
+                <a:tc>
+                  <a:txBody>
+                    <a:bodyPr/>
+                    <a:lstStyle/>
+                    <a:p>
+                      <a:r>
+                        <a:rPr lang="en-US" dirty="0"/>
+                        <a:t>.save </a:t>
+                      </a:r>
+                      <a:r>
+                        <a:rPr lang="en-US" b="1" dirty="0"/>
+                        <a:t>C</a:t>
+                      </a:r>
+                      <a:endParaRPr lang="en-US" dirty="0"/>
+                    </a:p>
+                  </a:txBody>
+                  <a:tcPr anchor="ctr"/>
+                </a:tc>
+                <a:tc>
+                  <a:txBody>
+                    <a:bodyPr/>
+                    <a:lstStyle/>
+                    <a:p>
+                      <a:r>
+                        <a:rPr lang="en-US" dirty="0"/>
+                        <a:t>New merchants need to be added to database</a:t>
+                      </a:r>
+                    </a:p>
+                  </a:txBody>
+                  <a:tcPr anchor="ctr"/>
+                </a:tc>
+                <a:tc>
+                  <a:txBody>
+                    <a:bodyPr/>
+                    <a:lstStyle/>
+                    <a:p>
+                      <a:r>
+                        <a:rPr lang="en-US" dirty="0"/>
+                        <a:t>Insert a new merchant with a name into the merchants table</a:t>
+                      </a:r>
+                    </a:p>
+                  </a:txBody>
+                  <a:tcPr anchor="ctr"/>
+                </a:tc>
+                <a:tc>
+                  <a:txBody>
+                    <a:bodyPr/>
+                    <a:lstStyle/>
+                    <a:p>
+                      <a:r>
+                        <a:rPr lang="en-US" dirty="0"/>
+                        <a:t>Database assigns id and returns it</a:t>
+                      </a:r>
+                    </a:p>
+                  </a:txBody>
+                  <a:tcPr anchor="ctr"/>
+                </a:tc>
+                <a:extLst>
+                  <a:ext uri="{0D108BD9-81ED-4DB2-BD59-A6C34878D82A}">
+                    <a16:rowId xmlns:a16="http://schemas.microsoft.com/office/drawing/2014/main" val="1323884526"/>
+                  </a:ext>
+                </a:extLst>
+              </a:tr>
+              <a:tr h="370840">
+                <a:tc>
+                  <a:txBody>
+                    <a:bodyPr/>
+                    <a:lstStyle/>
+                    <a:p>
+                      <a:r>
+                        <a:rPr lang="en-US" dirty="0"/>
+                        <a:t>Merchant</a:t>
+                      </a:r>
+                    </a:p>
+                  </a:txBody>
+                  <a:tcPr anchor="ctr"/>
+                </a:tc>
+                <a:tc>
+                  <a:txBody>
+                    <a:bodyPr/>
+                    <a:lstStyle/>
+                    <a:p>
+                      <a:r>
+                        <a:rPr lang="en-US" dirty="0" err="1"/>
+                        <a:t>Self.find</a:t>
+                      </a:r>
+                      <a:r>
+                        <a:rPr lang="en-US" dirty="0"/>
+                        <a:t> </a:t>
+                      </a:r>
+                      <a:r>
+                        <a:rPr lang="en-US" b="1" dirty="0"/>
+                        <a:t>R</a:t>
+                      </a:r>
+                      <a:endParaRPr lang="en-US" dirty="0"/>
+                    </a:p>
+                  </a:txBody>
+                  <a:tcPr anchor="ctr"/>
+                </a:tc>
+                <a:tc>
+                  <a:txBody>
+                    <a:bodyPr/>
+                    <a:lstStyle/>
+                    <a:p>
+                      <a:r>
+                        <a:rPr lang="en-US" dirty="0"/>
+                        <a:t>Merchants will need to be found and selected to </a:t>
+                      </a:r>
+                    </a:p>
+                    <a:p>
+                      <a:pPr marL="285750" indent="-285750">
+                        <a:buFont typeface="Arial" panose="020B0604020202020204" pitchFamily="34" charset="0"/>
+                        <a:buChar char="•"/>
+                      </a:pPr>
+                      <a:r>
+                        <a:rPr lang="en-US" dirty="0"/>
+                        <a:t>Identify merchants to be edited</a:t>
+                      </a:r>
+                    </a:p>
+                    <a:p>
+                      <a:pPr marL="285750" indent="-285750">
+                        <a:buFont typeface="Arial" panose="020B0604020202020204" pitchFamily="34" charset="0"/>
+                        <a:buChar char="•"/>
+                      </a:pPr>
+                      <a:r>
+                        <a:rPr lang="en-US" dirty="0"/>
+                        <a:t>Filter displayed table by merchants</a:t>
+                      </a:r>
+                    </a:p>
+                  </a:txBody>
+                  <a:tcPr anchor="ctr"/>
+                </a:tc>
+                <a:tc>
+                  <a:txBody>
+                    <a:bodyPr/>
+                    <a:lstStyle/>
+                    <a:p>
+                      <a:r>
+                        <a:rPr lang="en-US" dirty="0"/>
+                        <a:t>Takes in an id and searches the merchants table for all merchants with that id</a:t>
+                      </a:r>
+                    </a:p>
+                  </a:txBody>
+                  <a:tcPr anchor="ctr"/>
+                </a:tc>
+                <a:tc>
+                  <a:txBody>
+                    <a:bodyPr/>
+                    <a:lstStyle/>
+                    <a:p>
+                      <a:r>
+                        <a:rPr lang="en-US" dirty="0"/>
+                        <a:t>The first matching merchant</a:t>
+                      </a:r>
+                    </a:p>
+                  </a:txBody>
+                  <a:tcPr anchor="ctr"/>
+                </a:tc>
+                <a:extLst>
+                  <a:ext uri="{0D108BD9-81ED-4DB2-BD59-A6C34878D82A}">
+                    <a16:rowId xmlns:a16="http://schemas.microsoft.com/office/drawing/2014/main" val="2731388846"/>
+                  </a:ext>
+                </a:extLst>
+              </a:tr>
+              <a:tr h="370840">
+                <a:tc>
+                  <a:txBody>
+                    <a:bodyPr/>
+                    <a:lstStyle/>
+                    <a:p>
+                      <a:r>
+                        <a:rPr lang="en-US" dirty="0"/>
+                        <a:t>Merchant</a:t>
+                      </a:r>
+                    </a:p>
+                  </a:txBody>
+                  <a:tcPr/>
+                </a:tc>
+                <a:tc>
+                  <a:txBody>
+                    <a:bodyPr/>
+                    <a:lstStyle/>
+                    <a:p>
+                      <a:r>
+                        <a:rPr lang="en-US" dirty="0" err="1"/>
+                        <a:t>Self.all</a:t>
+                      </a:r>
+                      <a:r>
+                        <a:rPr lang="en-US" dirty="0"/>
+                        <a:t> </a:t>
+                      </a:r>
+                      <a:r>
+                        <a:rPr lang="en-US" b="1" dirty="0"/>
+                        <a:t>R</a:t>
+                      </a:r>
+                      <a:endParaRPr lang="en-US" dirty="0"/>
+                    </a:p>
+                  </a:txBody>
+                  <a:tcPr/>
+                </a:tc>
+                <a:tc>
+                  <a:txBody>
+                    <a:bodyPr/>
+                    <a:lstStyle/>
+                    <a:p>
+                      <a:r>
+                        <a:rPr lang="en-US" dirty="0"/>
+                        <a:t>My Merchants page will need to show a list of all existing merchants</a:t>
+                      </a:r>
+                    </a:p>
+                  </a:txBody>
+                  <a:tcPr/>
+                </a:tc>
+                <a:tc>
+                  <a:txBody>
+                    <a:bodyPr/>
+                    <a:lstStyle/>
+                    <a:p>
+                      <a:r>
+                        <a:rPr lang="en-US" dirty="0"/>
+                        <a:t>Selects all merchants in merchants table</a:t>
+                      </a:r>
+                    </a:p>
+                  </a:txBody>
+                  <a:tcPr/>
+                </a:tc>
+                <a:tc>
+                  <a:txBody>
+                    <a:bodyPr/>
+                    <a:lstStyle/>
+                    <a:p>
+                      <a:r>
+                        <a:rPr lang="en-US" dirty="0"/>
+                        <a:t>Full list of merchants in merchants table</a:t>
+                      </a:r>
+                    </a:p>
+                  </a:txBody>
+                  <a:tcPr/>
+                </a:tc>
+                <a:extLst>
+                  <a:ext uri="{0D108BD9-81ED-4DB2-BD59-A6C34878D82A}">
+                    <a16:rowId xmlns:a16="http://schemas.microsoft.com/office/drawing/2014/main" val="3831984839"/>
+                  </a:ext>
+                </a:extLst>
+              </a:tr>
+              <a:tr h="370840">
+                <a:tc>
+                  <a:txBody>
+                    <a:bodyPr/>
+                    <a:lstStyle/>
+                    <a:p>
+                      <a:r>
+                        <a:rPr lang="en-US" dirty="0"/>
+                        <a:t>Merchant</a:t>
+                      </a:r>
+                    </a:p>
+                  </a:txBody>
+                  <a:tcPr/>
+                </a:tc>
+                <a:tc>
+                  <a:txBody>
+                    <a:bodyPr/>
+                    <a:lstStyle/>
+                    <a:p>
+                      <a:endParaRPr lang="en-US" dirty="0"/>
+                    </a:p>
+                  </a:txBody>
+                  <a:tcPr/>
+                </a:tc>
+                <a:tc>
+                  <a:txBody>
+                    <a:bodyPr/>
+                    <a:lstStyle/>
+                    <a:p>
+                      <a:endParaRPr lang="en-US"/>
+                    </a:p>
+                  </a:txBody>
+                  <a:tcPr/>
+                </a:tc>
+                <a:tc>
+                  <a:txBody>
+                    <a:bodyPr/>
+                    <a:lstStyle/>
+                    <a:p>
+                      <a:endParaRPr lang="en-US"/>
+                    </a:p>
+                  </a:txBody>
+                  <a:tcPr/>
+                </a:tc>
+                <a:tc>
+                  <a:txBody>
+                    <a:bodyPr/>
+                    <a:lstStyle/>
+                    <a:p>
+                      <a:endParaRPr lang="en-US"/>
+                    </a:p>
+                  </a:txBody>
+                  <a:tcPr/>
+                </a:tc>
+                <a:extLst>
+                  <a:ext uri="{0D108BD9-81ED-4DB2-BD59-A6C34878D82A}">
+                    <a16:rowId xmlns:a16="http://schemas.microsoft.com/office/drawing/2014/main" val="1081334054"/>
+                  </a:ext>
+                </a:extLst>
+              </a:tr>
+              <a:tr h="370840">
+                <a:tc>
+                  <a:txBody>
+                    <a:bodyPr/>
+                    <a:lstStyle/>
+                    <a:p>
+                      <a:endParaRPr lang="en-US"/>
+                    </a:p>
+                  </a:txBody>
+                  <a:tcPr/>
+                </a:tc>
+                <a:tc>
+                  <a:txBody>
+                    <a:bodyPr/>
+                    <a:lstStyle/>
+                    <a:p>
+                      <a:endParaRPr lang="en-US"/>
+                    </a:p>
+                  </a:txBody>
+                  <a:tcPr/>
+                </a:tc>
+                <a:tc>
+                  <a:txBody>
+                    <a:bodyPr/>
+                    <a:lstStyle/>
+                    <a:p>
+                      <a:endParaRPr lang="en-US"/>
+                    </a:p>
+                  </a:txBody>
+                  <a:tcPr/>
+                </a:tc>
+                <a:tc>
+                  <a:txBody>
+                    <a:bodyPr/>
+                    <a:lstStyle/>
+                    <a:p>
+                      <a:endParaRPr lang="en-US"/>
+                    </a:p>
+                  </a:txBody>
+                  <a:tcPr/>
+                </a:tc>
+                <a:tc>
+                  <a:txBody>
+                    <a:bodyPr/>
+                    <a:lstStyle/>
+                    <a:p>
+                      <a:endParaRPr lang="en-US"/>
+                    </a:p>
+                  </a:txBody>
+                  <a:tcPr/>
+                </a:tc>
+                <a:extLst>
+                  <a:ext uri="{0D108BD9-81ED-4DB2-BD59-A6C34878D82A}">
+                    <a16:rowId xmlns:a16="http://schemas.microsoft.com/office/drawing/2014/main" val="2432464653"/>
+                  </a:ext>
+                </a:extLst>
+              </a:tr>
+              <a:tr h="370840">
+                <a:tc>
+                  <a:txBody>
+                    <a:bodyPr/>
+                    <a:lstStyle/>
+                    <a:p>
+                      <a:endParaRPr lang="en-US"/>
+                    </a:p>
+                  </a:txBody>
+                  <a:tcPr/>
+                </a:tc>
+                <a:tc>
+                  <a:txBody>
+                    <a:bodyPr/>
+                    <a:lstStyle/>
+                    <a:p>
+                      <a:endParaRPr lang="en-US"/>
+                    </a:p>
+                  </a:txBody>
+                  <a:tcPr/>
+                </a:tc>
+                <a:tc>
+                  <a:txBody>
+                    <a:bodyPr/>
+                    <a:lstStyle/>
+                    <a:p>
+                      <a:endParaRPr lang="en-US"/>
+                    </a:p>
+                  </a:txBody>
+                  <a:tcPr/>
+                </a:tc>
+                <a:tc>
+                  <a:txBody>
+                    <a:bodyPr/>
+                    <a:lstStyle/>
+                    <a:p>
+                      <a:endParaRPr lang="en-US" dirty="0"/>
+                    </a:p>
+                  </a:txBody>
+                  <a:tcPr/>
+                </a:tc>
+                <a:tc>
+                  <a:txBody>
+                    <a:bodyPr/>
+                    <a:lstStyle/>
+                    <a:p>
+                      <a:endParaRPr lang="en-US" dirty="0"/>
+                    </a:p>
+                  </a:txBody>
+                  <a:tcPr/>
+                </a:tc>
+                <a:extLst>
+                  <a:ext uri="{0D108BD9-81ED-4DB2-BD59-A6C34878D82A}">
+                    <a16:rowId xmlns:a16="http://schemas.microsoft.com/office/drawing/2014/main" val="4233394324"/>
+                  </a:ext>
+                </a:extLst>
+              </a:tr>
+            </a:tbl>
+          </a:graphicData>
+        </a:graphic>
+      </p:graphicFrame>
+    </p:spTree>
+    <p:extLst>
+      <p:ext uri="{BB962C8B-B14F-4D97-AF65-F5344CB8AC3E}">
+        <p14:creationId xmlns:p14="http://schemas.microsoft.com/office/powerpoint/2010/main" val="3728071061"/>
+      </p:ext>
+    </p:extLst>
+  </p:cSld>
+  <p:clrMapOvr>
+    <a:masterClrMapping/>
+  </p:clrMapOvr>
+</p:sld>
+</file>
+
 <file path=ppt/slides/slide2.xml><?xml version="1.0" encoding="utf-8"?>
+<p:sld xmlns:a="http://schemas.openxmlformats.org/drawingml/2006/main" xmlns:r="http://schemas.openxmlformats.org/officeDocument/2006/relationships" xmlns:p="http://schemas.openxmlformats.org/presentationml/2006/main">
+  <p:cSld>
+    <p:spTree>
+      <p:nvGrpSpPr>
+        <p:cNvPr id="1" name=""/>
+        <p:cNvGrpSpPr/>
+        <p:nvPr/>
+      </p:nvGrpSpPr>
+      <p:grpSpPr>
+        <a:xfrm>
+          <a:off x="0" y="0"/>
+          <a:ext cx="0" cy="0"/>
+          <a:chOff x="0" y="0"/>
+          <a:chExt cx="0" cy="0"/>
+        </a:xfrm>
+      </p:grpSpPr>
+      <p:sp>
+        <p:nvSpPr>
+          <p:cNvPr id="3" name="Content Placeholder 2">
+            <a:extLst>
+              <a:ext uri="{FF2B5EF4-FFF2-40B4-BE49-F238E27FC236}">
+                <a16:creationId xmlns:a16="http://schemas.microsoft.com/office/drawing/2014/main" id="{D52E2655-CF68-0C4E-9D77-867C12AB5CF6}"/>
+              </a:ext>
+            </a:extLst>
+          </p:cNvPr>
+          <p:cNvSpPr>
+            <a:spLocks noGrp="1"/>
+          </p:cNvSpPr>
+          <p:nvPr>
+            <p:ph idx="1"/>
+          </p:nvPr>
+        </p:nvSpPr>
+        <p:spPr>
+          <a:xfrm>
+            <a:off x="838200" y="188259"/>
+            <a:ext cx="10515600" cy="6575612"/>
+          </a:xfrm>
+        </p:spPr>
+        <p:txBody>
+          <a:bodyPr>
+            <a:normAutofit fontScale="77500" lnSpcReduction="20000"/>
+          </a:bodyPr>
+          <a:lstStyle/>
+          <a:p>
+            <a:pPr marL="0" indent="0">
+              <a:buNone/>
+            </a:pPr>
+            <a:r>
+              <a:rPr lang="en-GB" b="1" dirty="0"/>
+              <a:t>Spending Tracker</a:t>
+            </a:r>
+          </a:p>
+          <a:p>
+            <a:pPr marL="0" indent="0">
+              <a:buNone/>
+            </a:pPr>
+            <a:endParaRPr lang="en-GB" b="1" dirty="0"/>
+          </a:p>
+          <a:p>
+            <a:pPr marL="0" indent="0">
+              <a:buNone/>
+            </a:pPr>
+            <a:r>
+              <a:rPr lang="en-GB" dirty="0"/>
+              <a:t>Build an app that allows a user to track their spending.</a:t>
+            </a:r>
+          </a:p>
+          <a:p>
+            <a:pPr marL="0" indent="0">
+              <a:buNone/>
+            </a:pPr>
+            <a:r>
+              <a:rPr lang="en-GB" b="1" dirty="0"/>
+              <a:t>MVP</a:t>
+            </a:r>
+          </a:p>
+          <a:p>
+            <a:pPr lvl="1"/>
+            <a:r>
+              <a:rPr lang="en-GB" dirty="0"/>
+              <a:t>The app should allow the user to create, edit and delete merchants, e.g. Tesco, Amazon, </a:t>
+            </a:r>
+            <a:r>
+              <a:rPr lang="en-GB" dirty="0" err="1"/>
+              <a:t>ScotRail</a:t>
+            </a:r>
+            <a:endParaRPr lang="en-GB" dirty="0"/>
+          </a:p>
+          <a:p>
+            <a:pPr lvl="1"/>
+            <a:r>
+              <a:rPr lang="en-GB" dirty="0"/>
+              <a:t>The app should allow the user to create, edit and delete tags for their spending, e.g. groceries, entertainment, transport</a:t>
+            </a:r>
+          </a:p>
+          <a:p>
+            <a:pPr lvl="1"/>
+            <a:r>
+              <a:rPr lang="en-GB" dirty="0"/>
+              <a:t>The user should be able to assign tags and merchants to a transaction, as well as an amount spent on each transaction.</a:t>
+            </a:r>
+          </a:p>
+          <a:p>
+            <a:pPr lvl="1"/>
+            <a:r>
+              <a:rPr lang="en-GB" dirty="0"/>
+              <a:t>The app should display all the transactions a user has made in a single view, with each transaction's amount, merchant and tag, and a total for all transactions.</a:t>
+            </a:r>
+          </a:p>
+          <a:p>
+            <a:pPr marL="457200" lvl="1" indent="0">
+              <a:buNone/>
+            </a:pPr>
+            <a:endParaRPr lang="en-GB" dirty="0"/>
+          </a:p>
+          <a:p>
+            <a:pPr marL="0" indent="0">
+              <a:buNone/>
+            </a:pPr>
+            <a:r>
+              <a:rPr lang="en-GB" b="1" dirty="0"/>
+              <a:t>Inspired by:</a:t>
+            </a:r>
+          </a:p>
+          <a:p>
+            <a:pPr marL="0" indent="0">
+              <a:buNone/>
+            </a:pPr>
+            <a:r>
+              <a:rPr lang="en-GB" dirty="0" err="1"/>
+              <a:t>Monzo</a:t>
+            </a:r>
+            <a:r>
+              <a:rPr lang="en-GB" dirty="0"/>
+              <a:t>, </a:t>
+            </a:r>
+            <a:r>
+              <a:rPr lang="en-GB" dirty="0" err="1"/>
+              <a:t>MoneyDashboard</a:t>
+            </a:r>
+            <a:r>
+              <a:rPr lang="en-GB" dirty="0"/>
+              <a:t>, lots of mobile/online banking apps</a:t>
+            </a:r>
+          </a:p>
+          <a:p>
+            <a:pPr marL="0" indent="0">
+              <a:buNone/>
+            </a:pPr>
+            <a:endParaRPr lang="en-GB" dirty="0"/>
+          </a:p>
+          <a:p>
+            <a:pPr marL="0" indent="0">
+              <a:buNone/>
+            </a:pPr>
+            <a:r>
+              <a:rPr lang="en-GB" b="1" dirty="0"/>
+              <a:t>Possible Extensions</a:t>
+            </a:r>
+          </a:p>
+          <a:p>
+            <a:pPr lvl="1"/>
+            <a:r>
+              <a:rPr lang="en-GB" dirty="0"/>
+              <a:t>Transactions should have a timestamp, and the user should be able to view transactions sorted by the time they took place.</a:t>
+            </a:r>
+          </a:p>
+          <a:p>
+            <a:pPr lvl="1"/>
+            <a:r>
+              <a:rPr lang="en-GB" dirty="0"/>
+              <a:t>The user should be able to supply a budget, and the app should alert the user somehow when when they are nearing this budget or have gone over it.</a:t>
+            </a:r>
+          </a:p>
+          <a:p>
+            <a:pPr lvl="1"/>
+            <a:r>
+              <a:rPr lang="en-GB" dirty="0"/>
+              <a:t>The user should be able to filter their view of transactions, for example, to view all transactions in a given month, or view all spending on groceries.</a:t>
+            </a:r>
+          </a:p>
+        </p:txBody>
+      </p:sp>
+    </p:spTree>
+    <p:extLst>
+      <p:ext uri="{BB962C8B-B14F-4D97-AF65-F5344CB8AC3E}">
+        <p14:creationId xmlns:p14="http://schemas.microsoft.com/office/powerpoint/2010/main" val="1324376685"/>
+      </p:ext>
+    </p:extLst>
+  </p:cSld>
+  <p:clrMapOvr>
+    <a:masterClrMapping/>
+  </p:clrMapOvr>
+</p:sld>
+</file>
+
+<file path=ppt/slides/slide3.xml><?xml version="1.0" encoding="utf-8"?>
 <p:sld xmlns:a="http://schemas.openxmlformats.org/drawingml/2006/main" xmlns:r="http://schemas.openxmlformats.org/officeDocument/2006/relationships" xmlns:p="http://schemas.openxmlformats.org/presentationml/2006/main">
   <p:cSld>
     <p:spTree>
@@ -7005,7 +8740,7 @@
 </p:sld>
 </file>
 
-<file path=ppt/slides/slide3.xml><?xml version="1.0" encoding="utf-8"?>
+<file path=ppt/slides/slide4.xml><?xml version="1.0" encoding="utf-8"?>
 <p:sld xmlns:a="http://schemas.openxmlformats.org/drawingml/2006/main" xmlns:r="http://schemas.openxmlformats.org/officeDocument/2006/relationships" xmlns:p="http://schemas.openxmlformats.org/presentationml/2006/main">
   <p:cSld>
     <p:spTree>
@@ -8551,7 +10286,7 @@
 </p:sld>
 </file>
 
-<file path=ppt/slides/slide4.xml><?xml version="1.0" encoding="utf-8"?>
+<file path=ppt/slides/slide5.xml><?xml version="1.0" encoding="utf-8"?>
 <p:sld xmlns:a="http://schemas.openxmlformats.org/drawingml/2006/main" xmlns:r="http://schemas.openxmlformats.org/officeDocument/2006/relationships" xmlns:p="http://schemas.openxmlformats.org/presentationml/2006/main">
   <p:cSld>
     <p:spTree>
@@ -10056,7 +11791,7 @@
 </p:sld>
 </file>
 
-<file path=ppt/slides/slide5.xml><?xml version="1.0" encoding="utf-8"?>
+<file path=ppt/slides/slide6.xml><?xml version="1.0" encoding="utf-8"?>
 <p:sld xmlns:a="http://schemas.openxmlformats.org/drawingml/2006/main" xmlns:r="http://schemas.openxmlformats.org/officeDocument/2006/relationships" xmlns:p="http://schemas.openxmlformats.org/presentationml/2006/main">
   <p:cSld>
     <p:spTree>
@@ -11375,7 +13110,7 @@
 </p:sld>
 </file>
 
-<file path=ppt/slides/slide6.xml><?xml version="1.0" encoding="utf-8"?>
+<file path=ppt/slides/slide7.xml><?xml version="1.0" encoding="utf-8"?>
 <p:sld xmlns:a="http://schemas.openxmlformats.org/drawingml/2006/main" xmlns:r="http://schemas.openxmlformats.org/officeDocument/2006/relationships" xmlns:p="http://schemas.openxmlformats.org/presentationml/2006/main">
   <p:cSld>
     <p:spTree>
@@ -13032,7 +14767,7 @@
 </p:sld>
 </file>
 
-<file path=ppt/slides/slide7.xml><?xml version="1.0" encoding="utf-8"?>
+<file path=ppt/slides/slide8.xml><?xml version="1.0" encoding="utf-8"?>
 <p:sld xmlns:a="http://schemas.openxmlformats.org/drawingml/2006/main" xmlns:r="http://schemas.openxmlformats.org/officeDocument/2006/relationships" xmlns:p="http://schemas.openxmlformats.org/presentationml/2006/main">
   <p:cSld>
     <p:spTree>
@@ -16446,7 +18181,7 @@
 </p:sld>
 </file>
 
-<file path=ppt/slides/slide8.xml><?xml version="1.0" encoding="utf-8"?>
+<file path=ppt/slides/slide9.xml><?xml version="1.0" encoding="utf-8"?>
 <p:sld xmlns:a="http://schemas.openxmlformats.org/drawingml/2006/main" xmlns:r="http://schemas.openxmlformats.org/officeDocument/2006/relationships" xmlns:p="http://schemas.openxmlformats.org/presentationml/2006/main">
   <p:cSld>
     <p:spTree>
@@ -20018,895 +21753,6 @@
     <p:extLst>
       <p:ext uri="{BB962C8B-B14F-4D97-AF65-F5344CB8AC3E}">
         <p14:creationId xmlns:p14="http://schemas.microsoft.com/office/powerpoint/2010/main" val="338386805"/>
-      </p:ext>
-    </p:extLst>
-  </p:cSld>
-  <p:clrMapOvr>
-    <a:masterClrMapping/>
-  </p:clrMapOvr>
-</p:sld>
-</file>
-
-<file path=ppt/slides/slide9.xml><?xml version="1.0" encoding="utf-8"?>
-<p:sld xmlns:a="http://schemas.openxmlformats.org/drawingml/2006/main" xmlns:r="http://schemas.openxmlformats.org/officeDocument/2006/relationships" xmlns:p="http://schemas.openxmlformats.org/presentationml/2006/main">
-  <p:cSld>
-    <p:spTree>
-      <p:nvGrpSpPr>
-        <p:cNvPr id="1" name=""/>
-        <p:cNvGrpSpPr/>
-        <p:nvPr/>
-      </p:nvGrpSpPr>
-      <p:grpSpPr>
-        <a:xfrm>
-          <a:off x="0" y="0"/>
-          <a:ext cx="0" cy="0"/>
-          <a:chOff x="0" y="0"/>
-          <a:chExt cx="0" cy="0"/>
-        </a:xfrm>
-      </p:grpSpPr>
-      <p:sp>
-        <p:nvSpPr>
-          <p:cNvPr id="2" name="Title 1">
-            <a:extLst>
-              <a:ext uri="{FF2B5EF4-FFF2-40B4-BE49-F238E27FC236}">
-                <a16:creationId xmlns:a16="http://schemas.microsoft.com/office/drawing/2014/main" id="{A3FA626A-39B1-794F-9A3F-83D37F75B451}"/>
-              </a:ext>
-            </a:extLst>
-          </p:cNvPr>
-          <p:cNvSpPr>
-            <a:spLocks noGrp="1"/>
-          </p:cNvSpPr>
-          <p:nvPr>
-            <p:ph type="title"/>
-          </p:nvPr>
-        </p:nvSpPr>
-        <p:spPr>
-          <a:xfrm>
-            <a:off x="838200" y="55844"/>
-            <a:ext cx="10515600" cy="341095"/>
-          </a:xfrm>
-        </p:spPr>
-        <p:txBody>
-          <a:bodyPr>
-            <a:normAutofit fontScale="90000"/>
-          </a:bodyPr>
-          <a:lstStyle/>
-          <a:p>
-            <a:pPr algn="ctr"/>
-            <a:r>
-              <a:rPr lang="en-US" sz="2800" b="1" dirty="0"/>
-              <a:t>Classes</a:t>
-            </a:r>
-          </a:p>
-        </p:txBody>
-      </p:sp>
-      <p:graphicFrame>
-        <p:nvGraphicFramePr>
-          <p:cNvPr id="4" name="Table 3">
-            <a:extLst>
-              <a:ext uri="{FF2B5EF4-FFF2-40B4-BE49-F238E27FC236}">
-                <a16:creationId xmlns:a16="http://schemas.microsoft.com/office/drawing/2014/main" id="{E76B9E62-50FD-A244-A881-30CEE53BFD4C}"/>
-              </a:ext>
-            </a:extLst>
-          </p:cNvPr>
-          <p:cNvGraphicFramePr>
-            <a:graphicFrameLocks noGrp="1"/>
-          </p:cNvGraphicFramePr>
-          <p:nvPr>
-            <p:extLst>
-              <p:ext uri="{D42A27DB-BD31-4B8C-83A1-F6EECF244321}">
-                <p14:modId xmlns:p14="http://schemas.microsoft.com/office/powerpoint/2010/main" val="4229818805"/>
-              </p:ext>
-            </p:extLst>
-          </p:nvPr>
-        </p:nvGraphicFramePr>
-        <p:xfrm>
-          <a:off x="309284" y="464175"/>
-          <a:ext cx="2369671" cy="6326590"/>
-        </p:xfrm>
-        <a:graphic>
-          <a:graphicData uri="http://schemas.openxmlformats.org/drawingml/2006/table">
-            <a:tbl>
-              <a:tblPr firstRow="1" bandRow="1">
-                <a:tableStyleId>{5940675A-B579-460E-94D1-54222C63F5DA}</a:tableStyleId>
-              </a:tblPr>
-              <a:tblGrid>
-                <a:gridCol w="2369671">
-                  <a:extLst>
-                    <a:ext uri="{9D8B030D-6E8A-4147-A177-3AD203B41FA5}">
-                      <a16:colId xmlns:a16="http://schemas.microsoft.com/office/drawing/2014/main" val="4005843325"/>
-                    </a:ext>
-                  </a:extLst>
-                </a:gridCol>
-              </a:tblGrid>
-              <a:tr h="372229">
-                <a:tc>
-                  <a:txBody>
-                    <a:bodyPr/>
-                    <a:lstStyle/>
-                    <a:p>
-                      <a:pPr algn="ctr"/>
-                      <a:r>
-                        <a:rPr lang="en-US" dirty="0"/>
-                        <a:t>Merchant</a:t>
-                      </a:r>
-                    </a:p>
-                  </a:txBody>
-                  <a:tcPr anchor="ctr">
-                    <a:solidFill>
-                      <a:srgbClr val="D883FF"/>
-                    </a:solidFill>
-                  </a:tcPr>
-                </a:tc>
-                <a:extLst>
-                  <a:ext uri="{0D108BD9-81ED-4DB2-BD59-A6C34878D82A}">
-                    <a16:rowId xmlns:a16="http://schemas.microsoft.com/office/drawing/2014/main" val="4181850750"/>
-                  </a:ext>
-                </a:extLst>
-              </a:tr>
-              <a:tr h="2639671">
-                <a:tc>
-                  <a:txBody>
-                    <a:bodyPr/>
-                    <a:lstStyle/>
-                    <a:p>
-                      <a:pPr algn="l"/>
-                      <a:r>
-                        <a:rPr lang="en-US" dirty="0"/>
-                        <a:t>@id</a:t>
-                      </a:r>
-                    </a:p>
-                    <a:p>
-                      <a:pPr algn="l"/>
-                      <a:r>
-                        <a:rPr lang="en-US" dirty="0"/>
-                        <a:t>@</a:t>
-                      </a:r>
-                      <a:r>
-                        <a:rPr lang="en-US" dirty="0" err="1"/>
-                        <a:t>merchant_name</a:t>
-                      </a:r>
-                      <a:r>
-                        <a:rPr lang="en-US" dirty="0"/>
-                        <a:t>(</a:t>
-                      </a:r>
-                      <a:r>
-                        <a:rPr lang="en-US" dirty="0" err="1"/>
-                        <a:t>Str</a:t>
-                      </a:r>
-                      <a:r>
-                        <a:rPr lang="en-US" dirty="0"/>
-                        <a:t>)</a:t>
-                      </a:r>
-                    </a:p>
-                  </a:txBody>
-                  <a:tcPr anchor="ctr"/>
-                </a:tc>
-                <a:extLst>
-                  <a:ext uri="{0D108BD9-81ED-4DB2-BD59-A6C34878D82A}">
-                    <a16:rowId xmlns:a16="http://schemas.microsoft.com/office/drawing/2014/main" val="2995859431"/>
-                  </a:ext>
-                </a:extLst>
-              </a:tr>
-              <a:tr h="3314690">
-                <a:tc>
-                  <a:txBody>
-                    <a:bodyPr/>
-                    <a:lstStyle/>
-                    <a:p>
-                      <a:pPr marL="285750" indent="-285750" algn="l">
-                        <a:buFontTx/>
-                        <a:buChar char="-"/>
-                      </a:pPr>
-                      <a:r>
-                        <a:rPr lang="en-US" dirty="0"/>
-                        <a:t>Initialize</a:t>
-                      </a:r>
-                    </a:p>
-                    <a:p>
-                      <a:pPr marL="285750" indent="-285750" algn="l">
-                        <a:buFontTx/>
-                        <a:buChar char="-"/>
-                      </a:pPr>
-                      <a:r>
-                        <a:rPr lang="en-US" dirty="0"/>
-                        <a:t>Save (to database)</a:t>
-                      </a:r>
-                    </a:p>
-                    <a:p>
-                      <a:pPr marL="285750" indent="-285750" algn="l">
-                        <a:buFontTx/>
-                        <a:buChar char="-"/>
-                      </a:pPr>
-                      <a:r>
-                        <a:rPr lang="en-US" dirty="0"/>
-                        <a:t>Self find</a:t>
-                      </a:r>
-                    </a:p>
-                    <a:p>
-                      <a:pPr marL="285750" indent="-285750" algn="l">
-                        <a:buFontTx/>
-                        <a:buChar char="-"/>
-                      </a:pPr>
-                      <a:r>
-                        <a:rPr lang="en-US" dirty="0"/>
-                        <a:t>Self all</a:t>
-                      </a:r>
-                    </a:p>
-                    <a:p>
-                      <a:pPr marL="285750" indent="-285750" algn="l">
-                        <a:buFontTx/>
-                        <a:buChar char="-"/>
-                      </a:pPr>
-                      <a:r>
-                        <a:rPr lang="en-US" dirty="0"/>
-                        <a:t>Self map items</a:t>
-                      </a:r>
-                    </a:p>
-                    <a:p>
-                      <a:pPr marL="285750" indent="-285750" algn="l">
-                        <a:buFontTx/>
-                        <a:buChar char="-"/>
-                      </a:pPr>
-                      <a:r>
-                        <a:rPr lang="en-US" dirty="0"/>
-                        <a:t>delete</a:t>
-                      </a:r>
-                    </a:p>
-                  </a:txBody>
-                  <a:tcPr anchor="ctr"/>
-                </a:tc>
-                <a:extLst>
-                  <a:ext uri="{0D108BD9-81ED-4DB2-BD59-A6C34878D82A}">
-                    <a16:rowId xmlns:a16="http://schemas.microsoft.com/office/drawing/2014/main" val="2112490845"/>
-                  </a:ext>
-                </a:extLst>
-              </a:tr>
-            </a:tbl>
-          </a:graphicData>
-        </a:graphic>
-      </p:graphicFrame>
-      <p:graphicFrame>
-        <p:nvGraphicFramePr>
-          <p:cNvPr id="5" name="Table 4">
-            <a:extLst>
-              <a:ext uri="{FF2B5EF4-FFF2-40B4-BE49-F238E27FC236}">
-                <a16:creationId xmlns:a16="http://schemas.microsoft.com/office/drawing/2014/main" id="{1B86D617-CA67-D44E-9F22-CAC79CB6A2A4}"/>
-              </a:ext>
-            </a:extLst>
-          </p:cNvPr>
-          <p:cNvGraphicFramePr>
-            <a:graphicFrameLocks noGrp="1"/>
-          </p:cNvGraphicFramePr>
-          <p:nvPr>
-            <p:extLst>
-              <p:ext uri="{D42A27DB-BD31-4B8C-83A1-F6EECF244321}">
-                <p14:modId xmlns:p14="http://schemas.microsoft.com/office/powerpoint/2010/main" val="1814829198"/>
-              </p:ext>
-            </p:extLst>
-          </p:nvPr>
-        </p:nvGraphicFramePr>
-        <p:xfrm>
-          <a:off x="3074894" y="464174"/>
-          <a:ext cx="2203824" cy="6326591"/>
-        </p:xfrm>
-        <a:graphic>
-          <a:graphicData uri="http://schemas.openxmlformats.org/drawingml/2006/table">
-            <a:tbl>
-              <a:tblPr firstRow="1" bandRow="1">
-                <a:tableStyleId>{5940675A-B579-460E-94D1-54222C63F5DA}</a:tableStyleId>
-              </a:tblPr>
-              <a:tblGrid>
-                <a:gridCol w="2203824">
-                  <a:extLst>
-                    <a:ext uri="{9D8B030D-6E8A-4147-A177-3AD203B41FA5}">
-                      <a16:colId xmlns:a16="http://schemas.microsoft.com/office/drawing/2014/main" val="4005843325"/>
-                    </a:ext>
-                  </a:extLst>
-                </a:gridCol>
-              </a:tblGrid>
-              <a:tr h="454944">
-                <a:tc>
-                  <a:txBody>
-                    <a:bodyPr/>
-                    <a:lstStyle/>
-                    <a:p>
-                      <a:pPr algn="ctr"/>
-                      <a:r>
-                        <a:rPr lang="en-US" dirty="0"/>
-                        <a:t>Tags</a:t>
-                      </a:r>
-                    </a:p>
-                  </a:txBody>
-                  <a:tcPr anchor="ctr">
-                    <a:solidFill>
-                      <a:srgbClr val="D883FF"/>
-                    </a:solidFill>
-                  </a:tcPr>
-                </a:tc>
-                <a:extLst>
-                  <a:ext uri="{0D108BD9-81ED-4DB2-BD59-A6C34878D82A}">
-                    <a16:rowId xmlns:a16="http://schemas.microsoft.com/office/drawing/2014/main" val="4181850750"/>
-                  </a:ext>
-                </a:extLst>
-              </a:tr>
-              <a:tr h="2805717">
-                <a:tc>
-                  <a:txBody>
-                    <a:bodyPr/>
-                    <a:lstStyle/>
-                    <a:p>
-                      <a:pPr algn="l"/>
-                      <a:r>
-                        <a:rPr lang="en-US" dirty="0"/>
-                        <a:t>@id</a:t>
-                      </a:r>
-                    </a:p>
-                    <a:p>
-                      <a:pPr algn="l"/>
-                      <a:r>
-                        <a:rPr lang="en-US" dirty="0"/>
-                        <a:t>@</a:t>
-                      </a:r>
-                      <a:r>
-                        <a:rPr lang="en-US" dirty="0" err="1"/>
-                        <a:t>tag_name</a:t>
-                      </a:r>
-                      <a:r>
-                        <a:rPr lang="en-US" dirty="0"/>
-                        <a:t>(</a:t>
-                      </a:r>
-                      <a:r>
-                        <a:rPr lang="en-US" dirty="0" err="1"/>
-                        <a:t>Str</a:t>
-                      </a:r>
-                      <a:r>
-                        <a:rPr lang="en-US" dirty="0"/>
-                        <a:t>)</a:t>
-                      </a:r>
-                    </a:p>
-                  </a:txBody>
-                  <a:tcPr anchor="ctr"/>
-                </a:tc>
-                <a:extLst>
-                  <a:ext uri="{0D108BD9-81ED-4DB2-BD59-A6C34878D82A}">
-                    <a16:rowId xmlns:a16="http://schemas.microsoft.com/office/drawing/2014/main" val="2995859431"/>
-                  </a:ext>
-                </a:extLst>
-              </a:tr>
-              <a:tr h="3065930">
-                <a:tc>
-                  <a:txBody>
-                    <a:bodyPr/>
-                    <a:lstStyle/>
-                    <a:p>
-                      <a:pPr marL="285750" indent="-285750" algn="l">
-                        <a:buFontTx/>
-                        <a:buChar char="-"/>
-                      </a:pPr>
-                      <a:r>
-                        <a:rPr lang="en-US" dirty="0"/>
-                        <a:t>Initialize</a:t>
-                      </a:r>
-                    </a:p>
-                    <a:p>
-                      <a:pPr marL="285750" indent="-285750" algn="l">
-                        <a:buFontTx/>
-                        <a:buChar char="-"/>
-                      </a:pPr>
-                      <a:r>
-                        <a:rPr lang="en-US" dirty="0"/>
-                        <a:t>Save (to database)</a:t>
-                      </a:r>
-                    </a:p>
-                    <a:p>
-                      <a:pPr marL="285750" indent="-285750" algn="l">
-                        <a:buFontTx/>
-                        <a:buChar char="-"/>
-                      </a:pPr>
-                      <a:r>
-                        <a:rPr lang="en-US" dirty="0"/>
-                        <a:t>Self find</a:t>
-                      </a:r>
-                    </a:p>
-                    <a:p>
-                      <a:pPr marL="285750" indent="-285750" algn="l">
-                        <a:buFontTx/>
-                        <a:buChar char="-"/>
-                      </a:pPr>
-                      <a:r>
-                        <a:rPr lang="en-US" dirty="0"/>
-                        <a:t>Self all</a:t>
-                      </a:r>
-                    </a:p>
-                    <a:p>
-                      <a:pPr marL="285750" indent="-285750" algn="l">
-                        <a:buFontTx/>
-                        <a:buChar char="-"/>
-                      </a:pPr>
-                      <a:r>
-                        <a:rPr lang="en-US" dirty="0"/>
-                        <a:t>Self map items</a:t>
-                      </a:r>
-                    </a:p>
-                    <a:p>
-                      <a:pPr marL="285750" indent="-285750" algn="l">
-                        <a:buFontTx/>
-                        <a:buChar char="-"/>
-                      </a:pPr>
-                      <a:r>
-                        <a:rPr lang="en-US" dirty="0"/>
-                        <a:t>delete</a:t>
-                      </a:r>
-                    </a:p>
-                    <a:p>
-                      <a:pPr algn="ctr"/>
-                      <a:endParaRPr lang="en-US" dirty="0"/>
-                    </a:p>
-                  </a:txBody>
-                  <a:tcPr anchor="ctr"/>
-                </a:tc>
-                <a:extLst>
-                  <a:ext uri="{0D108BD9-81ED-4DB2-BD59-A6C34878D82A}">
-                    <a16:rowId xmlns:a16="http://schemas.microsoft.com/office/drawing/2014/main" val="2112490845"/>
-                  </a:ext>
-                </a:extLst>
-              </a:tr>
-            </a:tbl>
-          </a:graphicData>
-        </a:graphic>
-      </p:graphicFrame>
-      <p:graphicFrame>
-        <p:nvGraphicFramePr>
-          <p:cNvPr id="6" name="Table 5">
-            <a:extLst>
-              <a:ext uri="{FF2B5EF4-FFF2-40B4-BE49-F238E27FC236}">
-                <a16:creationId xmlns:a16="http://schemas.microsoft.com/office/drawing/2014/main" id="{E60E3F86-205D-C94E-8BFB-D187A2E5A87D}"/>
-              </a:ext>
-            </a:extLst>
-          </p:cNvPr>
-          <p:cNvGraphicFramePr>
-            <a:graphicFrameLocks noGrp="1"/>
-          </p:cNvGraphicFramePr>
-          <p:nvPr>
-            <p:extLst>
-              <p:ext uri="{D42A27DB-BD31-4B8C-83A1-F6EECF244321}">
-                <p14:modId xmlns:p14="http://schemas.microsoft.com/office/powerpoint/2010/main" val="3829048076"/>
-              </p:ext>
-            </p:extLst>
-          </p:nvPr>
-        </p:nvGraphicFramePr>
-        <p:xfrm>
-          <a:off x="5674657" y="464175"/>
-          <a:ext cx="3630706" cy="6344341"/>
-        </p:xfrm>
-        <a:graphic>
-          <a:graphicData uri="http://schemas.openxmlformats.org/drawingml/2006/table">
-            <a:tbl>
-              <a:tblPr firstRow="1" bandRow="1">
-                <a:tableStyleId>{5940675A-B579-460E-94D1-54222C63F5DA}</a:tableStyleId>
-              </a:tblPr>
-              <a:tblGrid>
-                <a:gridCol w="3630706">
-                  <a:extLst>
-                    <a:ext uri="{9D8B030D-6E8A-4147-A177-3AD203B41FA5}">
-                      <a16:colId xmlns:a16="http://schemas.microsoft.com/office/drawing/2014/main" val="4005843325"/>
-                    </a:ext>
-                  </a:extLst>
-                </a:gridCol>
-              </a:tblGrid>
-              <a:tr h="400741">
-                <a:tc>
-                  <a:txBody>
-                    <a:bodyPr/>
-                    <a:lstStyle/>
-                    <a:p>
-                      <a:pPr algn="ctr"/>
-                      <a:r>
-                        <a:rPr lang="en-US" dirty="0"/>
-                        <a:t>Transaction</a:t>
-                      </a:r>
-                    </a:p>
-                  </a:txBody>
-                  <a:tcPr anchor="ctr">
-                    <a:solidFill>
-                      <a:srgbClr val="D883FF"/>
-                    </a:solidFill>
-                  </a:tcPr>
-                </a:tc>
-                <a:extLst>
-                  <a:ext uri="{0D108BD9-81ED-4DB2-BD59-A6C34878D82A}">
-                    <a16:rowId xmlns:a16="http://schemas.microsoft.com/office/drawing/2014/main" val="4181850750"/>
-                  </a:ext>
-                </a:extLst>
-              </a:tr>
-              <a:tr h="2600733">
-                <a:tc>
-                  <a:txBody>
-                    <a:bodyPr/>
-                    <a:lstStyle/>
-                    <a:p>
-                      <a:r>
-                        <a:rPr lang="en-US" dirty="0"/>
-                        <a:t>@id</a:t>
-                      </a:r>
-                    </a:p>
-                    <a:p>
-                      <a:r>
-                        <a:rPr lang="en-US" dirty="0"/>
-                        <a:t>@amount(numeric)</a:t>
-                      </a:r>
-                    </a:p>
-                    <a:p>
-                      <a:r>
-                        <a:rPr lang="en-US" dirty="0"/>
-                        <a:t>@</a:t>
-                      </a:r>
-                      <a:r>
-                        <a:rPr lang="en-US" dirty="0" err="1"/>
-                        <a:t>merchant_id</a:t>
-                      </a:r>
-                      <a:endParaRPr lang="en-US" dirty="0"/>
-                    </a:p>
-                    <a:p>
-                      <a:r>
-                        <a:rPr lang="en-US" dirty="0"/>
-                        <a:t>@</a:t>
-                      </a:r>
-                      <a:r>
-                        <a:rPr lang="en-US" dirty="0" err="1"/>
-                        <a:t>tag_id</a:t>
-                      </a:r>
-                      <a:endParaRPr lang="en-US" dirty="0"/>
-                    </a:p>
-                    <a:p>
-                      <a:r>
-                        <a:rPr lang="en-US" dirty="0"/>
-                        <a:t>@essential(</a:t>
-                      </a:r>
-                      <a:r>
-                        <a:rPr lang="en-US" dirty="0" err="1"/>
-                        <a:t>Str</a:t>
-                      </a:r>
-                      <a:r>
-                        <a:rPr lang="en-US" dirty="0"/>
-                        <a:t>)</a:t>
-                      </a:r>
-                    </a:p>
-                    <a:p>
-                      <a:r>
-                        <a:rPr lang="en-US" dirty="0"/>
-                        <a:t>@time(numeric)</a:t>
-                      </a:r>
-                    </a:p>
-                    <a:p>
-                      <a:r>
-                        <a:rPr lang="en-US" dirty="0"/>
-                        <a:t>@day(</a:t>
-                      </a:r>
-                      <a:r>
-                        <a:rPr lang="en-US" dirty="0" err="1"/>
-                        <a:t>Int</a:t>
-                      </a:r>
-                      <a:r>
-                        <a:rPr lang="en-US" dirty="0"/>
-                        <a:t>)</a:t>
-                      </a:r>
-                    </a:p>
-                    <a:p>
-                      <a:r>
-                        <a:rPr lang="en-US" dirty="0"/>
-                        <a:t>@month(</a:t>
-                      </a:r>
-                      <a:r>
-                        <a:rPr lang="en-US" dirty="0" err="1"/>
-                        <a:t>Str</a:t>
-                      </a:r>
-                      <a:r>
-                        <a:rPr lang="en-US" dirty="0"/>
-                        <a:t>)</a:t>
-                      </a:r>
-                    </a:p>
-                    <a:p>
-                      <a:r>
-                        <a:rPr lang="en-US" dirty="0"/>
-                        <a:t>@</a:t>
-                      </a:r>
-                      <a:r>
-                        <a:rPr lang="en-US" dirty="0" err="1"/>
-                        <a:t>total_spent</a:t>
-                      </a:r>
-                      <a:r>
-                        <a:rPr lang="en-US" dirty="0"/>
-                        <a:t>(numeric)</a:t>
-                      </a:r>
-                    </a:p>
-                    <a:p>
-                      <a:r>
-                        <a:rPr lang="en-US" dirty="0"/>
-                        <a:t>@</a:t>
-                      </a:r>
-                      <a:r>
-                        <a:rPr lang="en-US" dirty="0" err="1"/>
-                        <a:t>remaining_budget</a:t>
-                      </a:r>
-                      <a:r>
-                        <a:rPr lang="en-US" dirty="0"/>
-                        <a:t>(numeric)</a:t>
-                      </a:r>
-                    </a:p>
-                  </a:txBody>
-                  <a:tcPr/>
-                </a:tc>
-                <a:extLst>
-                  <a:ext uri="{0D108BD9-81ED-4DB2-BD59-A6C34878D82A}">
-                    <a16:rowId xmlns:a16="http://schemas.microsoft.com/office/drawing/2014/main" val="2995859431"/>
-                  </a:ext>
-                </a:extLst>
-              </a:tr>
-              <a:tr h="1768047">
-                <a:tc>
-                  <a:txBody>
-                    <a:bodyPr/>
-                    <a:lstStyle/>
-                    <a:p>
-                      <a:pPr marL="285750" indent="-285750" algn="l">
-                        <a:buFontTx/>
-                        <a:buChar char="-"/>
-                      </a:pPr>
-                      <a:r>
-                        <a:rPr lang="en-US" dirty="0"/>
-                        <a:t>Initialize</a:t>
-                      </a:r>
-                    </a:p>
-                    <a:p>
-                      <a:pPr marL="285750" indent="-285750" algn="l">
-                        <a:buFontTx/>
-                        <a:buChar char="-"/>
-                      </a:pPr>
-                      <a:r>
-                        <a:rPr lang="en-US" dirty="0"/>
-                        <a:t>Get time/date now</a:t>
-                      </a:r>
-                    </a:p>
-                    <a:p>
-                      <a:pPr marL="285750" indent="-285750" algn="l">
-                        <a:buFontTx/>
-                        <a:buChar char="-"/>
-                      </a:pPr>
-                      <a:r>
-                        <a:rPr lang="en-US" dirty="0"/>
-                        <a:t>Split time/date to time/day/month</a:t>
-                      </a:r>
-                    </a:p>
-                    <a:p>
-                      <a:pPr marL="285750" indent="-285750" algn="l">
-                        <a:buFontTx/>
-                        <a:buChar char="-"/>
-                      </a:pPr>
-                      <a:r>
-                        <a:rPr lang="en-US" dirty="0"/>
-                        <a:t>Calculate total spent</a:t>
-                      </a:r>
-                    </a:p>
-                    <a:p>
-                      <a:pPr marL="285750" indent="-285750" algn="l">
-                        <a:buFontTx/>
-                        <a:buChar char="-"/>
-                      </a:pPr>
-                      <a:r>
-                        <a:rPr lang="en-US" dirty="0"/>
-                        <a:t>Calculate remaining budget</a:t>
-                      </a:r>
-                    </a:p>
-                    <a:p>
-                      <a:pPr marL="285750" indent="-285750" algn="l">
-                        <a:buFontTx/>
-                        <a:buChar char="-"/>
-                      </a:pPr>
-                      <a:r>
-                        <a:rPr lang="en-US" dirty="0"/>
-                        <a:t>Save (to database)</a:t>
-                      </a:r>
-                    </a:p>
-                    <a:p>
-                      <a:pPr marL="285750" indent="-285750" algn="l">
-                        <a:buFontTx/>
-                        <a:buChar char="-"/>
-                      </a:pPr>
-                      <a:r>
-                        <a:rPr lang="en-US" dirty="0"/>
-                        <a:t>Self find</a:t>
-                      </a:r>
-                    </a:p>
-                    <a:p>
-                      <a:pPr marL="285750" indent="-285750" algn="l">
-                        <a:buFontTx/>
-                        <a:buChar char="-"/>
-                      </a:pPr>
-                      <a:r>
-                        <a:rPr lang="en-US" dirty="0"/>
-                        <a:t>Self all</a:t>
-                      </a:r>
-                    </a:p>
-                    <a:p>
-                      <a:pPr marL="285750" indent="-285750" algn="l">
-                        <a:buFontTx/>
-                        <a:buChar char="-"/>
-                      </a:pPr>
-                      <a:r>
-                        <a:rPr lang="en-US" dirty="0"/>
-                        <a:t>Self map items</a:t>
-                      </a:r>
-                    </a:p>
-                    <a:p>
-                      <a:pPr marL="285750" indent="-285750" algn="l">
-                        <a:buFontTx/>
-                        <a:buChar char="-"/>
-                      </a:pPr>
-                      <a:r>
-                        <a:rPr lang="en-US" dirty="0"/>
-                        <a:t>delete</a:t>
-                      </a:r>
-                    </a:p>
-                  </a:txBody>
-                  <a:tcPr/>
-                </a:tc>
-                <a:extLst>
-                  <a:ext uri="{0D108BD9-81ED-4DB2-BD59-A6C34878D82A}">
-                    <a16:rowId xmlns:a16="http://schemas.microsoft.com/office/drawing/2014/main" val="2112490845"/>
-                  </a:ext>
-                </a:extLst>
-              </a:tr>
-            </a:tbl>
-          </a:graphicData>
-        </a:graphic>
-      </p:graphicFrame>
-      <p:graphicFrame>
-        <p:nvGraphicFramePr>
-          <p:cNvPr id="7" name="Table 6">
-            <a:extLst>
-              <a:ext uri="{FF2B5EF4-FFF2-40B4-BE49-F238E27FC236}">
-                <a16:creationId xmlns:a16="http://schemas.microsoft.com/office/drawing/2014/main" id="{4C2FB6E0-E161-F941-A854-5C5681E349B6}"/>
-              </a:ext>
-            </a:extLst>
-          </p:cNvPr>
-          <p:cNvGraphicFramePr>
-            <a:graphicFrameLocks noGrp="1"/>
-          </p:cNvGraphicFramePr>
-          <p:nvPr>
-            <p:extLst>
-              <p:ext uri="{D42A27DB-BD31-4B8C-83A1-F6EECF244321}">
-                <p14:modId xmlns:p14="http://schemas.microsoft.com/office/powerpoint/2010/main" val="1572713515"/>
-              </p:ext>
-            </p:extLst>
-          </p:nvPr>
-        </p:nvGraphicFramePr>
-        <p:xfrm>
-          <a:off x="9701303" y="464174"/>
-          <a:ext cx="2203824" cy="6337982"/>
-        </p:xfrm>
-        <a:graphic>
-          <a:graphicData uri="http://schemas.openxmlformats.org/drawingml/2006/table">
-            <a:tbl>
-              <a:tblPr firstRow="1" bandRow="1">
-                <a:tableStyleId>{5940675A-B579-460E-94D1-54222C63F5DA}</a:tableStyleId>
-              </a:tblPr>
-              <a:tblGrid>
-                <a:gridCol w="2203824">
-                  <a:extLst>
-                    <a:ext uri="{9D8B030D-6E8A-4147-A177-3AD203B41FA5}">
-                      <a16:colId xmlns:a16="http://schemas.microsoft.com/office/drawing/2014/main" val="4005843325"/>
-                    </a:ext>
-                  </a:extLst>
-                </a:gridCol>
-              </a:tblGrid>
-              <a:tr h="525733">
-                <a:tc>
-                  <a:txBody>
-                    <a:bodyPr/>
-                    <a:lstStyle/>
-                    <a:p>
-                      <a:pPr algn="ctr"/>
-                      <a:r>
-                        <a:rPr lang="en-US" dirty="0"/>
-                        <a:t>Budget</a:t>
-                      </a:r>
-                    </a:p>
-                  </a:txBody>
-                  <a:tcPr anchor="ctr">
-                    <a:solidFill>
-                      <a:srgbClr val="D883FF"/>
-                    </a:solidFill>
-                  </a:tcPr>
-                </a:tc>
-                <a:extLst>
-                  <a:ext uri="{0D108BD9-81ED-4DB2-BD59-A6C34878D82A}">
-                    <a16:rowId xmlns:a16="http://schemas.microsoft.com/office/drawing/2014/main" val="4181850750"/>
-                  </a:ext>
-                </a:extLst>
-              </a:tr>
-              <a:tr h="2787066">
-                <a:tc>
-                  <a:txBody>
-                    <a:bodyPr/>
-                    <a:lstStyle/>
-                    <a:p>
-                      <a:r>
-                        <a:rPr lang="en-US" dirty="0"/>
-                        <a:t>@id</a:t>
-                      </a:r>
-                    </a:p>
-                    <a:p>
-                      <a:r>
-                        <a:rPr lang="en-US" dirty="0"/>
-                        <a:t>@budget(numeric)</a:t>
-                      </a:r>
-                    </a:p>
-                  </a:txBody>
-                  <a:tcPr/>
-                </a:tc>
-                <a:extLst>
-                  <a:ext uri="{0D108BD9-81ED-4DB2-BD59-A6C34878D82A}">
-                    <a16:rowId xmlns:a16="http://schemas.microsoft.com/office/drawing/2014/main" val="2995859431"/>
-                  </a:ext>
-                </a:extLst>
-              </a:tr>
-              <a:tr h="3025183">
-                <a:tc>
-                  <a:txBody>
-                    <a:bodyPr/>
-                    <a:lstStyle/>
-                    <a:p>
-                      <a:pPr marL="285750" indent="-285750" algn="l">
-                        <a:buFontTx/>
-                        <a:buChar char="-"/>
-                      </a:pPr>
-                      <a:r>
-                        <a:rPr lang="en-US" dirty="0"/>
-                        <a:t>Initialize</a:t>
-                      </a:r>
-                    </a:p>
-                    <a:p>
-                      <a:pPr marL="285750" indent="-285750" algn="l">
-                        <a:buFontTx/>
-                        <a:buChar char="-"/>
-                      </a:pPr>
-                      <a:r>
-                        <a:rPr lang="en-US" dirty="0"/>
-                        <a:t>Edit</a:t>
-                      </a:r>
-                    </a:p>
-                    <a:p>
-                      <a:pPr marL="285750" indent="-285750" algn="l">
-                        <a:buFontTx/>
-                        <a:buChar char="-"/>
-                      </a:pPr>
-                      <a:r>
-                        <a:rPr lang="en-US" dirty="0"/>
-                        <a:t>delete</a:t>
-                      </a:r>
-                    </a:p>
-                    <a:p>
-                      <a:endParaRPr lang="en-US" dirty="0"/>
-                    </a:p>
-                  </a:txBody>
-                  <a:tcPr/>
-                </a:tc>
-                <a:extLst>
-                  <a:ext uri="{0D108BD9-81ED-4DB2-BD59-A6C34878D82A}">
-                    <a16:rowId xmlns:a16="http://schemas.microsoft.com/office/drawing/2014/main" val="2112490845"/>
-                  </a:ext>
-                </a:extLst>
-              </a:tr>
-            </a:tbl>
-          </a:graphicData>
-        </a:graphic>
-      </p:graphicFrame>
-    </p:spTree>
-    <p:extLst>
-      <p:ext uri="{BB962C8B-B14F-4D97-AF65-F5344CB8AC3E}">
-        <p14:creationId xmlns:p14="http://schemas.microsoft.com/office/powerpoint/2010/main" val="3918205902"/>
       </p:ext>
     </p:extLst>
   </p:cSld>

</xml_diff>

<commit_message>
delete and delete_all methods added to merchant class
</commit_message>
<xml_diff>
--- a/Plans_Project_Management/Budget_App_Plan_08Nov2018.pptx
+++ b/Plans_Project_Management/Budget_App_Plan_08Nov2018.pptx
@@ -16,7 +16,8 @@
     <p:sldId id="263" r:id="rId10"/>
     <p:sldId id="264" r:id="rId11"/>
     <p:sldId id="257" r:id="rId12"/>
-    <p:sldId id="266" r:id="rId13"/>
+    <p:sldId id="268" r:id="rId13"/>
+    <p:sldId id="266" r:id="rId14"/>
   </p:sldIdLst>
   <p:sldSz cx="12192000" cy="6858000"/>
   <p:notesSz cx="6858000" cy="9144000"/>
@@ -5416,7 +5417,7 @@
             <a:pPr algn="ctr"/>
             <a:r>
               <a:rPr lang="en-US" sz="2800" b="1" dirty="0"/>
-              <a:t>Function rationale</a:t>
+              <a:t>Function rationale – Page 1</a:t>
             </a:r>
           </a:p>
         </p:txBody>
@@ -5433,17 +5434,11 @@
           <p:cNvGraphicFramePr>
             <a:graphicFrameLocks noGrp="1"/>
           </p:cNvGraphicFramePr>
-          <p:nvPr>
-            <p:extLst>
-              <p:ext uri="{D42A27DB-BD31-4B8C-83A1-F6EECF244321}">
-                <p14:modId xmlns:p14="http://schemas.microsoft.com/office/powerpoint/2010/main" val="1348953"/>
-              </p:ext>
-            </p:extLst>
-          </p:nvPr>
+          <p:nvPr/>
         </p:nvGraphicFramePr>
         <p:xfrm>
           <a:off x="85165" y="765885"/>
-          <a:ext cx="12021670" cy="4226560"/>
+          <a:ext cx="12021670" cy="6040120"/>
         </p:xfrm>
         <a:graphic>
           <a:graphicData uri="http://schemas.openxmlformats.org/drawingml/2006/table">
@@ -5843,6 +5838,10 @@
                     <a:bodyPr/>
                     <a:lstStyle/>
                     <a:p>
+                      <a:r>
+                        <a:rPr lang="en-US" dirty="0" err="1"/>
+                        <a:t>Self.map_items</a:t>
+                      </a:r>
                       <a:endParaRPr lang="en-US" dirty="0"/>
                     </a:p>
                   </a:txBody>
@@ -5853,7 +5852,18 @@
                     <a:bodyPr/>
                     <a:lstStyle/>
                     <a:p>
-                      <a:endParaRPr lang="en-US"/>
+                      <a:r>
+                        <a:rPr lang="en-US" dirty="0"/>
+                        <a:t>Needed for the </a:t>
+                      </a:r>
+                      <a:r>
+                        <a:rPr lang="en-US" dirty="0" err="1"/>
+                        <a:t>self.all</a:t>
+                      </a:r>
+                      <a:r>
+                        <a:rPr lang="en-US" dirty="0"/>
+                        <a:t> function to work</a:t>
+                      </a:r>
                     </a:p>
                   </a:txBody>
                   <a:tcPr/>
@@ -5863,7 +5873,10 @@
                     <a:bodyPr/>
                     <a:lstStyle/>
                     <a:p>
-                      <a:endParaRPr lang="en-US"/>
+                      <a:r>
+                        <a:rPr lang="en-US" dirty="0"/>
+                        <a:t>News up new merchant objects into a hash </a:t>
+                      </a:r>
                     </a:p>
                   </a:txBody>
                   <a:tcPr/>
@@ -5873,7 +5886,15 @@
                     <a:bodyPr/>
                     <a:lstStyle/>
                     <a:p>
-                      <a:endParaRPr lang="en-US"/>
+                      <a:r>
+                        <a:rPr lang="en-US" dirty="0"/>
+                        <a:t>Hash of new merchant objects called </a:t>
+                      </a:r>
+                      <a:r>
+                        <a:rPr lang="en-US" dirty="0" err="1"/>
+                        <a:t>merchant_data</a:t>
+                      </a:r>
+                      <a:endParaRPr lang="en-US" dirty="0"/>
                     </a:p>
                   </a:txBody>
                   <a:tcPr/>
@@ -5890,7 +5911,10 @@
                     <a:bodyPr/>
                     <a:lstStyle/>
                     <a:p>
-                      <a:endParaRPr lang="en-US"/>
+                      <a:r>
+                        <a:rPr lang="en-US" dirty="0"/>
+                        <a:t>Merchant</a:t>
+                      </a:r>
                     </a:p>
                   </a:txBody>
                   <a:tcPr/>
@@ -5900,7 +5924,15 @@
                     <a:bodyPr/>
                     <a:lstStyle/>
                     <a:p>
-                      <a:endParaRPr lang="en-US"/>
+                      <a:r>
+                        <a:rPr lang="en-US" dirty="0"/>
+                        <a:t>.update </a:t>
+                      </a:r>
+                      <a:r>
+                        <a:rPr lang="en-US" b="1" dirty="0"/>
+                        <a:t>U</a:t>
+                      </a:r>
+                      <a:endParaRPr lang="en-US" dirty="0"/>
                     </a:p>
                   </a:txBody>
                   <a:tcPr/>
@@ -5910,7 +5942,10 @@
                     <a:bodyPr/>
                     <a:lstStyle/>
                     <a:p>
-                      <a:endParaRPr lang="en-US"/>
+                      <a:r>
+                        <a:rPr lang="en-US" dirty="0"/>
+                        <a:t>User need to be able to change and update merchants</a:t>
+                      </a:r>
                     </a:p>
                   </a:txBody>
                   <a:tcPr/>
@@ -5920,7 +5955,18 @@
                     <a:bodyPr/>
                     <a:lstStyle/>
                     <a:p>
-                      <a:endParaRPr lang="en-US"/>
+                      <a:r>
+                        <a:rPr lang="en-US" dirty="0"/>
+                        <a:t>The name of an existing merchant is changed in Ruby using @</a:t>
+                      </a:r>
+                      <a:r>
+                        <a:rPr lang="en-US" dirty="0" err="1"/>
+                        <a:t>merchant.merchant_name</a:t>
+                      </a:r>
+                      <a:r>
+                        <a:rPr lang="en-US" dirty="0"/>
+                        <a:t>, then the update function is called on that merchant to change it in the database</a:t>
+                      </a:r>
                     </a:p>
                   </a:txBody>
                   <a:tcPr/>
@@ -5930,7 +5976,10 @@
                     <a:bodyPr/>
                     <a:lstStyle/>
                     <a:p>
-                      <a:endParaRPr lang="en-US"/>
+                      <a:r>
+                        <a:rPr lang="en-US" dirty="0"/>
+                        <a:t>No specified output, but the alteration should appear in the database</a:t>
+                      </a:r>
                     </a:p>
                   </a:txBody>
                   <a:tcPr/>
@@ -5941,13 +5990,154 @@
                   </a:ext>
                 </a:extLst>
               </a:tr>
+            </a:tbl>
+          </a:graphicData>
+        </a:graphic>
+      </p:graphicFrame>
+    </p:spTree>
+    <p:extLst>
+      <p:ext uri="{BB962C8B-B14F-4D97-AF65-F5344CB8AC3E}">
+        <p14:creationId xmlns:p14="http://schemas.microsoft.com/office/powerpoint/2010/main" val="4228554045"/>
+      </p:ext>
+    </p:extLst>
+  </p:cSld>
+  <p:clrMapOvr>
+    <a:masterClrMapping/>
+  </p:clrMapOvr>
+</p:sld>
+</file>
+
+<file path=ppt/slides/slide13.xml><?xml version="1.0" encoding="utf-8"?>
+<p:sld xmlns:a="http://schemas.openxmlformats.org/drawingml/2006/main" xmlns:r="http://schemas.openxmlformats.org/officeDocument/2006/relationships" xmlns:p="http://schemas.openxmlformats.org/presentationml/2006/main">
+  <p:cSld>
+    <p:spTree>
+      <p:nvGrpSpPr>
+        <p:cNvPr id="1" name=""/>
+        <p:cNvGrpSpPr/>
+        <p:nvPr/>
+      </p:nvGrpSpPr>
+      <p:grpSpPr>
+        <a:xfrm>
+          <a:off x="0" y="0"/>
+          <a:ext cx="0" cy="0"/>
+          <a:chOff x="0" y="0"/>
+          <a:chExt cx="0" cy="0"/>
+        </a:xfrm>
+      </p:grpSpPr>
+      <p:sp>
+        <p:nvSpPr>
+          <p:cNvPr id="2" name="Title 1">
+            <a:extLst>
+              <a:ext uri="{FF2B5EF4-FFF2-40B4-BE49-F238E27FC236}">
+                <a16:creationId xmlns:a16="http://schemas.microsoft.com/office/drawing/2014/main" id="{76D7CAB5-A4EF-7B43-BD1B-F0A73C0FAF29}"/>
+              </a:ext>
+            </a:extLst>
+          </p:cNvPr>
+          <p:cNvSpPr>
+            <a:spLocks noGrp="1"/>
+          </p:cNvSpPr>
+          <p:nvPr>
+            <p:ph type="title"/>
+          </p:nvPr>
+        </p:nvSpPr>
+        <p:spPr>
+          <a:xfrm>
+            <a:off x="838200" y="365125"/>
+            <a:ext cx="10515600" cy="266887"/>
+          </a:xfrm>
+        </p:spPr>
+        <p:txBody>
+          <a:bodyPr>
+            <a:normAutofit fontScale="90000"/>
+          </a:bodyPr>
+          <a:lstStyle/>
+          <a:p>
+            <a:pPr algn="ctr"/>
+            <a:r>
+              <a:rPr lang="en-US" sz="2800" b="1" dirty="0"/>
+              <a:t>Function rationale – Page 2</a:t>
+            </a:r>
+          </a:p>
+        </p:txBody>
+      </p:sp>
+      <p:graphicFrame>
+        <p:nvGraphicFramePr>
+          <p:cNvPr id="4" name="Table 3">
+            <a:extLst>
+              <a:ext uri="{FF2B5EF4-FFF2-40B4-BE49-F238E27FC236}">
+                <a16:creationId xmlns:a16="http://schemas.microsoft.com/office/drawing/2014/main" id="{AA02A76F-4B68-E947-809B-4E0F1064ECFE}"/>
+              </a:ext>
+            </a:extLst>
+          </p:cNvPr>
+          <p:cNvGraphicFramePr>
+            <a:graphicFrameLocks noGrp="1"/>
+          </p:cNvGraphicFramePr>
+          <p:nvPr>
+            <p:extLst>
+              <p:ext uri="{D42A27DB-BD31-4B8C-83A1-F6EECF244321}">
+                <p14:modId xmlns:p14="http://schemas.microsoft.com/office/powerpoint/2010/main" val="1387531503"/>
+              </p:ext>
+            </p:extLst>
+          </p:nvPr>
+        </p:nvGraphicFramePr>
+        <p:xfrm>
+          <a:off x="85165" y="765885"/>
+          <a:ext cx="12021670" cy="3312160"/>
+        </p:xfrm>
+        <a:graphic>
+          <a:graphicData uri="http://schemas.openxmlformats.org/drawingml/2006/table">
+            <a:tbl>
+              <a:tblPr firstRow="1" bandRow="1">
+                <a:tableStyleId>{5940675A-B579-460E-94D1-54222C63F5DA}</a:tableStyleId>
+              </a:tblPr>
+              <a:tblGrid>
+                <a:gridCol w="1259541">
+                  <a:extLst>
+                    <a:ext uri="{9D8B030D-6E8A-4147-A177-3AD203B41FA5}">
+                      <a16:colId xmlns:a16="http://schemas.microsoft.com/office/drawing/2014/main" val="3310124708"/>
+                    </a:ext>
+                  </a:extLst>
+                </a:gridCol>
+                <a:gridCol w="1761565">
+                  <a:extLst>
+                    <a:ext uri="{9D8B030D-6E8A-4147-A177-3AD203B41FA5}">
+                      <a16:colId xmlns:a16="http://schemas.microsoft.com/office/drawing/2014/main" val="1695059105"/>
+                    </a:ext>
+                  </a:extLst>
+                </a:gridCol>
+                <a:gridCol w="3482788">
+                  <a:extLst>
+                    <a:ext uri="{9D8B030D-6E8A-4147-A177-3AD203B41FA5}">
+                      <a16:colId xmlns:a16="http://schemas.microsoft.com/office/drawing/2014/main" val="2644020309"/>
+                    </a:ext>
+                  </a:extLst>
+                </a:gridCol>
+                <a:gridCol w="3113442">
+                  <a:extLst>
+                    <a:ext uri="{9D8B030D-6E8A-4147-A177-3AD203B41FA5}">
+                      <a16:colId xmlns:a16="http://schemas.microsoft.com/office/drawing/2014/main" val="3698080099"/>
+                    </a:ext>
+                  </a:extLst>
+                </a:gridCol>
+                <a:gridCol w="2404334">
+                  <a:extLst>
+                    <a:ext uri="{9D8B030D-6E8A-4147-A177-3AD203B41FA5}">
+                      <a16:colId xmlns:a16="http://schemas.microsoft.com/office/drawing/2014/main" val="358479963"/>
+                    </a:ext>
+                  </a:extLst>
+                </a:gridCol>
+              </a:tblGrid>
               <a:tr h="370840">
                 <a:tc>
                   <a:txBody>
                     <a:bodyPr/>
                     <a:lstStyle/>
                     <a:p>
-                      <a:endParaRPr lang="en-US"/>
+                      <a:pPr algn="ctr"/>
+                      <a:r>
+                        <a:rPr lang="en-US" b="1" dirty="0"/>
+                        <a:t>Class</a:t>
+                      </a:r>
                     </a:p>
                   </a:txBody>
                   <a:tcPr/>
@@ -5957,7 +6147,11 @@
                     <a:bodyPr/>
                     <a:lstStyle/>
                     <a:p>
-                      <a:endParaRPr lang="en-US"/>
+                      <a:pPr algn="ctr"/>
+                      <a:r>
+                        <a:rPr lang="en-US" b="1" dirty="0"/>
+                        <a:t>Function Name</a:t>
+                      </a:r>
                     </a:p>
                   </a:txBody>
                   <a:tcPr/>
@@ -5967,7 +6161,11 @@
                     <a:bodyPr/>
                     <a:lstStyle/>
                     <a:p>
-                      <a:endParaRPr lang="en-US"/>
+                      <a:pPr algn="ctr"/>
+                      <a:r>
+                        <a:rPr lang="en-US" b="1" dirty="0"/>
+                        <a:t>Why?</a:t>
+                      </a:r>
                     </a:p>
                   </a:txBody>
                   <a:tcPr/>
@@ -5977,7 +6175,11 @@
                     <a:bodyPr/>
                     <a:lstStyle/>
                     <a:p>
-                      <a:endParaRPr lang="en-US" dirty="0"/>
+                      <a:pPr algn="ctr"/>
+                      <a:r>
+                        <a:rPr lang="en-US" b="1" dirty="0"/>
+                        <a:t>How?</a:t>
+                      </a:r>
                     </a:p>
                   </a:txBody>
                   <a:tcPr/>
@@ -5987,14 +6189,334 @@
                     <a:bodyPr/>
                     <a:lstStyle/>
                     <a:p>
-                      <a:endParaRPr lang="en-US" dirty="0"/>
+                      <a:pPr algn="ctr"/>
+                      <a:r>
+                        <a:rPr lang="en-US" b="1" dirty="0"/>
+                        <a:t>Returning</a:t>
+                      </a:r>
                     </a:p>
                   </a:txBody>
                   <a:tcPr/>
                 </a:tc>
                 <a:extLst>
                   <a:ext uri="{0D108BD9-81ED-4DB2-BD59-A6C34878D82A}">
-                    <a16:rowId xmlns:a16="http://schemas.microsoft.com/office/drawing/2014/main" val="4233394324"/>
+                    <a16:rowId xmlns:a16="http://schemas.microsoft.com/office/drawing/2014/main" val="4165366467"/>
+                  </a:ext>
+                </a:extLst>
+              </a:tr>
+              <a:tr h="370840">
+                <a:tc>
+                  <a:txBody>
+                    <a:bodyPr/>
+                    <a:lstStyle/>
+                    <a:p>
+                      <a:r>
+                        <a:rPr lang="en-US" dirty="0"/>
+                        <a:t>Merchant</a:t>
+                      </a:r>
+                    </a:p>
+                  </a:txBody>
+                  <a:tcPr anchor="ctr"/>
+                </a:tc>
+                <a:tc>
+                  <a:txBody>
+                    <a:bodyPr/>
+                    <a:lstStyle/>
+                    <a:p>
+                      <a:r>
+                        <a:rPr lang="en-US" dirty="0"/>
+                        <a:t>Delete by id</a:t>
+                      </a:r>
+                    </a:p>
+                  </a:txBody>
+                  <a:tcPr anchor="ctr"/>
+                </a:tc>
+                <a:tc>
+                  <a:txBody>
+                    <a:bodyPr/>
+                    <a:lstStyle/>
+                    <a:p>
+                      <a:r>
+                        <a:rPr lang="en-US" dirty="0"/>
+                        <a:t>Users will need to have the ability to delete existing merchants</a:t>
+                      </a:r>
+                    </a:p>
+                  </a:txBody>
+                  <a:tcPr anchor="ctr"/>
+                </a:tc>
+                <a:tc>
+                  <a:txBody>
+                    <a:bodyPr/>
+                    <a:lstStyle/>
+                    <a:p>
+                      <a:r>
+                        <a:rPr lang="en-US" dirty="0"/>
+                        <a:t>By selecting the entry with a specific id in the merchants table and deleting it</a:t>
+                      </a:r>
+                    </a:p>
+                  </a:txBody>
+                  <a:tcPr anchor="ctr"/>
+                </a:tc>
+                <a:tc>
+                  <a:txBody>
+                    <a:bodyPr/>
+                    <a:lstStyle/>
+                    <a:p>
+                      <a:r>
+                        <a:rPr lang="en-US" dirty="0"/>
+                        <a:t>The merchant just deleted, not need to display this</a:t>
+                      </a:r>
+                    </a:p>
+                  </a:txBody>
+                  <a:tcPr anchor="ctr"/>
+                </a:tc>
+                <a:extLst>
+                  <a:ext uri="{0D108BD9-81ED-4DB2-BD59-A6C34878D82A}">
+                    <a16:rowId xmlns:a16="http://schemas.microsoft.com/office/drawing/2014/main" val="1323884526"/>
+                  </a:ext>
+                </a:extLst>
+              </a:tr>
+              <a:tr h="370840">
+                <a:tc>
+                  <a:txBody>
+                    <a:bodyPr/>
+                    <a:lstStyle/>
+                    <a:p>
+                      <a:r>
+                        <a:rPr lang="en-US" dirty="0"/>
+                        <a:t>Merchant</a:t>
+                      </a:r>
+                    </a:p>
+                  </a:txBody>
+                  <a:tcPr anchor="ctr"/>
+                </a:tc>
+                <a:tc>
+                  <a:txBody>
+                    <a:bodyPr/>
+                    <a:lstStyle/>
+                    <a:p>
+                      <a:r>
+                        <a:rPr lang="en-US" dirty="0"/>
+                        <a:t>Delete all</a:t>
+                      </a:r>
+                    </a:p>
+                  </a:txBody>
+                  <a:tcPr anchor="ctr"/>
+                </a:tc>
+                <a:tc>
+                  <a:txBody>
+                    <a:bodyPr/>
+                    <a:lstStyle/>
+                    <a:p>
+                      <a:r>
+                        <a:rPr lang="en-US" dirty="0"/>
+                        <a:t>It might be useful for users to be able to delete all their existing merchants</a:t>
+                      </a:r>
+                    </a:p>
+                  </a:txBody>
+                  <a:tcPr anchor="ctr"/>
+                </a:tc>
+                <a:tc>
+                  <a:txBody>
+                    <a:bodyPr/>
+                    <a:lstStyle/>
+                    <a:p>
+                      <a:r>
+                        <a:rPr lang="en-US" dirty="0"/>
+                        <a:t>By selecting everything in the merchants table and deleting it</a:t>
+                      </a:r>
+                    </a:p>
+                  </a:txBody>
+                  <a:tcPr anchor="ctr"/>
+                </a:tc>
+                <a:tc>
+                  <a:txBody>
+                    <a:bodyPr/>
+                    <a:lstStyle/>
+                    <a:p>
+                      <a:r>
+                        <a:rPr lang="en-US"/>
+                        <a:t>No ?</a:t>
+                      </a:r>
+                      <a:endParaRPr lang="en-US" dirty="0"/>
+                    </a:p>
+                  </a:txBody>
+                  <a:tcPr anchor="ctr"/>
+                </a:tc>
+                <a:extLst>
+                  <a:ext uri="{0D108BD9-81ED-4DB2-BD59-A6C34878D82A}">
+                    <a16:rowId xmlns:a16="http://schemas.microsoft.com/office/drawing/2014/main" val="2731388846"/>
+                  </a:ext>
+                </a:extLst>
+              </a:tr>
+              <a:tr h="370840">
+                <a:tc>
+                  <a:txBody>
+                    <a:bodyPr/>
+                    <a:lstStyle/>
+                    <a:p>
+                      <a:endParaRPr lang="en-US" dirty="0"/>
+                    </a:p>
+                  </a:txBody>
+                  <a:tcPr/>
+                </a:tc>
+                <a:tc>
+                  <a:txBody>
+                    <a:bodyPr/>
+                    <a:lstStyle/>
+                    <a:p>
+                      <a:endParaRPr lang="en-US" dirty="0"/>
+                    </a:p>
+                  </a:txBody>
+                  <a:tcPr/>
+                </a:tc>
+                <a:tc>
+                  <a:txBody>
+                    <a:bodyPr/>
+                    <a:lstStyle/>
+                    <a:p>
+                      <a:endParaRPr lang="en-US" dirty="0"/>
+                    </a:p>
+                  </a:txBody>
+                  <a:tcPr/>
+                </a:tc>
+                <a:tc>
+                  <a:txBody>
+                    <a:bodyPr/>
+                    <a:lstStyle/>
+                    <a:p>
+                      <a:endParaRPr lang="en-US" dirty="0"/>
+                    </a:p>
+                  </a:txBody>
+                  <a:tcPr/>
+                </a:tc>
+                <a:tc>
+                  <a:txBody>
+                    <a:bodyPr/>
+                    <a:lstStyle/>
+                    <a:p>
+                      <a:endParaRPr lang="en-US" dirty="0"/>
+                    </a:p>
+                  </a:txBody>
+                  <a:tcPr/>
+                </a:tc>
+                <a:extLst>
+                  <a:ext uri="{0D108BD9-81ED-4DB2-BD59-A6C34878D82A}">
+                    <a16:rowId xmlns:a16="http://schemas.microsoft.com/office/drawing/2014/main" val="3831984839"/>
+                  </a:ext>
+                </a:extLst>
+              </a:tr>
+              <a:tr h="370840">
+                <a:tc>
+                  <a:txBody>
+                    <a:bodyPr/>
+                    <a:lstStyle/>
+                    <a:p>
+                      <a:endParaRPr lang="en-US" dirty="0"/>
+                    </a:p>
+                  </a:txBody>
+                  <a:tcPr/>
+                </a:tc>
+                <a:tc>
+                  <a:txBody>
+                    <a:bodyPr/>
+                    <a:lstStyle/>
+                    <a:p>
+                      <a:endParaRPr lang="en-US" dirty="0"/>
+                    </a:p>
+                  </a:txBody>
+                  <a:tcPr/>
+                </a:tc>
+                <a:tc>
+                  <a:txBody>
+                    <a:bodyPr/>
+                    <a:lstStyle/>
+                    <a:p>
+                      <a:endParaRPr lang="en-US" dirty="0"/>
+                    </a:p>
+                  </a:txBody>
+                  <a:tcPr/>
+                </a:tc>
+                <a:tc>
+                  <a:txBody>
+                    <a:bodyPr/>
+                    <a:lstStyle/>
+                    <a:p>
+                      <a:endParaRPr lang="en-US" dirty="0"/>
+                    </a:p>
+                  </a:txBody>
+                  <a:tcPr/>
+                </a:tc>
+                <a:tc>
+                  <a:txBody>
+                    <a:bodyPr/>
+                    <a:lstStyle/>
+                    <a:p>
+                      <a:endParaRPr lang="en-US" dirty="0"/>
+                    </a:p>
+                  </a:txBody>
+                  <a:tcPr/>
+                </a:tc>
+                <a:extLst>
+                  <a:ext uri="{0D108BD9-81ED-4DB2-BD59-A6C34878D82A}">
+                    <a16:rowId xmlns:a16="http://schemas.microsoft.com/office/drawing/2014/main" val="1081334054"/>
+                  </a:ext>
+                </a:extLst>
+              </a:tr>
+              <a:tr h="370840">
+                <a:tc>
+                  <a:txBody>
+                    <a:bodyPr/>
+                    <a:lstStyle/>
+                    <a:p>
+                      <a:endParaRPr lang="en-US" dirty="0"/>
+                    </a:p>
+                  </a:txBody>
+                  <a:tcPr/>
+                </a:tc>
+                <a:tc>
+                  <a:txBody>
+                    <a:bodyPr/>
+                    <a:lstStyle/>
+                    <a:p>
+                      <a:endParaRPr lang="en-US" dirty="0"/>
+                    </a:p>
+                  </a:txBody>
+                  <a:tcPr/>
+                </a:tc>
+                <a:tc>
+                  <a:txBody>
+                    <a:bodyPr/>
+                    <a:lstStyle/>
+                    <a:p>
+                      <a:endParaRPr lang="en-US" dirty="0"/>
+                    </a:p>
+                  </a:txBody>
+                  <a:tcPr/>
+                </a:tc>
+                <a:tc>
+                  <a:txBody>
+                    <a:bodyPr/>
+                    <a:lstStyle/>
+                    <a:p>
+                      <a:endParaRPr lang="en-US" dirty="0"/>
+                    </a:p>
+                  </a:txBody>
+                  <a:tcPr/>
+                </a:tc>
+                <a:tc>
+                  <a:txBody>
+                    <a:bodyPr/>
+                    <a:lstStyle/>
+                    <a:p>
+                      <a:endParaRPr lang="en-US" dirty="0"/>
+                    </a:p>
+                  </a:txBody>
+                  <a:tcPr/>
+                </a:tc>
+                <a:extLst>
+                  <a:ext uri="{0D108BD9-81ED-4DB2-BD59-A6C34878D82A}">
+                    <a16:rowId xmlns:a16="http://schemas.microsoft.com/office/drawing/2014/main" val="2432464653"/>
                   </a:ext>
                 </a:extLst>
               </a:tr>

</xml_diff>

<commit_message>
budgets and budget_transcations tables and table dependency diagram added to ppt
</commit_message>
<xml_diff>
--- a/Plans_Project_Management/Budget_App_Plan_08Nov2018.pptx
+++ b/Plans_Project_Management/Budget_App_Plan_08Nov2018.pptx
@@ -14,10 +14,12 @@
     <p:sldId id="265" r:id="rId8"/>
     <p:sldId id="262" r:id="rId9"/>
     <p:sldId id="263" r:id="rId10"/>
-    <p:sldId id="264" r:id="rId11"/>
-    <p:sldId id="257" r:id="rId12"/>
-    <p:sldId id="268" r:id="rId13"/>
-    <p:sldId id="266" r:id="rId14"/>
+    <p:sldId id="270" r:id="rId11"/>
+    <p:sldId id="264" r:id="rId12"/>
+    <p:sldId id="257" r:id="rId13"/>
+    <p:sldId id="268" r:id="rId14"/>
+    <p:sldId id="266" r:id="rId15"/>
+    <p:sldId id="269" r:id="rId16"/>
   </p:sldIdLst>
   <p:sldSz cx="12192000" cy="6858000"/>
   <p:notesSz cx="6858000" cy="9144000"/>
@@ -3438,6 +3440,519 @@
           <p:cNvPr id="2" name="Title 1">
             <a:extLst>
               <a:ext uri="{FF2B5EF4-FFF2-40B4-BE49-F238E27FC236}">
+                <a16:creationId xmlns:a16="http://schemas.microsoft.com/office/drawing/2014/main" id="{E4F275E3-3B14-814F-B029-FABBCFDA9885}"/>
+              </a:ext>
+            </a:extLst>
+          </p:cNvPr>
+          <p:cNvSpPr>
+            <a:spLocks noGrp="1"/>
+          </p:cNvSpPr>
+          <p:nvPr>
+            <p:ph type="title"/>
+          </p:nvPr>
+        </p:nvSpPr>
+        <p:spPr/>
+        <p:txBody>
+          <a:bodyPr/>
+          <a:lstStyle/>
+          <a:p>
+            <a:r>
+              <a:rPr lang="en-US" dirty="0"/>
+              <a:t>Table Dependencies</a:t>
+            </a:r>
+          </a:p>
+        </p:txBody>
+      </p:sp>
+      <p:sp>
+        <p:nvSpPr>
+          <p:cNvPr id="4" name="Rounded Rectangle 3">
+            <a:extLst>
+              <a:ext uri="{FF2B5EF4-FFF2-40B4-BE49-F238E27FC236}">
+                <a16:creationId xmlns:a16="http://schemas.microsoft.com/office/drawing/2014/main" id="{45208BDA-1E02-2A45-A677-D1AB90CDDCAA}"/>
+              </a:ext>
+            </a:extLst>
+          </p:cNvPr>
+          <p:cNvSpPr/>
+          <p:nvPr/>
+        </p:nvSpPr>
+        <p:spPr>
+          <a:xfrm>
+            <a:off x="254000" y="1690688"/>
+            <a:ext cx="3115734" cy="660400"/>
+          </a:xfrm>
+          <a:prstGeom prst="roundRect">
+            <a:avLst/>
+          </a:prstGeom>
+          <a:solidFill>
+            <a:srgbClr val="FFFD78"/>
+          </a:solidFill>
+        </p:spPr>
+        <p:style>
+          <a:lnRef idx="2">
+            <a:schemeClr val="accent1">
+              <a:shade val="50000"/>
+            </a:schemeClr>
+          </a:lnRef>
+          <a:fillRef idx="1">
+            <a:schemeClr val="accent1"/>
+          </a:fillRef>
+          <a:effectRef idx="0">
+            <a:schemeClr val="accent1"/>
+          </a:effectRef>
+          <a:fontRef idx="minor">
+            <a:schemeClr val="lt1"/>
+          </a:fontRef>
+        </p:style>
+        <p:txBody>
+          <a:bodyPr rtlCol="0" anchor="ctr"/>
+          <a:lstStyle/>
+          <a:p>
+            <a:pPr algn="ctr"/>
+            <a:r>
+              <a:rPr lang="en-US" sz="2800" dirty="0">
+                <a:solidFill>
+                  <a:schemeClr val="tx1"/>
+                </a:solidFill>
+              </a:rPr>
+              <a:t>Merchants</a:t>
+            </a:r>
+          </a:p>
+        </p:txBody>
+      </p:sp>
+      <p:sp>
+        <p:nvSpPr>
+          <p:cNvPr id="5" name="Rounded Rectangle 4">
+            <a:extLst>
+              <a:ext uri="{FF2B5EF4-FFF2-40B4-BE49-F238E27FC236}">
+                <a16:creationId xmlns:a16="http://schemas.microsoft.com/office/drawing/2014/main" id="{0D67E4FD-5AFE-3246-8547-58C4E0461E38}"/>
+              </a:ext>
+            </a:extLst>
+          </p:cNvPr>
+          <p:cNvSpPr/>
+          <p:nvPr/>
+        </p:nvSpPr>
+        <p:spPr>
+          <a:xfrm>
+            <a:off x="4318000" y="1690688"/>
+            <a:ext cx="3115734" cy="660400"/>
+          </a:xfrm>
+          <a:prstGeom prst="roundRect">
+            <a:avLst/>
+          </a:prstGeom>
+          <a:solidFill>
+            <a:srgbClr val="FFC000"/>
+          </a:solidFill>
+        </p:spPr>
+        <p:style>
+          <a:lnRef idx="2">
+            <a:schemeClr val="accent1">
+              <a:shade val="50000"/>
+            </a:schemeClr>
+          </a:lnRef>
+          <a:fillRef idx="1">
+            <a:schemeClr val="accent1"/>
+          </a:fillRef>
+          <a:effectRef idx="0">
+            <a:schemeClr val="accent1"/>
+          </a:effectRef>
+          <a:fontRef idx="minor">
+            <a:schemeClr val="lt1"/>
+          </a:fontRef>
+        </p:style>
+        <p:txBody>
+          <a:bodyPr rtlCol="0" anchor="ctr"/>
+          <a:lstStyle/>
+          <a:p>
+            <a:pPr algn="ctr"/>
+            <a:r>
+              <a:rPr lang="en-US" sz="2800" dirty="0"/>
+              <a:t>Tags</a:t>
+            </a:r>
+          </a:p>
+        </p:txBody>
+      </p:sp>
+      <p:sp>
+        <p:nvSpPr>
+          <p:cNvPr id="7" name="Rounded Rectangle 6">
+            <a:extLst>
+              <a:ext uri="{FF2B5EF4-FFF2-40B4-BE49-F238E27FC236}">
+                <a16:creationId xmlns:a16="http://schemas.microsoft.com/office/drawing/2014/main" id="{608E0B89-06BB-534C-BCC3-421CCABEBEAB}"/>
+              </a:ext>
+            </a:extLst>
+          </p:cNvPr>
+          <p:cNvSpPr/>
+          <p:nvPr/>
+        </p:nvSpPr>
+        <p:spPr>
+          <a:xfrm>
+            <a:off x="4250267" y="4938712"/>
+            <a:ext cx="3251200" cy="660400"/>
+          </a:xfrm>
+          <a:prstGeom prst="roundRect">
+            <a:avLst/>
+          </a:prstGeom>
+          <a:solidFill>
+            <a:srgbClr val="206593"/>
+          </a:solidFill>
+        </p:spPr>
+        <p:style>
+          <a:lnRef idx="2">
+            <a:schemeClr val="accent1">
+              <a:shade val="50000"/>
+            </a:schemeClr>
+          </a:lnRef>
+          <a:fillRef idx="1">
+            <a:schemeClr val="accent1"/>
+          </a:fillRef>
+          <a:effectRef idx="0">
+            <a:schemeClr val="accent1"/>
+          </a:effectRef>
+          <a:fontRef idx="minor">
+            <a:schemeClr val="lt1"/>
+          </a:fontRef>
+        </p:style>
+        <p:txBody>
+          <a:bodyPr rtlCol="0" anchor="ctr"/>
+          <a:lstStyle/>
+          <a:p>
+            <a:pPr algn="ctr"/>
+            <a:r>
+              <a:rPr lang="en-US" sz="2800" dirty="0"/>
+              <a:t>Budget_transactions</a:t>
+            </a:r>
+          </a:p>
+        </p:txBody>
+      </p:sp>
+      <p:grpSp>
+        <p:nvGrpSpPr>
+          <p:cNvPr id="11" name="Group 10">
+            <a:extLst>
+              <a:ext uri="{FF2B5EF4-FFF2-40B4-BE49-F238E27FC236}">
+                <a16:creationId xmlns:a16="http://schemas.microsoft.com/office/drawing/2014/main" id="{13A7AD95-51EB-0648-97F9-F5D893550B35}"/>
+              </a:ext>
+            </a:extLst>
+          </p:cNvPr>
+          <p:cNvGrpSpPr/>
+          <p:nvPr/>
+        </p:nvGrpSpPr>
+        <p:grpSpPr>
+          <a:xfrm>
+            <a:off x="2286000" y="3314700"/>
+            <a:ext cx="7230530" cy="660400"/>
+            <a:chOff x="2286000" y="2991910"/>
+            <a:chExt cx="7230530" cy="660400"/>
+          </a:xfrm>
+        </p:grpSpPr>
+        <p:sp>
+          <p:nvSpPr>
+            <p:cNvPr id="6" name="Rounded Rectangle 5">
+              <a:extLst>
+                <a:ext uri="{FF2B5EF4-FFF2-40B4-BE49-F238E27FC236}">
+                  <a16:creationId xmlns:a16="http://schemas.microsoft.com/office/drawing/2014/main" id="{AC6D0035-C6FE-8641-973B-061002ADA8FF}"/>
+                </a:ext>
+              </a:extLst>
+            </p:cNvPr>
+            <p:cNvSpPr/>
+            <p:nvPr/>
+          </p:nvSpPr>
+          <p:spPr>
+            <a:xfrm>
+              <a:off x="2286000" y="2991910"/>
+              <a:ext cx="3115734" cy="660400"/>
+            </a:xfrm>
+            <a:prstGeom prst="roundRect">
+              <a:avLst/>
+            </a:prstGeom>
+            <a:solidFill>
+              <a:srgbClr val="33C1C4"/>
+            </a:solidFill>
+          </p:spPr>
+          <p:style>
+            <a:lnRef idx="2">
+              <a:schemeClr val="accent1">
+                <a:shade val="50000"/>
+              </a:schemeClr>
+            </a:lnRef>
+            <a:fillRef idx="1">
+              <a:schemeClr val="accent1"/>
+            </a:fillRef>
+            <a:effectRef idx="0">
+              <a:schemeClr val="accent1"/>
+            </a:effectRef>
+            <a:fontRef idx="minor">
+              <a:schemeClr val="lt1"/>
+            </a:fontRef>
+          </p:style>
+          <p:txBody>
+            <a:bodyPr rtlCol="0" anchor="ctr"/>
+            <a:lstStyle/>
+            <a:p>
+              <a:pPr algn="ctr"/>
+              <a:r>
+                <a:rPr lang="en-US" sz="2800" dirty="0"/>
+                <a:t>Transactions</a:t>
+              </a:r>
+            </a:p>
+          </p:txBody>
+        </p:sp>
+        <p:sp>
+          <p:nvSpPr>
+            <p:cNvPr id="8" name="Rounded Rectangle 7">
+              <a:extLst>
+                <a:ext uri="{FF2B5EF4-FFF2-40B4-BE49-F238E27FC236}">
+                  <a16:creationId xmlns:a16="http://schemas.microsoft.com/office/drawing/2014/main" id="{8854CFE1-8E8B-6445-A9EA-164A6F914AE9}"/>
+                </a:ext>
+              </a:extLst>
+            </p:cNvPr>
+            <p:cNvSpPr/>
+            <p:nvPr/>
+          </p:nvSpPr>
+          <p:spPr>
+            <a:xfrm>
+              <a:off x="6400796" y="2991910"/>
+              <a:ext cx="3115734" cy="660400"/>
+            </a:xfrm>
+            <a:prstGeom prst="roundRect">
+              <a:avLst/>
+            </a:prstGeom>
+            <a:solidFill>
+              <a:srgbClr val="002060"/>
+            </a:solidFill>
+          </p:spPr>
+          <p:style>
+            <a:lnRef idx="2">
+              <a:schemeClr val="accent1">
+                <a:shade val="50000"/>
+              </a:schemeClr>
+            </a:lnRef>
+            <a:fillRef idx="1">
+              <a:schemeClr val="accent1"/>
+            </a:fillRef>
+            <a:effectRef idx="0">
+              <a:schemeClr val="accent1"/>
+            </a:effectRef>
+            <a:fontRef idx="minor">
+              <a:schemeClr val="lt1"/>
+            </a:fontRef>
+          </p:style>
+          <p:txBody>
+            <a:bodyPr rtlCol="0" anchor="ctr"/>
+            <a:lstStyle/>
+            <a:p>
+              <a:pPr algn="ctr"/>
+              <a:r>
+                <a:rPr lang="en-US" sz="2800" dirty="0"/>
+                <a:t>Budgets</a:t>
+              </a:r>
+            </a:p>
+          </p:txBody>
+        </p:sp>
+      </p:grpSp>
+      <p:cxnSp>
+        <p:nvCxnSpPr>
+          <p:cNvPr id="13" name="Straight Arrow Connector 12">
+            <a:extLst>
+              <a:ext uri="{FF2B5EF4-FFF2-40B4-BE49-F238E27FC236}">
+                <a16:creationId xmlns:a16="http://schemas.microsoft.com/office/drawing/2014/main" id="{C45E91E8-854C-254C-B56F-734221FA49F3}"/>
+              </a:ext>
+            </a:extLst>
+          </p:cNvPr>
+          <p:cNvCxnSpPr>
+            <a:cxnSpLocks/>
+            <a:stCxn id="6" idx="2"/>
+            <a:endCxn id="7" idx="0"/>
+          </p:cNvCxnSpPr>
+          <p:nvPr/>
+        </p:nvCxnSpPr>
+        <p:spPr>
+          <a:xfrm>
+            <a:off x="3843867" y="3975100"/>
+            <a:ext cx="2032000" cy="963612"/>
+          </a:xfrm>
+          <a:prstGeom prst="straightConnector1">
+            <a:avLst/>
+          </a:prstGeom>
+          <a:ln w="38100">
+            <a:headEnd type="triangle"/>
+            <a:tailEnd type="none"/>
+          </a:ln>
+        </p:spPr>
+        <p:style>
+          <a:lnRef idx="1">
+            <a:schemeClr val="dk1"/>
+          </a:lnRef>
+          <a:fillRef idx="0">
+            <a:schemeClr val="dk1"/>
+          </a:fillRef>
+          <a:effectRef idx="0">
+            <a:schemeClr val="dk1"/>
+          </a:effectRef>
+          <a:fontRef idx="minor">
+            <a:schemeClr val="tx1"/>
+          </a:fontRef>
+        </p:style>
+      </p:cxnSp>
+      <p:cxnSp>
+        <p:nvCxnSpPr>
+          <p:cNvPr id="16" name="Straight Arrow Connector 15">
+            <a:extLst>
+              <a:ext uri="{FF2B5EF4-FFF2-40B4-BE49-F238E27FC236}">
+                <a16:creationId xmlns:a16="http://schemas.microsoft.com/office/drawing/2014/main" id="{9F14E514-D53C-5C40-8776-6818E7916AE0}"/>
+              </a:ext>
+            </a:extLst>
+          </p:cNvPr>
+          <p:cNvCxnSpPr>
+            <a:cxnSpLocks/>
+          </p:cNvCxnSpPr>
+          <p:nvPr/>
+        </p:nvCxnSpPr>
+        <p:spPr>
+          <a:xfrm flipH="1">
+            <a:off x="5875867" y="3975100"/>
+            <a:ext cx="2032000" cy="963612"/>
+          </a:xfrm>
+          <a:prstGeom prst="straightConnector1">
+            <a:avLst/>
+          </a:prstGeom>
+          <a:ln w="38100">
+            <a:headEnd type="triangle"/>
+            <a:tailEnd type="none"/>
+          </a:ln>
+        </p:spPr>
+        <p:style>
+          <a:lnRef idx="1">
+            <a:schemeClr val="dk1"/>
+          </a:lnRef>
+          <a:fillRef idx="0">
+            <a:schemeClr val="dk1"/>
+          </a:fillRef>
+          <a:effectRef idx="0">
+            <a:schemeClr val="dk1"/>
+          </a:effectRef>
+          <a:fontRef idx="minor">
+            <a:schemeClr val="tx1"/>
+          </a:fontRef>
+        </p:style>
+      </p:cxnSp>
+      <p:cxnSp>
+        <p:nvCxnSpPr>
+          <p:cNvPr id="17" name="Straight Arrow Connector 16">
+            <a:extLst>
+              <a:ext uri="{FF2B5EF4-FFF2-40B4-BE49-F238E27FC236}">
+                <a16:creationId xmlns:a16="http://schemas.microsoft.com/office/drawing/2014/main" id="{09FDDAD4-9017-FA46-91FC-47FB0C256153}"/>
+              </a:ext>
+            </a:extLst>
+          </p:cNvPr>
+          <p:cNvCxnSpPr>
+            <a:cxnSpLocks/>
+          </p:cNvCxnSpPr>
+          <p:nvPr/>
+        </p:nvCxnSpPr>
+        <p:spPr>
+          <a:xfrm>
+            <a:off x="1811867" y="2346855"/>
+            <a:ext cx="2032000" cy="963612"/>
+          </a:xfrm>
+          <a:prstGeom prst="straightConnector1">
+            <a:avLst/>
+          </a:prstGeom>
+          <a:ln w="38100">
+            <a:headEnd type="triangle"/>
+            <a:tailEnd type="none"/>
+          </a:ln>
+        </p:spPr>
+        <p:style>
+          <a:lnRef idx="1">
+            <a:schemeClr val="dk1"/>
+          </a:lnRef>
+          <a:fillRef idx="0">
+            <a:schemeClr val="dk1"/>
+          </a:fillRef>
+          <a:effectRef idx="0">
+            <a:schemeClr val="dk1"/>
+          </a:effectRef>
+          <a:fontRef idx="minor">
+            <a:schemeClr val="tx1"/>
+          </a:fontRef>
+        </p:style>
+      </p:cxnSp>
+      <p:cxnSp>
+        <p:nvCxnSpPr>
+          <p:cNvPr id="18" name="Straight Arrow Connector 17">
+            <a:extLst>
+              <a:ext uri="{FF2B5EF4-FFF2-40B4-BE49-F238E27FC236}">
+                <a16:creationId xmlns:a16="http://schemas.microsoft.com/office/drawing/2014/main" id="{9164C5DD-A028-F04F-BAF4-52F1C2CFD4E8}"/>
+              </a:ext>
+            </a:extLst>
+          </p:cNvPr>
+          <p:cNvCxnSpPr>
+            <a:cxnSpLocks/>
+          </p:cNvCxnSpPr>
+          <p:nvPr/>
+        </p:nvCxnSpPr>
+        <p:spPr>
+          <a:xfrm flipH="1">
+            <a:off x="3843867" y="2346855"/>
+            <a:ext cx="2032000" cy="963612"/>
+          </a:xfrm>
+          <a:prstGeom prst="straightConnector1">
+            <a:avLst/>
+          </a:prstGeom>
+          <a:ln w="38100">
+            <a:headEnd type="triangle"/>
+            <a:tailEnd type="none"/>
+          </a:ln>
+        </p:spPr>
+        <p:style>
+          <a:lnRef idx="1">
+            <a:schemeClr val="dk1"/>
+          </a:lnRef>
+          <a:fillRef idx="0">
+            <a:schemeClr val="dk1"/>
+          </a:fillRef>
+          <a:effectRef idx="0">
+            <a:schemeClr val="dk1"/>
+          </a:effectRef>
+          <a:fontRef idx="minor">
+            <a:schemeClr val="tx1"/>
+          </a:fontRef>
+        </p:style>
+      </p:cxnSp>
+    </p:spTree>
+    <p:extLst>
+      <p:ext uri="{BB962C8B-B14F-4D97-AF65-F5344CB8AC3E}">
+        <p14:creationId xmlns:p14="http://schemas.microsoft.com/office/powerpoint/2010/main" val="2686663812"/>
+      </p:ext>
+    </p:extLst>
+  </p:cSld>
+  <p:clrMapOvr>
+    <a:masterClrMapping/>
+  </p:clrMapOvr>
+</p:sld>
+</file>
+
+<file path=ppt/slides/slide11.xml><?xml version="1.0" encoding="utf-8"?>
+<p:sld xmlns:a="http://schemas.openxmlformats.org/drawingml/2006/main" xmlns:r="http://schemas.openxmlformats.org/officeDocument/2006/relationships" xmlns:p="http://schemas.openxmlformats.org/presentationml/2006/main">
+  <p:cSld>
+    <p:spTree>
+      <p:nvGrpSpPr>
+        <p:cNvPr id="1" name=""/>
+        <p:cNvGrpSpPr/>
+        <p:nvPr/>
+      </p:nvGrpSpPr>
+      <p:grpSpPr>
+        <a:xfrm>
+          <a:off x="0" y="0"/>
+          <a:ext cx="0" cy="0"/>
+          <a:chOff x="0" y="0"/>
+          <a:chExt cx="0" cy="0"/>
+        </a:xfrm>
+      </p:grpSpPr>
+      <p:sp>
+        <p:nvSpPr>
+          <p:cNvPr id="2" name="Title 1">
+            <a:extLst>
+              <a:ext uri="{FF2B5EF4-FFF2-40B4-BE49-F238E27FC236}">
                 <a16:creationId xmlns:a16="http://schemas.microsoft.com/office/drawing/2014/main" id="{A3FA626A-39B1-794F-9A3F-83D37F75B451}"/>
               </a:ext>
             </a:extLst>
@@ -4305,7 +4820,7 @@
 </p:sld>
 </file>
 
-<file path=ppt/slides/slide11.xml><?xml version="1.0" encoding="utf-8"?>
+<file path=ppt/slides/slide12.xml><?xml version="1.0" encoding="utf-8"?>
 <p:sld xmlns:a="http://schemas.openxmlformats.org/drawingml/2006/main" xmlns:r="http://schemas.openxmlformats.org/officeDocument/2006/relationships" xmlns:p="http://schemas.openxmlformats.org/presentationml/2006/main">
   <p:cSld>
     <p:spTree>
@@ -5369,7 +5884,7 @@
 </p:sld>
 </file>
 
-<file path=ppt/slides/slide12.xml><?xml version="1.0" encoding="utf-8"?>
+<file path=ppt/slides/slide13.xml><?xml version="1.0" encoding="utf-8"?>
 <p:sld xmlns:a="http://schemas.openxmlformats.org/drawingml/2006/main" xmlns:r="http://schemas.openxmlformats.org/officeDocument/2006/relationships" xmlns:p="http://schemas.openxmlformats.org/presentationml/2006/main">
   <p:cSld>
     <p:spTree>
@@ -6007,7 +6522,7 @@
 </p:sld>
 </file>
 
-<file path=ppt/slides/slide13.xml><?xml version="1.0" encoding="utf-8"?>
+<file path=ppt/slides/slide14.xml><?xml version="1.0" encoding="utf-8"?>
 <p:sld xmlns:a="http://schemas.openxmlformats.org/drawingml/2006/main" xmlns:r="http://schemas.openxmlformats.org/officeDocument/2006/relationships" xmlns:p="http://schemas.openxmlformats.org/presentationml/2006/main">
   <p:cSld>
     <p:spTree>
@@ -6075,7 +6590,7 @@
           <p:nvPr>
             <p:extLst>
               <p:ext uri="{D42A27DB-BD31-4B8C-83A1-F6EECF244321}">
-                <p14:modId xmlns:p14="http://schemas.microsoft.com/office/powerpoint/2010/main" val="1387531503"/>
+                <p14:modId xmlns:p14="http://schemas.microsoft.com/office/powerpoint/2010/main" val="4012866511"/>
               </p:ext>
             </p:extLst>
           </p:nvPr>
@@ -6225,8 +6740,13 @@
                     <a:p>
                       <a:r>
                         <a:rPr lang="en-US" dirty="0"/>
-                        <a:t>Delete by id</a:t>
-                      </a:r>
+                        <a:t>Delete by id </a:t>
+                      </a:r>
+                      <a:r>
+                        <a:rPr lang="en-US" b="1" dirty="0"/>
+                        <a:t>D</a:t>
+                      </a:r>
+                      <a:endParaRPr lang="en-US" dirty="0"/>
                     </a:p>
                   </a:txBody>
                   <a:tcPr anchor="ctr"/>
@@ -6297,8 +6817,13 @@
                     <a:p>
                       <a:r>
                         <a:rPr lang="en-US" dirty="0"/>
-                        <a:t>Delete all</a:t>
-                      </a:r>
+                        <a:t>Delete all </a:t>
+                      </a:r>
+                      <a:r>
+                        <a:rPr lang="en-US" b="1" dirty="0"/>
+                        <a:t>D</a:t>
+                      </a:r>
+                      <a:endParaRPr lang="en-US" dirty="0"/>
                     </a:p>
                   </a:txBody>
                   <a:tcPr anchor="ctr"/>
@@ -6335,10 +6860,9 @@
                     <a:lstStyle/>
                     <a:p>
                       <a:r>
-                        <a:rPr lang="en-US"/>
+                        <a:rPr lang="en-US" dirty="0"/>
                         <a:t>No ?</a:t>
                       </a:r>
-                      <a:endParaRPr lang="en-US" dirty="0"/>
                     </a:p>
                   </a:txBody>
                   <a:tcPr anchor="ctr"/>
@@ -6528,6 +7052,161 @@
     <p:extLst>
       <p:ext uri="{BB962C8B-B14F-4D97-AF65-F5344CB8AC3E}">
         <p14:creationId xmlns:p14="http://schemas.microsoft.com/office/powerpoint/2010/main" val="3728071061"/>
+      </p:ext>
+    </p:extLst>
+  </p:cSld>
+  <p:clrMapOvr>
+    <a:masterClrMapping/>
+  </p:clrMapOvr>
+</p:sld>
+</file>
+
+<file path=ppt/slides/slide15.xml><?xml version="1.0" encoding="utf-8"?>
+<p:sld xmlns:a="http://schemas.openxmlformats.org/drawingml/2006/main" xmlns:r="http://schemas.openxmlformats.org/officeDocument/2006/relationships" xmlns:p="http://schemas.openxmlformats.org/presentationml/2006/main">
+  <p:cSld>
+    <p:spTree>
+      <p:nvGrpSpPr>
+        <p:cNvPr id="1" name=""/>
+        <p:cNvGrpSpPr/>
+        <p:nvPr/>
+      </p:nvGrpSpPr>
+      <p:grpSpPr>
+        <a:xfrm>
+          <a:off x="0" y="0"/>
+          <a:ext cx="0" cy="0"/>
+          <a:chOff x="0" y="0"/>
+          <a:chExt cx="0" cy="0"/>
+        </a:xfrm>
+      </p:grpSpPr>
+      <p:sp>
+        <p:nvSpPr>
+          <p:cNvPr id="2" name="Title 1">
+            <a:extLst>
+              <a:ext uri="{FF2B5EF4-FFF2-40B4-BE49-F238E27FC236}">
+                <a16:creationId xmlns:a16="http://schemas.microsoft.com/office/drawing/2014/main" id="{D68B12F6-2D39-E846-81AC-2332B628DD2B}"/>
+              </a:ext>
+            </a:extLst>
+          </p:cNvPr>
+          <p:cNvSpPr>
+            <a:spLocks noGrp="1"/>
+          </p:cNvSpPr>
+          <p:nvPr>
+            <p:ph type="title"/>
+          </p:nvPr>
+        </p:nvSpPr>
+        <p:spPr/>
+        <p:txBody>
+          <a:bodyPr/>
+          <a:lstStyle/>
+          <a:p>
+            <a:r>
+              <a:rPr lang="en-US" dirty="0"/>
+              <a:t>Merchant Class Checklist (Back-end)</a:t>
+            </a:r>
+          </a:p>
+        </p:txBody>
+      </p:sp>
+      <p:sp>
+        <p:nvSpPr>
+          <p:cNvPr id="3" name="Content Placeholder 2">
+            <a:extLst>
+              <a:ext uri="{FF2B5EF4-FFF2-40B4-BE49-F238E27FC236}">
+                <a16:creationId xmlns:a16="http://schemas.microsoft.com/office/drawing/2014/main" id="{1FC5DA40-2C2D-594D-B150-4D8418E46839}"/>
+              </a:ext>
+            </a:extLst>
+          </p:cNvPr>
+          <p:cNvSpPr>
+            <a:spLocks noGrp="1"/>
+          </p:cNvSpPr>
+          <p:nvPr>
+            <p:ph idx="1"/>
+          </p:nvPr>
+        </p:nvSpPr>
+        <p:spPr/>
+        <p:txBody>
+          <a:bodyPr>
+            <a:normAutofit/>
+          </a:bodyPr>
+          <a:lstStyle/>
+          <a:p>
+            <a:pPr marL="0" indent="0">
+              <a:buNone/>
+            </a:pPr>
+            <a:r>
+              <a:rPr lang="en-GB" dirty="0"/>
+              <a:t>Build an app that allows a user to track their spending.</a:t>
+            </a:r>
+          </a:p>
+          <a:p>
+            <a:pPr marL="0" indent="0">
+              <a:buNone/>
+            </a:pPr>
+            <a:r>
+              <a:rPr lang="en-GB" b="1" dirty="0"/>
+              <a:t>MVP</a:t>
+            </a:r>
+          </a:p>
+          <a:p>
+            <a:pPr lvl="1"/>
+            <a:r>
+              <a:rPr lang="en-GB" dirty="0"/>
+              <a:t>The app should allow the user to </a:t>
+            </a:r>
+          </a:p>
+          <a:p>
+            <a:pPr lvl="2"/>
+            <a:r>
+              <a:rPr lang="en-GB" strike="sngStrike" dirty="0"/>
+              <a:t>create</a:t>
+            </a:r>
+            <a:r>
+              <a:rPr lang="en-GB" dirty="0"/>
+              <a:t>, </a:t>
+            </a:r>
+          </a:p>
+          <a:p>
+            <a:pPr lvl="2"/>
+            <a:r>
+              <a:rPr lang="en-GB" strike="sngStrike" dirty="0"/>
+              <a:t>edit</a:t>
+            </a:r>
+            <a:r>
+              <a:rPr lang="en-GB" dirty="0"/>
+              <a:t> </a:t>
+            </a:r>
+          </a:p>
+          <a:p>
+            <a:pPr lvl="2"/>
+            <a:r>
+              <a:rPr lang="en-GB" dirty="0"/>
+              <a:t>and </a:t>
+            </a:r>
+            <a:r>
+              <a:rPr lang="en-GB" strike="sngStrike" dirty="0"/>
+              <a:t>delete</a:t>
+            </a:r>
+            <a:r>
+              <a:rPr lang="en-GB" dirty="0"/>
+              <a:t> merchants, e.g. Tesco, Amazon, </a:t>
+            </a:r>
+            <a:r>
+              <a:rPr lang="en-GB" dirty="0" err="1"/>
+              <a:t>ScotRail</a:t>
+            </a:r>
+            <a:endParaRPr lang="en-GB" dirty="0"/>
+          </a:p>
+          <a:p>
+            <a:pPr marL="457200" lvl="1" indent="0">
+              <a:buNone/>
+            </a:pPr>
+            <a:endParaRPr lang="en-GB" dirty="0"/>
+          </a:p>
+        </p:txBody>
+      </p:sp>
+    </p:spTree>
+    <p:extLst>
+      <p:ext uri="{BB962C8B-B14F-4D97-AF65-F5344CB8AC3E}">
+        <p14:creationId xmlns:p14="http://schemas.microsoft.com/office/powerpoint/2010/main" val="1801390461"/>
       </p:ext>
     </p:extLst>
   </p:cSld>
@@ -18738,17 +19417,21 @@
         </p:nvSpPr>
         <p:spPr>
           <a:xfrm>
-            <a:off x="838199" y="-94149"/>
-            <a:ext cx="10515600" cy="1325563"/>
+            <a:off x="331694" y="-15873"/>
+            <a:ext cx="2913530" cy="991513"/>
           </a:xfrm>
         </p:spPr>
         <p:txBody>
-          <a:bodyPr/>
+          <a:bodyPr>
+            <a:normAutofit/>
+          </a:bodyPr>
           <a:lstStyle/>
           <a:p>
             <a:pPr algn="ctr"/>
             <a:r>
-              <a:rPr lang="en-US" b="1" dirty="0"/>
+              <a:rPr lang="en-US" sz="3600" b="1" dirty="0">
+                <a:latin typeface="+mn-lt"/>
+              </a:rPr>
               <a:t>Tables</a:t>
             </a:r>
           </a:p>
@@ -18769,14 +19452,14 @@
           <p:nvPr>
             <p:extLst>
               <p:ext uri="{D42A27DB-BD31-4B8C-83A1-F6EECF244321}">
-                <p14:modId xmlns:p14="http://schemas.microsoft.com/office/powerpoint/2010/main" val="848259731"/>
+                <p14:modId xmlns:p14="http://schemas.microsoft.com/office/powerpoint/2010/main" val="1531850384"/>
               </p:ext>
             </p:extLst>
           </p:nvPr>
         </p:nvGraphicFramePr>
         <p:xfrm>
-          <a:off x="525928" y="1031240"/>
-          <a:ext cx="2365188" cy="2397760"/>
+          <a:off x="64994" y="1031240"/>
+          <a:ext cx="1723465" cy="2397760"/>
         </p:xfrm>
         <a:graphic>
           <a:graphicData uri="http://schemas.openxmlformats.org/drawingml/2006/table">
@@ -18785,14 +19468,14 @@
                 <a:tableStyleId>{17292A2E-F333-43FB-9621-5CBBE7FDCDCB}</a:tableStyleId>
               </a:tblPr>
               <a:tblGrid>
-                <a:gridCol w="684306">
+                <a:gridCol w="405653">
                   <a:extLst>
                     <a:ext uri="{9D8B030D-6E8A-4147-A177-3AD203B41FA5}">
                       <a16:colId xmlns:a16="http://schemas.microsoft.com/office/drawing/2014/main" val="1019678322"/>
                     </a:ext>
                   </a:extLst>
                 </a:gridCol>
-                <a:gridCol w="1680882">
+                <a:gridCol w="1317812">
                   <a:extLst>
                     <a:ext uri="{9D8B030D-6E8A-4147-A177-3AD203B41FA5}">
                       <a16:colId xmlns:a16="http://schemas.microsoft.com/office/drawing/2014/main" val="702228982"/>
@@ -18808,7 +19491,11 @@
                     <a:p>
                       <a:pPr algn="ctr"/>
                       <a:r>
-                        <a:rPr lang="en-US" dirty="0"/>
+                        <a:rPr lang="en-US" dirty="0">
+                          <a:solidFill>
+                            <a:schemeClr val="tx1"/>
+                          </a:solidFill>
+                        </a:rPr>
                         <a:t>Merchants</a:t>
                       </a:r>
                     </a:p>
@@ -18850,6 +19537,9 @@
                       <a:headEnd type="none" w="med" len="med"/>
                       <a:tailEnd type="none" w="med" len="med"/>
                     </a:lnB>
+                    <a:solidFill>
+                      <a:srgbClr val="FFFD78"/>
+                    </a:solidFill>
                   </a:tcPr>
                 </a:tc>
                 <a:tc hMerge="1">
@@ -19324,14 +20014,14 @@
           <p:nvPr>
             <p:extLst>
               <p:ext uri="{D42A27DB-BD31-4B8C-83A1-F6EECF244321}">
-                <p14:modId xmlns:p14="http://schemas.microsoft.com/office/powerpoint/2010/main" val="2583524728"/>
+                <p14:modId xmlns:p14="http://schemas.microsoft.com/office/powerpoint/2010/main" val="4027828955"/>
               </p:ext>
             </p:extLst>
           </p:nvPr>
         </p:nvGraphicFramePr>
         <p:xfrm>
-          <a:off x="3574675" y="1031240"/>
-          <a:ext cx="2365188" cy="2123440"/>
+          <a:off x="1916949" y="1031240"/>
+          <a:ext cx="1726829" cy="2397760"/>
         </p:xfrm>
         <a:graphic>
           <a:graphicData uri="http://schemas.openxmlformats.org/drawingml/2006/table">
@@ -19340,14 +20030,14 @@
                 <a:tableStyleId>{17292A2E-F333-43FB-9621-5CBBE7FDCDCB}</a:tableStyleId>
               </a:tblPr>
               <a:tblGrid>
-                <a:gridCol w="684306">
+                <a:gridCol w="462805">
                   <a:extLst>
                     <a:ext uri="{9D8B030D-6E8A-4147-A177-3AD203B41FA5}">
                       <a16:colId xmlns:a16="http://schemas.microsoft.com/office/drawing/2014/main" val="1019678322"/>
                     </a:ext>
                   </a:extLst>
                 </a:gridCol>
-                <a:gridCol w="1680882">
+                <a:gridCol w="1264024">
                   <a:extLst>
                     <a:ext uri="{9D8B030D-6E8A-4147-A177-3AD203B41FA5}">
                       <a16:colId xmlns:a16="http://schemas.microsoft.com/office/drawing/2014/main" val="702228982"/>
@@ -19483,7 +20173,14 @@
                       <a:pPr algn="ctr"/>
                       <a:r>
                         <a:rPr lang="en-US" b="1" dirty="0"/>
-                        <a:t>Tag Name (VARCHAR)</a:t>
+                        <a:t>Tag </a:t>
+                      </a:r>
+                    </a:p>
+                    <a:p>
+                      <a:pPr algn="ctr"/>
+                      <a:r>
+                        <a:rPr lang="en-US" b="1" dirty="0"/>
+                        <a:t>Name (VARCHAR)</a:t>
                       </a:r>
                     </a:p>
                   </a:txBody>
@@ -22200,19 +22897,22 @@
               </a:ext>
             </a:extLst>
           </p:cNvPr>
-          <p:cNvCxnSpPr/>
+          <p:cNvCxnSpPr>
+            <a:cxnSpLocks/>
+          </p:cNvCxnSpPr>
           <p:nvPr/>
         </p:nvCxnSpPr>
         <p:spPr>
           <a:xfrm>
-            <a:off x="968188" y="3429000"/>
-            <a:ext cx="1627094" cy="1129553"/>
+            <a:off x="224303" y="3429000"/>
+            <a:ext cx="2370979" cy="1129553"/>
           </a:xfrm>
           <a:prstGeom prst="straightConnector1">
             <a:avLst/>
           </a:prstGeom>
-          <a:ln>
-            <a:tailEnd type="triangle"/>
+          <a:ln w="38100">
+            <a:headEnd type="triangle"/>
+            <a:tailEnd type="none"/>
           </a:ln>
         </p:spPr>
         <p:style>
@@ -22246,13 +22946,1745 @@
         </p:nvCxnSpPr>
         <p:spPr>
           <a:xfrm>
-            <a:off x="3943722" y="3163963"/>
-            <a:ext cx="224866" cy="1488719"/>
+            <a:off x="2151529" y="3429000"/>
+            <a:ext cx="2017059" cy="1223682"/>
           </a:xfrm>
           <a:prstGeom prst="straightConnector1">
             <a:avLst/>
           </a:prstGeom>
-          <a:ln>
+          <a:ln w="38100">
+            <a:headEnd type="triangle"/>
+            <a:tailEnd type="none"/>
+          </a:ln>
+        </p:spPr>
+        <p:style>
+          <a:lnRef idx="1">
+            <a:schemeClr val="dk1"/>
+          </a:lnRef>
+          <a:fillRef idx="0">
+            <a:schemeClr val="dk1"/>
+          </a:fillRef>
+          <a:effectRef idx="0">
+            <a:schemeClr val="dk1"/>
+          </a:effectRef>
+          <a:fontRef idx="minor">
+            <a:schemeClr val="tx1"/>
+          </a:fontRef>
+        </p:style>
+      </p:cxnSp>
+      <p:graphicFrame>
+        <p:nvGraphicFramePr>
+          <p:cNvPr id="11" name="Table 10">
+            <a:extLst>
+              <a:ext uri="{FF2B5EF4-FFF2-40B4-BE49-F238E27FC236}">
+                <a16:creationId xmlns:a16="http://schemas.microsoft.com/office/drawing/2014/main" id="{3FA7779D-668F-824B-9309-4C6C3C938E99}"/>
+              </a:ext>
+            </a:extLst>
+          </p:cNvPr>
+          <p:cNvGraphicFramePr>
+            <a:graphicFrameLocks noGrp="1"/>
+          </p:cNvGraphicFramePr>
+          <p:nvPr>
+            <p:extLst>
+              <p:ext uri="{D42A27DB-BD31-4B8C-83A1-F6EECF244321}">
+                <p14:modId xmlns:p14="http://schemas.microsoft.com/office/powerpoint/2010/main" val="1495656828"/>
+              </p:ext>
+            </p:extLst>
+          </p:nvPr>
+        </p:nvGraphicFramePr>
+        <p:xfrm>
+          <a:off x="3751731" y="191865"/>
+          <a:ext cx="2662516" cy="2123440"/>
+        </p:xfrm>
+        <a:graphic>
+          <a:graphicData uri="http://schemas.openxmlformats.org/drawingml/2006/table">
+            <a:tbl>
+              <a:tblPr firstRow="1" bandRow="1">
+                <a:tableStyleId>{17292A2E-F333-43FB-9621-5CBBE7FDCDCB}</a:tableStyleId>
+              </a:tblPr>
+              <a:tblGrid>
+                <a:gridCol w="450307">
+                  <a:extLst>
+                    <a:ext uri="{9D8B030D-6E8A-4147-A177-3AD203B41FA5}">
+                      <a16:colId xmlns:a16="http://schemas.microsoft.com/office/drawing/2014/main" val="1019678322"/>
+                    </a:ext>
+                  </a:extLst>
+                </a:gridCol>
+                <a:gridCol w="1311256">
+                  <a:extLst>
+                    <a:ext uri="{9D8B030D-6E8A-4147-A177-3AD203B41FA5}">
+                      <a16:colId xmlns:a16="http://schemas.microsoft.com/office/drawing/2014/main" val="702228982"/>
+                    </a:ext>
+                  </a:extLst>
+                </a:gridCol>
+                <a:gridCol w="900953">
+                  <a:extLst>
+                    <a:ext uri="{9D8B030D-6E8A-4147-A177-3AD203B41FA5}">
+                      <a16:colId xmlns:a16="http://schemas.microsoft.com/office/drawing/2014/main" val="3039201924"/>
+                    </a:ext>
+                  </a:extLst>
+                </a:gridCol>
+              </a:tblGrid>
+              <a:tr h="370840">
+                <a:tc gridSpan="3">
+                  <a:txBody>
+                    <a:bodyPr/>
+                    <a:lstStyle/>
+                    <a:p>
+                      <a:pPr algn="ctr"/>
+                      <a:r>
+                        <a:rPr lang="en-US" dirty="0"/>
+                        <a:t>Budget_transactions</a:t>
+                      </a:r>
+                    </a:p>
+                  </a:txBody>
+                  <a:tcPr anchor="ctr">
+                    <a:lnL w="12700" cap="flat" cmpd="sng" algn="ctr">
+                      <a:solidFill>
+                        <a:schemeClr val="tx1"/>
+                      </a:solidFill>
+                      <a:prstDash val="solid"/>
+                      <a:round/>
+                      <a:headEnd type="none" w="med" len="med"/>
+                      <a:tailEnd type="none" w="med" len="med"/>
+                    </a:lnL>
+                    <a:lnR w="12700" cap="flat" cmpd="sng" algn="ctr">
+                      <a:solidFill>
+                        <a:schemeClr val="tx1"/>
+                      </a:solidFill>
+                      <a:prstDash val="solid"/>
+                      <a:round/>
+                      <a:headEnd type="none" w="med" len="med"/>
+                      <a:tailEnd type="none" w="med" len="med"/>
+                    </a:lnR>
+                    <a:lnT w="12700" cap="flat" cmpd="sng" algn="ctr">
+                      <a:solidFill>
+                        <a:schemeClr val="tx1"/>
+                      </a:solidFill>
+                      <a:prstDash val="solid"/>
+                      <a:round/>
+                      <a:headEnd type="none" w="med" len="med"/>
+                      <a:tailEnd type="none" w="med" len="med"/>
+                    </a:lnT>
+                    <a:lnB w="12700" cap="flat" cmpd="sng" algn="ctr">
+                      <a:solidFill>
+                        <a:schemeClr val="tx1"/>
+                      </a:solidFill>
+                      <a:prstDash val="solid"/>
+                      <a:round/>
+                      <a:headEnd type="none" w="med" len="med"/>
+                      <a:tailEnd type="none" w="med" len="med"/>
+                    </a:lnB>
+                    <a:solidFill>
+                      <a:srgbClr val="206593"/>
+                    </a:solidFill>
+                  </a:tcPr>
+                </a:tc>
+                <a:tc hMerge="1">
+                  <a:txBody>
+                    <a:bodyPr/>
+                    <a:lstStyle/>
+                    <a:p>
+                      <a:endParaRPr lang="en-US" dirty="0"/>
+                    </a:p>
+                  </a:txBody>
+                  <a:tcPr/>
+                </a:tc>
+                <a:tc hMerge="1">
+                  <a:txBody>
+                    <a:bodyPr/>
+                    <a:lstStyle/>
+                    <a:p>
+                      <a:pPr algn="ctr"/>
+                      <a:endParaRPr lang="en-US" dirty="0"/>
+                    </a:p>
+                  </a:txBody>
+                  <a:tcPr anchor="ctr">
+                    <a:lnL w="12700" cap="flat" cmpd="sng" algn="ctr">
+                      <a:solidFill>
+                        <a:schemeClr val="tx1"/>
+                      </a:solidFill>
+                      <a:prstDash val="solid"/>
+                      <a:round/>
+                      <a:headEnd type="none" w="med" len="med"/>
+                      <a:tailEnd type="none" w="med" len="med"/>
+                    </a:lnL>
+                    <a:lnR w="12700" cap="flat" cmpd="sng" algn="ctr">
+                      <a:solidFill>
+                        <a:schemeClr val="tx1"/>
+                      </a:solidFill>
+                      <a:prstDash val="solid"/>
+                      <a:round/>
+                      <a:headEnd type="none" w="med" len="med"/>
+                      <a:tailEnd type="none" w="med" len="med"/>
+                    </a:lnR>
+                    <a:lnT w="12700" cap="flat" cmpd="sng" algn="ctr">
+                      <a:solidFill>
+                        <a:schemeClr val="tx1"/>
+                      </a:solidFill>
+                      <a:prstDash val="solid"/>
+                      <a:round/>
+                      <a:headEnd type="none" w="med" len="med"/>
+                      <a:tailEnd type="none" w="med" len="med"/>
+                    </a:lnT>
+                    <a:lnB w="12700" cap="flat" cmpd="sng" algn="ctr">
+                      <a:solidFill>
+                        <a:schemeClr val="tx1"/>
+                      </a:solidFill>
+                      <a:prstDash val="solid"/>
+                      <a:round/>
+                      <a:headEnd type="none" w="med" len="med"/>
+                      <a:tailEnd type="none" w="med" len="med"/>
+                    </a:lnB>
+                    <a:solidFill>
+                      <a:srgbClr val="002060"/>
+                    </a:solidFill>
+                  </a:tcPr>
+                </a:tc>
+                <a:extLst>
+                  <a:ext uri="{0D108BD9-81ED-4DB2-BD59-A6C34878D82A}">
+                    <a16:rowId xmlns:a16="http://schemas.microsoft.com/office/drawing/2014/main" val="3211573024"/>
+                  </a:ext>
+                </a:extLst>
+              </a:tr>
+              <a:tr h="370840">
+                <a:tc>
+                  <a:txBody>
+                    <a:bodyPr/>
+                    <a:lstStyle/>
+                    <a:p>
+                      <a:pPr algn="ctr"/>
+                      <a:r>
+                        <a:rPr lang="en-US" b="1" dirty="0"/>
+                        <a:t>Id</a:t>
+                      </a:r>
+                    </a:p>
+                  </a:txBody>
+                  <a:tcPr anchor="ctr">
+                    <a:lnL w="12700" cap="flat" cmpd="sng" algn="ctr">
+                      <a:solidFill>
+                        <a:schemeClr val="tx1"/>
+                      </a:solidFill>
+                      <a:prstDash val="solid"/>
+                      <a:round/>
+                      <a:headEnd type="none" w="med" len="med"/>
+                      <a:tailEnd type="none" w="med" len="med"/>
+                    </a:lnL>
+                    <a:lnR w="12700" cap="flat" cmpd="sng" algn="ctr">
+                      <a:solidFill>
+                        <a:schemeClr val="tx1"/>
+                      </a:solidFill>
+                      <a:prstDash val="solid"/>
+                      <a:round/>
+                      <a:headEnd type="none" w="med" len="med"/>
+                      <a:tailEnd type="none" w="med" len="med"/>
+                    </a:lnR>
+                    <a:lnT w="12700" cap="flat" cmpd="sng" algn="ctr">
+                      <a:solidFill>
+                        <a:schemeClr val="tx1"/>
+                      </a:solidFill>
+                      <a:prstDash val="solid"/>
+                      <a:round/>
+                      <a:headEnd type="none" w="med" len="med"/>
+                      <a:tailEnd type="none" w="med" len="med"/>
+                    </a:lnT>
+                    <a:lnB w="12700" cap="flat" cmpd="sng" algn="ctr">
+                      <a:solidFill>
+                        <a:schemeClr val="tx1"/>
+                      </a:solidFill>
+                      <a:prstDash val="solid"/>
+                      <a:round/>
+                      <a:headEnd type="none" w="med" len="med"/>
+                      <a:tailEnd type="none" w="med" len="med"/>
+                    </a:lnB>
+                  </a:tcPr>
+                </a:tc>
+                <a:tc>
+                  <a:txBody>
+                    <a:bodyPr/>
+                    <a:lstStyle/>
+                    <a:p>
+                      <a:pPr algn="ctr"/>
+                      <a:r>
+                        <a:rPr lang="en-US" b="1" dirty="0"/>
+                        <a:t>Transaction id</a:t>
+                      </a:r>
+                    </a:p>
+                  </a:txBody>
+                  <a:tcPr anchor="ctr">
+                    <a:lnL w="12700" cap="flat" cmpd="sng" algn="ctr">
+                      <a:solidFill>
+                        <a:schemeClr val="tx1"/>
+                      </a:solidFill>
+                      <a:prstDash val="solid"/>
+                      <a:round/>
+                      <a:headEnd type="none" w="med" len="med"/>
+                      <a:tailEnd type="none" w="med" len="med"/>
+                    </a:lnL>
+                    <a:lnR w="12700" cap="flat" cmpd="sng" algn="ctr">
+                      <a:solidFill>
+                        <a:schemeClr val="tx1"/>
+                      </a:solidFill>
+                      <a:prstDash val="solid"/>
+                      <a:round/>
+                      <a:headEnd type="none" w="med" len="med"/>
+                      <a:tailEnd type="none" w="med" len="med"/>
+                    </a:lnR>
+                    <a:lnT w="12700" cap="flat" cmpd="sng" algn="ctr">
+                      <a:solidFill>
+                        <a:schemeClr val="tx1"/>
+                      </a:solidFill>
+                      <a:prstDash val="solid"/>
+                      <a:round/>
+                      <a:headEnd type="none" w="med" len="med"/>
+                      <a:tailEnd type="none" w="med" len="med"/>
+                    </a:lnT>
+                    <a:lnB w="12700" cap="flat" cmpd="sng" algn="ctr">
+                      <a:solidFill>
+                        <a:schemeClr val="tx1"/>
+                      </a:solidFill>
+                      <a:prstDash val="solid"/>
+                      <a:round/>
+                      <a:headEnd type="none" w="med" len="med"/>
+                      <a:tailEnd type="none" w="med" len="med"/>
+                    </a:lnB>
+                  </a:tcPr>
+                </a:tc>
+                <a:tc>
+                  <a:txBody>
+                    <a:bodyPr/>
+                    <a:lstStyle/>
+                    <a:p>
+                      <a:pPr algn="ctr"/>
+                      <a:r>
+                        <a:rPr lang="en-US" b="1" dirty="0"/>
+                        <a:t>Budget id</a:t>
+                      </a:r>
+                    </a:p>
+                  </a:txBody>
+                  <a:tcPr anchor="ctr">
+                    <a:lnL w="12700" cap="flat" cmpd="sng" algn="ctr">
+                      <a:solidFill>
+                        <a:schemeClr val="tx1"/>
+                      </a:solidFill>
+                      <a:prstDash val="solid"/>
+                      <a:round/>
+                      <a:headEnd type="none" w="med" len="med"/>
+                      <a:tailEnd type="none" w="med" len="med"/>
+                    </a:lnL>
+                    <a:lnR w="12700" cap="flat" cmpd="sng" algn="ctr">
+                      <a:solidFill>
+                        <a:schemeClr val="tx1"/>
+                      </a:solidFill>
+                      <a:prstDash val="solid"/>
+                      <a:round/>
+                      <a:headEnd type="none" w="med" len="med"/>
+                      <a:tailEnd type="none" w="med" len="med"/>
+                    </a:lnR>
+                    <a:lnT w="12700" cap="flat" cmpd="sng" algn="ctr">
+                      <a:solidFill>
+                        <a:schemeClr val="tx1"/>
+                      </a:solidFill>
+                      <a:prstDash val="solid"/>
+                      <a:round/>
+                      <a:headEnd type="none" w="med" len="med"/>
+                      <a:tailEnd type="none" w="med" len="med"/>
+                    </a:lnT>
+                    <a:lnB w="12700" cap="flat" cmpd="sng" algn="ctr">
+                      <a:solidFill>
+                        <a:schemeClr val="tx1"/>
+                      </a:solidFill>
+                      <a:prstDash val="solid"/>
+                      <a:round/>
+                      <a:headEnd type="none" w="med" len="med"/>
+                      <a:tailEnd type="none" w="med" len="med"/>
+                    </a:lnB>
+                  </a:tcPr>
+                </a:tc>
+                <a:extLst>
+                  <a:ext uri="{0D108BD9-81ED-4DB2-BD59-A6C34878D82A}">
+                    <a16:rowId xmlns:a16="http://schemas.microsoft.com/office/drawing/2014/main" val="2556437728"/>
+                  </a:ext>
+                </a:extLst>
+              </a:tr>
+              <a:tr h="370840">
+                <a:tc>
+                  <a:txBody>
+                    <a:bodyPr/>
+                    <a:lstStyle/>
+                    <a:p>
+                      <a:pPr algn="ctr"/>
+                      <a:r>
+                        <a:rPr lang="en-US" dirty="0"/>
+                        <a:t>1</a:t>
+                      </a:r>
+                    </a:p>
+                  </a:txBody>
+                  <a:tcPr anchor="ctr">
+                    <a:lnL w="12700" cap="flat" cmpd="sng" algn="ctr">
+                      <a:solidFill>
+                        <a:schemeClr val="tx1"/>
+                      </a:solidFill>
+                      <a:prstDash val="solid"/>
+                      <a:round/>
+                      <a:headEnd type="none" w="med" len="med"/>
+                      <a:tailEnd type="none" w="med" len="med"/>
+                    </a:lnL>
+                    <a:lnR w="12700" cap="flat" cmpd="sng" algn="ctr">
+                      <a:solidFill>
+                        <a:schemeClr val="tx1"/>
+                      </a:solidFill>
+                      <a:prstDash val="solid"/>
+                      <a:round/>
+                      <a:headEnd type="none" w="med" len="med"/>
+                      <a:tailEnd type="none" w="med" len="med"/>
+                    </a:lnR>
+                    <a:lnT w="12700" cap="flat" cmpd="sng" algn="ctr">
+                      <a:solidFill>
+                        <a:schemeClr val="tx1"/>
+                      </a:solidFill>
+                      <a:prstDash val="solid"/>
+                      <a:round/>
+                      <a:headEnd type="none" w="med" len="med"/>
+                      <a:tailEnd type="none" w="med" len="med"/>
+                    </a:lnT>
+                    <a:lnB w="12700" cap="flat" cmpd="sng" algn="ctr">
+                      <a:solidFill>
+                        <a:schemeClr val="tx1"/>
+                      </a:solidFill>
+                      <a:prstDash val="solid"/>
+                      <a:round/>
+                      <a:headEnd type="none" w="med" len="med"/>
+                      <a:tailEnd type="none" w="med" len="med"/>
+                    </a:lnB>
+                  </a:tcPr>
+                </a:tc>
+                <a:tc>
+                  <a:txBody>
+                    <a:bodyPr/>
+                    <a:lstStyle/>
+                    <a:p>
+                      <a:pPr algn="ctr"/>
+                      <a:r>
+                        <a:rPr lang="en-US" dirty="0"/>
+                        <a:t>1</a:t>
+                      </a:r>
+                    </a:p>
+                  </a:txBody>
+                  <a:tcPr anchor="ctr">
+                    <a:lnL w="12700" cap="flat" cmpd="sng" algn="ctr">
+                      <a:solidFill>
+                        <a:schemeClr val="tx1"/>
+                      </a:solidFill>
+                      <a:prstDash val="solid"/>
+                      <a:round/>
+                      <a:headEnd type="none" w="med" len="med"/>
+                      <a:tailEnd type="none" w="med" len="med"/>
+                    </a:lnL>
+                    <a:lnR w="12700" cap="flat" cmpd="sng" algn="ctr">
+                      <a:solidFill>
+                        <a:schemeClr val="tx1"/>
+                      </a:solidFill>
+                      <a:prstDash val="solid"/>
+                      <a:round/>
+                      <a:headEnd type="none" w="med" len="med"/>
+                      <a:tailEnd type="none" w="med" len="med"/>
+                    </a:lnR>
+                    <a:lnT w="12700" cap="flat" cmpd="sng" algn="ctr">
+                      <a:solidFill>
+                        <a:schemeClr val="tx1"/>
+                      </a:solidFill>
+                      <a:prstDash val="solid"/>
+                      <a:round/>
+                      <a:headEnd type="none" w="med" len="med"/>
+                      <a:tailEnd type="none" w="med" len="med"/>
+                    </a:lnT>
+                    <a:lnB w="12700" cap="flat" cmpd="sng" algn="ctr">
+                      <a:solidFill>
+                        <a:schemeClr val="tx1"/>
+                      </a:solidFill>
+                      <a:prstDash val="solid"/>
+                      <a:round/>
+                      <a:headEnd type="none" w="med" len="med"/>
+                      <a:tailEnd type="none" w="med" len="med"/>
+                    </a:lnB>
+                  </a:tcPr>
+                </a:tc>
+                <a:tc>
+                  <a:txBody>
+                    <a:bodyPr/>
+                    <a:lstStyle/>
+                    <a:p>
+                      <a:pPr algn="ctr"/>
+                      <a:r>
+                        <a:rPr lang="en-US" dirty="0"/>
+                        <a:t>1</a:t>
+                      </a:r>
+                    </a:p>
+                  </a:txBody>
+                  <a:tcPr anchor="ctr">
+                    <a:lnL w="12700" cap="flat" cmpd="sng" algn="ctr">
+                      <a:solidFill>
+                        <a:schemeClr val="tx1"/>
+                      </a:solidFill>
+                      <a:prstDash val="solid"/>
+                      <a:round/>
+                      <a:headEnd type="none" w="med" len="med"/>
+                      <a:tailEnd type="none" w="med" len="med"/>
+                    </a:lnL>
+                    <a:lnR w="12700" cap="flat" cmpd="sng" algn="ctr">
+                      <a:solidFill>
+                        <a:schemeClr val="tx1"/>
+                      </a:solidFill>
+                      <a:prstDash val="solid"/>
+                      <a:round/>
+                      <a:headEnd type="none" w="med" len="med"/>
+                      <a:tailEnd type="none" w="med" len="med"/>
+                    </a:lnR>
+                    <a:lnT w="12700" cap="flat" cmpd="sng" algn="ctr">
+                      <a:solidFill>
+                        <a:schemeClr val="tx1"/>
+                      </a:solidFill>
+                      <a:prstDash val="solid"/>
+                      <a:round/>
+                      <a:headEnd type="none" w="med" len="med"/>
+                      <a:tailEnd type="none" w="med" len="med"/>
+                    </a:lnT>
+                    <a:lnB w="12700" cap="flat" cmpd="sng" algn="ctr">
+                      <a:solidFill>
+                        <a:schemeClr val="tx1"/>
+                      </a:solidFill>
+                      <a:prstDash val="solid"/>
+                      <a:round/>
+                      <a:headEnd type="none" w="med" len="med"/>
+                      <a:tailEnd type="none" w="med" len="med"/>
+                    </a:lnB>
+                  </a:tcPr>
+                </a:tc>
+                <a:extLst>
+                  <a:ext uri="{0D108BD9-81ED-4DB2-BD59-A6C34878D82A}">
+                    <a16:rowId xmlns:a16="http://schemas.microsoft.com/office/drawing/2014/main" val="466209325"/>
+                  </a:ext>
+                </a:extLst>
+              </a:tr>
+              <a:tr h="370840">
+                <a:tc>
+                  <a:txBody>
+                    <a:bodyPr/>
+                    <a:lstStyle/>
+                    <a:p>
+                      <a:pPr algn="ctr"/>
+                      <a:r>
+                        <a:rPr lang="en-US" dirty="0"/>
+                        <a:t>2</a:t>
+                      </a:r>
+                    </a:p>
+                  </a:txBody>
+                  <a:tcPr anchor="ctr">
+                    <a:lnL w="12700" cap="flat" cmpd="sng" algn="ctr">
+                      <a:solidFill>
+                        <a:schemeClr val="tx1"/>
+                      </a:solidFill>
+                      <a:prstDash val="solid"/>
+                      <a:round/>
+                      <a:headEnd type="none" w="med" len="med"/>
+                      <a:tailEnd type="none" w="med" len="med"/>
+                    </a:lnL>
+                    <a:lnR w="12700" cap="flat" cmpd="sng" algn="ctr">
+                      <a:solidFill>
+                        <a:schemeClr val="tx1"/>
+                      </a:solidFill>
+                      <a:prstDash val="solid"/>
+                      <a:round/>
+                      <a:headEnd type="none" w="med" len="med"/>
+                      <a:tailEnd type="none" w="med" len="med"/>
+                    </a:lnR>
+                    <a:lnT w="12700" cap="flat" cmpd="sng" algn="ctr">
+                      <a:solidFill>
+                        <a:schemeClr val="tx1"/>
+                      </a:solidFill>
+                      <a:prstDash val="solid"/>
+                      <a:round/>
+                      <a:headEnd type="none" w="med" len="med"/>
+                      <a:tailEnd type="none" w="med" len="med"/>
+                    </a:lnT>
+                    <a:lnB w="12700" cap="flat" cmpd="sng" algn="ctr">
+                      <a:solidFill>
+                        <a:schemeClr val="tx1"/>
+                      </a:solidFill>
+                      <a:prstDash val="solid"/>
+                      <a:round/>
+                      <a:headEnd type="none" w="med" len="med"/>
+                      <a:tailEnd type="none" w="med" len="med"/>
+                    </a:lnB>
+                  </a:tcPr>
+                </a:tc>
+                <a:tc>
+                  <a:txBody>
+                    <a:bodyPr/>
+                    <a:lstStyle/>
+                    <a:p>
+                      <a:pPr algn="ctr"/>
+                      <a:r>
+                        <a:rPr lang="en-US" dirty="0"/>
+                        <a:t>2</a:t>
+                      </a:r>
+                    </a:p>
+                  </a:txBody>
+                  <a:tcPr anchor="ctr">
+                    <a:lnL w="12700" cap="flat" cmpd="sng" algn="ctr">
+                      <a:solidFill>
+                        <a:schemeClr val="tx1"/>
+                      </a:solidFill>
+                      <a:prstDash val="solid"/>
+                      <a:round/>
+                      <a:headEnd type="none" w="med" len="med"/>
+                      <a:tailEnd type="none" w="med" len="med"/>
+                    </a:lnL>
+                    <a:lnR w="12700" cap="flat" cmpd="sng" algn="ctr">
+                      <a:solidFill>
+                        <a:schemeClr val="tx1"/>
+                      </a:solidFill>
+                      <a:prstDash val="solid"/>
+                      <a:round/>
+                      <a:headEnd type="none" w="med" len="med"/>
+                      <a:tailEnd type="none" w="med" len="med"/>
+                    </a:lnR>
+                    <a:lnT w="12700" cap="flat" cmpd="sng" algn="ctr">
+                      <a:solidFill>
+                        <a:schemeClr val="tx1"/>
+                      </a:solidFill>
+                      <a:prstDash val="solid"/>
+                      <a:round/>
+                      <a:headEnd type="none" w="med" len="med"/>
+                      <a:tailEnd type="none" w="med" len="med"/>
+                    </a:lnT>
+                    <a:lnB w="12700" cap="flat" cmpd="sng" algn="ctr">
+                      <a:solidFill>
+                        <a:schemeClr val="tx1"/>
+                      </a:solidFill>
+                      <a:prstDash val="solid"/>
+                      <a:round/>
+                      <a:headEnd type="none" w="med" len="med"/>
+                      <a:tailEnd type="none" w="med" len="med"/>
+                    </a:lnB>
+                  </a:tcPr>
+                </a:tc>
+                <a:tc>
+                  <a:txBody>
+                    <a:bodyPr/>
+                    <a:lstStyle/>
+                    <a:p>
+                      <a:pPr algn="ctr"/>
+                      <a:r>
+                        <a:rPr lang="en-US" dirty="0"/>
+                        <a:t>1</a:t>
+                      </a:r>
+                    </a:p>
+                  </a:txBody>
+                  <a:tcPr anchor="ctr">
+                    <a:lnL w="12700" cap="flat" cmpd="sng" algn="ctr">
+                      <a:solidFill>
+                        <a:schemeClr val="tx1"/>
+                      </a:solidFill>
+                      <a:prstDash val="solid"/>
+                      <a:round/>
+                      <a:headEnd type="none" w="med" len="med"/>
+                      <a:tailEnd type="none" w="med" len="med"/>
+                    </a:lnL>
+                    <a:lnR w="12700" cap="flat" cmpd="sng" algn="ctr">
+                      <a:solidFill>
+                        <a:schemeClr val="tx1"/>
+                      </a:solidFill>
+                      <a:prstDash val="solid"/>
+                      <a:round/>
+                      <a:headEnd type="none" w="med" len="med"/>
+                      <a:tailEnd type="none" w="med" len="med"/>
+                    </a:lnR>
+                    <a:lnT w="12700" cap="flat" cmpd="sng" algn="ctr">
+                      <a:solidFill>
+                        <a:schemeClr val="tx1"/>
+                      </a:solidFill>
+                      <a:prstDash val="solid"/>
+                      <a:round/>
+                      <a:headEnd type="none" w="med" len="med"/>
+                      <a:tailEnd type="none" w="med" len="med"/>
+                    </a:lnT>
+                    <a:lnB w="12700" cap="flat" cmpd="sng" algn="ctr">
+                      <a:solidFill>
+                        <a:schemeClr val="tx1"/>
+                      </a:solidFill>
+                      <a:prstDash val="solid"/>
+                      <a:round/>
+                      <a:headEnd type="none" w="med" len="med"/>
+                      <a:tailEnd type="none" w="med" len="med"/>
+                    </a:lnB>
+                  </a:tcPr>
+                </a:tc>
+                <a:extLst>
+                  <a:ext uri="{0D108BD9-81ED-4DB2-BD59-A6C34878D82A}">
+                    <a16:rowId xmlns:a16="http://schemas.microsoft.com/office/drawing/2014/main" val="3843750482"/>
+                  </a:ext>
+                </a:extLst>
+              </a:tr>
+              <a:tr h="370840">
+                <a:tc>
+                  <a:txBody>
+                    <a:bodyPr/>
+                    <a:lstStyle/>
+                    <a:p>
+                      <a:pPr algn="ctr"/>
+                      <a:r>
+                        <a:rPr lang="en-US" dirty="0"/>
+                        <a:t>3</a:t>
+                      </a:r>
+                    </a:p>
+                  </a:txBody>
+                  <a:tcPr anchor="ctr">
+                    <a:lnL w="12700" cap="flat" cmpd="sng" algn="ctr">
+                      <a:solidFill>
+                        <a:schemeClr val="tx1"/>
+                      </a:solidFill>
+                      <a:prstDash val="solid"/>
+                      <a:round/>
+                      <a:headEnd type="none" w="med" len="med"/>
+                      <a:tailEnd type="none" w="med" len="med"/>
+                    </a:lnL>
+                    <a:lnR w="12700" cap="flat" cmpd="sng" algn="ctr">
+                      <a:solidFill>
+                        <a:schemeClr val="tx1"/>
+                      </a:solidFill>
+                      <a:prstDash val="solid"/>
+                      <a:round/>
+                      <a:headEnd type="none" w="med" len="med"/>
+                      <a:tailEnd type="none" w="med" len="med"/>
+                    </a:lnR>
+                    <a:lnT w="12700" cap="flat" cmpd="sng" algn="ctr">
+                      <a:solidFill>
+                        <a:schemeClr val="tx1"/>
+                      </a:solidFill>
+                      <a:prstDash val="solid"/>
+                      <a:round/>
+                      <a:headEnd type="none" w="med" len="med"/>
+                      <a:tailEnd type="none" w="med" len="med"/>
+                    </a:lnT>
+                    <a:lnB w="12700" cap="flat" cmpd="sng" algn="ctr">
+                      <a:solidFill>
+                        <a:schemeClr val="tx1"/>
+                      </a:solidFill>
+                      <a:prstDash val="solid"/>
+                      <a:round/>
+                      <a:headEnd type="none" w="med" len="med"/>
+                      <a:tailEnd type="none" w="med" len="med"/>
+                    </a:lnB>
+                  </a:tcPr>
+                </a:tc>
+                <a:tc>
+                  <a:txBody>
+                    <a:bodyPr/>
+                    <a:lstStyle/>
+                    <a:p>
+                      <a:pPr algn="ctr"/>
+                      <a:r>
+                        <a:rPr lang="en-US" dirty="0"/>
+                        <a:t>1</a:t>
+                      </a:r>
+                    </a:p>
+                  </a:txBody>
+                  <a:tcPr anchor="ctr">
+                    <a:lnL w="12700" cap="flat" cmpd="sng" algn="ctr">
+                      <a:solidFill>
+                        <a:schemeClr val="tx1"/>
+                      </a:solidFill>
+                      <a:prstDash val="solid"/>
+                      <a:round/>
+                      <a:headEnd type="none" w="med" len="med"/>
+                      <a:tailEnd type="none" w="med" len="med"/>
+                    </a:lnL>
+                    <a:lnR w="12700" cap="flat" cmpd="sng" algn="ctr">
+                      <a:solidFill>
+                        <a:schemeClr val="tx1"/>
+                      </a:solidFill>
+                      <a:prstDash val="solid"/>
+                      <a:round/>
+                      <a:headEnd type="none" w="med" len="med"/>
+                      <a:tailEnd type="none" w="med" len="med"/>
+                    </a:lnR>
+                    <a:lnT w="12700" cap="flat" cmpd="sng" algn="ctr">
+                      <a:solidFill>
+                        <a:schemeClr val="tx1"/>
+                      </a:solidFill>
+                      <a:prstDash val="solid"/>
+                      <a:round/>
+                      <a:headEnd type="none" w="med" len="med"/>
+                      <a:tailEnd type="none" w="med" len="med"/>
+                    </a:lnT>
+                    <a:lnB w="12700" cap="flat" cmpd="sng" algn="ctr">
+                      <a:solidFill>
+                        <a:schemeClr val="tx1"/>
+                      </a:solidFill>
+                      <a:prstDash val="solid"/>
+                      <a:round/>
+                      <a:headEnd type="none" w="med" len="med"/>
+                      <a:tailEnd type="none" w="med" len="med"/>
+                    </a:lnB>
+                  </a:tcPr>
+                </a:tc>
+                <a:tc>
+                  <a:txBody>
+                    <a:bodyPr/>
+                    <a:lstStyle/>
+                    <a:p>
+                      <a:pPr algn="ctr"/>
+                      <a:r>
+                        <a:rPr lang="en-US" dirty="0"/>
+                        <a:t>3</a:t>
+                      </a:r>
+                    </a:p>
+                  </a:txBody>
+                  <a:tcPr anchor="ctr">
+                    <a:lnL w="12700" cap="flat" cmpd="sng" algn="ctr">
+                      <a:solidFill>
+                        <a:schemeClr val="tx1"/>
+                      </a:solidFill>
+                      <a:prstDash val="solid"/>
+                      <a:round/>
+                      <a:headEnd type="none" w="med" len="med"/>
+                      <a:tailEnd type="none" w="med" len="med"/>
+                    </a:lnL>
+                    <a:lnR w="12700" cap="flat" cmpd="sng" algn="ctr">
+                      <a:solidFill>
+                        <a:schemeClr val="tx1"/>
+                      </a:solidFill>
+                      <a:prstDash val="solid"/>
+                      <a:round/>
+                      <a:headEnd type="none" w="med" len="med"/>
+                      <a:tailEnd type="none" w="med" len="med"/>
+                    </a:lnR>
+                    <a:lnT w="12700" cap="flat" cmpd="sng" algn="ctr">
+                      <a:solidFill>
+                        <a:schemeClr val="tx1"/>
+                      </a:solidFill>
+                      <a:prstDash val="solid"/>
+                      <a:round/>
+                      <a:headEnd type="none" w="med" len="med"/>
+                      <a:tailEnd type="none" w="med" len="med"/>
+                    </a:lnT>
+                    <a:lnB w="12700" cap="flat" cmpd="sng" algn="ctr">
+                      <a:solidFill>
+                        <a:schemeClr val="tx1"/>
+                      </a:solidFill>
+                      <a:prstDash val="solid"/>
+                      <a:round/>
+                      <a:headEnd type="none" w="med" len="med"/>
+                      <a:tailEnd type="none" w="med" len="med"/>
+                    </a:lnB>
+                  </a:tcPr>
+                </a:tc>
+                <a:extLst>
+                  <a:ext uri="{0D108BD9-81ED-4DB2-BD59-A6C34878D82A}">
+                    <a16:rowId xmlns:a16="http://schemas.microsoft.com/office/drawing/2014/main" val="1822218103"/>
+                  </a:ext>
+                </a:extLst>
+              </a:tr>
+            </a:tbl>
+          </a:graphicData>
+        </a:graphic>
+      </p:graphicFrame>
+      <p:graphicFrame>
+        <p:nvGraphicFramePr>
+          <p:cNvPr id="12" name="Table 11">
+            <a:extLst>
+              <a:ext uri="{FF2B5EF4-FFF2-40B4-BE49-F238E27FC236}">
+                <a16:creationId xmlns:a16="http://schemas.microsoft.com/office/drawing/2014/main" id="{E67665B7-8AED-4B47-A230-9DE0B9B111D5}"/>
+              </a:ext>
+            </a:extLst>
+          </p:cNvPr>
+          <p:cNvGraphicFramePr>
+            <a:graphicFrameLocks noGrp="1"/>
+          </p:cNvGraphicFramePr>
+          <p:nvPr>
+            <p:extLst>
+              <p:ext uri="{D42A27DB-BD31-4B8C-83A1-F6EECF244321}">
+                <p14:modId xmlns:p14="http://schemas.microsoft.com/office/powerpoint/2010/main" val="4148091791"/>
+              </p:ext>
+            </p:extLst>
+          </p:nvPr>
+        </p:nvGraphicFramePr>
+        <p:xfrm>
+          <a:off x="6520707" y="1025262"/>
+          <a:ext cx="5568201" cy="2199640"/>
+        </p:xfrm>
+        <a:graphic>
+          <a:graphicData uri="http://schemas.openxmlformats.org/drawingml/2006/table">
+            <a:tbl>
+              <a:tblPr firstRow="1" bandRow="1">
+                <a:tableStyleId>{17292A2E-F333-43FB-9621-5CBBE7FDCDCB}</a:tableStyleId>
+              </a:tblPr>
+              <a:tblGrid>
+                <a:gridCol w="514366">
+                  <a:extLst>
+                    <a:ext uri="{9D8B030D-6E8A-4147-A177-3AD203B41FA5}">
+                      <a16:colId xmlns:a16="http://schemas.microsoft.com/office/drawing/2014/main" val="1019678322"/>
+                    </a:ext>
+                  </a:extLst>
+                </a:gridCol>
+                <a:gridCol w="1340165">
+                  <a:extLst>
+                    <a:ext uri="{9D8B030D-6E8A-4147-A177-3AD203B41FA5}">
+                      <a16:colId xmlns:a16="http://schemas.microsoft.com/office/drawing/2014/main" val="702228982"/>
+                    </a:ext>
+                  </a:extLst>
+                </a:gridCol>
+                <a:gridCol w="986777">
+                  <a:extLst>
+                    <a:ext uri="{9D8B030D-6E8A-4147-A177-3AD203B41FA5}">
+                      <a16:colId xmlns:a16="http://schemas.microsoft.com/office/drawing/2014/main" val="3039201924"/>
+                    </a:ext>
+                  </a:extLst>
+                </a:gridCol>
+                <a:gridCol w="1403050">
+                  <a:extLst>
+                    <a:ext uri="{9D8B030D-6E8A-4147-A177-3AD203B41FA5}">
+                      <a16:colId xmlns:a16="http://schemas.microsoft.com/office/drawing/2014/main" val="3459712493"/>
+                    </a:ext>
+                  </a:extLst>
+                </a:gridCol>
+                <a:gridCol w="1323843">
+                  <a:extLst>
+                    <a:ext uri="{9D8B030D-6E8A-4147-A177-3AD203B41FA5}">
+                      <a16:colId xmlns:a16="http://schemas.microsoft.com/office/drawing/2014/main" val="1171233005"/>
+                    </a:ext>
+                  </a:extLst>
+                </a:gridCol>
+              </a:tblGrid>
+              <a:tr h="370840">
+                <a:tc gridSpan="5">
+                  <a:txBody>
+                    <a:bodyPr/>
+                    <a:lstStyle/>
+                    <a:p>
+                      <a:pPr algn="ctr"/>
+                      <a:r>
+                        <a:rPr lang="en-US" dirty="0"/>
+                        <a:t>Budgets</a:t>
+                      </a:r>
+                    </a:p>
+                  </a:txBody>
+                  <a:tcPr anchor="ctr">
+                    <a:lnL w="12700" cap="flat" cmpd="sng" algn="ctr">
+                      <a:solidFill>
+                        <a:schemeClr val="tx1"/>
+                      </a:solidFill>
+                      <a:prstDash val="solid"/>
+                      <a:round/>
+                      <a:headEnd type="none" w="med" len="med"/>
+                      <a:tailEnd type="none" w="med" len="med"/>
+                    </a:lnL>
+                    <a:lnR w="12700" cap="flat" cmpd="sng" algn="ctr">
+                      <a:solidFill>
+                        <a:schemeClr val="tx1"/>
+                      </a:solidFill>
+                      <a:prstDash val="solid"/>
+                      <a:round/>
+                      <a:headEnd type="none" w="med" len="med"/>
+                      <a:tailEnd type="none" w="med" len="med"/>
+                    </a:lnR>
+                    <a:lnT w="12700" cap="flat" cmpd="sng" algn="ctr">
+                      <a:solidFill>
+                        <a:schemeClr val="tx1"/>
+                      </a:solidFill>
+                      <a:prstDash val="solid"/>
+                      <a:round/>
+                      <a:headEnd type="none" w="med" len="med"/>
+                      <a:tailEnd type="none" w="med" len="med"/>
+                    </a:lnT>
+                    <a:lnB w="12700" cap="flat" cmpd="sng" algn="ctr">
+                      <a:solidFill>
+                        <a:schemeClr val="tx1"/>
+                      </a:solidFill>
+                      <a:prstDash val="solid"/>
+                      <a:round/>
+                      <a:headEnd type="none" w="med" len="med"/>
+                      <a:tailEnd type="none" w="med" len="med"/>
+                    </a:lnB>
+                    <a:solidFill>
+                      <a:srgbClr val="002060"/>
+                    </a:solidFill>
+                  </a:tcPr>
+                </a:tc>
+                <a:tc hMerge="1">
+                  <a:txBody>
+                    <a:bodyPr/>
+                    <a:lstStyle/>
+                    <a:p>
+                      <a:endParaRPr lang="en-US" dirty="0"/>
+                    </a:p>
+                  </a:txBody>
+                  <a:tcPr/>
+                </a:tc>
+                <a:tc hMerge="1">
+                  <a:txBody>
+                    <a:bodyPr/>
+                    <a:lstStyle/>
+                    <a:p>
+                      <a:pPr algn="ctr"/>
+                      <a:endParaRPr lang="en-US" dirty="0"/>
+                    </a:p>
+                  </a:txBody>
+                  <a:tcPr anchor="ctr">
+                    <a:lnL w="12700" cap="flat" cmpd="sng" algn="ctr">
+                      <a:solidFill>
+                        <a:schemeClr val="tx1"/>
+                      </a:solidFill>
+                      <a:prstDash val="solid"/>
+                      <a:round/>
+                      <a:headEnd type="none" w="med" len="med"/>
+                      <a:tailEnd type="none" w="med" len="med"/>
+                    </a:lnL>
+                    <a:lnR w="12700" cap="flat" cmpd="sng" algn="ctr">
+                      <a:solidFill>
+                        <a:schemeClr val="tx1"/>
+                      </a:solidFill>
+                      <a:prstDash val="solid"/>
+                      <a:round/>
+                      <a:headEnd type="none" w="med" len="med"/>
+                      <a:tailEnd type="none" w="med" len="med"/>
+                    </a:lnR>
+                    <a:lnT w="12700" cap="flat" cmpd="sng" algn="ctr">
+                      <a:solidFill>
+                        <a:schemeClr val="tx1"/>
+                      </a:solidFill>
+                      <a:prstDash val="solid"/>
+                      <a:round/>
+                      <a:headEnd type="none" w="med" len="med"/>
+                      <a:tailEnd type="none" w="med" len="med"/>
+                    </a:lnT>
+                    <a:lnB w="12700" cap="flat" cmpd="sng" algn="ctr">
+                      <a:solidFill>
+                        <a:schemeClr val="tx1"/>
+                      </a:solidFill>
+                      <a:prstDash val="solid"/>
+                      <a:round/>
+                      <a:headEnd type="none" w="med" len="med"/>
+                      <a:tailEnd type="none" w="med" len="med"/>
+                    </a:lnB>
+                    <a:solidFill>
+                      <a:srgbClr val="002060"/>
+                    </a:solidFill>
+                  </a:tcPr>
+                </a:tc>
+                <a:tc hMerge="1">
+                  <a:txBody>
+                    <a:bodyPr/>
+                    <a:lstStyle/>
+                    <a:p>
+                      <a:pPr algn="ctr"/>
+                      <a:endParaRPr lang="en-US" dirty="0"/>
+                    </a:p>
+                  </a:txBody>
+                  <a:tcPr anchor="ctr">
+                    <a:lnL w="12700" cap="flat" cmpd="sng" algn="ctr">
+                      <a:solidFill>
+                        <a:schemeClr val="tx1"/>
+                      </a:solidFill>
+                      <a:prstDash val="solid"/>
+                      <a:round/>
+                      <a:headEnd type="none" w="med" len="med"/>
+                      <a:tailEnd type="none" w="med" len="med"/>
+                    </a:lnL>
+                    <a:lnR w="12700" cap="flat" cmpd="sng" algn="ctr">
+                      <a:solidFill>
+                        <a:schemeClr val="tx1"/>
+                      </a:solidFill>
+                      <a:prstDash val="solid"/>
+                      <a:round/>
+                      <a:headEnd type="none" w="med" len="med"/>
+                      <a:tailEnd type="none" w="med" len="med"/>
+                    </a:lnR>
+                    <a:lnT w="12700" cap="flat" cmpd="sng" algn="ctr">
+                      <a:solidFill>
+                        <a:schemeClr val="tx1"/>
+                      </a:solidFill>
+                      <a:prstDash val="solid"/>
+                      <a:round/>
+                      <a:headEnd type="none" w="med" len="med"/>
+                      <a:tailEnd type="none" w="med" len="med"/>
+                    </a:lnT>
+                    <a:lnB w="12700" cap="flat" cmpd="sng" algn="ctr">
+                      <a:solidFill>
+                        <a:schemeClr val="tx1"/>
+                      </a:solidFill>
+                      <a:prstDash val="solid"/>
+                      <a:round/>
+                      <a:headEnd type="none" w="med" len="med"/>
+                      <a:tailEnd type="none" w="med" len="med"/>
+                    </a:lnB>
+                    <a:solidFill>
+                      <a:srgbClr val="002060"/>
+                    </a:solidFill>
+                  </a:tcPr>
+                </a:tc>
+                <a:tc hMerge="1">
+                  <a:txBody>
+                    <a:bodyPr/>
+                    <a:lstStyle/>
+                    <a:p>
+                      <a:pPr algn="ctr"/>
+                      <a:endParaRPr lang="en-US" dirty="0"/>
+                    </a:p>
+                  </a:txBody>
+                  <a:tcPr anchor="ctr">
+                    <a:lnL w="12700" cap="flat" cmpd="sng" algn="ctr">
+                      <a:solidFill>
+                        <a:schemeClr val="tx1"/>
+                      </a:solidFill>
+                      <a:prstDash val="solid"/>
+                      <a:round/>
+                      <a:headEnd type="none" w="med" len="med"/>
+                      <a:tailEnd type="none" w="med" len="med"/>
+                    </a:lnL>
+                    <a:lnR w="12700" cap="flat" cmpd="sng" algn="ctr">
+                      <a:solidFill>
+                        <a:schemeClr val="tx1"/>
+                      </a:solidFill>
+                      <a:prstDash val="solid"/>
+                      <a:round/>
+                      <a:headEnd type="none" w="med" len="med"/>
+                      <a:tailEnd type="none" w="med" len="med"/>
+                    </a:lnR>
+                    <a:lnT w="12700" cap="flat" cmpd="sng" algn="ctr">
+                      <a:solidFill>
+                        <a:schemeClr val="tx1"/>
+                      </a:solidFill>
+                      <a:prstDash val="solid"/>
+                      <a:round/>
+                      <a:headEnd type="none" w="med" len="med"/>
+                      <a:tailEnd type="none" w="med" len="med"/>
+                    </a:lnT>
+                    <a:lnB w="12700" cap="flat" cmpd="sng" algn="ctr">
+                      <a:solidFill>
+                        <a:schemeClr val="tx1"/>
+                      </a:solidFill>
+                      <a:prstDash val="solid"/>
+                      <a:round/>
+                      <a:headEnd type="none" w="med" len="med"/>
+                      <a:tailEnd type="none" w="med" len="med"/>
+                    </a:lnB>
+                    <a:solidFill>
+                      <a:srgbClr val="002060"/>
+                    </a:solidFill>
+                  </a:tcPr>
+                </a:tc>
+                <a:extLst>
+                  <a:ext uri="{0D108BD9-81ED-4DB2-BD59-A6C34878D82A}">
+                    <a16:rowId xmlns:a16="http://schemas.microsoft.com/office/drawing/2014/main" val="3211573024"/>
+                  </a:ext>
+                </a:extLst>
+              </a:tr>
+              <a:tr h="370840">
+                <a:tc>
+                  <a:txBody>
+                    <a:bodyPr/>
+                    <a:lstStyle/>
+                    <a:p>
+                      <a:pPr algn="ctr"/>
+                      <a:r>
+                        <a:rPr lang="en-US" b="1" dirty="0"/>
+                        <a:t>Id</a:t>
+                      </a:r>
+                    </a:p>
+                  </a:txBody>
+                  <a:tcPr anchor="ctr">
+                    <a:lnL w="12700" cap="flat" cmpd="sng" algn="ctr">
+                      <a:solidFill>
+                        <a:schemeClr val="tx1"/>
+                      </a:solidFill>
+                      <a:prstDash val="solid"/>
+                      <a:round/>
+                      <a:headEnd type="none" w="med" len="med"/>
+                      <a:tailEnd type="none" w="med" len="med"/>
+                    </a:lnL>
+                    <a:lnR w="12700" cap="flat" cmpd="sng" algn="ctr">
+                      <a:solidFill>
+                        <a:schemeClr val="tx1"/>
+                      </a:solidFill>
+                      <a:prstDash val="solid"/>
+                      <a:round/>
+                      <a:headEnd type="none" w="med" len="med"/>
+                      <a:tailEnd type="none" w="med" len="med"/>
+                    </a:lnR>
+                    <a:lnT w="12700" cap="flat" cmpd="sng" algn="ctr">
+                      <a:solidFill>
+                        <a:schemeClr val="tx1"/>
+                      </a:solidFill>
+                      <a:prstDash val="solid"/>
+                      <a:round/>
+                      <a:headEnd type="none" w="med" len="med"/>
+                      <a:tailEnd type="none" w="med" len="med"/>
+                    </a:lnT>
+                    <a:lnB w="12700" cap="flat" cmpd="sng" algn="ctr">
+                      <a:solidFill>
+                        <a:schemeClr val="tx1"/>
+                      </a:solidFill>
+                      <a:prstDash val="solid"/>
+                      <a:round/>
+                      <a:headEnd type="none" w="med" len="med"/>
+                      <a:tailEnd type="none" w="med" len="med"/>
+                    </a:lnB>
+                  </a:tcPr>
+                </a:tc>
+                <a:tc>
+                  <a:txBody>
+                    <a:bodyPr/>
+                    <a:lstStyle/>
+                    <a:p>
+                      <a:pPr algn="ctr"/>
+                      <a:r>
+                        <a:rPr lang="en-US" b="1" dirty="0"/>
+                        <a:t>Budget name (£) (VARCHAR)</a:t>
+                      </a:r>
+                    </a:p>
+                  </a:txBody>
+                  <a:tcPr anchor="ctr">
+                    <a:lnL w="12700" cap="flat" cmpd="sng" algn="ctr">
+                      <a:solidFill>
+                        <a:schemeClr val="tx1"/>
+                      </a:solidFill>
+                      <a:prstDash val="solid"/>
+                      <a:round/>
+                      <a:headEnd type="none" w="med" len="med"/>
+                      <a:tailEnd type="none" w="med" len="med"/>
+                    </a:lnL>
+                    <a:lnR w="12700" cap="flat" cmpd="sng" algn="ctr">
+                      <a:solidFill>
+                        <a:schemeClr val="tx1"/>
+                      </a:solidFill>
+                      <a:prstDash val="solid"/>
+                      <a:round/>
+                      <a:headEnd type="none" w="med" len="med"/>
+                      <a:tailEnd type="none" w="med" len="med"/>
+                    </a:lnR>
+                    <a:lnT w="12700" cap="flat" cmpd="sng" algn="ctr">
+                      <a:solidFill>
+                        <a:schemeClr val="tx1"/>
+                      </a:solidFill>
+                      <a:prstDash val="solid"/>
+                      <a:round/>
+                      <a:headEnd type="none" w="med" len="med"/>
+                      <a:tailEnd type="none" w="med" len="med"/>
+                    </a:lnT>
+                    <a:lnB w="12700" cap="flat" cmpd="sng" algn="ctr">
+                      <a:solidFill>
+                        <a:schemeClr val="tx1"/>
+                      </a:solidFill>
+                      <a:prstDash val="solid"/>
+                      <a:round/>
+                      <a:headEnd type="none" w="med" len="med"/>
+                      <a:tailEnd type="none" w="med" len="med"/>
+                    </a:lnB>
+                  </a:tcPr>
+                </a:tc>
+                <a:tc>
+                  <a:txBody>
+                    <a:bodyPr/>
+                    <a:lstStyle/>
+                    <a:p>
+                      <a:pPr algn="ctr"/>
+                      <a:r>
+                        <a:rPr lang="en-US" b="1" dirty="0"/>
+                        <a:t>Budget Amount (£) (INT)</a:t>
+                      </a:r>
+                    </a:p>
+                  </a:txBody>
+                  <a:tcPr anchor="ctr">
+                    <a:lnL w="12700" cap="flat" cmpd="sng" algn="ctr">
+                      <a:solidFill>
+                        <a:schemeClr val="tx1"/>
+                      </a:solidFill>
+                      <a:prstDash val="solid"/>
+                      <a:round/>
+                      <a:headEnd type="none" w="med" len="med"/>
+                      <a:tailEnd type="none" w="med" len="med"/>
+                    </a:lnL>
+                    <a:lnR w="12700" cap="flat" cmpd="sng" algn="ctr">
+                      <a:solidFill>
+                        <a:schemeClr val="tx1"/>
+                      </a:solidFill>
+                      <a:prstDash val="solid"/>
+                      <a:round/>
+                      <a:headEnd type="none" w="med" len="med"/>
+                      <a:tailEnd type="none" w="med" len="med"/>
+                    </a:lnR>
+                    <a:lnT w="12700" cap="flat" cmpd="sng" algn="ctr">
+                      <a:solidFill>
+                        <a:schemeClr val="tx1"/>
+                      </a:solidFill>
+                      <a:prstDash val="solid"/>
+                      <a:round/>
+                      <a:headEnd type="none" w="med" len="med"/>
+                      <a:tailEnd type="none" w="med" len="med"/>
+                    </a:lnT>
+                    <a:lnB w="12700" cap="flat" cmpd="sng" algn="ctr">
+                      <a:solidFill>
+                        <a:schemeClr val="tx1"/>
+                      </a:solidFill>
+                      <a:prstDash val="solid"/>
+                      <a:round/>
+                      <a:headEnd type="none" w="med" len="med"/>
+                      <a:tailEnd type="none" w="med" len="med"/>
+                    </a:lnB>
+                  </a:tcPr>
+                </a:tc>
+                <a:tc>
+                  <a:txBody>
+                    <a:bodyPr/>
+                    <a:lstStyle/>
+                    <a:p>
+                      <a:pPr algn="ctr"/>
+                      <a:r>
+                        <a:rPr lang="en-US" b="1" dirty="0"/>
+                        <a:t>Start Time (DATETIME)</a:t>
+                      </a:r>
+                    </a:p>
+                  </a:txBody>
+                  <a:tcPr anchor="ctr">
+                    <a:lnL w="12700" cap="flat" cmpd="sng" algn="ctr">
+                      <a:solidFill>
+                        <a:schemeClr val="tx1"/>
+                      </a:solidFill>
+                      <a:prstDash val="solid"/>
+                      <a:round/>
+                      <a:headEnd type="none" w="med" len="med"/>
+                      <a:tailEnd type="none" w="med" len="med"/>
+                    </a:lnL>
+                    <a:lnR w="12700" cap="flat" cmpd="sng" algn="ctr">
+                      <a:solidFill>
+                        <a:schemeClr val="tx1"/>
+                      </a:solidFill>
+                      <a:prstDash val="solid"/>
+                      <a:round/>
+                      <a:headEnd type="none" w="med" len="med"/>
+                      <a:tailEnd type="none" w="med" len="med"/>
+                    </a:lnR>
+                    <a:lnT w="12700" cap="flat" cmpd="sng" algn="ctr">
+                      <a:solidFill>
+                        <a:schemeClr val="tx1"/>
+                      </a:solidFill>
+                      <a:prstDash val="solid"/>
+                      <a:round/>
+                      <a:headEnd type="none" w="med" len="med"/>
+                      <a:tailEnd type="none" w="med" len="med"/>
+                    </a:lnT>
+                    <a:lnB w="12700" cap="flat" cmpd="sng" algn="ctr">
+                      <a:solidFill>
+                        <a:schemeClr val="tx1"/>
+                      </a:solidFill>
+                      <a:prstDash val="solid"/>
+                      <a:round/>
+                      <a:headEnd type="none" w="med" len="med"/>
+                      <a:tailEnd type="none" w="med" len="med"/>
+                    </a:lnB>
+                  </a:tcPr>
+                </a:tc>
+                <a:tc>
+                  <a:txBody>
+                    <a:bodyPr/>
+                    <a:lstStyle/>
+                    <a:p>
+                      <a:pPr algn="ctr"/>
+                      <a:r>
+                        <a:rPr lang="en-US" b="1" dirty="0"/>
+                        <a:t>End Time</a:t>
+                      </a:r>
+                    </a:p>
+                    <a:p>
+                      <a:pPr algn="ctr"/>
+                      <a:r>
+                        <a:rPr lang="en-US" b="1" dirty="0"/>
+                        <a:t>(DATETIME)</a:t>
+                      </a:r>
+                    </a:p>
+                  </a:txBody>
+                  <a:tcPr anchor="ctr">
+                    <a:lnL w="12700" cap="flat" cmpd="sng" algn="ctr">
+                      <a:solidFill>
+                        <a:schemeClr val="tx1"/>
+                      </a:solidFill>
+                      <a:prstDash val="solid"/>
+                      <a:round/>
+                      <a:headEnd type="none" w="med" len="med"/>
+                      <a:tailEnd type="none" w="med" len="med"/>
+                    </a:lnL>
+                    <a:lnR w="12700" cap="flat" cmpd="sng" algn="ctr">
+                      <a:solidFill>
+                        <a:schemeClr val="tx1"/>
+                      </a:solidFill>
+                      <a:prstDash val="solid"/>
+                      <a:round/>
+                      <a:headEnd type="none" w="med" len="med"/>
+                      <a:tailEnd type="none" w="med" len="med"/>
+                    </a:lnR>
+                    <a:lnT w="12700" cap="flat" cmpd="sng" algn="ctr">
+                      <a:solidFill>
+                        <a:schemeClr val="tx1"/>
+                      </a:solidFill>
+                      <a:prstDash val="solid"/>
+                      <a:round/>
+                      <a:headEnd type="none" w="med" len="med"/>
+                      <a:tailEnd type="none" w="med" len="med"/>
+                    </a:lnT>
+                    <a:lnB w="12700" cap="flat" cmpd="sng" algn="ctr">
+                      <a:solidFill>
+                        <a:schemeClr val="tx1"/>
+                      </a:solidFill>
+                      <a:prstDash val="solid"/>
+                      <a:round/>
+                      <a:headEnd type="none" w="med" len="med"/>
+                      <a:tailEnd type="none" w="med" len="med"/>
+                    </a:lnB>
+                  </a:tcPr>
+                </a:tc>
+                <a:extLst>
+                  <a:ext uri="{0D108BD9-81ED-4DB2-BD59-A6C34878D82A}">
+                    <a16:rowId xmlns:a16="http://schemas.microsoft.com/office/drawing/2014/main" val="2556437728"/>
+                  </a:ext>
+                </a:extLst>
+              </a:tr>
+              <a:tr h="370840">
+                <a:tc>
+                  <a:txBody>
+                    <a:bodyPr/>
+                    <a:lstStyle/>
+                    <a:p>
+                      <a:pPr algn="ctr"/>
+                      <a:r>
+                        <a:rPr lang="en-US" dirty="0"/>
+                        <a:t>1</a:t>
+                      </a:r>
+                    </a:p>
+                  </a:txBody>
+                  <a:tcPr anchor="ctr">
+                    <a:lnL w="12700" cap="flat" cmpd="sng" algn="ctr">
+                      <a:solidFill>
+                        <a:schemeClr val="tx1"/>
+                      </a:solidFill>
+                      <a:prstDash val="solid"/>
+                      <a:round/>
+                      <a:headEnd type="none" w="med" len="med"/>
+                      <a:tailEnd type="none" w="med" len="med"/>
+                    </a:lnL>
+                    <a:lnR w="12700" cap="flat" cmpd="sng" algn="ctr">
+                      <a:solidFill>
+                        <a:schemeClr val="tx1"/>
+                      </a:solidFill>
+                      <a:prstDash val="solid"/>
+                      <a:round/>
+                      <a:headEnd type="none" w="med" len="med"/>
+                      <a:tailEnd type="none" w="med" len="med"/>
+                    </a:lnR>
+                    <a:lnT w="12700" cap="flat" cmpd="sng" algn="ctr">
+                      <a:solidFill>
+                        <a:schemeClr val="tx1"/>
+                      </a:solidFill>
+                      <a:prstDash val="solid"/>
+                      <a:round/>
+                      <a:headEnd type="none" w="med" len="med"/>
+                      <a:tailEnd type="none" w="med" len="med"/>
+                    </a:lnT>
+                    <a:lnB w="12700" cap="flat" cmpd="sng" algn="ctr">
+                      <a:solidFill>
+                        <a:schemeClr val="tx1"/>
+                      </a:solidFill>
+                      <a:prstDash val="solid"/>
+                      <a:round/>
+                      <a:headEnd type="none" w="med" len="med"/>
+                      <a:tailEnd type="none" w="med" len="med"/>
+                    </a:lnB>
+                  </a:tcPr>
+                </a:tc>
+                <a:tc>
+                  <a:txBody>
+                    <a:bodyPr/>
+                    <a:lstStyle/>
+                    <a:p>
+                      <a:pPr algn="ctr"/>
+                      <a:r>
+                        <a:rPr lang="en-US" dirty="0"/>
+                        <a:t>May 2018</a:t>
+                      </a:r>
+                    </a:p>
+                  </a:txBody>
+                  <a:tcPr anchor="ctr">
+                    <a:lnL w="12700" cap="flat" cmpd="sng" algn="ctr">
+                      <a:solidFill>
+                        <a:schemeClr val="tx1"/>
+                      </a:solidFill>
+                      <a:prstDash val="solid"/>
+                      <a:round/>
+                      <a:headEnd type="none" w="med" len="med"/>
+                      <a:tailEnd type="none" w="med" len="med"/>
+                    </a:lnL>
+                    <a:lnR w="12700" cap="flat" cmpd="sng" algn="ctr">
+                      <a:solidFill>
+                        <a:schemeClr val="tx1"/>
+                      </a:solidFill>
+                      <a:prstDash val="solid"/>
+                      <a:round/>
+                      <a:headEnd type="none" w="med" len="med"/>
+                      <a:tailEnd type="none" w="med" len="med"/>
+                    </a:lnR>
+                    <a:lnT w="12700" cap="flat" cmpd="sng" algn="ctr">
+                      <a:solidFill>
+                        <a:schemeClr val="tx1"/>
+                      </a:solidFill>
+                      <a:prstDash val="solid"/>
+                      <a:round/>
+                      <a:headEnd type="none" w="med" len="med"/>
+                      <a:tailEnd type="none" w="med" len="med"/>
+                    </a:lnT>
+                    <a:lnB w="12700" cap="flat" cmpd="sng" algn="ctr">
+                      <a:solidFill>
+                        <a:schemeClr val="tx1"/>
+                      </a:solidFill>
+                      <a:prstDash val="solid"/>
+                      <a:round/>
+                      <a:headEnd type="none" w="med" len="med"/>
+                      <a:tailEnd type="none" w="med" len="med"/>
+                    </a:lnB>
+                  </a:tcPr>
+                </a:tc>
+                <a:tc>
+                  <a:txBody>
+                    <a:bodyPr/>
+                    <a:lstStyle/>
+                    <a:p>
+                      <a:pPr algn="ctr"/>
+                      <a:r>
+                        <a:rPr lang="en-US" dirty="0"/>
+                        <a:t>500</a:t>
+                      </a:r>
+                    </a:p>
+                  </a:txBody>
+                  <a:tcPr anchor="ctr">
+                    <a:lnL w="12700" cap="flat" cmpd="sng" algn="ctr">
+                      <a:solidFill>
+                        <a:schemeClr val="tx1"/>
+                      </a:solidFill>
+                      <a:prstDash val="solid"/>
+                      <a:round/>
+                      <a:headEnd type="none" w="med" len="med"/>
+                      <a:tailEnd type="none" w="med" len="med"/>
+                    </a:lnL>
+                    <a:lnR w="12700" cap="flat" cmpd="sng" algn="ctr">
+                      <a:solidFill>
+                        <a:schemeClr val="tx1"/>
+                      </a:solidFill>
+                      <a:prstDash val="solid"/>
+                      <a:round/>
+                      <a:headEnd type="none" w="med" len="med"/>
+                      <a:tailEnd type="none" w="med" len="med"/>
+                    </a:lnR>
+                    <a:lnT w="12700" cap="flat" cmpd="sng" algn="ctr">
+                      <a:solidFill>
+                        <a:schemeClr val="tx1"/>
+                      </a:solidFill>
+                      <a:prstDash val="solid"/>
+                      <a:round/>
+                      <a:headEnd type="none" w="med" len="med"/>
+                      <a:tailEnd type="none" w="med" len="med"/>
+                    </a:lnT>
+                    <a:lnB w="12700" cap="flat" cmpd="sng" algn="ctr">
+                      <a:solidFill>
+                        <a:schemeClr val="tx1"/>
+                      </a:solidFill>
+                      <a:prstDash val="solid"/>
+                      <a:round/>
+                      <a:headEnd type="none" w="med" len="med"/>
+                      <a:tailEnd type="none" w="med" len="med"/>
+                    </a:lnB>
+                  </a:tcPr>
+                </a:tc>
+                <a:tc>
+                  <a:txBody>
+                    <a:bodyPr/>
+                    <a:lstStyle/>
+                    <a:p>
+                      <a:pPr algn="ctr"/>
+                      <a:r>
+                        <a:rPr lang="en-GB" dirty="0"/>
+                        <a:t>03.41 AM Thursday, 03 May, 2018</a:t>
+                      </a:r>
+                      <a:endParaRPr lang="en-US" dirty="0"/>
+                    </a:p>
+                  </a:txBody>
+                  <a:tcPr anchor="ctr">
+                    <a:lnL w="12700" cap="flat" cmpd="sng" algn="ctr">
+                      <a:solidFill>
+                        <a:schemeClr val="tx1"/>
+                      </a:solidFill>
+                      <a:prstDash val="solid"/>
+                      <a:round/>
+                      <a:headEnd type="none" w="med" len="med"/>
+                      <a:tailEnd type="none" w="med" len="med"/>
+                    </a:lnL>
+                    <a:lnR w="12700" cap="flat" cmpd="sng" algn="ctr">
+                      <a:solidFill>
+                        <a:schemeClr val="tx1"/>
+                      </a:solidFill>
+                      <a:prstDash val="solid"/>
+                      <a:round/>
+                      <a:headEnd type="none" w="med" len="med"/>
+                      <a:tailEnd type="none" w="med" len="med"/>
+                    </a:lnR>
+                    <a:lnT w="12700" cap="flat" cmpd="sng" algn="ctr">
+                      <a:solidFill>
+                        <a:schemeClr val="tx1"/>
+                      </a:solidFill>
+                      <a:prstDash val="solid"/>
+                      <a:round/>
+                      <a:headEnd type="none" w="med" len="med"/>
+                      <a:tailEnd type="none" w="med" len="med"/>
+                    </a:lnT>
+                    <a:lnB w="12700" cap="flat" cmpd="sng" algn="ctr">
+                      <a:solidFill>
+                        <a:schemeClr val="tx1"/>
+                      </a:solidFill>
+                      <a:prstDash val="solid"/>
+                      <a:round/>
+                      <a:headEnd type="none" w="med" len="med"/>
+                      <a:tailEnd type="none" w="med" len="med"/>
+                    </a:lnB>
+                  </a:tcPr>
+                </a:tc>
+                <a:tc>
+                  <a:txBody>
+                    <a:bodyPr/>
+                    <a:lstStyle/>
+                    <a:p>
+                      <a:pPr algn="ctr"/>
+                      <a:r>
+                        <a:rPr lang="en-GB" dirty="0"/>
+                        <a:t>03.41 AM Thursday, 30 May, </a:t>
+                      </a:r>
+                      <a:endParaRPr lang="en-US" dirty="0"/>
+                    </a:p>
+                  </a:txBody>
+                  <a:tcPr anchor="ctr">
+                    <a:lnL w="12700" cap="flat" cmpd="sng" algn="ctr">
+                      <a:solidFill>
+                        <a:schemeClr val="tx1"/>
+                      </a:solidFill>
+                      <a:prstDash val="solid"/>
+                      <a:round/>
+                      <a:headEnd type="none" w="med" len="med"/>
+                      <a:tailEnd type="none" w="med" len="med"/>
+                    </a:lnL>
+                    <a:lnR w="12700" cap="flat" cmpd="sng" algn="ctr">
+                      <a:solidFill>
+                        <a:schemeClr val="tx1"/>
+                      </a:solidFill>
+                      <a:prstDash val="solid"/>
+                      <a:round/>
+                      <a:headEnd type="none" w="med" len="med"/>
+                      <a:tailEnd type="none" w="med" len="med"/>
+                    </a:lnR>
+                    <a:lnT w="12700" cap="flat" cmpd="sng" algn="ctr">
+                      <a:solidFill>
+                        <a:schemeClr val="tx1"/>
+                      </a:solidFill>
+                      <a:prstDash val="solid"/>
+                      <a:round/>
+                      <a:headEnd type="none" w="med" len="med"/>
+                      <a:tailEnd type="none" w="med" len="med"/>
+                    </a:lnT>
+                    <a:lnB w="12700" cap="flat" cmpd="sng" algn="ctr">
+                      <a:solidFill>
+                        <a:schemeClr val="tx1"/>
+                      </a:solidFill>
+                      <a:prstDash val="solid"/>
+                      <a:round/>
+                      <a:headEnd type="none" w="med" len="med"/>
+                      <a:tailEnd type="none" w="med" len="med"/>
+                    </a:lnB>
+                  </a:tcPr>
+                </a:tc>
+                <a:extLst>
+                  <a:ext uri="{0D108BD9-81ED-4DB2-BD59-A6C34878D82A}">
+                    <a16:rowId xmlns:a16="http://schemas.microsoft.com/office/drawing/2014/main" val="466209325"/>
+                  </a:ext>
+                </a:extLst>
+              </a:tr>
+            </a:tbl>
+          </a:graphicData>
+        </a:graphic>
+      </p:graphicFrame>
+      <p:cxnSp>
+        <p:nvCxnSpPr>
+          <p:cNvPr id="18" name="Straight Arrow Connector 17">
+            <a:extLst>
+              <a:ext uri="{FF2B5EF4-FFF2-40B4-BE49-F238E27FC236}">
+                <a16:creationId xmlns:a16="http://schemas.microsoft.com/office/drawing/2014/main" id="{4B17CE36-8256-EB4F-9282-B36DBF6557D9}"/>
+              </a:ext>
+            </a:extLst>
+          </p:cNvPr>
+          <p:cNvCxnSpPr>
+            <a:cxnSpLocks/>
+          </p:cNvCxnSpPr>
+          <p:nvPr/>
+        </p:nvCxnSpPr>
+        <p:spPr>
+          <a:xfrm flipH="1">
+            <a:off x="331694" y="2315305"/>
+            <a:ext cx="4529169" cy="2337377"/>
+          </a:xfrm>
+          <a:prstGeom prst="straightConnector1">
+            <a:avLst/>
+          </a:prstGeom>
+          <a:ln w="38100">
+            <a:headEnd type="none"/>
+            <a:tailEnd type="triangle"/>
+          </a:ln>
+        </p:spPr>
+        <p:style>
+          <a:lnRef idx="1">
+            <a:schemeClr val="dk1"/>
+          </a:lnRef>
+          <a:fillRef idx="0">
+            <a:schemeClr val="dk1"/>
+          </a:fillRef>
+          <a:effectRef idx="0">
+            <a:schemeClr val="dk1"/>
+          </a:effectRef>
+          <a:fontRef idx="minor">
+            <a:schemeClr val="tx1"/>
+          </a:fontRef>
+        </p:style>
+      </p:cxnSp>
+      <p:cxnSp>
+        <p:nvCxnSpPr>
+          <p:cNvPr id="20" name="Straight Arrow Connector 19">
+            <a:extLst>
+              <a:ext uri="{FF2B5EF4-FFF2-40B4-BE49-F238E27FC236}">
+                <a16:creationId xmlns:a16="http://schemas.microsoft.com/office/drawing/2014/main" id="{10C8B23C-85A6-FB41-BA9B-3578961C2749}"/>
+              </a:ext>
+            </a:extLst>
+          </p:cNvPr>
+          <p:cNvCxnSpPr>
+            <a:cxnSpLocks/>
+          </p:cNvCxnSpPr>
+          <p:nvPr/>
+        </p:nvCxnSpPr>
+        <p:spPr>
+          <a:xfrm>
+            <a:off x="5912224" y="2315305"/>
+            <a:ext cx="608483" cy="427895"/>
+          </a:xfrm>
+          <a:prstGeom prst="straightConnector1">
+            <a:avLst/>
+          </a:prstGeom>
+          <a:ln w="38100">
+            <a:headEnd type="none"/>
             <a:tailEnd type="triangle"/>
           </a:ln>
         </p:spPr>

</xml_diff>

<commit_message>
initialize method added and tested in budget class
</commit_message>
<xml_diff>
--- a/Plans_Project_Management/Budget_App_Plan_08Nov2018.pptx
+++ b/Plans_Project_Management/Budget_App_Plan_08Nov2018.pptx
@@ -4681,7 +4681,7 @@
           <p:nvPr>
             <p:extLst>
               <p:ext uri="{D42A27DB-BD31-4B8C-83A1-F6EECF244321}">
-                <p14:modId xmlns:p14="http://schemas.microsoft.com/office/powerpoint/2010/main" val="1572713515"/>
+                <p14:modId xmlns:p14="http://schemas.microsoft.com/office/powerpoint/2010/main" val="3656778964"/>
               </p:ext>
             </p:extLst>
           </p:nvPr>
@@ -4746,6 +4746,28 @@
                         <a:rPr lang="en-US" dirty="0"/>
                         <a:t>@budget(numeric)</a:t>
                       </a:r>
+                    </a:p>
+                    <a:p>
+                      <a:r>
+                        <a:rPr lang="en-US" dirty="0"/>
+                        <a:t>@</a:t>
+                      </a:r>
+                      <a:r>
+                        <a:rPr lang="en-US" dirty="0" err="1"/>
+                        <a:t>start_time</a:t>
+                      </a:r>
+                      <a:endParaRPr lang="en-US" dirty="0"/>
+                    </a:p>
+                    <a:p>
+                      <a:r>
+                        <a:rPr lang="en-US" dirty="0"/>
+                        <a:t>@</a:t>
+                      </a:r>
+                      <a:r>
+                        <a:rPr lang="en-US"/>
+                        <a:t>end_time</a:t>
+                      </a:r>
+                      <a:endParaRPr lang="en-US" dirty="0"/>
                     </a:p>
                   </a:txBody>
                   <a:tcPr/>
@@ -24676,9 +24698,9 @@
           <p:nvPr/>
         </p:nvCxnSpPr>
         <p:spPr>
-          <a:xfrm>
-            <a:off x="5912224" y="2315305"/>
-            <a:ext cx="608483" cy="427895"/>
+          <a:xfrm flipV="1">
+            <a:off x="5912224" y="1879600"/>
+            <a:ext cx="759509" cy="435706"/>
           </a:xfrm>
           <a:prstGeom prst="straightConnector1">
             <a:avLst/>

</xml_diff>

<commit_message>
additional functions planned for transactions
</commit_message>
<xml_diff>
--- a/Plans_Project_Management/Budget_App_Plan_08Nov2018.pptx
+++ b/Plans_Project_Management/Budget_App_Plan_08Nov2018.pptx
@@ -19,7 +19,9 @@
     <p:sldId id="257" r:id="rId13"/>
     <p:sldId id="268" r:id="rId14"/>
     <p:sldId id="266" r:id="rId15"/>
-    <p:sldId id="269" r:id="rId16"/>
+    <p:sldId id="271" r:id="rId16"/>
+    <p:sldId id="272" r:id="rId17"/>
+    <p:sldId id="269" r:id="rId18"/>
   </p:sldIdLst>
   <p:sldSz cx="12192000" cy="6858000"/>
   <p:notesSz cx="6858000" cy="9144000"/>
@@ -273,7 +275,7 @@
           <a:p>
             <a:fld id="{718D7DD3-0D86-7041-9F4A-55F1DF225378}" type="datetimeFigureOut">
               <a:rPr lang="en-US" smtClean="0"/>
-              <a:t>11/9/18</a:t>
+              <a:t>11/12/18</a:t>
             </a:fld>
             <a:endParaRPr lang="en-US"/>
           </a:p>
@@ -471,7 +473,7 @@
           <a:p>
             <a:fld id="{718D7DD3-0D86-7041-9F4A-55F1DF225378}" type="datetimeFigureOut">
               <a:rPr lang="en-US" smtClean="0"/>
-              <a:t>11/9/18</a:t>
+              <a:t>11/12/18</a:t>
             </a:fld>
             <a:endParaRPr lang="en-US"/>
           </a:p>
@@ -679,7 +681,7 @@
           <a:p>
             <a:fld id="{718D7DD3-0D86-7041-9F4A-55F1DF225378}" type="datetimeFigureOut">
               <a:rPr lang="en-US" smtClean="0"/>
-              <a:t>11/9/18</a:t>
+              <a:t>11/12/18</a:t>
             </a:fld>
             <a:endParaRPr lang="en-US"/>
           </a:p>
@@ -877,7 +879,7 @@
           <a:p>
             <a:fld id="{718D7DD3-0D86-7041-9F4A-55F1DF225378}" type="datetimeFigureOut">
               <a:rPr lang="en-US" smtClean="0"/>
-              <a:t>11/9/18</a:t>
+              <a:t>11/12/18</a:t>
             </a:fld>
             <a:endParaRPr lang="en-US"/>
           </a:p>
@@ -1152,7 +1154,7 @@
           <a:p>
             <a:fld id="{718D7DD3-0D86-7041-9F4A-55F1DF225378}" type="datetimeFigureOut">
               <a:rPr lang="en-US" smtClean="0"/>
-              <a:t>11/9/18</a:t>
+              <a:t>11/12/18</a:t>
             </a:fld>
             <a:endParaRPr lang="en-US"/>
           </a:p>
@@ -1417,7 +1419,7 @@
           <a:p>
             <a:fld id="{718D7DD3-0D86-7041-9F4A-55F1DF225378}" type="datetimeFigureOut">
               <a:rPr lang="en-US" smtClean="0"/>
-              <a:t>11/9/18</a:t>
+              <a:t>11/12/18</a:t>
             </a:fld>
             <a:endParaRPr lang="en-US"/>
           </a:p>
@@ -1829,7 +1831,7 @@
           <a:p>
             <a:fld id="{718D7DD3-0D86-7041-9F4A-55F1DF225378}" type="datetimeFigureOut">
               <a:rPr lang="en-US" smtClean="0"/>
-              <a:t>11/9/18</a:t>
+              <a:t>11/12/18</a:t>
             </a:fld>
             <a:endParaRPr lang="en-US"/>
           </a:p>
@@ -1970,7 +1972,7 @@
           <a:p>
             <a:fld id="{718D7DD3-0D86-7041-9F4A-55F1DF225378}" type="datetimeFigureOut">
               <a:rPr lang="en-US" smtClean="0"/>
-              <a:t>11/9/18</a:t>
+              <a:t>11/12/18</a:t>
             </a:fld>
             <a:endParaRPr lang="en-US"/>
           </a:p>
@@ -2083,7 +2085,7 @@
           <a:p>
             <a:fld id="{718D7DD3-0D86-7041-9F4A-55F1DF225378}" type="datetimeFigureOut">
               <a:rPr lang="en-US" smtClean="0"/>
-              <a:t>11/9/18</a:t>
+              <a:t>11/12/18</a:t>
             </a:fld>
             <a:endParaRPr lang="en-US"/>
           </a:p>
@@ -2394,7 +2396,7 @@
           <a:p>
             <a:fld id="{718D7DD3-0D86-7041-9F4A-55F1DF225378}" type="datetimeFigureOut">
               <a:rPr lang="en-US" smtClean="0"/>
-              <a:t>11/9/18</a:t>
+              <a:t>11/12/18</a:t>
             </a:fld>
             <a:endParaRPr lang="en-US"/>
           </a:p>
@@ -2682,7 +2684,7 @@
           <a:p>
             <a:fld id="{718D7DD3-0D86-7041-9F4A-55F1DF225378}" type="datetimeFigureOut">
               <a:rPr lang="en-US" smtClean="0"/>
-              <a:t>11/9/18</a:t>
+              <a:t>11/12/18</a:t>
             </a:fld>
             <a:endParaRPr lang="en-US"/>
           </a:p>
@@ -2923,7 +2925,7 @@
           <a:p>
             <a:fld id="{718D7DD3-0D86-7041-9F4A-55F1DF225378}" type="datetimeFigureOut">
               <a:rPr lang="en-US" smtClean="0"/>
-              <a:t>11/9/18</a:t>
+              <a:t>11/12/18</a:t>
             </a:fld>
             <a:endParaRPr lang="en-US"/>
           </a:p>
@@ -4681,7 +4683,7 @@
           <p:nvPr>
             <p:extLst>
               <p:ext uri="{D42A27DB-BD31-4B8C-83A1-F6EECF244321}">
-                <p14:modId xmlns:p14="http://schemas.microsoft.com/office/powerpoint/2010/main" val="3656778964"/>
+                <p14:modId xmlns:p14="http://schemas.microsoft.com/office/powerpoint/2010/main" val="4054288860"/>
               </p:ext>
             </p:extLst>
           </p:nvPr>
@@ -4744,7 +4746,37 @@
                     <a:p>
                       <a:r>
                         <a:rPr lang="en-US" dirty="0"/>
-                        <a:t>@budget(numeric)</a:t>
+                        <a:t>@</a:t>
+                      </a:r>
+                      <a:r>
+                        <a:rPr lang="en-US" dirty="0" err="1"/>
+                        <a:t>budget_name</a:t>
+                      </a:r>
+                      <a:r>
+                        <a:rPr lang="en-US" dirty="0"/>
+                        <a:t>(</a:t>
+                      </a:r>
+                      <a:r>
+                        <a:rPr lang="en-US" dirty="0" err="1"/>
+                        <a:t>Str</a:t>
+                      </a:r>
+                      <a:r>
+                        <a:rPr lang="en-US" dirty="0"/>
+                        <a:t>)</a:t>
+                      </a:r>
+                    </a:p>
+                    <a:p>
+                      <a:r>
+                        <a:rPr lang="en-US" dirty="0"/>
+                        <a:t>@</a:t>
+                      </a:r>
+                      <a:r>
+                        <a:rPr lang="en-US" dirty="0" err="1"/>
+                        <a:t>budget_amount</a:t>
+                      </a:r>
+                      <a:r>
+                        <a:rPr lang="en-US" dirty="0"/>
+                        <a:t>(numeric)</a:t>
                       </a:r>
                     </a:p>
                     <a:p>
@@ -4756,7 +4788,10 @@
                         <a:rPr lang="en-US" dirty="0" err="1"/>
                         <a:t>start_time</a:t>
                       </a:r>
-                      <a:endParaRPr lang="en-US" dirty="0"/>
+                      <a:r>
+                        <a:rPr lang="en-US" dirty="0"/>
+                        <a:t>(TIMESTAMP)</a:t>
+                      </a:r>
                     </a:p>
                     <a:p>
                       <a:r>
@@ -4764,7 +4799,7 @@
                         <a:t>@</a:t>
                       </a:r>
                       <a:r>
-                        <a:rPr lang="en-US"/>
+                        <a:rPr lang="en-US" dirty="0" err="1"/>
                         <a:t>end_time</a:t>
                       </a:r>
                       <a:endParaRPr lang="en-US" dirty="0"/>
@@ -5954,7 +5989,7 @@
             <a:pPr algn="ctr"/>
             <a:r>
               <a:rPr lang="en-US" sz="2800" b="1" dirty="0"/>
-              <a:t>Function rationale – Page 1</a:t>
+              <a:t>Function rationale – Page 1 - Merchants</a:t>
             </a:r>
           </a:p>
         </p:txBody>
@@ -6592,8 +6627,13 @@
             <a:pPr algn="ctr"/>
             <a:r>
               <a:rPr lang="en-US" sz="2800" b="1" dirty="0"/>
-              <a:t>Function rationale – Page 2</a:t>
+              <a:t>Function rationale – Page 2 - </a:t>
             </a:r>
+            <a:r>
+              <a:rPr lang="en-US" sz="2800" b="1" dirty="0" err="1"/>
+              <a:t>Merchnats</a:t>
+            </a:r>
+            <a:endParaRPr lang="en-US" sz="2800" b="1" dirty="0"/>
           </a:p>
         </p:txBody>
       </p:sp>
@@ -6612,7 +6652,7 @@
           <p:nvPr>
             <p:extLst>
               <p:ext uri="{D42A27DB-BD31-4B8C-83A1-F6EECF244321}">
-                <p14:modId xmlns:p14="http://schemas.microsoft.com/office/powerpoint/2010/main" val="4012866511"/>
+                <p14:modId xmlns:p14="http://schemas.microsoft.com/office/powerpoint/2010/main" val="3194475105"/>
               </p:ext>
             </p:extLst>
           </p:nvPr>
@@ -6895,8 +6935,21 @@
                   </a:ext>
                 </a:extLst>
               </a:tr>
-              <a:tr h="370840">
-                <a:tc>
+              <a:tr h="1112520">
+                <a:tc gridSpan="5">
+                  <a:txBody>
+                    <a:bodyPr/>
+                    <a:lstStyle/>
+                    <a:p>
+                      <a:r>
+                        <a:rPr lang="en-US" dirty="0"/>
+                        <a:t>Tag and Budget classes need all the same functions as Merchant class for the same reasons.</a:t>
+                      </a:r>
+                    </a:p>
+                  </a:txBody>
+                  <a:tcPr/>
+                </a:tc>
+                <a:tc hMerge="1">
                   <a:txBody>
                     <a:bodyPr/>
                     <a:lstStyle/>
@@ -6906,7 +6959,7 @@
                   </a:txBody>
                   <a:tcPr/>
                 </a:tc>
-                <a:tc>
+                <a:tc hMerge="1">
                   <a:txBody>
                     <a:bodyPr/>
                     <a:lstStyle/>
@@ -6916,7 +6969,7 @@
                   </a:txBody>
                   <a:tcPr/>
                 </a:tc>
-                <a:tc>
+                <a:tc hMerge="1">
                   <a:txBody>
                     <a:bodyPr/>
                     <a:lstStyle/>
@@ -6926,17 +6979,7 @@
                   </a:txBody>
                   <a:tcPr/>
                 </a:tc>
-                <a:tc>
-                  <a:txBody>
-                    <a:bodyPr/>
-                    <a:lstStyle/>
-                    <a:p>
-                      <a:endParaRPr lang="en-US" dirty="0"/>
-                    </a:p>
-                  </a:txBody>
-                  <a:tcPr/>
-                </a:tc>
-                <a:tc>
+                <a:tc hMerge="1">
                   <a:txBody>
                     <a:bodyPr/>
                     <a:lstStyle/>
@@ -6949,120 +6992,6 @@
                 <a:extLst>
                   <a:ext uri="{0D108BD9-81ED-4DB2-BD59-A6C34878D82A}">
                     <a16:rowId xmlns:a16="http://schemas.microsoft.com/office/drawing/2014/main" val="3831984839"/>
-                  </a:ext>
-                </a:extLst>
-              </a:tr>
-              <a:tr h="370840">
-                <a:tc>
-                  <a:txBody>
-                    <a:bodyPr/>
-                    <a:lstStyle/>
-                    <a:p>
-                      <a:endParaRPr lang="en-US" dirty="0"/>
-                    </a:p>
-                  </a:txBody>
-                  <a:tcPr/>
-                </a:tc>
-                <a:tc>
-                  <a:txBody>
-                    <a:bodyPr/>
-                    <a:lstStyle/>
-                    <a:p>
-                      <a:endParaRPr lang="en-US" dirty="0"/>
-                    </a:p>
-                  </a:txBody>
-                  <a:tcPr/>
-                </a:tc>
-                <a:tc>
-                  <a:txBody>
-                    <a:bodyPr/>
-                    <a:lstStyle/>
-                    <a:p>
-                      <a:endParaRPr lang="en-US" dirty="0"/>
-                    </a:p>
-                  </a:txBody>
-                  <a:tcPr/>
-                </a:tc>
-                <a:tc>
-                  <a:txBody>
-                    <a:bodyPr/>
-                    <a:lstStyle/>
-                    <a:p>
-                      <a:endParaRPr lang="en-US" dirty="0"/>
-                    </a:p>
-                  </a:txBody>
-                  <a:tcPr/>
-                </a:tc>
-                <a:tc>
-                  <a:txBody>
-                    <a:bodyPr/>
-                    <a:lstStyle/>
-                    <a:p>
-                      <a:endParaRPr lang="en-US" dirty="0"/>
-                    </a:p>
-                  </a:txBody>
-                  <a:tcPr/>
-                </a:tc>
-                <a:extLst>
-                  <a:ext uri="{0D108BD9-81ED-4DB2-BD59-A6C34878D82A}">
-                    <a16:rowId xmlns:a16="http://schemas.microsoft.com/office/drawing/2014/main" val="1081334054"/>
-                  </a:ext>
-                </a:extLst>
-              </a:tr>
-              <a:tr h="370840">
-                <a:tc>
-                  <a:txBody>
-                    <a:bodyPr/>
-                    <a:lstStyle/>
-                    <a:p>
-                      <a:endParaRPr lang="en-US" dirty="0"/>
-                    </a:p>
-                  </a:txBody>
-                  <a:tcPr/>
-                </a:tc>
-                <a:tc>
-                  <a:txBody>
-                    <a:bodyPr/>
-                    <a:lstStyle/>
-                    <a:p>
-                      <a:endParaRPr lang="en-US" dirty="0"/>
-                    </a:p>
-                  </a:txBody>
-                  <a:tcPr/>
-                </a:tc>
-                <a:tc>
-                  <a:txBody>
-                    <a:bodyPr/>
-                    <a:lstStyle/>
-                    <a:p>
-                      <a:endParaRPr lang="en-US" dirty="0"/>
-                    </a:p>
-                  </a:txBody>
-                  <a:tcPr/>
-                </a:tc>
-                <a:tc>
-                  <a:txBody>
-                    <a:bodyPr/>
-                    <a:lstStyle/>
-                    <a:p>
-                      <a:endParaRPr lang="en-US" dirty="0"/>
-                    </a:p>
-                  </a:txBody>
-                  <a:tcPr/>
-                </a:tc>
-                <a:tc>
-                  <a:txBody>
-                    <a:bodyPr/>
-                    <a:lstStyle/>
-                    <a:p>
-                      <a:endParaRPr lang="en-US" dirty="0"/>
-                    </a:p>
-                  </a:txBody>
-                  <a:tcPr/>
-                </a:tc>
-                <a:extLst>
-                  <a:ext uri="{0D108BD9-81ED-4DB2-BD59-A6C34878D82A}">
-                    <a16:rowId xmlns:a16="http://schemas.microsoft.com/office/drawing/2014/main" val="2432464653"/>
                   </a:ext>
                 </a:extLst>
               </a:tr>
@@ -7084,6 +7013,1421 @@
 </file>
 
 <file path=ppt/slides/slide15.xml><?xml version="1.0" encoding="utf-8"?>
+<p:sld xmlns:a="http://schemas.openxmlformats.org/drawingml/2006/main" xmlns:r="http://schemas.openxmlformats.org/officeDocument/2006/relationships" xmlns:p="http://schemas.openxmlformats.org/presentationml/2006/main">
+  <p:cSld>
+    <p:spTree>
+      <p:nvGrpSpPr>
+        <p:cNvPr id="1" name=""/>
+        <p:cNvGrpSpPr/>
+        <p:nvPr/>
+      </p:nvGrpSpPr>
+      <p:grpSpPr>
+        <a:xfrm>
+          <a:off x="0" y="0"/>
+          <a:ext cx="0" cy="0"/>
+          <a:chOff x="0" y="0"/>
+          <a:chExt cx="0" cy="0"/>
+        </a:xfrm>
+      </p:grpSpPr>
+      <p:sp>
+        <p:nvSpPr>
+          <p:cNvPr id="2" name="Title 1">
+            <a:extLst>
+              <a:ext uri="{FF2B5EF4-FFF2-40B4-BE49-F238E27FC236}">
+                <a16:creationId xmlns:a16="http://schemas.microsoft.com/office/drawing/2014/main" id="{76D7CAB5-A4EF-7B43-BD1B-F0A73C0FAF29}"/>
+              </a:ext>
+            </a:extLst>
+          </p:cNvPr>
+          <p:cNvSpPr>
+            <a:spLocks noGrp="1"/>
+          </p:cNvSpPr>
+          <p:nvPr>
+            <p:ph type="title"/>
+          </p:nvPr>
+        </p:nvSpPr>
+        <p:spPr>
+          <a:xfrm>
+            <a:off x="838200" y="365125"/>
+            <a:ext cx="10515600" cy="266887"/>
+          </a:xfrm>
+        </p:spPr>
+        <p:txBody>
+          <a:bodyPr>
+            <a:normAutofit fontScale="90000"/>
+          </a:bodyPr>
+          <a:lstStyle/>
+          <a:p>
+            <a:pPr algn="ctr"/>
+            <a:r>
+              <a:rPr lang="en-US" sz="2800" b="1" dirty="0"/>
+              <a:t>Function rationale – Page 3 - Transactions</a:t>
+            </a:r>
+          </a:p>
+        </p:txBody>
+      </p:sp>
+      <p:graphicFrame>
+        <p:nvGraphicFramePr>
+          <p:cNvPr id="4" name="Table 3">
+            <a:extLst>
+              <a:ext uri="{FF2B5EF4-FFF2-40B4-BE49-F238E27FC236}">
+                <a16:creationId xmlns:a16="http://schemas.microsoft.com/office/drawing/2014/main" id="{AA02A76F-4B68-E947-809B-4E0F1064ECFE}"/>
+              </a:ext>
+            </a:extLst>
+          </p:cNvPr>
+          <p:cNvGraphicFramePr>
+            <a:graphicFrameLocks noGrp="1"/>
+          </p:cNvGraphicFramePr>
+          <p:nvPr>
+            <p:extLst>
+              <p:ext uri="{D42A27DB-BD31-4B8C-83A1-F6EECF244321}">
+                <p14:modId xmlns:p14="http://schemas.microsoft.com/office/powerpoint/2010/main" val="1162771010"/>
+              </p:ext>
+            </p:extLst>
+          </p:nvPr>
+        </p:nvGraphicFramePr>
+        <p:xfrm>
+          <a:off x="85165" y="765885"/>
+          <a:ext cx="12021670" cy="3037840"/>
+        </p:xfrm>
+        <a:graphic>
+          <a:graphicData uri="http://schemas.openxmlformats.org/drawingml/2006/table">
+            <a:tbl>
+              <a:tblPr firstRow="1" bandRow="1">
+                <a:tableStyleId>{5940675A-B579-460E-94D1-54222C63F5DA}</a:tableStyleId>
+              </a:tblPr>
+              <a:tblGrid>
+                <a:gridCol w="1259541">
+                  <a:extLst>
+                    <a:ext uri="{9D8B030D-6E8A-4147-A177-3AD203B41FA5}">
+                      <a16:colId xmlns:a16="http://schemas.microsoft.com/office/drawing/2014/main" val="3310124708"/>
+                    </a:ext>
+                  </a:extLst>
+                </a:gridCol>
+                <a:gridCol w="1761565">
+                  <a:extLst>
+                    <a:ext uri="{9D8B030D-6E8A-4147-A177-3AD203B41FA5}">
+                      <a16:colId xmlns:a16="http://schemas.microsoft.com/office/drawing/2014/main" val="1695059105"/>
+                    </a:ext>
+                  </a:extLst>
+                </a:gridCol>
+                <a:gridCol w="3482788">
+                  <a:extLst>
+                    <a:ext uri="{9D8B030D-6E8A-4147-A177-3AD203B41FA5}">
+                      <a16:colId xmlns:a16="http://schemas.microsoft.com/office/drawing/2014/main" val="2644020309"/>
+                    </a:ext>
+                  </a:extLst>
+                </a:gridCol>
+                <a:gridCol w="3113442">
+                  <a:extLst>
+                    <a:ext uri="{9D8B030D-6E8A-4147-A177-3AD203B41FA5}">
+                      <a16:colId xmlns:a16="http://schemas.microsoft.com/office/drawing/2014/main" val="3698080099"/>
+                    </a:ext>
+                  </a:extLst>
+                </a:gridCol>
+                <a:gridCol w="2404334">
+                  <a:extLst>
+                    <a:ext uri="{9D8B030D-6E8A-4147-A177-3AD203B41FA5}">
+                      <a16:colId xmlns:a16="http://schemas.microsoft.com/office/drawing/2014/main" val="358479963"/>
+                    </a:ext>
+                  </a:extLst>
+                </a:gridCol>
+              </a:tblGrid>
+              <a:tr h="370840">
+                <a:tc>
+                  <a:txBody>
+                    <a:bodyPr/>
+                    <a:lstStyle/>
+                    <a:p>
+                      <a:pPr algn="ctr"/>
+                      <a:r>
+                        <a:rPr lang="en-US" b="1" dirty="0"/>
+                        <a:t>Class</a:t>
+                      </a:r>
+                    </a:p>
+                  </a:txBody>
+                  <a:tcPr/>
+                </a:tc>
+                <a:tc>
+                  <a:txBody>
+                    <a:bodyPr/>
+                    <a:lstStyle/>
+                    <a:p>
+                      <a:pPr algn="ctr"/>
+                      <a:r>
+                        <a:rPr lang="en-US" b="1" dirty="0"/>
+                        <a:t>Function Name</a:t>
+                      </a:r>
+                    </a:p>
+                  </a:txBody>
+                  <a:tcPr/>
+                </a:tc>
+                <a:tc>
+                  <a:txBody>
+                    <a:bodyPr/>
+                    <a:lstStyle/>
+                    <a:p>
+                      <a:pPr algn="ctr"/>
+                      <a:r>
+                        <a:rPr lang="en-US" b="1" dirty="0"/>
+                        <a:t>Why?</a:t>
+                      </a:r>
+                    </a:p>
+                  </a:txBody>
+                  <a:tcPr/>
+                </a:tc>
+                <a:tc>
+                  <a:txBody>
+                    <a:bodyPr/>
+                    <a:lstStyle/>
+                    <a:p>
+                      <a:pPr algn="ctr"/>
+                      <a:r>
+                        <a:rPr lang="en-US" b="1" dirty="0"/>
+                        <a:t>How?</a:t>
+                      </a:r>
+                    </a:p>
+                  </a:txBody>
+                  <a:tcPr/>
+                </a:tc>
+                <a:tc>
+                  <a:txBody>
+                    <a:bodyPr/>
+                    <a:lstStyle/>
+                    <a:p>
+                      <a:pPr algn="ctr"/>
+                      <a:r>
+                        <a:rPr lang="en-US" b="1" dirty="0"/>
+                        <a:t>Returning</a:t>
+                      </a:r>
+                    </a:p>
+                  </a:txBody>
+                  <a:tcPr/>
+                </a:tc>
+                <a:extLst>
+                  <a:ext uri="{0D108BD9-81ED-4DB2-BD59-A6C34878D82A}">
+                    <a16:rowId xmlns:a16="http://schemas.microsoft.com/office/drawing/2014/main" val="4165366467"/>
+                  </a:ext>
+                </a:extLst>
+              </a:tr>
+              <a:tr h="370840">
+                <a:tc>
+                  <a:txBody>
+                    <a:bodyPr/>
+                    <a:lstStyle/>
+                    <a:p>
+                      <a:r>
+                        <a:rPr lang="en-US" dirty="0"/>
+                        <a:t>Transaction</a:t>
+                      </a:r>
+                    </a:p>
+                  </a:txBody>
+                  <a:tcPr anchor="ctr"/>
+                </a:tc>
+                <a:tc>
+                  <a:txBody>
+                    <a:bodyPr/>
+                    <a:lstStyle/>
+                    <a:p>
+                      <a:r>
+                        <a:rPr lang="en-US" dirty="0"/>
+                        <a:t>.save </a:t>
+                      </a:r>
+                      <a:r>
+                        <a:rPr lang="en-US" b="1" dirty="0"/>
+                        <a:t>C</a:t>
+                      </a:r>
+                      <a:endParaRPr lang="en-US" dirty="0"/>
+                    </a:p>
+                  </a:txBody>
+                  <a:tcPr anchor="ctr"/>
+                </a:tc>
+                <a:tc>
+                  <a:txBody>
+                    <a:bodyPr/>
+                    <a:lstStyle/>
+                    <a:p>
+                      <a:r>
+                        <a:rPr lang="en-US" dirty="0"/>
+                        <a:t>New transactions need to be saved to the database</a:t>
+                      </a:r>
+                    </a:p>
+                  </a:txBody>
+                  <a:tcPr anchor="ctr"/>
+                </a:tc>
+                <a:tc>
+                  <a:txBody>
+                    <a:bodyPr/>
+                    <a:lstStyle/>
+                    <a:p>
+                      <a:r>
+                        <a:rPr lang="en-US" dirty="0"/>
+                        <a:t>New transaction is inserted into the Transactions table</a:t>
+                      </a:r>
+                    </a:p>
+                  </a:txBody>
+                  <a:tcPr anchor="ctr"/>
+                </a:tc>
+                <a:tc>
+                  <a:txBody>
+                    <a:bodyPr/>
+                    <a:lstStyle/>
+                    <a:p>
+                      <a:r>
+                        <a:rPr lang="en-US" dirty="0"/>
+                        <a:t>id</a:t>
+                      </a:r>
+                    </a:p>
+                  </a:txBody>
+                  <a:tcPr anchor="ctr"/>
+                </a:tc>
+                <a:extLst>
+                  <a:ext uri="{0D108BD9-81ED-4DB2-BD59-A6C34878D82A}">
+                    <a16:rowId xmlns:a16="http://schemas.microsoft.com/office/drawing/2014/main" val="1323884526"/>
+                  </a:ext>
+                </a:extLst>
+              </a:tr>
+              <a:tr h="370840">
+                <a:tc>
+                  <a:txBody>
+                    <a:bodyPr/>
+                    <a:lstStyle/>
+                    <a:p>
+                      <a:pPr marL="0" marR="0" lvl="0" indent="0" algn="l" defTabSz="914400" rtl="0" eaLnBrk="1" fontAlgn="auto" latinLnBrk="0" hangingPunct="1">
+                        <a:lnSpc>
+                          <a:spcPct val="100000"/>
+                        </a:lnSpc>
+                        <a:spcBef>
+                          <a:spcPts val="0"/>
+                        </a:spcBef>
+                        <a:spcAft>
+                          <a:spcPts val="0"/>
+                        </a:spcAft>
+                        <a:buClrTx/>
+                        <a:buSzTx/>
+                        <a:buFontTx/>
+                        <a:buNone/>
+                        <a:tabLst/>
+                        <a:defRPr/>
+                      </a:pPr>
+                      <a:r>
+                        <a:rPr kumimoji="0" lang="en-US" sz="1800" b="0" i="0" u="none" strike="noStrike" kern="1200" cap="none" spc="0" normalizeH="0" baseline="0" noProof="0">
+                          <a:ln>
+                            <a:noFill/>
+                          </a:ln>
+                          <a:solidFill>
+                            <a:prstClr val="black"/>
+                          </a:solidFill>
+                          <a:effectLst/>
+                          <a:uLnTx/>
+                          <a:uFillTx/>
+                          <a:latin typeface="Calibri" panose="020F0502020204030204"/>
+                          <a:ea typeface="+mn-ea"/>
+                          <a:cs typeface="+mn-cs"/>
+                        </a:rPr>
+                        <a:t>Transaction</a:t>
+                      </a:r>
+                      <a:endParaRPr kumimoji="0" lang="en-US" sz="1800" b="0" i="0" u="none" strike="noStrike" kern="1200" cap="none" spc="0" normalizeH="0" baseline="0" noProof="0" dirty="0">
+                        <a:ln>
+                          <a:noFill/>
+                        </a:ln>
+                        <a:solidFill>
+                          <a:prstClr val="black"/>
+                        </a:solidFill>
+                        <a:effectLst/>
+                        <a:uLnTx/>
+                        <a:uFillTx/>
+                        <a:latin typeface="Calibri" panose="020F0502020204030204"/>
+                        <a:ea typeface="+mn-ea"/>
+                        <a:cs typeface="+mn-cs"/>
+                      </a:endParaRPr>
+                    </a:p>
+                  </a:txBody>
+                  <a:tcPr anchor="ctr"/>
+                </a:tc>
+                <a:tc>
+                  <a:txBody>
+                    <a:bodyPr/>
+                    <a:lstStyle/>
+                    <a:p>
+                      <a:r>
+                        <a:rPr lang="en-US" dirty="0" err="1"/>
+                        <a:t>Self.find</a:t>
+                      </a:r>
+                      <a:r>
+                        <a:rPr lang="en-US" dirty="0"/>
+                        <a:t> </a:t>
+                      </a:r>
+                      <a:r>
+                        <a:rPr lang="en-US" b="1" dirty="0"/>
+                        <a:t>R</a:t>
+                      </a:r>
+                      <a:endParaRPr lang="en-US" dirty="0"/>
+                    </a:p>
+                  </a:txBody>
+                  <a:tcPr anchor="ctr"/>
+                </a:tc>
+                <a:tc>
+                  <a:txBody>
+                    <a:bodyPr/>
+                    <a:lstStyle/>
+                    <a:p>
+                      <a:r>
+                        <a:rPr lang="en-US" dirty="0"/>
+                        <a:t>Transactions will need to be identified to allow them to be added to budgets</a:t>
+                      </a:r>
+                    </a:p>
+                  </a:txBody>
+                  <a:tcPr anchor="ctr"/>
+                </a:tc>
+                <a:tc>
+                  <a:txBody>
+                    <a:bodyPr/>
+                    <a:lstStyle/>
+                    <a:p>
+                      <a:r>
+                        <a:rPr lang="en-US" dirty="0"/>
+                        <a:t>All transactions matching a certain id can be selected</a:t>
+                      </a:r>
+                    </a:p>
+                  </a:txBody>
+                  <a:tcPr anchor="ctr"/>
+                </a:tc>
+                <a:tc>
+                  <a:txBody>
+                    <a:bodyPr/>
+                    <a:lstStyle/>
+                    <a:p>
+                      <a:r>
+                        <a:rPr lang="en-US" dirty="0"/>
+                        <a:t>The transaction searched for</a:t>
+                      </a:r>
+                    </a:p>
+                  </a:txBody>
+                  <a:tcPr anchor="ctr"/>
+                </a:tc>
+                <a:extLst>
+                  <a:ext uri="{0D108BD9-81ED-4DB2-BD59-A6C34878D82A}">
+                    <a16:rowId xmlns:a16="http://schemas.microsoft.com/office/drawing/2014/main" val="2731388846"/>
+                  </a:ext>
+                </a:extLst>
+              </a:tr>
+              <a:tr h="370840">
+                <a:tc>
+                  <a:txBody>
+                    <a:bodyPr/>
+                    <a:lstStyle/>
+                    <a:p>
+                      <a:pPr marL="0" marR="0" lvl="0" indent="0" algn="l" defTabSz="914400" rtl="0" eaLnBrk="1" fontAlgn="auto" latinLnBrk="0" hangingPunct="1">
+                        <a:lnSpc>
+                          <a:spcPct val="100000"/>
+                        </a:lnSpc>
+                        <a:spcBef>
+                          <a:spcPts val="0"/>
+                        </a:spcBef>
+                        <a:spcAft>
+                          <a:spcPts val="0"/>
+                        </a:spcAft>
+                        <a:buClrTx/>
+                        <a:buSzTx/>
+                        <a:buFontTx/>
+                        <a:buNone/>
+                        <a:tabLst/>
+                        <a:defRPr/>
+                      </a:pPr>
+                      <a:r>
+                        <a:rPr kumimoji="0" lang="en-US" sz="1800" b="0" i="0" u="none" strike="noStrike" kern="1200" cap="none" spc="0" normalizeH="0" baseline="0" noProof="0">
+                          <a:ln>
+                            <a:noFill/>
+                          </a:ln>
+                          <a:solidFill>
+                            <a:prstClr val="black"/>
+                          </a:solidFill>
+                          <a:effectLst/>
+                          <a:uLnTx/>
+                          <a:uFillTx/>
+                          <a:latin typeface="Calibri" panose="020F0502020204030204"/>
+                          <a:ea typeface="+mn-ea"/>
+                          <a:cs typeface="+mn-cs"/>
+                        </a:rPr>
+                        <a:t>Transaction</a:t>
+                      </a:r>
+                      <a:endParaRPr kumimoji="0" lang="en-US" sz="1800" b="0" i="0" u="none" strike="noStrike" kern="1200" cap="none" spc="0" normalizeH="0" baseline="0" noProof="0" dirty="0">
+                        <a:ln>
+                          <a:noFill/>
+                        </a:ln>
+                        <a:solidFill>
+                          <a:prstClr val="black"/>
+                        </a:solidFill>
+                        <a:effectLst/>
+                        <a:uLnTx/>
+                        <a:uFillTx/>
+                        <a:latin typeface="Calibri" panose="020F0502020204030204"/>
+                        <a:ea typeface="+mn-ea"/>
+                        <a:cs typeface="+mn-cs"/>
+                      </a:endParaRPr>
+                    </a:p>
+                  </a:txBody>
+                  <a:tcPr/>
+                </a:tc>
+                <a:tc>
+                  <a:txBody>
+                    <a:bodyPr/>
+                    <a:lstStyle/>
+                    <a:p>
+                      <a:r>
+                        <a:rPr lang="en-US" dirty="0" err="1"/>
+                        <a:t>Self.all</a:t>
+                      </a:r>
+                      <a:r>
+                        <a:rPr lang="en-US" dirty="0"/>
+                        <a:t> </a:t>
+                      </a:r>
+                      <a:r>
+                        <a:rPr lang="en-US" b="1" dirty="0"/>
+                        <a:t>R</a:t>
+                      </a:r>
+                      <a:endParaRPr lang="en-US" dirty="0"/>
+                    </a:p>
+                  </a:txBody>
+                  <a:tcPr/>
+                </a:tc>
+                <a:tc>
+                  <a:txBody>
+                    <a:bodyPr/>
+                    <a:lstStyle/>
+                    <a:p>
+                      <a:endParaRPr lang="en-US" dirty="0"/>
+                    </a:p>
+                  </a:txBody>
+                  <a:tcPr/>
+                </a:tc>
+                <a:tc>
+                  <a:txBody>
+                    <a:bodyPr/>
+                    <a:lstStyle/>
+                    <a:p>
+                      <a:endParaRPr lang="en-US" dirty="0"/>
+                    </a:p>
+                  </a:txBody>
+                  <a:tcPr/>
+                </a:tc>
+                <a:tc>
+                  <a:txBody>
+                    <a:bodyPr/>
+                    <a:lstStyle/>
+                    <a:p>
+                      <a:endParaRPr lang="en-US" dirty="0"/>
+                    </a:p>
+                  </a:txBody>
+                  <a:tcPr/>
+                </a:tc>
+                <a:extLst>
+                  <a:ext uri="{0D108BD9-81ED-4DB2-BD59-A6C34878D82A}">
+                    <a16:rowId xmlns:a16="http://schemas.microsoft.com/office/drawing/2014/main" val="3831984839"/>
+                  </a:ext>
+                </a:extLst>
+              </a:tr>
+              <a:tr h="370840">
+                <a:tc>
+                  <a:txBody>
+                    <a:bodyPr/>
+                    <a:lstStyle/>
+                    <a:p>
+                      <a:pPr marL="0" marR="0" lvl="0" indent="0" algn="l" defTabSz="914400" rtl="0" eaLnBrk="1" fontAlgn="auto" latinLnBrk="0" hangingPunct="1">
+                        <a:lnSpc>
+                          <a:spcPct val="100000"/>
+                        </a:lnSpc>
+                        <a:spcBef>
+                          <a:spcPts val="0"/>
+                        </a:spcBef>
+                        <a:spcAft>
+                          <a:spcPts val="0"/>
+                        </a:spcAft>
+                        <a:buClrTx/>
+                        <a:buSzTx/>
+                        <a:buFontTx/>
+                        <a:buNone/>
+                        <a:tabLst/>
+                        <a:defRPr/>
+                      </a:pPr>
+                      <a:r>
+                        <a:rPr kumimoji="0" lang="en-US" sz="1800" b="0" i="0" u="none" strike="noStrike" kern="1200" cap="none" spc="0" normalizeH="0" baseline="0" noProof="0">
+                          <a:ln>
+                            <a:noFill/>
+                          </a:ln>
+                          <a:solidFill>
+                            <a:prstClr val="black"/>
+                          </a:solidFill>
+                          <a:effectLst/>
+                          <a:uLnTx/>
+                          <a:uFillTx/>
+                          <a:latin typeface="Calibri" panose="020F0502020204030204"/>
+                          <a:ea typeface="+mn-ea"/>
+                          <a:cs typeface="+mn-cs"/>
+                        </a:rPr>
+                        <a:t>Transaction</a:t>
+                      </a:r>
+                      <a:endParaRPr kumimoji="0" lang="en-US" sz="1800" b="0" i="0" u="none" strike="noStrike" kern="1200" cap="none" spc="0" normalizeH="0" baseline="0" noProof="0" dirty="0">
+                        <a:ln>
+                          <a:noFill/>
+                        </a:ln>
+                        <a:solidFill>
+                          <a:prstClr val="black"/>
+                        </a:solidFill>
+                        <a:effectLst/>
+                        <a:uLnTx/>
+                        <a:uFillTx/>
+                        <a:latin typeface="Calibri" panose="020F0502020204030204"/>
+                        <a:ea typeface="+mn-ea"/>
+                        <a:cs typeface="+mn-cs"/>
+                      </a:endParaRPr>
+                    </a:p>
+                  </a:txBody>
+                  <a:tcPr/>
+                </a:tc>
+                <a:tc>
+                  <a:txBody>
+                    <a:bodyPr/>
+                    <a:lstStyle/>
+                    <a:p>
+                      <a:r>
+                        <a:rPr lang="en-US" dirty="0" err="1"/>
+                        <a:t>Self.map_items</a:t>
+                      </a:r>
+                      <a:endParaRPr lang="en-US" dirty="0"/>
+                    </a:p>
+                  </a:txBody>
+                  <a:tcPr/>
+                </a:tc>
+                <a:tc>
+                  <a:txBody>
+                    <a:bodyPr/>
+                    <a:lstStyle/>
+                    <a:p>
+                      <a:endParaRPr lang="en-US" dirty="0"/>
+                    </a:p>
+                  </a:txBody>
+                  <a:tcPr/>
+                </a:tc>
+                <a:tc>
+                  <a:txBody>
+                    <a:bodyPr/>
+                    <a:lstStyle/>
+                    <a:p>
+                      <a:endParaRPr lang="en-US" dirty="0"/>
+                    </a:p>
+                  </a:txBody>
+                  <a:tcPr/>
+                </a:tc>
+                <a:tc>
+                  <a:txBody>
+                    <a:bodyPr/>
+                    <a:lstStyle/>
+                    <a:p>
+                      <a:endParaRPr lang="en-US" dirty="0"/>
+                    </a:p>
+                  </a:txBody>
+                  <a:tcPr/>
+                </a:tc>
+                <a:extLst>
+                  <a:ext uri="{0D108BD9-81ED-4DB2-BD59-A6C34878D82A}">
+                    <a16:rowId xmlns:a16="http://schemas.microsoft.com/office/drawing/2014/main" val="1081334054"/>
+                  </a:ext>
+                </a:extLst>
+              </a:tr>
+              <a:tr h="370840">
+                <a:tc>
+                  <a:txBody>
+                    <a:bodyPr/>
+                    <a:lstStyle/>
+                    <a:p>
+                      <a:pPr marL="0" marR="0" lvl="0" indent="0" algn="l" defTabSz="914400" rtl="0" eaLnBrk="1" fontAlgn="auto" latinLnBrk="0" hangingPunct="1">
+                        <a:lnSpc>
+                          <a:spcPct val="100000"/>
+                        </a:lnSpc>
+                        <a:spcBef>
+                          <a:spcPts val="0"/>
+                        </a:spcBef>
+                        <a:spcAft>
+                          <a:spcPts val="0"/>
+                        </a:spcAft>
+                        <a:buClrTx/>
+                        <a:buSzTx/>
+                        <a:buFontTx/>
+                        <a:buNone/>
+                        <a:tabLst/>
+                        <a:defRPr/>
+                      </a:pPr>
+                      <a:r>
+                        <a:rPr kumimoji="0" lang="en-US" sz="1800" b="0" i="0" u="none" strike="noStrike" kern="1200" cap="none" spc="0" normalizeH="0" baseline="0" noProof="0" dirty="0">
+                          <a:ln>
+                            <a:noFill/>
+                          </a:ln>
+                          <a:solidFill>
+                            <a:prstClr val="black"/>
+                          </a:solidFill>
+                          <a:effectLst/>
+                          <a:uLnTx/>
+                          <a:uFillTx/>
+                          <a:latin typeface="Calibri" panose="020F0502020204030204"/>
+                          <a:ea typeface="+mn-ea"/>
+                          <a:cs typeface="+mn-cs"/>
+                        </a:rPr>
+                        <a:t>Transaction</a:t>
+                      </a:r>
+                    </a:p>
+                  </a:txBody>
+                  <a:tcPr/>
+                </a:tc>
+                <a:tc>
+                  <a:txBody>
+                    <a:bodyPr/>
+                    <a:lstStyle/>
+                    <a:p>
+                      <a:r>
+                        <a:rPr lang="en-US" dirty="0"/>
+                        <a:t>.update </a:t>
+                      </a:r>
+                      <a:r>
+                        <a:rPr lang="en-US" b="1" dirty="0"/>
+                        <a:t>U</a:t>
+                      </a:r>
+                      <a:endParaRPr lang="en-US" dirty="0"/>
+                    </a:p>
+                  </a:txBody>
+                  <a:tcPr/>
+                </a:tc>
+                <a:tc>
+                  <a:txBody>
+                    <a:bodyPr/>
+                    <a:lstStyle/>
+                    <a:p>
+                      <a:endParaRPr lang="en-US" dirty="0"/>
+                    </a:p>
+                  </a:txBody>
+                  <a:tcPr/>
+                </a:tc>
+                <a:tc>
+                  <a:txBody>
+                    <a:bodyPr/>
+                    <a:lstStyle/>
+                    <a:p>
+                      <a:endParaRPr lang="en-US" dirty="0"/>
+                    </a:p>
+                  </a:txBody>
+                  <a:tcPr/>
+                </a:tc>
+                <a:tc>
+                  <a:txBody>
+                    <a:bodyPr/>
+                    <a:lstStyle/>
+                    <a:p>
+                      <a:endParaRPr lang="en-US" dirty="0"/>
+                    </a:p>
+                  </a:txBody>
+                  <a:tcPr/>
+                </a:tc>
+                <a:extLst>
+                  <a:ext uri="{0D108BD9-81ED-4DB2-BD59-A6C34878D82A}">
+                    <a16:rowId xmlns:a16="http://schemas.microsoft.com/office/drawing/2014/main" val="2432464653"/>
+                  </a:ext>
+                </a:extLst>
+              </a:tr>
+            </a:tbl>
+          </a:graphicData>
+        </a:graphic>
+      </p:graphicFrame>
+    </p:spTree>
+    <p:extLst>
+      <p:ext uri="{BB962C8B-B14F-4D97-AF65-F5344CB8AC3E}">
+        <p14:creationId xmlns:p14="http://schemas.microsoft.com/office/powerpoint/2010/main" val="3784308486"/>
+      </p:ext>
+    </p:extLst>
+  </p:cSld>
+  <p:clrMapOvr>
+    <a:masterClrMapping/>
+  </p:clrMapOvr>
+</p:sld>
+</file>
+
+<file path=ppt/slides/slide16.xml><?xml version="1.0" encoding="utf-8"?>
+<p:sld xmlns:a="http://schemas.openxmlformats.org/drawingml/2006/main" xmlns:r="http://schemas.openxmlformats.org/officeDocument/2006/relationships" xmlns:p="http://schemas.openxmlformats.org/presentationml/2006/main">
+  <p:cSld>
+    <p:spTree>
+      <p:nvGrpSpPr>
+        <p:cNvPr id="1" name=""/>
+        <p:cNvGrpSpPr/>
+        <p:nvPr/>
+      </p:nvGrpSpPr>
+      <p:grpSpPr>
+        <a:xfrm>
+          <a:off x="0" y="0"/>
+          <a:ext cx="0" cy="0"/>
+          <a:chOff x="0" y="0"/>
+          <a:chExt cx="0" cy="0"/>
+        </a:xfrm>
+      </p:grpSpPr>
+      <p:sp>
+        <p:nvSpPr>
+          <p:cNvPr id="2" name="Title 1">
+            <a:extLst>
+              <a:ext uri="{FF2B5EF4-FFF2-40B4-BE49-F238E27FC236}">
+                <a16:creationId xmlns:a16="http://schemas.microsoft.com/office/drawing/2014/main" id="{76D7CAB5-A4EF-7B43-BD1B-F0A73C0FAF29}"/>
+              </a:ext>
+            </a:extLst>
+          </p:cNvPr>
+          <p:cNvSpPr>
+            <a:spLocks noGrp="1"/>
+          </p:cNvSpPr>
+          <p:nvPr>
+            <p:ph type="title"/>
+          </p:nvPr>
+        </p:nvSpPr>
+        <p:spPr>
+          <a:xfrm>
+            <a:off x="838200" y="365125"/>
+            <a:ext cx="10515600" cy="266887"/>
+          </a:xfrm>
+        </p:spPr>
+        <p:txBody>
+          <a:bodyPr>
+            <a:normAutofit fontScale="90000"/>
+          </a:bodyPr>
+          <a:lstStyle/>
+          <a:p>
+            <a:pPr algn="ctr"/>
+            <a:r>
+              <a:rPr lang="en-US" sz="2800" b="1" dirty="0"/>
+              <a:t>Function rationale – Page 4 Transactions</a:t>
+            </a:r>
+          </a:p>
+        </p:txBody>
+      </p:sp>
+      <p:graphicFrame>
+        <p:nvGraphicFramePr>
+          <p:cNvPr id="4" name="Table 3">
+            <a:extLst>
+              <a:ext uri="{FF2B5EF4-FFF2-40B4-BE49-F238E27FC236}">
+                <a16:creationId xmlns:a16="http://schemas.microsoft.com/office/drawing/2014/main" id="{AA02A76F-4B68-E947-809B-4E0F1064ECFE}"/>
+              </a:ext>
+            </a:extLst>
+          </p:cNvPr>
+          <p:cNvGraphicFramePr>
+            <a:graphicFrameLocks noGrp="1"/>
+          </p:cNvGraphicFramePr>
+          <p:nvPr>
+            <p:extLst>
+              <p:ext uri="{D42A27DB-BD31-4B8C-83A1-F6EECF244321}">
+                <p14:modId xmlns:p14="http://schemas.microsoft.com/office/powerpoint/2010/main" val="175121615"/>
+              </p:ext>
+            </p:extLst>
+          </p:nvPr>
+        </p:nvGraphicFramePr>
+        <p:xfrm>
+          <a:off x="85165" y="765885"/>
+          <a:ext cx="12021670" cy="3129280"/>
+        </p:xfrm>
+        <a:graphic>
+          <a:graphicData uri="http://schemas.openxmlformats.org/drawingml/2006/table">
+            <a:tbl>
+              <a:tblPr firstRow="1" bandRow="1">
+                <a:tableStyleId>{5940675A-B579-460E-94D1-54222C63F5DA}</a:tableStyleId>
+              </a:tblPr>
+              <a:tblGrid>
+                <a:gridCol w="1259541">
+                  <a:extLst>
+                    <a:ext uri="{9D8B030D-6E8A-4147-A177-3AD203B41FA5}">
+                      <a16:colId xmlns:a16="http://schemas.microsoft.com/office/drawing/2014/main" val="3310124708"/>
+                    </a:ext>
+                  </a:extLst>
+                </a:gridCol>
+                <a:gridCol w="1761565">
+                  <a:extLst>
+                    <a:ext uri="{9D8B030D-6E8A-4147-A177-3AD203B41FA5}">
+                      <a16:colId xmlns:a16="http://schemas.microsoft.com/office/drawing/2014/main" val="1695059105"/>
+                    </a:ext>
+                  </a:extLst>
+                </a:gridCol>
+                <a:gridCol w="3482788">
+                  <a:extLst>
+                    <a:ext uri="{9D8B030D-6E8A-4147-A177-3AD203B41FA5}">
+                      <a16:colId xmlns:a16="http://schemas.microsoft.com/office/drawing/2014/main" val="2644020309"/>
+                    </a:ext>
+                  </a:extLst>
+                </a:gridCol>
+                <a:gridCol w="3113442">
+                  <a:extLst>
+                    <a:ext uri="{9D8B030D-6E8A-4147-A177-3AD203B41FA5}">
+                      <a16:colId xmlns:a16="http://schemas.microsoft.com/office/drawing/2014/main" val="3698080099"/>
+                    </a:ext>
+                  </a:extLst>
+                </a:gridCol>
+                <a:gridCol w="2404334">
+                  <a:extLst>
+                    <a:ext uri="{9D8B030D-6E8A-4147-A177-3AD203B41FA5}">
+                      <a16:colId xmlns:a16="http://schemas.microsoft.com/office/drawing/2014/main" val="358479963"/>
+                    </a:ext>
+                  </a:extLst>
+                </a:gridCol>
+              </a:tblGrid>
+              <a:tr h="370840">
+                <a:tc>
+                  <a:txBody>
+                    <a:bodyPr/>
+                    <a:lstStyle/>
+                    <a:p>
+                      <a:pPr algn="ctr"/>
+                      <a:r>
+                        <a:rPr lang="en-US" b="1" dirty="0"/>
+                        <a:t>Class</a:t>
+                      </a:r>
+                    </a:p>
+                  </a:txBody>
+                  <a:tcPr/>
+                </a:tc>
+                <a:tc>
+                  <a:txBody>
+                    <a:bodyPr/>
+                    <a:lstStyle/>
+                    <a:p>
+                      <a:pPr algn="ctr"/>
+                      <a:r>
+                        <a:rPr lang="en-US" b="1" dirty="0"/>
+                        <a:t>Function Name</a:t>
+                      </a:r>
+                    </a:p>
+                  </a:txBody>
+                  <a:tcPr/>
+                </a:tc>
+                <a:tc>
+                  <a:txBody>
+                    <a:bodyPr/>
+                    <a:lstStyle/>
+                    <a:p>
+                      <a:pPr algn="ctr"/>
+                      <a:r>
+                        <a:rPr lang="en-US" b="1" dirty="0"/>
+                        <a:t>Why?</a:t>
+                      </a:r>
+                    </a:p>
+                  </a:txBody>
+                  <a:tcPr/>
+                </a:tc>
+                <a:tc>
+                  <a:txBody>
+                    <a:bodyPr/>
+                    <a:lstStyle/>
+                    <a:p>
+                      <a:pPr algn="ctr"/>
+                      <a:r>
+                        <a:rPr lang="en-US" b="1" dirty="0"/>
+                        <a:t>How?</a:t>
+                      </a:r>
+                    </a:p>
+                  </a:txBody>
+                  <a:tcPr/>
+                </a:tc>
+                <a:tc>
+                  <a:txBody>
+                    <a:bodyPr/>
+                    <a:lstStyle/>
+                    <a:p>
+                      <a:pPr algn="ctr"/>
+                      <a:r>
+                        <a:rPr lang="en-US" b="1" dirty="0"/>
+                        <a:t>Returning</a:t>
+                      </a:r>
+                    </a:p>
+                  </a:txBody>
+                  <a:tcPr/>
+                </a:tc>
+                <a:extLst>
+                  <a:ext uri="{0D108BD9-81ED-4DB2-BD59-A6C34878D82A}">
+                    <a16:rowId xmlns:a16="http://schemas.microsoft.com/office/drawing/2014/main" val="4165366467"/>
+                  </a:ext>
+                </a:extLst>
+              </a:tr>
+              <a:tr h="370840">
+                <a:tc>
+                  <a:txBody>
+                    <a:bodyPr/>
+                    <a:lstStyle/>
+                    <a:p>
+                      <a:pPr marL="0" marR="0" lvl="0" indent="0" algn="l" defTabSz="914400" rtl="0" eaLnBrk="1" fontAlgn="auto" latinLnBrk="0" hangingPunct="1">
+                        <a:lnSpc>
+                          <a:spcPct val="100000"/>
+                        </a:lnSpc>
+                        <a:spcBef>
+                          <a:spcPts val="0"/>
+                        </a:spcBef>
+                        <a:spcAft>
+                          <a:spcPts val="0"/>
+                        </a:spcAft>
+                        <a:buClrTx/>
+                        <a:buSzTx/>
+                        <a:buFontTx/>
+                        <a:buNone/>
+                        <a:tabLst/>
+                        <a:defRPr/>
+                      </a:pPr>
+                      <a:r>
+                        <a:rPr kumimoji="0" lang="en-US" sz="1800" b="0" i="0" u="none" strike="noStrike" kern="1200" cap="none" spc="0" normalizeH="0" baseline="0" noProof="0">
+                          <a:ln>
+                            <a:noFill/>
+                          </a:ln>
+                          <a:solidFill>
+                            <a:prstClr val="black"/>
+                          </a:solidFill>
+                          <a:effectLst/>
+                          <a:uLnTx/>
+                          <a:uFillTx/>
+                          <a:latin typeface="Calibri" panose="020F0502020204030204"/>
+                          <a:ea typeface="+mn-ea"/>
+                          <a:cs typeface="+mn-cs"/>
+                        </a:rPr>
+                        <a:t>Transaction</a:t>
+                      </a:r>
+                      <a:endParaRPr kumimoji="0" lang="en-US" sz="1800" b="0" i="0" u="none" strike="noStrike" kern="1200" cap="none" spc="0" normalizeH="0" baseline="0" noProof="0" dirty="0">
+                        <a:ln>
+                          <a:noFill/>
+                        </a:ln>
+                        <a:solidFill>
+                          <a:prstClr val="black"/>
+                        </a:solidFill>
+                        <a:effectLst/>
+                        <a:uLnTx/>
+                        <a:uFillTx/>
+                        <a:latin typeface="Calibri" panose="020F0502020204030204"/>
+                        <a:ea typeface="+mn-ea"/>
+                        <a:cs typeface="+mn-cs"/>
+                      </a:endParaRPr>
+                    </a:p>
+                  </a:txBody>
+                  <a:tcPr anchor="ctr"/>
+                </a:tc>
+                <a:tc>
+                  <a:txBody>
+                    <a:bodyPr/>
+                    <a:lstStyle/>
+                    <a:p>
+                      <a:r>
+                        <a:rPr lang="en-US" dirty="0"/>
+                        <a:t>Delete by id </a:t>
+                      </a:r>
+                      <a:r>
+                        <a:rPr lang="en-US" b="1" dirty="0"/>
+                        <a:t>D</a:t>
+                      </a:r>
+                      <a:endParaRPr lang="en-US" dirty="0"/>
+                    </a:p>
+                  </a:txBody>
+                  <a:tcPr anchor="ctr"/>
+                </a:tc>
+                <a:tc>
+                  <a:txBody>
+                    <a:bodyPr/>
+                    <a:lstStyle/>
+                    <a:p>
+                      <a:endParaRPr lang="en-US" dirty="0"/>
+                    </a:p>
+                  </a:txBody>
+                  <a:tcPr anchor="ctr"/>
+                </a:tc>
+                <a:tc>
+                  <a:txBody>
+                    <a:bodyPr/>
+                    <a:lstStyle/>
+                    <a:p>
+                      <a:endParaRPr lang="en-US" dirty="0"/>
+                    </a:p>
+                  </a:txBody>
+                  <a:tcPr anchor="ctr"/>
+                </a:tc>
+                <a:tc>
+                  <a:txBody>
+                    <a:bodyPr/>
+                    <a:lstStyle/>
+                    <a:p>
+                      <a:endParaRPr lang="en-US" dirty="0"/>
+                    </a:p>
+                  </a:txBody>
+                  <a:tcPr anchor="ctr"/>
+                </a:tc>
+                <a:extLst>
+                  <a:ext uri="{0D108BD9-81ED-4DB2-BD59-A6C34878D82A}">
+                    <a16:rowId xmlns:a16="http://schemas.microsoft.com/office/drawing/2014/main" val="1323884526"/>
+                  </a:ext>
+                </a:extLst>
+              </a:tr>
+              <a:tr h="282986">
+                <a:tc>
+                  <a:txBody>
+                    <a:bodyPr/>
+                    <a:lstStyle/>
+                    <a:p>
+                      <a:pPr marL="0" marR="0" lvl="0" indent="0" algn="l" defTabSz="914400" rtl="0" eaLnBrk="1" fontAlgn="auto" latinLnBrk="0" hangingPunct="1">
+                        <a:lnSpc>
+                          <a:spcPct val="100000"/>
+                        </a:lnSpc>
+                        <a:spcBef>
+                          <a:spcPts val="0"/>
+                        </a:spcBef>
+                        <a:spcAft>
+                          <a:spcPts val="0"/>
+                        </a:spcAft>
+                        <a:buClrTx/>
+                        <a:buSzTx/>
+                        <a:buFontTx/>
+                        <a:buNone/>
+                        <a:tabLst/>
+                        <a:defRPr/>
+                      </a:pPr>
+                      <a:r>
+                        <a:rPr kumimoji="0" lang="en-US" sz="1800" b="0" i="0" u="none" strike="noStrike" kern="1200" cap="none" spc="0" normalizeH="0" baseline="0" noProof="0" dirty="0">
+                          <a:ln>
+                            <a:noFill/>
+                          </a:ln>
+                          <a:solidFill>
+                            <a:prstClr val="black"/>
+                          </a:solidFill>
+                          <a:effectLst/>
+                          <a:uLnTx/>
+                          <a:uFillTx/>
+                          <a:latin typeface="Calibri" panose="020F0502020204030204"/>
+                          <a:ea typeface="+mn-ea"/>
+                          <a:cs typeface="+mn-cs"/>
+                        </a:rPr>
+                        <a:t>Transaction</a:t>
+                      </a:r>
+                    </a:p>
+                  </a:txBody>
+                  <a:tcPr anchor="ctr"/>
+                </a:tc>
+                <a:tc>
+                  <a:txBody>
+                    <a:bodyPr/>
+                    <a:lstStyle/>
+                    <a:p>
+                      <a:r>
+                        <a:rPr lang="en-US" dirty="0"/>
+                        <a:t>Delete all </a:t>
+                      </a:r>
+                      <a:r>
+                        <a:rPr lang="en-US" b="1" dirty="0"/>
+                        <a:t>D</a:t>
+                      </a:r>
+                      <a:endParaRPr lang="en-US" dirty="0"/>
+                    </a:p>
+                  </a:txBody>
+                  <a:tcPr anchor="ctr"/>
+                </a:tc>
+                <a:tc>
+                  <a:txBody>
+                    <a:bodyPr/>
+                    <a:lstStyle/>
+                    <a:p>
+                      <a:endParaRPr lang="en-US" dirty="0"/>
+                    </a:p>
+                  </a:txBody>
+                  <a:tcPr anchor="ctr"/>
+                </a:tc>
+                <a:tc>
+                  <a:txBody>
+                    <a:bodyPr/>
+                    <a:lstStyle/>
+                    <a:p>
+                      <a:endParaRPr lang="en-US" dirty="0"/>
+                    </a:p>
+                  </a:txBody>
+                  <a:tcPr anchor="ctr"/>
+                </a:tc>
+                <a:tc>
+                  <a:txBody>
+                    <a:bodyPr/>
+                    <a:lstStyle/>
+                    <a:p>
+                      <a:endParaRPr lang="en-US" dirty="0"/>
+                    </a:p>
+                  </a:txBody>
+                  <a:tcPr anchor="ctr"/>
+                </a:tc>
+                <a:extLst>
+                  <a:ext uri="{0D108BD9-81ED-4DB2-BD59-A6C34878D82A}">
+                    <a16:rowId xmlns:a16="http://schemas.microsoft.com/office/drawing/2014/main" val="2731388846"/>
+                  </a:ext>
+                </a:extLst>
+              </a:tr>
+              <a:tr h="370840">
+                <a:tc>
+                  <a:txBody>
+                    <a:bodyPr/>
+                    <a:lstStyle/>
+                    <a:p>
+                      <a:r>
+                        <a:rPr lang="en-US" dirty="0"/>
+                        <a:t>Transaction</a:t>
+                      </a:r>
+                    </a:p>
+                  </a:txBody>
+                  <a:tcPr/>
+                </a:tc>
+                <a:tc>
+                  <a:txBody>
+                    <a:bodyPr/>
+                    <a:lstStyle/>
+                    <a:p>
+                      <a:r>
+                        <a:rPr lang="en-US" dirty="0"/>
+                        <a:t>Find by merchant</a:t>
+                      </a:r>
+                    </a:p>
+                  </a:txBody>
+                  <a:tcPr/>
+                </a:tc>
+                <a:tc>
+                  <a:txBody>
+                    <a:bodyPr/>
+                    <a:lstStyle/>
+                    <a:p>
+                      <a:endParaRPr lang="en-US" dirty="0"/>
+                    </a:p>
+                  </a:txBody>
+                  <a:tcPr/>
+                </a:tc>
+                <a:tc>
+                  <a:txBody>
+                    <a:bodyPr/>
+                    <a:lstStyle/>
+                    <a:p>
+                      <a:endParaRPr lang="en-US" dirty="0"/>
+                    </a:p>
+                  </a:txBody>
+                  <a:tcPr/>
+                </a:tc>
+                <a:tc>
+                  <a:txBody>
+                    <a:bodyPr/>
+                    <a:lstStyle/>
+                    <a:p>
+                      <a:endParaRPr lang="en-US" dirty="0"/>
+                    </a:p>
+                  </a:txBody>
+                  <a:tcPr/>
+                </a:tc>
+                <a:extLst>
+                  <a:ext uri="{0D108BD9-81ED-4DB2-BD59-A6C34878D82A}">
+                    <a16:rowId xmlns:a16="http://schemas.microsoft.com/office/drawing/2014/main" val="3831984839"/>
+                  </a:ext>
+                </a:extLst>
+              </a:tr>
+              <a:tr h="370840">
+                <a:tc>
+                  <a:txBody>
+                    <a:bodyPr/>
+                    <a:lstStyle/>
+                    <a:p>
+                      <a:r>
+                        <a:rPr lang="en-US" dirty="0"/>
+                        <a:t>Transaction</a:t>
+                      </a:r>
+                    </a:p>
+                  </a:txBody>
+                  <a:tcPr/>
+                </a:tc>
+                <a:tc>
+                  <a:txBody>
+                    <a:bodyPr/>
+                    <a:lstStyle/>
+                    <a:p>
+                      <a:r>
+                        <a:rPr lang="en-US" dirty="0"/>
+                        <a:t>Find by tag</a:t>
+                      </a:r>
+                    </a:p>
+                  </a:txBody>
+                  <a:tcPr/>
+                </a:tc>
+                <a:tc>
+                  <a:txBody>
+                    <a:bodyPr/>
+                    <a:lstStyle/>
+                    <a:p>
+                      <a:endParaRPr lang="en-US" dirty="0"/>
+                    </a:p>
+                  </a:txBody>
+                  <a:tcPr/>
+                </a:tc>
+                <a:tc>
+                  <a:txBody>
+                    <a:bodyPr/>
+                    <a:lstStyle/>
+                    <a:p>
+                      <a:endParaRPr lang="en-US" dirty="0"/>
+                    </a:p>
+                  </a:txBody>
+                  <a:tcPr/>
+                </a:tc>
+                <a:tc>
+                  <a:txBody>
+                    <a:bodyPr/>
+                    <a:lstStyle/>
+                    <a:p>
+                      <a:endParaRPr lang="en-US" dirty="0"/>
+                    </a:p>
+                  </a:txBody>
+                  <a:tcPr/>
+                </a:tc>
+                <a:extLst>
+                  <a:ext uri="{0D108BD9-81ED-4DB2-BD59-A6C34878D82A}">
+                    <a16:rowId xmlns:a16="http://schemas.microsoft.com/office/drawing/2014/main" val="1081334054"/>
+                  </a:ext>
+                </a:extLst>
+              </a:tr>
+              <a:tr h="370840">
+                <a:tc>
+                  <a:txBody>
+                    <a:bodyPr/>
+                    <a:lstStyle/>
+                    <a:p>
+                      <a:r>
+                        <a:rPr lang="en-US" dirty="0"/>
+                        <a:t>Transaction</a:t>
+                      </a:r>
+                    </a:p>
+                  </a:txBody>
+                  <a:tcPr/>
+                </a:tc>
+                <a:tc>
+                  <a:txBody>
+                    <a:bodyPr/>
+                    <a:lstStyle/>
+                    <a:p>
+                      <a:r>
+                        <a:rPr lang="en-US" dirty="0"/>
+                        <a:t>Find by Timestamp</a:t>
+                      </a:r>
+                    </a:p>
+                  </a:txBody>
+                  <a:tcPr/>
+                </a:tc>
+                <a:tc>
+                  <a:txBody>
+                    <a:bodyPr/>
+                    <a:lstStyle/>
+                    <a:p>
+                      <a:endParaRPr lang="en-US" dirty="0"/>
+                    </a:p>
+                  </a:txBody>
+                  <a:tcPr/>
+                </a:tc>
+                <a:tc>
+                  <a:txBody>
+                    <a:bodyPr/>
+                    <a:lstStyle/>
+                    <a:p>
+                      <a:endParaRPr lang="en-US" dirty="0"/>
+                    </a:p>
+                  </a:txBody>
+                  <a:tcPr/>
+                </a:tc>
+                <a:tc>
+                  <a:txBody>
+                    <a:bodyPr/>
+                    <a:lstStyle/>
+                    <a:p>
+                      <a:endParaRPr lang="en-US" dirty="0"/>
+                    </a:p>
+                  </a:txBody>
+                  <a:tcPr/>
+                </a:tc>
+                <a:extLst>
+                  <a:ext uri="{0D108BD9-81ED-4DB2-BD59-A6C34878D82A}">
+                    <a16:rowId xmlns:a16="http://schemas.microsoft.com/office/drawing/2014/main" val="2432464653"/>
+                  </a:ext>
+                </a:extLst>
+              </a:tr>
+              <a:tr h="370840">
+                <a:tc>
+                  <a:txBody>
+                    <a:bodyPr/>
+                    <a:lstStyle/>
+                    <a:p>
+                      <a:r>
+                        <a:rPr lang="en-US" dirty="0"/>
+                        <a:t>Transaction</a:t>
+                      </a:r>
+                    </a:p>
+                  </a:txBody>
+                  <a:tcPr/>
+                </a:tc>
+                <a:tc>
+                  <a:txBody>
+                    <a:bodyPr/>
+                    <a:lstStyle/>
+                    <a:p>
+                      <a:r>
+                        <a:rPr lang="en-US"/>
+                        <a:t>Get time now</a:t>
+                      </a:r>
+                      <a:endParaRPr lang="en-US" dirty="0"/>
+                    </a:p>
+                  </a:txBody>
+                  <a:tcPr/>
+                </a:tc>
+                <a:tc>
+                  <a:txBody>
+                    <a:bodyPr/>
+                    <a:lstStyle/>
+                    <a:p>
+                      <a:endParaRPr lang="en-US" dirty="0"/>
+                    </a:p>
+                  </a:txBody>
+                  <a:tcPr/>
+                </a:tc>
+                <a:tc>
+                  <a:txBody>
+                    <a:bodyPr/>
+                    <a:lstStyle/>
+                    <a:p>
+                      <a:endParaRPr lang="en-US" dirty="0"/>
+                    </a:p>
+                  </a:txBody>
+                  <a:tcPr/>
+                </a:tc>
+                <a:tc>
+                  <a:txBody>
+                    <a:bodyPr/>
+                    <a:lstStyle/>
+                    <a:p>
+                      <a:endParaRPr lang="en-US" dirty="0"/>
+                    </a:p>
+                  </a:txBody>
+                  <a:tcPr/>
+                </a:tc>
+                <a:extLst>
+                  <a:ext uri="{0D108BD9-81ED-4DB2-BD59-A6C34878D82A}">
+                    <a16:rowId xmlns:a16="http://schemas.microsoft.com/office/drawing/2014/main" val="366904803"/>
+                  </a:ext>
+                </a:extLst>
+              </a:tr>
+            </a:tbl>
+          </a:graphicData>
+        </a:graphic>
+      </p:graphicFrame>
+    </p:spTree>
+    <p:extLst>
+      <p:ext uri="{BB962C8B-B14F-4D97-AF65-F5344CB8AC3E}">
+        <p14:creationId xmlns:p14="http://schemas.microsoft.com/office/powerpoint/2010/main" val="3897000117"/>
+      </p:ext>
+    </p:extLst>
+  </p:cSld>
+  <p:clrMapOvr>
+    <a:masterClrMapping/>
+  </p:clrMapOvr>
+</p:sld>
+</file>
+
+<file path=ppt/slides/slide17.xml><?xml version="1.0" encoding="utf-8"?>
 <p:sld xmlns:a="http://schemas.openxmlformats.org/drawingml/2006/main" xmlns:r="http://schemas.openxmlformats.org/officeDocument/2006/relationships" xmlns:p="http://schemas.openxmlformats.org/presentationml/2006/main">
   <p:cSld>
     <p:spTree>

</xml_diff>

<commit_message>
additional functions further fleshed out and order planned for transactions class
</commit_message>
<xml_diff>
--- a/Plans_Project_Management/Budget_App_Plan_08Nov2018.pptx
+++ b/Plans_Project_Management/Budget_App_Plan_08Nov2018.pptx
@@ -7080,14 +7080,14 @@
           <p:nvPr>
             <p:extLst>
               <p:ext uri="{D42A27DB-BD31-4B8C-83A1-F6EECF244321}">
-                <p14:modId xmlns:p14="http://schemas.microsoft.com/office/powerpoint/2010/main" val="1162771010"/>
+                <p14:modId xmlns:p14="http://schemas.microsoft.com/office/powerpoint/2010/main" val="3550569693"/>
               </p:ext>
             </p:extLst>
           </p:nvPr>
         </p:nvGraphicFramePr>
         <p:xfrm>
           <a:off x="85165" y="765885"/>
-          <a:ext cx="12021670" cy="3037840"/>
+          <a:ext cx="12021670" cy="5491480"/>
         </p:xfrm>
         <a:graphic>
           <a:graphicData uri="http://schemas.openxmlformats.org/drawingml/2006/table">
@@ -7496,7 +7496,10 @@
                     <a:bodyPr/>
                     <a:lstStyle/>
                     <a:p>
-                      <a:endParaRPr lang="en-US" dirty="0"/>
+                      <a:r>
+                        <a:rPr lang="en-US" dirty="0"/>
+                        <a:t>Whole transactions table will need to be shown on transactions page</a:t>
+                      </a:r>
                     </a:p>
                   </a:txBody>
                   <a:tcPr/>
@@ -7506,7 +7509,10 @@
                     <a:bodyPr/>
                     <a:lstStyle/>
                     <a:p>
-                      <a:endParaRPr lang="en-US" dirty="0"/>
+                      <a:r>
+                        <a:rPr lang="en-US" dirty="0"/>
+                        <a:t>The whole transactions table will be selected and shown</a:t>
+                      </a:r>
                     </a:p>
                   </a:txBody>
                   <a:tcPr/>
@@ -7516,7 +7522,10 @@
                     <a:bodyPr/>
                     <a:lstStyle/>
                     <a:p>
-                      <a:endParaRPr lang="en-US" dirty="0"/>
+                      <a:r>
+                        <a:rPr lang="en-US" dirty="0"/>
+                        <a:t>Full list of budgets in budgets table</a:t>
+                      </a:r>
                     </a:p>
                   </a:txBody>
                   <a:tcPr/>
@@ -7604,7 +7613,18 @@
                     <a:bodyPr/>
                     <a:lstStyle/>
                     <a:p>
-                      <a:endParaRPr lang="en-US" dirty="0"/>
+                      <a:r>
+                        <a:rPr lang="en-US" dirty="0"/>
+                        <a:t>Required for </a:t>
+                      </a:r>
+                      <a:r>
+                        <a:rPr lang="en-US" dirty="0" err="1"/>
+                        <a:t>self.all</a:t>
+                      </a:r>
+                      <a:r>
+                        <a:rPr lang="en-US" dirty="0"/>
+                        <a:t> to work</a:t>
+                      </a:r>
                     </a:p>
                   </a:txBody>
                   <a:tcPr/>
@@ -7614,7 +7634,10 @@
                     <a:bodyPr/>
                     <a:lstStyle/>
                     <a:p>
-                      <a:endParaRPr lang="en-US" dirty="0"/>
+                      <a:r>
+                        <a:rPr lang="en-US" dirty="0"/>
+                        <a:t>News up transaction objects into a hash</a:t>
+                      </a:r>
                     </a:p>
                   </a:txBody>
                   <a:tcPr/>
@@ -7624,7 +7647,10 @@
                     <a:bodyPr/>
                     <a:lstStyle/>
                     <a:p>
-                      <a:endParaRPr lang="en-US" dirty="0"/>
+                      <a:r>
+                        <a:rPr lang="en-US" dirty="0"/>
+                        <a:t>Hash of transaction objects</a:t>
+                      </a:r>
                     </a:p>
                   </a:txBody>
                   <a:tcPr/>
@@ -7702,6 +7728,50 @@
                     <a:bodyPr/>
                     <a:lstStyle/>
                     <a:p>
+                      <a:r>
+                        <a:rPr lang="en-US" dirty="0"/>
+                        <a:t>Transaction will need to be able to be updated and changed</a:t>
+                      </a:r>
+                    </a:p>
+                  </a:txBody>
+                  <a:tcPr/>
+                </a:tc>
+                <a:tc>
+                  <a:txBody>
+                    <a:bodyPr/>
+                    <a:lstStyle/>
+                    <a:p>
+                      <a:pPr marL="0" marR="0" lvl="0" indent="0" algn="l" defTabSz="914400" rtl="0" eaLnBrk="1" fontAlgn="auto" latinLnBrk="0" hangingPunct="1">
+                        <a:lnSpc>
+                          <a:spcPct val="100000"/>
+                        </a:lnSpc>
+                        <a:spcBef>
+                          <a:spcPts val="0"/>
+                        </a:spcBef>
+                        <a:spcAft>
+                          <a:spcPts val="0"/>
+                        </a:spcAft>
+                        <a:buClrTx/>
+                        <a:buSzTx/>
+                        <a:buFontTx/>
+                        <a:buNone/>
+                        <a:tabLst/>
+                        <a:defRPr/>
+                      </a:pPr>
+                      <a:r>
+                        <a:rPr lang="en-US" dirty="0"/>
+                        <a:t>The name of an existing transaction is changed in Ruby using @</a:t>
+                      </a:r>
+                      <a:r>
+                        <a:rPr lang="en-US" dirty="0" err="1"/>
+                        <a:t>transaction.transaction_name</a:t>
+                      </a:r>
+                      <a:r>
+                        <a:rPr lang="en-US" dirty="0"/>
+                        <a:t>, then the update function is called on that transaction to change it in the database</a:t>
+                      </a:r>
+                    </a:p>
+                    <a:p>
                       <a:endParaRPr lang="en-US" dirty="0"/>
                     </a:p>
                   </a:txBody>
@@ -7712,15 +7782,28 @@
                     <a:bodyPr/>
                     <a:lstStyle/>
                     <a:p>
-                      <a:endParaRPr lang="en-US" dirty="0"/>
-                    </a:p>
-                  </a:txBody>
-                  <a:tcPr/>
-                </a:tc>
-                <a:tc>
-                  <a:txBody>
-                    <a:bodyPr/>
-                    <a:lstStyle/>
+                      <a:pPr marL="0" marR="0" lvl="0" indent="0" algn="l" defTabSz="914400" rtl="0" eaLnBrk="1" fontAlgn="auto" latinLnBrk="0" hangingPunct="1">
+                        <a:lnSpc>
+                          <a:spcPct val="100000"/>
+                        </a:lnSpc>
+                        <a:spcBef>
+                          <a:spcPts val="0"/>
+                        </a:spcBef>
+                        <a:spcAft>
+                          <a:spcPts val="0"/>
+                        </a:spcAft>
+                        <a:buClrTx/>
+                        <a:buSzTx/>
+                        <a:buFontTx/>
+                        <a:buNone/>
+                        <a:tabLst/>
+                        <a:defRPr/>
+                      </a:pPr>
+                      <a:r>
+                        <a:rPr lang="en-US" dirty="0"/>
+                        <a:t>No specified output, but the alteration should appear in the database</a:t>
+                      </a:r>
+                    </a:p>
                     <a:p>
                       <a:endParaRPr lang="en-US" dirty="0"/>
                     </a:p>
@@ -7818,14 +7901,14 @@
           <p:nvPr>
             <p:extLst>
               <p:ext uri="{D42A27DB-BD31-4B8C-83A1-F6EECF244321}">
-                <p14:modId xmlns:p14="http://schemas.microsoft.com/office/powerpoint/2010/main" val="175121615"/>
+                <p14:modId xmlns:p14="http://schemas.microsoft.com/office/powerpoint/2010/main" val="2265807285"/>
               </p:ext>
             </p:extLst>
           </p:nvPr>
         </p:nvGraphicFramePr>
         <p:xfrm>
           <a:off x="85165" y="765885"/>
-          <a:ext cx="12021670" cy="3129280"/>
+          <a:ext cx="12021670" cy="5857240"/>
         </p:xfrm>
         <a:graphic>
           <a:graphicData uri="http://schemas.openxmlformats.org/drawingml/2006/table">
@@ -8028,7 +8111,10 @@
                     <a:bodyPr/>
                     <a:lstStyle/>
                     <a:p>
-                      <a:endParaRPr lang="en-US" dirty="0"/>
+                      <a:r>
+                        <a:rPr lang="en-US" dirty="0"/>
+                        <a:t>Transactions need to have the ability to be deleted</a:t>
+                      </a:r>
                     </a:p>
                   </a:txBody>
                   <a:tcPr anchor="ctr"/>
@@ -8038,7 +8124,10 @@
                     <a:bodyPr/>
                     <a:lstStyle/>
                     <a:p>
-                      <a:endParaRPr lang="en-US" dirty="0"/>
+                      <a:r>
+                        <a:rPr lang="en-US" dirty="0"/>
+                        <a:t>By selecting the entry with a specific id in the transactions table and deleting it</a:t>
+                      </a:r>
                     </a:p>
                   </a:txBody>
                   <a:tcPr anchor="ctr"/>
@@ -8048,7 +8137,10 @@
                     <a:bodyPr/>
                     <a:lstStyle/>
                     <a:p>
-                      <a:endParaRPr lang="en-US" dirty="0"/>
+                      <a:r>
+                        <a:rPr lang="en-US" dirty="0"/>
+                        <a:t>The transaction just deleted, not need to display this</a:t>
+                      </a:r>
                     </a:p>
                   </a:txBody>
                   <a:tcPr anchor="ctr"/>
@@ -8126,7 +8218,10 @@
                     <a:bodyPr/>
                     <a:lstStyle/>
                     <a:p>
-                      <a:endParaRPr lang="en-US" dirty="0"/>
+                      <a:r>
+                        <a:rPr lang="en-US" dirty="0"/>
+                        <a:t>User may want to wipe entire transactions table</a:t>
+                      </a:r>
                     </a:p>
                   </a:txBody>
                   <a:tcPr anchor="ctr"/>
@@ -8136,7 +8231,10 @@
                     <a:bodyPr/>
                     <a:lstStyle/>
                     <a:p>
-                      <a:endParaRPr lang="en-US" dirty="0"/>
+                      <a:r>
+                        <a:rPr lang="en-US" dirty="0"/>
+                        <a:t>By selecting everything in the transactions table and deleting it</a:t>
+                      </a:r>
                     </a:p>
                   </a:txBody>
                   <a:tcPr anchor="ctr"/>
@@ -8146,7 +8244,10 @@
                     <a:bodyPr/>
                     <a:lstStyle/>
                     <a:p>
-                      <a:endParaRPr lang="en-US" dirty="0"/>
+                      <a:r>
+                        <a:rPr lang="en-US" dirty="0"/>
+                        <a:t>No ?</a:t>
+                      </a:r>
                     </a:p>
                   </a:txBody>
                   <a:tcPr anchor="ctr"/>
@@ -8178,8 +8279,13 @@
                     <a:p>
                       <a:r>
                         <a:rPr lang="en-US" dirty="0"/>
-                        <a:t>Find by merchant</a:t>
-                      </a:r>
+                        <a:t>Find by </a:t>
+                      </a:r>
+                      <a:r>
+                        <a:rPr lang="en-US" dirty="0" err="1"/>
+                        <a:t>merchant_id</a:t>
+                      </a:r>
+                      <a:endParaRPr lang="en-US" dirty="0"/>
                     </a:p>
                   </a:txBody>
                   <a:tcPr/>
@@ -8189,7 +8295,10 @@
                     <a:bodyPr/>
                     <a:lstStyle/>
                     <a:p>
-                      <a:endParaRPr lang="en-US" dirty="0"/>
+                      <a:r>
+                        <a:rPr lang="en-US" dirty="0"/>
+                        <a:t>Full transactions table will need to be filtered by a particular merchant</a:t>
+                      </a:r>
                     </a:p>
                   </a:txBody>
                   <a:tcPr/>
@@ -8199,20 +8308,26 @@
                     <a:bodyPr/>
                     <a:lstStyle/>
                     <a:p>
-                      <a:endParaRPr lang="en-US" dirty="0"/>
-                    </a:p>
-                  </a:txBody>
-                  <a:tcPr/>
-                </a:tc>
-                <a:tc>
-                  <a:txBody>
-                    <a:bodyPr/>
-                    <a:lstStyle/>
-                    <a:p>
-                      <a:endParaRPr lang="en-US" dirty="0"/>
-                    </a:p>
-                  </a:txBody>
-                  <a:tcPr/>
+                      <a:r>
+                        <a:rPr lang="en-US" dirty="0"/>
+                        <a:t>All transactions matching a certain merchant id can be selected</a:t>
+                      </a:r>
+                    </a:p>
+                  </a:txBody>
+                  <a:tcPr anchor="ctr"/>
+                </a:tc>
+                <a:tc>
+                  <a:txBody>
+                    <a:bodyPr/>
+                    <a:lstStyle/>
+                    <a:p>
+                      <a:r>
+                        <a:rPr lang="en-US" dirty="0"/>
+                        <a:t>The transaction searched for</a:t>
+                      </a:r>
+                    </a:p>
+                  </a:txBody>
+                  <a:tcPr anchor="ctr"/>
                 </a:tc>
                 <a:extLst>
                   <a:ext uri="{0D108BD9-81ED-4DB2-BD59-A6C34878D82A}">
@@ -8241,8 +8356,13 @@
                     <a:p>
                       <a:r>
                         <a:rPr lang="en-US" dirty="0"/>
-                        <a:t>Find by tag</a:t>
-                      </a:r>
+                        <a:t>Find by </a:t>
+                      </a:r>
+                      <a:r>
+                        <a:rPr lang="en-US" dirty="0" err="1"/>
+                        <a:t>tag_id</a:t>
+                      </a:r>
+                      <a:endParaRPr lang="en-US" dirty="0"/>
                     </a:p>
                   </a:txBody>
                   <a:tcPr/>
@@ -8252,7 +8372,10 @@
                     <a:bodyPr/>
                     <a:lstStyle/>
                     <a:p>
-                      <a:endParaRPr lang="en-US" dirty="0"/>
+                      <a:r>
+                        <a:rPr lang="en-US" dirty="0"/>
+                        <a:t>Full transaction table will need to be filtered by a particular merchant</a:t>
+                      </a:r>
                     </a:p>
                   </a:txBody>
                   <a:tcPr/>
@@ -8262,20 +8385,26 @@
                     <a:bodyPr/>
                     <a:lstStyle/>
                     <a:p>
-                      <a:endParaRPr lang="en-US" dirty="0"/>
-                    </a:p>
-                  </a:txBody>
-                  <a:tcPr/>
-                </a:tc>
-                <a:tc>
-                  <a:txBody>
-                    <a:bodyPr/>
-                    <a:lstStyle/>
-                    <a:p>
-                      <a:endParaRPr lang="en-US" dirty="0"/>
-                    </a:p>
-                  </a:txBody>
-                  <a:tcPr/>
+                      <a:r>
+                        <a:rPr lang="en-US" dirty="0"/>
+                        <a:t>All transactions matching a certain tag id can be selected</a:t>
+                      </a:r>
+                    </a:p>
+                  </a:txBody>
+                  <a:tcPr anchor="ctr"/>
+                </a:tc>
+                <a:tc>
+                  <a:txBody>
+                    <a:bodyPr/>
+                    <a:lstStyle/>
+                    <a:p>
+                      <a:r>
+                        <a:rPr lang="en-US" dirty="0"/>
+                        <a:t>The transaction searched for</a:t>
+                      </a:r>
+                    </a:p>
+                  </a:txBody>
+                  <a:tcPr anchor="ctr"/>
                 </a:tc>
                 <a:extLst>
                   <a:ext uri="{0D108BD9-81ED-4DB2-BD59-A6C34878D82A}">
@@ -8315,7 +8444,10 @@
                     <a:bodyPr/>
                     <a:lstStyle/>
                     <a:p>
-                      <a:endParaRPr lang="en-US" dirty="0"/>
+                      <a:r>
+                        <a:rPr lang="en-US" dirty="0"/>
+                        <a:t>Transactions table will need to be filtered by a date range</a:t>
+                      </a:r>
                     </a:p>
                   </a:txBody>
                   <a:tcPr/>
@@ -8325,20 +8457,26 @@
                     <a:bodyPr/>
                     <a:lstStyle/>
                     <a:p>
-                      <a:endParaRPr lang="en-US" dirty="0"/>
-                    </a:p>
-                  </a:txBody>
-                  <a:tcPr/>
-                </a:tc>
-                <a:tc>
-                  <a:txBody>
-                    <a:bodyPr/>
-                    <a:lstStyle/>
-                    <a:p>
-                      <a:endParaRPr lang="en-US" dirty="0"/>
-                    </a:p>
-                  </a:txBody>
-                  <a:tcPr/>
+                      <a:r>
+                        <a:rPr lang="en-US" dirty="0"/>
+                        <a:t>All transactions falling within a specified time range</a:t>
+                      </a:r>
+                    </a:p>
+                  </a:txBody>
+                  <a:tcPr anchor="ctr"/>
+                </a:tc>
+                <a:tc>
+                  <a:txBody>
+                    <a:bodyPr/>
+                    <a:lstStyle/>
+                    <a:p>
+                      <a:r>
+                        <a:rPr lang="en-US" dirty="0"/>
+                        <a:t>The transaction searched for</a:t>
+                      </a:r>
+                    </a:p>
+                  </a:txBody>
+                  <a:tcPr anchor="ctr"/>
                 </a:tc>
                 <a:extLst>
                   <a:ext uri="{0D108BD9-81ED-4DB2-BD59-A6C34878D82A}">
@@ -8379,7 +8517,10 @@
                     <a:bodyPr/>
                     <a:lstStyle/>
                     <a:p>
-                      <a:endParaRPr lang="en-US" dirty="0"/>
+                      <a:r>
+                        <a:rPr lang="en-US" dirty="0"/>
+                        <a:t>Automatically capture the time and date when a new transaction is added and add to data base</a:t>
+                      </a:r>
                     </a:p>
                   </a:txBody>
                   <a:tcPr/>
@@ -8389,7 +8530,16 @@
                     <a:bodyPr/>
                     <a:lstStyle/>
                     <a:p>
-                      <a:endParaRPr lang="en-US" dirty="0"/>
+                      <a:r>
+                        <a:rPr lang="en-US" dirty="0"/>
+                        <a:t>Use ruby function to capture the time</a:t>
+                      </a:r>
+                    </a:p>
+                    <a:p>
+                      <a:r>
+                        <a:rPr lang="en-US" dirty="0"/>
+                        <a:t>Add captured time to transaction when it is initialized</a:t>
+                      </a:r>
                     </a:p>
                   </a:txBody>
                   <a:tcPr/>
@@ -8399,6 +8549,10 @@
                     <a:bodyPr/>
                     <a:lstStyle/>
                     <a:p>
+                      <a:r>
+                        <a:rPr lang="en-US"/>
+                        <a:t>Time now</a:t>
+                      </a:r>
                       <a:endParaRPr lang="en-US" dirty="0"/>
                     </a:p>
                   </a:txBody>

</xml_diff>

<commit_message>
rationale behind budget_transaction class, and total spend and remaining budget functions hashed out
</commit_message>
<xml_diff>
--- a/Plans_Project_Management/Budget_App_Plan_08Nov2018.pptx
+++ b/Plans_Project_Management/Budget_App_Plan_08Nov2018.pptx
@@ -16,12 +16,15 @@
     <p:sldId id="263" r:id="rId10"/>
     <p:sldId id="270" r:id="rId11"/>
     <p:sldId id="264" r:id="rId12"/>
-    <p:sldId id="257" r:id="rId13"/>
-    <p:sldId id="268" r:id="rId14"/>
-    <p:sldId id="266" r:id="rId15"/>
-    <p:sldId id="271" r:id="rId16"/>
-    <p:sldId id="272" r:id="rId17"/>
-    <p:sldId id="269" r:id="rId18"/>
+    <p:sldId id="273" r:id="rId13"/>
+    <p:sldId id="257" r:id="rId14"/>
+    <p:sldId id="268" r:id="rId15"/>
+    <p:sldId id="266" r:id="rId16"/>
+    <p:sldId id="271" r:id="rId17"/>
+    <p:sldId id="272" r:id="rId18"/>
+    <p:sldId id="274" r:id="rId19"/>
+    <p:sldId id="275" r:id="rId20"/>
+    <p:sldId id="269" r:id="rId21"/>
   </p:sldIdLst>
   <p:sldSz cx="12192000" cy="6858000"/>
   <p:notesSz cx="6858000" cy="9144000"/>
@@ -4377,14 +4380,14 @@
           <p:nvPr>
             <p:extLst>
               <p:ext uri="{D42A27DB-BD31-4B8C-83A1-F6EECF244321}">
-                <p14:modId xmlns:p14="http://schemas.microsoft.com/office/powerpoint/2010/main" val="3829048076"/>
+                <p14:modId xmlns:p14="http://schemas.microsoft.com/office/powerpoint/2010/main" val="3347654519"/>
               </p:ext>
             </p:extLst>
           </p:nvPr>
         </p:nvGraphicFramePr>
         <p:xfrm>
           <a:off x="5674657" y="464175"/>
-          <a:ext cx="3630706" cy="6344341"/>
+          <a:ext cx="3630706" cy="5561794"/>
         </p:xfrm>
         <a:graphic>
           <a:graphicData uri="http://schemas.openxmlformats.org/drawingml/2006/table">
@@ -4482,35 +4485,15 @@
                     <a:p>
                       <a:r>
                         <a:rPr lang="en-US" dirty="0"/>
-                        <a:t>@time(numeric)</a:t>
-                      </a:r>
-                    </a:p>
-                    <a:p>
-                      <a:r>
-                        <a:rPr lang="en-US" dirty="0"/>
-                        <a:t>@day(</a:t>
+                        <a:t>@</a:t>
                       </a:r>
                       <a:r>
                         <a:rPr lang="en-US" dirty="0" err="1"/>
-                        <a:t>Int</a:t>
-                      </a:r>
-                      <a:r>
-                        <a:rPr lang="en-US" dirty="0"/>
-                        <a:t>)</a:t>
-                      </a:r>
-                    </a:p>
-                    <a:p>
-                      <a:r>
-                        <a:rPr lang="en-US" dirty="0"/>
-                        <a:t>@month(</a:t>
-                      </a:r>
-                      <a:r>
-                        <a:rPr lang="en-US" dirty="0" err="1"/>
-                        <a:t>Str</a:t>
-                      </a:r>
-                      <a:r>
-                        <a:rPr lang="en-US" dirty="0"/>
-                        <a:t>)</a:t>
+                        <a:t>time_added</a:t>
+                      </a:r>
+                      <a:r>
+                        <a:rPr lang="en-US" dirty="0"/>
+                        <a:t>(TIMESTAMP)</a:t>
                       </a:r>
                     </a:p>
                     <a:p>
@@ -4521,20 +4504,6 @@
                       <a:r>
                         <a:rPr lang="en-US" dirty="0" err="1"/>
                         <a:t>total_spent</a:t>
-                      </a:r>
-                      <a:r>
-                        <a:rPr lang="en-US" dirty="0"/>
-                        <a:t>(numeric)</a:t>
-                      </a:r>
-                    </a:p>
-                    <a:p>
-                      <a:r>
-                        <a:rPr lang="en-US" dirty="0"/>
-                        <a:t>@</a:t>
-                      </a:r>
-                      <a:r>
-                        <a:rPr lang="en-US" dirty="0" err="1"/>
-                        <a:t>remaining_budget</a:t>
                       </a:r>
                       <a:r>
                         <a:rPr lang="en-US" dirty="0"/>
@@ -4573,16 +4542,6 @@
                       <a:r>
                         <a:rPr lang="en-US" dirty="0"/>
                         <a:t>Get time/date now</a:t>
-                      </a:r>
-                    </a:p>
-                    <a:p>
-                      <a:pPr marL="285750" indent="-285750" algn="l">
-                        <a:buFontTx/>
-                        <a:buChar char="-"/>
-                      </a:pPr>
-                      <a:r>
-                        <a:rPr lang="en-US" dirty="0"/>
-                        <a:t>Split time/date to time/day/month</a:t>
                       </a:r>
                     </a:p>
                     <a:p>
@@ -4683,14 +4642,14 @@
           <p:nvPr>
             <p:extLst>
               <p:ext uri="{D42A27DB-BD31-4B8C-83A1-F6EECF244321}">
-                <p14:modId xmlns:p14="http://schemas.microsoft.com/office/powerpoint/2010/main" val="4054288860"/>
+                <p14:modId xmlns:p14="http://schemas.microsoft.com/office/powerpoint/2010/main" val="872058982"/>
               </p:ext>
             </p:extLst>
           </p:nvPr>
         </p:nvGraphicFramePr>
         <p:xfrm>
           <a:off x="9701303" y="464174"/>
-          <a:ext cx="2203824" cy="6337982"/>
+          <a:ext cx="2203824" cy="6385556"/>
         </p:xfrm>
         <a:graphic>
           <a:graphicData uri="http://schemas.openxmlformats.org/drawingml/2006/table">
@@ -4804,6 +4763,40 @@
                       </a:r>
                       <a:endParaRPr lang="en-US" dirty="0"/>
                     </a:p>
+                    <a:p>
+                      <a:pPr marL="0" marR="0" lvl="0" indent="0" algn="l" defTabSz="914400" rtl="0" eaLnBrk="1" fontAlgn="auto" latinLnBrk="0" hangingPunct="1">
+                        <a:lnSpc>
+                          <a:spcPct val="100000"/>
+                        </a:lnSpc>
+                        <a:spcBef>
+                          <a:spcPts val="0"/>
+                        </a:spcBef>
+                        <a:spcAft>
+                          <a:spcPts val="0"/>
+                        </a:spcAft>
+                        <a:buClrTx/>
+                        <a:buSzTx/>
+                        <a:buFontTx/>
+                        <a:buNone/>
+                        <a:tabLst/>
+                        <a:defRPr/>
+                      </a:pPr>
+                      <a:r>
+                        <a:rPr lang="en-US" dirty="0"/>
+                        <a:t>@</a:t>
+                      </a:r>
+                      <a:r>
+                        <a:rPr lang="en-US" dirty="0" err="1"/>
+                        <a:t>remaining_budget</a:t>
+                      </a:r>
+                      <a:r>
+                        <a:rPr lang="en-US" dirty="0"/>
+                        <a:t>(numeric)</a:t>
+                      </a:r>
+                    </a:p>
+                    <a:p>
+                      <a:endParaRPr lang="en-US" dirty="0"/>
+                    </a:p>
                   </a:txBody>
                   <a:tcPr/>
                 </a:tc>
@@ -4835,7 +4828,37 @@
                       </a:pPr>
                       <a:r>
                         <a:rPr lang="en-US" dirty="0"/>
-                        <a:t>Edit</a:t>
+                        <a:t>Save (to database)</a:t>
+                      </a:r>
+                    </a:p>
+                    <a:p>
+                      <a:pPr marL="285750" indent="-285750" algn="l">
+                        <a:buFontTx/>
+                        <a:buChar char="-"/>
+                      </a:pPr>
+                      <a:r>
+                        <a:rPr lang="en-US" dirty="0"/>
+                        <a:t>Self find</a:t>
+                      </a:r>
+                    </a:p>
+                    <a:p>
+                      <a:pPr marL="285750" indent="-285750" algn="l">
+                        <a:buFontTx/>
+                        <a:buChar char="-"/>
+                      </a:pPr>
+                      <a:r>
+                        <a:rPr lang="en-US" dirty="0"/>
+                        <a:t>Self all</a:t>
+                      </a:r>
+                    </a:p>
+                    <a:p>
+                      <a:pPr marL="285750" indent="-285750" algn="l">
+                        <a:buFontTx/>
+                        <a:buChar char="-"/>
+                      </a:pPr>
+                      <a:r>
+                        <a:rPr lang="en-US" dirty="0"/>
+                        <a:t>Self map items</a:t>
                       </a:r>
                     </a:p>
                     <a:p>
@@ -4878,6 +4901,320 @@
 </file>
 
 <file path=ppt/slides/slide12.xml><?xml version="1.0" encoding="utf-8"?>
+<p:sld xmlns:a="http://schemas.openxmlformats.org/drawingml/2006/main" xmlns:r="http://schemas.openxmlformats.org/officeDocument/2006/relationships" xmlns:p="http://schemas.openxmlformats.org/presentationml/2006/main">
+  <p:cSld>
+    <p:spTree>
+      <p:nvGrpSpPr>
+        <p:cNvPr id="1" name=""/>
+        <p:cNvGrpSpPr/>
+        <p:nvPr/>
+      </p:nvGrpSpPr>
+      <p:grpSpPr>
+        <a:xfrm>
+          <a:off x="0" y="0"/>
+          <a:ext cx="0" cy="0"/>
+          <a:chOff x="0" y="0"/>
+          <a:chExt cx="0" cy="0"/>
+        </a:xfrm>
+      </p:grpSpPr>
+      <p:sp>
+        <p:nvSpPr>
+          <p:cNvPr id="2" name="Title 1">
+            <a:extLst>
+              <a:ext uri="{FF2B5EF4-FFF2-40B4-BE49-F238E27FC236}">
+                <a16:creationId xmlns:a16="http://schemas.microsoft.com/office/drawing/2014/main" id="{A3FA626A-39B1-794F-9A3F-83D37F75B451}"/>
+              </a:ext>
+            </a:extLst>
+          </p:cNvPr>
+          <p:cNvSpPr>
+            <a:spLocks noGrp="1"/>
+          </p:cNvSpPr>
+          <p:nvPr>
+            <p:ph type="title"/>
+          </p:nvPr>
+        </p:nvSpPr>
+        <p:spPr>
+          <a:xfrm>
+            <a:off x="838200" y="55844"/>
+            <a:ext cx="10515600" cy="341095"/>
+          </a:xfrm>
+        </p:spPr>
+        <p:txBody>
+          <a:bodyPr>
+            <a:normAutofit fontScale="90000"/>
+          </a:bodyPr>
+          <a:lstStyle/>
+          <a:p>
+            <a:pPr algn="ctr"/>
+            <a:r>
+              <a:rPr lang="en-US" sz="2800" b="1" dirty="0"/>
+              <a:t>Classes</a:t>
+            </a:r>
+          </a:p>
+        </p:txBody>
+      </p:sp>
+      <p:graphicFrame>
+        <p:nvGraphicFramePr>
+          <p:cNvPr id="6" name="Table 5">
+            <a:extLst>
+              <a:ext uri="{FF2B5EF4-FFF2-40B4-BE49-F238E27FC236}">
+                <a16:creationId xmlns:a16="http://schemas.microsoft.com/office/drawing/2014/main" id="{E60E3F86-205D-C94E-8BFB-D187A2E5A87D}"/>
+              </a:ext>
+            </a:extLst>
+          </p:cNvPr>
+          <p:cNvGraphicFramePr>
+            <a:graphicFrameLocks noGrp="1"/>
+          </p:cNvGraphicFramePr>
+          <p:nvPr>
+            <p:extLst>
+              <p:ext uri="{D42A27DB-BD31-4B8C-83A1-F6EECF244321}">
+                <p14:modId xmlns:p14="http://schemas.microsoft.com/office/powerpoint/2010/main" val="2797195984"/>
+              </p:ext>
+            </p:extLst>
+          </p:nvPr>
+        </p:nvGraphicFramePr>
+        <p:xfrm>
+          <a:off x="484092" y="1044239"/>
+          <a:ext cx="3630706" cy="5561794"/>
+        </p:xfrm>
+        <a:graphic>
+          <a:graphicData uri="http://schemas.openxmlformats.org/drawingml/2006/table">
+            <a:tbl>
+              <a:tblPr firstRow="1" bandRow="1">
+                <a:tableStyleId>{5940675A-B579-460E-94D1-54222C63F5DA}</a:tableStyleId>
+              </a:tblPr>
+              <a:tblGrid>
+                <a:gridCol w="3630706">
+                  <a:extLst>
+                    <a:ext uri="{9D8B030D-6E8A-4147-A177-3AD203B41FA5}">
+                      <a16:colId xmlns:a16="http://schemas.microsoft.com/office/drawing/2014/main" val="4005843325"/>
+                    </a:ext>
+                  </a:extLst>
+                </a:gridCol>
+              </a:tblGrid>
+              <a:tr h="400741">
+                <a:tc>
+                  <a:txBody>
+                    <a:bodyPr/>
+                    <a:lstStyle/>
+                    <a:p>
+                      <a:pPr algn="ctr"/>
+                      <a:r>
+                        <a:rPr lang="en-US" dirty="0"/>
+                        <a:t>Budget_transactions</a:t>
+                      </a:r>
+                    </a:p>
+                  </a:txBody>
+                  <a:tcPr anchor="ctr">
+                    <a:solidFill>
+                      <a:srgbClr val="D883FF"/>
+                    </a:solidFill>
+                  </a:tcPr>
+                </a:tc>
+                <a:extLst>
+                  <a:ext uri="{0D108BD9-81ED-4DB2-BD59-A6C34878D82A}">
+                    <a16:rowId xmlns:a16="http://schemas.microsoft.com/office/drawing/2014/main" val="4181850750"/>
+                  </a:ext>
+                </a:extLst>
+              </a:tr>
+              <a:tr h="2600733">
+                <a:tc>
+                  <a:txBody>
+                    <a:bodyPr/>
+                    <a:lstStyle/>
+                    <a:p>
+                      <a:r>
+                        <a:rPr lang="en-US" dirty="0"/>
+                        <a:t>@id</a:t>
+                      </a:r>
+                    </a:p>
+                    <a:p>
+                      <a:r>
+                        <a:rPr lang="en-US" dirty="0"/>
+                        <a:t>@</a:t>
+                      </a:r>
+                      <a:r>
+                        <a:rPr lang="en-US" dirty="0" err="1"/>
+                        <a:t>transaction_id</a:t>
+                      </a:r>
+                      <a:endParaRPr lang="en-US" dirty="0"/>
+                    </a:p>
+                    <a:p>
+                      <a:r>
+                        <a:rPr lang="en-US" dirty="0"/>
+                        <a:t>@</a:t>
+                      </a:r>
+                      <a:r>
+                        <a:rPr lang="en-US" dirty="0" err="1"/>
+                        <a:t>budget_id</a:t>
+                      </a:r>
+                      <a:endParaRPr lang="en-US" dirty="0"/>
+                    </a:p>
+                    <a:p>
+                      <a:r>
+                        <a:rPr lang="en-US" dirty="0"/>
+                        <a:t>@</a:t>
+                      </a:r>
+                      <a:r>
+                        <a:rPr lang="en-US" dirty="0" err="1"/>
+                        <a:t>remaining_budget</a:t>
+                      </a:r>
+                      <a:endParaRPr lang="en-US" dirty="0"/>
+                    </a:p>
+                  </a:txBody>
+                  <a:tcPr/>
+                </a:tc>
+                <a:extLst>
+                  <a:ext uri="{0D108BD9-81ED-4DB2-BD59-A6C34878D82A}">
+                    <a16:rowId xmlns:a16="http://schemas.microsoft.com/office/drawing/2014/main" val="2995859431"/>
+                  </a:ext>
+                </a:extLst>
+              </a:tr>
+              <a:tr h="1768047">
+                <a:tc>
+                  <a:txBody>
+                    <a:bodyPr/>
+                    <a:lstStyle/>
+                    <a:p>
+                      <a:pPr marL="285750" indent="-285750" algn="l">
+                        <a:buFontTx/>
+                        <a:buChar char="-"/>
+                      </a:pPr>
+                      <a:r>
+                        <a:rPr lang="en-US" dirty="0"/>
+                        <a:t>Initialize</a:t>
+                      </a:r>
+                    </a:p>
+                    <a:p>
+                      <a:pPr marL="285750" marR="0" lvl="0" indent="-285750" algn="l" defTabSz="914400" rtl="0" eaLnBrk="1" fontAlgn="auto" latinLnBrk="0" hangingPunct="1">
+                        <a:lnSpc>
+                          <a:spcPct val="100000"/>
+                        </a:lnSpc>
+                        <a:spcBef>
+                          <a:spcPts val="0"/>
+                        </a:spcBef>
+                        <a:spcAft>
+                          <a:spcPts val="0"/>
+                        </a:spcAft>
+                        <a:buClrTx/>
+                        <a:buSzTx/>
+                        <a:buFontTx/>
+                        <a:buChar char="-"/>
+                        <a:tabLst/>
+                        <a:defRPr/>
+                      </a:pPr>
+                      <a:r>
+                        <a:rPr lang="en-US" dirty="0"/>
+                        <a:t>Calculate total spent</a:t>
+                      </a:r>
+                    </a:p>
+                    <a:p>
+                      <a:pPr marL="285750" marR="0" lvl="0" indent="-285750" algn="l" defTabSz="914400" rtl="0" eaLnBrk="1" fontAlgn="auto" latinLnBrk="0" hangingPunct="1">
+                        <a:lnSpc>
+                          <a:spcPct val="100000"/>
+                        </a:lnSpc>
+                        <a:spcBef>
+                          <a:spcPts val="0"/>
+                        </a:spcBef>
+                        <a:spcAft>
+                          <a:spcPts val="0"/>
+                        </a:spcAft>
+                        <a:buClrTx/>
+                        <a:buSzTx/>
+                        <a:buFontTx/>
+                        <a:buChar char="-"/>
+                        <a:tabLst/>
+                        <a:defRPr/>
+                      </a:pPr>
+                      <a:r>
+                        <a:rPr lang="en-US" dirty="0"/>
+                        <a:t>Calculate remaining budget</a:t>
+                      </a:r>
+                    </a:p>
+                    <a:p>
+                      <a:pPr marL="285750" indent="-285750" algn="l">
+                        <a:buFontTx/>
+                        <a:buChar char="-"/>
+                      </a:pPr>
+                      <a:r>
+                        <a:rPr lang="en-US" dirty="0"/>
+                        <a:t>Save (to database)</a:t>
+                      </a:r>
+                    </a:p>
+                    <a:p>
+                      <a:pPr marL="285750" indent="-285750" algn="l">
+                        <a:buFontTx/>
+                        <a:buChar char="-"/>
+                      </a:pPr>
+                      <a:r>
+                        <a:rPr lang="en-US" dirty="0"/>
+                        <a:t>Self find</a:t>
+                      </a:r>
+                    </a:p>
+                    <a:p>
+                      <a:pPr marL="285750" indent="-285750" algn="l">
+                        <a:buFontTx/>
+                        <a:buChar char="-"/>
+                      </a:pPr>
+                      <a:r>
+                        <a:rPr lang="en-US" dirty="0"/>
+                        <a:t>Self all</a:t>
+                      </a:r>
+                    </a:p>
+                    <a:p>
+                      <a:pPr marL="285750" indent="-285750" algn="l">
+                        <a:buFontTx/>
+                        <a:buChar char="-"/>
+                      </a:pPr>
+                      <a:r>
+                        <a:rPr lang="en-US" dirty="0"/>
+                        <a:t>Self map items</a:t>
+                      </a:r>
+                    </a:p>
+                    <a:p>
+                      <a:pPr marL="285750" indent="-285750" algn="l">
+                        <a:buFontTx/>
+                        <a:buChar char="-"/>
+                      </a:pPr>
+                      <a:r>
+                        <a:rPr lang="en-US" dirty="0"/>
+                        <a:t>delete</a:t>
+                      </a:r>
+                    </a:p>
+                    <a:p>
+                      <a:pPr marL="285750" indent="-285750" algn="l">
+                        <a:buFontTx/>
+                        <a:buChar char="-"/>
+                      </a:pPr>
+                      <a:endParaRPr lang="en-US" dirty="0"/>
+                    </a:p>
+                  </a:txBody>
+                  <a:tcPr/>
+                </a:tc>
+                <a:extLst>
+                  <a:ext uri="{0D108BD9-81ED-4DB2-BD59-A6C34878D82A}">
+                    <a16:rowId xmlns:a16="http://schemas.microsoft.com/office/drawing/2014/main" val="2112490845"/>
+                  </a:ext>
+                </a:extLst>
+              </a:tr>
+            </a:tbl>
+          </a:graphicData>
+        </a:graphic>
+      </p:graphicFrame>
+    </p:spTree>
+    <p:extLst>
+      <p:ext uri="{BB962C8B-B14F-4D97-AF65-F5344CB8AC3E}">
+        <p14:creationId xmlns:p14="http://schemas.microsoft.com/office/powerpoint/2010/main" val="1259943449"/>
+      </p:ext>
+    </p:extLst>
+  </p:cSld>
+  <p:clrMapOvr>
+    <a:masterClrMapping/>
+  </p:clrMapOvr>
+</p:sld>
+</file>
+
+<file path=ppt/slides/slide13.xml><?xml version="1.0" encoding="utf-8"?>
 <p:sld xmlns:a="http://schemas.openxmlformats.org/drawingml/2006/main" xmlns:r="http://schemas.openxmlformats.org/officeDocument/2006/relationships" xmlns:p="http://schemas.openxmlformats.org/presentationml/2006/main">
   <p:cSld>
     <p:spTree>
@@ -5941,7 +6278,7 @@
 </p:sld>
 </file>
 
-<file path=ppt/slides/slide13.xml><?xml version="1.0" encoding="utf-8"?>
+<file path=ppt/slides/slide14.xml><?xml version="1.0" encoding="utf-8"?>
 <p:sld xmlns:a="http://schemas.openxmlformats.org/drawingml/2006/main" xmlns:r="http://schemas.openxmlformats.org/officeDocument/2006/relationships" xmlns:p="http://schemas.openxmlformats.org/presentationml/2006/main">
   <p:cSld>
     <p:spTree>
@@ -6579,7 +6916,7 @@
 </p:sld>
 </file>
 
-<file path=ppt/slides/slide14.xml><?xml version="1.0" encoding="utf-8"?>
+<file path=ppt/slides/slide15.xml><?xml version="1.0" encoding="utf-8"?>
 <p:sld xmlns:a="http://schemas.openxmlformats.org/drawingml/2006/main" xmlns:r="http://schemas.openxmlformats.org/officeDocument/2006/relationships" xmlns:p="http://schemas.openxmlformats.org/presentationml/2006/main">
   <p:cSld>
     <p:spTree>
@@ -6627,13 +6964,8 @@
             <a:pPr algn="ctr"/>
             <a:r>
               <a:rPr lang="en-US" sz="2800" b="1" dirty="0"/>
-              <a:t>Function rationale – Page 2 - </a:t>
+              <a:t>Function rationale – Page 2 – Merchants/Budgets</a:t>
             </a:r>
-            <a:r>
-              <a:rPr lang="en-US" sz="2800" b="1" dirty="0" err="1"/>
-              <a:t>Merchnats</a:t>
-            </a:r>
-            <a:endParaRPr lang="en-US" sz="2800" b="1" dirty="0"/>
           </a:p>
         </p:txBody>
       </p:sp>
@@ -6999,6 +7331,234 @@
           </a:graphicData>
         </a:graphic>
       </p:graphicFrame>
+      <p:graphicFrame>
+        <p:nvGraphicFramePr>
+          <p:cNvPr id="5" name="Table 4">
+            <a:extLst>
+              <a:ext uri="{FF2B5EF4-FFF2-40B4-BE49-F238E27FC236}">
+                <a16:creationId xmlns:a16="http://schemas.microsoft.com/office/drawing/2014/main" id="{BBAC984F-A31A-054B-8FE0-1D065A6C16C4}"/>
+              </a:ext>
+            </a:extLst>
+          </p:cNvPr>
+          <p:cNvGraphicFramePr>
+            <a:graphicFrameLocks noGrp="1"/>
+          </p:cNvGraphicFramePr>
+          <p:nvPr>
+            <p:extLst>
+              <p:ext uri="{D42A27DB-BD31-4B8C-83A1-F6EECF244321}">
+                <p14:modId xmlns:p14="http://schemas.microsoft.com/office/powerpoint/2010/main" val="3217744030"/>
+              </p:ext>
+            </p:extLst>
+          </p:nvPr>
+        </p:nvGraphicFramePr>
+        <p:xfrm>
+          <a:off x="85165" y="4648499"/>
+          <a:ext cx="12021670" cy="1285240"/>
+        </p:xfrm>
+        <a:graphic>
+          <a:graphicData uri="http://schemas.openxmlformats.org/drawingml/2006/table">
+            <a:tbl>
+              <a:tblPr firstRow="1" bandRow="1">
+                <a:tableStyleId>{5940675A-B579-460E-94D1-54222C63F5DA}</a:tableStyleId>
+              </a:tblPr>
+              <a:tblGrid>
+                <a:gridCol w="1259541">
+                  <a:extLst>
+                    <a:ext uri="{9D8B030D-6E8A-4147-A177-3AD203B41FA5}">
+                      <a16:colId xmlns:a16="http://schemas.microsoft.com/office/drawing/2014/main" val="3310124708"/>
+                    </a:ext>
+                  </a:extLst>
+                </a:gridCol>
+                <a:gridCol w="1761565">
+                  <a:extLst>
+                    <a:ext uri="{9D8B030D-6E8A-4147-A177-3AD203B41FA5}">
+                      <a16:colId xmlns:a16="http://schemas.microsoft.com/office/drawing/2014/main" val="1695059105"/>
+                    </a:ext>
+                  </a:extLst>
+                </a:gridCol>
+                <a:gridCol w="3482788">
+                  <a:extLst>
+                    <a:ext uri="{9D8B030D-6E8A-4147-A177-3AD203B41FA5}">
+                      <a16:colId xmlns:a16="http://schemas.microsoft.com/office/drawing/2014/main" val="2644020309"/>
+                    </a:ext>
+                  </a:extLst>
+                </a:gridCol>
+                <a:gridCol w="3113442">
+                  <a:extLst>
+                    <a:ext uri="{9D8B030D-6E8A-4147-A177-3AD203B41FA5}">
+                      <a16:colId xmlns:a16="http://schemas.microsoft.com/office/drawing/2014/main" val="3698080099"/>
+                    </a:ext>
+                  </a:extLst>
+                </a:gridCol>
+                <a:gridCol w="2404334">
+                  <a:extLst>
+                    <a:ext uri="{9D8B030D-6E8A-4147-A177-3AD203B41FA5}">
+                      <a16:colId xmlns:a16="http://schemas.microsoft.com/office/drawing/2014/main" val="358479963"/>
+                    </a:ext>
+                  </a:extLst>
+                </a:gridCol>
+              </a:tblGrid>
+              <a:tr h="370840">
+                <a:tc>
+                  <a:txBody>
+                    <a:bodyPr/>
+                    <a:lstStyle/>
+                    <a:p>
+                      <a:pPr algn="ctr"/>
+                      <a:r>
+                        <a:rPr lang="en-US" b="1" dirty="0"/>
+                        <a:t>Class</a:t>
+                      </a:r>
+                    </a:p>
+                  </a:txBody>
+                  <a:tcPr/>
+                </a:tc>
+                <a:tc>
+                  <a:txBody>
+                    <a:bodyPr/>
+                    <a:lstStyle/>
+                    <a:p>
+                      <a:pPr algn="ctr"/>
+                      <a:r>
+                        <a:rPr lang="en-US" b="1" dirty="0"/>
+                        <a:t>Function Name</a:t>
+                      </a:r>
+                    </a:p>
+                  </a:txBody>
+                  <a:tcPr/>
+                </a:tc>
+                <a:tc>
+                  <a:txBody>
+                    <a:bodyPr/>
+                    <a:lstStyle/>
+                    <a:p>
+                      <a:pPr algn="ctr"/>
+                      <a:r>
+                        <a:rPr lang="en-US" b="1" dirty="0"/>
+                        <a:t>Why?</a:t>
+                      </a:r>
+                    </a:p>
+                  </a:txBody>
+                  <a:tcPr/>
+                </a:tc>
+                <a:tc>
+                  <a:txBody>
+                    <a:bodyPr/>
+                    <a:lstStyle/>
+                    <a:p>
+                      <a:pPr algn="ctr"/>
+                      <a:r>
+                        <a:rPr lang="en-US" b="1" dirty="0"/>
+                        <a:t>How?</a:t>
+                      </a:r>
+                    </a:p>
+                  </a:txBody>
+                  <a:tcPr/>
+                </a:tc>
+                <a:tc>
+                  <a:txBody>
+                    <a:bodyPr/>
+                    <a:lstStyle/>
+                    <a:p>
+                      <a:pPr algn="ctr"/>
+                      <a:r>
+                        <a:rPr lang="en-US" b="1" dirty="0"/>
+                        <a:t>Returning</a:t>
+                      </a:r>
+                    </a:p>
+                  </a:txBody>
+                  <a:tcPr/>
+                </a:tc>
+                <a:extLst>
+                  <a:ext uri="{0D108BD9-81ED-4DB2-BD59-A6C34878D82A}">
+                    <a16:rowId xmlns:a16="http://schemas.microsoft.com/office/drawing/2014/main" val="4165366467"/>
+                  </a:ext>
+                </a:extLst>
+              </a:tr>
+              <a:tr h="370840">
+                <a:tc>
+                  <a:txBody>
+                    <a:bodyPr/>
+                    <a:lstStyle/>
+                    <a:p>
+                      <a:r>
+                        <a:rPr lang="en-US" dirty="0"/>
+                        <a:t>Budget</a:t>
+                      </a:r>
+                    </a:p>
+                  </a:txBody>
+                  <a:tcPr anchor="ctr"/>
+                </a:tc>
+                <a:tc>
+                  <a:txBody>
+                    <a:bodyPr/>
+                    <a:lstStyle/>
+                    <a:p>
+                      <a:r>
+                        <a:rPr lang="en-US" b="0" dirty="0"/>
+                        <a:t>Budget Remaining</a:t>
+                      </a:r>
+                      <a:endParaRPr lang="en-US" dirty="0"/>
+                    </a:p>
+                  </a:txBody>
+                  <a:tcPr anchor="ctr"/>
+                </a:tc>
+                <a:tc>
+                  <a:txBody>
+                    <a:bodyPr/>
+                    <a:lstStyle/>
+                    <a:p>
+                      <a:r>
+                        <a:rPr lang="en-US" dirty="0"/>
+                        <a:t>Users will need to see how much is left in the budget after each transaction</a:t>
+                      </a:r>
+                    </a:p>
+                  </a:txBody>
+                  <a:tcPr anchor="ctr"/>
+                </a:tc>
+                <a:tc>
+                  <a:txBody>
+                    <a:bodyPr/>
+                    <a:lstStyle/>
+                    <a:p>
+                      <a:r>
+                        <a:rPr lang="en-US" dirty="0"/>
+                        <a:t>Select all transaction id’s </a:t>
+                      </a:r>
+                    </a:p>
+                    <a:p>
+                      <a:r>
+                        <a:rPr lang="en-US" dirty="0" err="1"/>
+                        <a:t>Budget_amount</a:t>
+                      </a:r>
+                      <a:r>
+                        <a:rPr lang="en-US" dirty="0"/>
+                        <a:t> </a:t>
+                      </a:r>
+                    </a:p>
+                  </a:txBody>
+                  <a:tcPr anchor="ctr"/>
+                </a:tc>
+                <a:tc>
+                  <a:txBody>
+                    <a:bodyPr/>
+                    <a:lstStyle/>
+                    <a:p>
+                      <a:endParaRPr lang="en-US" dirty="0"/>
+                    </a:p>
+                  </a:txBody>
+                  <a:tcPr anchor="ctr"/>
+                </a:tc>
+                <a:extLst>
+                  <a:ext uri="{0D108BD9-81ED-4DB2-BD59-A6C34878D82A}">
+                    <a16:rowId xmlns:a16="http://schemas.microsoft.com/office/drawing/2014/main" val="1323884526"/>
+                  </a:ext>
+                </a:extLst>
+              </a:tr>
+            </a:tbl>
+          </a:graphicData>
+        </a:graphic>
+      </p:graphicFrame>
     </p:spTree>
     <p:extLst>
       <p:ext uri="{BB962C8B-B14F-4D97-AF65-F5344CB8AC3E}">
@@ -7012,7 +7572,7 @@
 </p:sld>
 </file>
 
-<file path=ppt/slides/slide15.xml><?xml version="1.0" encoding="utf-8"?>
+<file path=ppt/slides/slide16.xml><?xml version="1.0" encoding="utf-8"?>
 <p:sld xmlns:a="http://schemas.openxmlformats.org/drawingml/2006/main" xmlns:r="http://schemas.openxmlformats.org/officeDocument/2006/relationships" xmlns:p="http://schemas.openxmlformats.org/presentationml/2006/main">
   <p:cSld>
     <p:spTree>
@@ -7833,7 +8393,7 @@
 </p:sld>
 </file>
 
-<file path=ppt/slides/slide16.xml><?xml version="1.0" encoding="utf-8"?>
+<file path=ppt/slides/slide17.xml><?xml version="1.0" encoding="utf-8"?>
 <p:sld xmlns:a="http://schemas.openxmlformats.org/drawingml/2006/main" xmlns:r="http://schemas.openxmlformats.org/officeDocument/2006/relationships" xmlns:p="http://schemas.openxmlformats.org/presentationml/2006/main">
   <p:cSld>
     <p:spTree>
@@ -8550,10 +9110,9 @@
                     <a:lstStyle/>
                     <a:p>
                       <a:r>
-                        <a:rPr lang="en-US"/>
+                        <a:rPr lang="en-US" dirty="0"/>
                         <a:t>Time now</a:t>
                       </a:r>
-                      <a:endParaRPr lang="en-US" dirty="0"/>
                     </a:p>
                   </a:txBody>
                   <a:tcPr/>
@@ -8581,7 +9140,7 @@
 </p:sld>
 </file>
 
-<file path=ppt/slides/slide17.xml><?xml version="1.0" encoding="utf-8"?>
+<file path=ppt/slides/slide18.xml><?xml version="1.0" encoding="utf-8"?>
 <p:sld xmlns:a="http://schemas.openxmlformats.org/drawingml/2006/main" xmlns:r="http://schemas.openxmlformats.org/officeDocument/2006/relationships" xmlns:p="http://schemas.openxmlformats.org/presentationml/2006/main">
   <p:cSld>
     <p:spTree>
@@ -8603,7 +9162,7 @@
           <p:cNvPr id="2" name="Title 1">
             <a:extLst>
               <a:ext uri="{FF2B5EF4-FFF2-40B4-BE49-F238E27FC236}">
-                <a16:creationId xmlns:a16="http://schemas.microsoft.com/office/drawing/2014/main" id="{D68B12F6-2D39-E846-81AC-2332B628DD2B}"/>
+                <a16:creationId xmlns:a16="http://schemas.microsoft.com/office/drawing/2014/main" id="{76D7CAB5-A4EF-7B43-BD1B-F0A73C0FAF29}"/>
               </a:ext>
             </a:extLst>
           </p:cNvPr>
@@ -8614,24 +9173,679 @@
             <p:ph type="title"/>
           </p:nvPr>
         </p:nvSpPr>
-        <p:spPr/>
+        <p:spPr>
+          <a:xfrm>
+            <a:off x="838200" y="365125"/>
+            <a:ext cx="10515600" cy="266887"/>
+          </a:xfrm>
+        </p:spPr>
         <p:txBody>
-          <a:bodyPr/>
+          <a:bodyPr>
+            <a:normAutofit fontScale="90000"/>
+          </a:bodyPr>
           <a:lstStyle/>
           <a:p>
+            <a:pPr algn="ctr"/>
             <a:r>
-              <a:rPr lang="en-US" dirty="0"/>
-              <a:t>Merchant Class Checklist (Back-end)</a:t>
+              <a:rPr lang="en-US" sz="2800" b="1" dirty="0"/>
+              <a:t>Function rationale – Page 5 Transactions</a:t>
             </a:r>
           </a:p>
         </p:txBody>
       </p:sp>
+      <p:graphicFrame>
+        <p:nvGraphicFramePr>
+          <p:cNvPr id="4" name="Table 3">
+            <a:extLst>
+              <a:ext uri="{FF2B5EF4-FFF2-40B4-BE49-F238E27FC236}">
+                <a16:creationId xmlns:a16="http://schemas.microsoft.com/office/drawing/2014/main" id="{AA02A76F-4B68-E947-809B-4E0F1064ECFE}"/>
+              </a:ext>
+            </a:extLst>
+          </p:cNvPr>
+          <p:cNvGraphicFramePr>
+            <a:graphicFrameLocks noGrp="1"/>
+          </p:cNvGraphicFramePr>
+          <p:nvPr>
+            <p:extLst>
+              <p:ext uri="{D42A27DB-BD31-4B8C-83A1-F6EECF244321}">
+                <p14:modId xmlns:p14="http://schemas.microsoft.com/office/powerpoint/2010/main" val="1788008415"/>
+              </p:ext>
+            </p:extLst>
+          </p:nvPr>
+        </p:nvGraphicFramePr>
+        <p:xfrm>
+          <a:off x="85165" y="765885"/>
+          <a:ext cx="12021670" cy="5877560"/>
+        </p:xfrm>
+        <a:graphic>
+          <a:graphicData uri="http://schemas.openxmlformats.org/drawingml/2006/table">
+            <a:tbl>
+              <a:tblPr firstRow="1" bandRow="1">
+                <a:tableStyleId>{5940675A-B579-460E-94D1-54222C63F5DA}</a:tableStyleId>
+              </a:tblPr>
+              <a:tblGrid>
+                <a:gridCol w="1259541">
+                  <a:extLst>
+                    <a:ext uri="{9D8B030D-6E8A-4147-A177-3AD203B41FA5}">
+                      <a16:colId xmlns:a16="http://schemas.microsoft.com/office/drawing/2014/main" val="3310124708"/>
+                    </a:ext>
+                  </a:extLst>
+                </a:gridCol>
+                <a:gridCol w="1761565">
+                  <a:extLst>
+                    <a:ext uri="{9D8B030D-6E8A-4147-A177-3AD203B41FA5}">
+                      <a16:colId xmlns:a16="http://schemas.microsoft.com/office/drawing/2014/main" val="1695059105"/>
+                    </a:ext>
+                  </a:extLst>
+                </a:gridCol>
+                <a:gridCol w="3482788">
+                  <a:extLst>
+                    <a:ext uri="{9D8B030D-6E8A-4147-A177-3AD203B41FA5}">
+                      <a16:colId xmlns:a16="http://schemas.microsoft.com/office/drawing/2014/main" val="2644020309"/>
+                    </a:ext>
+                  </a:extLst>
+                </a:gridCol>
+                <a:gridCol w="3113442">
+                  <a:extLst>
+                    <a:ext uri="{9D8B030D-6E8A-4147-A177-3AD203B41FA5}">
+                      <a16:colId xmlns:a16="http://schemas.microsoft.com/office/drawing/2014/main" val="3698080099"/>
+                    </a:ext>
+                  </a:extLst>
+                </a:gridCol>
+                <a:gridCol w="2404334">
+                  <a:extLst>
+                    <a:ext uri="{9D8B030D-6E8A-4147-A177-3AD203B41FA5}">
+                      <a16:colId xmlns:a16="http://schemas.microsoft.com/office/drawing/2014/main" val="358479963"/>
+                    </a:ext>
+                  </a:extLst>
+                </a:gridCol>
+              </a:tblGrid>
+              <a:tr h="370840">
+                <a:tc>
+                  <a:txBody>
+                    <a:bodyPr/>
+                    <a:lstStyle/>
+                    <a:p>
+                      <a:pPr algn="ctr"/>
+                      <a:r>
+                        <a:rPr lang="en-US" b="1" dirty="0"/>
+                        <a:t>Class</a:t>
+                      </a:r>
+                    </a:p>
+                  </a:txBody>
+                  <a:tcPr/>
+                </a:tc>
+                <a:tc>
+                  <a:txBody>
+                    <a:bodyPr/>
+                    <a:lstStyle/>
+                    <a:p>
+                      <a:pPr algn="ctr"/>
+                      <a:r>
+                        <a:rPr lang="en-US" b="1" dirty="0"/>
+                        <a:t>Function Name</a:t>
+                      </a:r>
+                    </a:p>
+                  </a:txBody>
+                  <a:tcPr/>
+                </a:tc>
+                <a:tc>
+                  <a:txBody>
+                    <a:bodyPr/>
+                    <a:lstStyle/>
+                    <a:p>
+                      <a:pPr algn="ctr"/>
+                      <a:r>
+                        <a:rPr lang="en-US" b="1" dirty="0"/>
+                        <a:t>Why?</a:t>
+                      </a:r>
+                    </a:p>
+                  </a:txBody>
+                  <a:tcPr/>
+                </a:tc>
+                <a:tc>
+                  <a:txBody>
+                    <a:bodyPr/>
+                    <a:lstStyle/>
+                    <a:p>
+                      <a:pPr algn="ctr"/>
+                      <a:r>
+                        <a:rPr lang="en-US" b="1" dirty="0"/>
+                        <a:t>How?</a:t>
+                      </a:r>
+                    </a:p>
+                  </a:txBody>
+                  <a:tcPr/>
+                </a:tc>
+                <a:tc>
+                  <a:txBody>
+                    <a:bodyPr/>
+                    <a:lstStyle/>
+                    <a:p>
+                      <a:pPr algn="ctr"/>
+                      <a:r>
+                        <a:rPr lang="en-US" b="1" dirty="0"/>
+                        <a:t>Returning</a:t>
+                      </a:r>
+                    </a:p>
+                  </a:txBody>
+                  <a:tcPr/>
+                </a:tc>
+                <a:extLst>
+                  <a:ext uri="{0D108BD9-81ED-4DB2-BD59-A6C34878D82A}">
+                    <a16:rowId xmlns:a16="http://schemas.microsoft.com/office/drawing/2014/main" val="4165366467"/>
+                  </a:ext>
+                </a:extLst>
+              </a:tr>
+              <a:tr h="370840">
+                <a:tc>
+                  <a:txBody>
+                    <a:bodyPr/>
+                    <a:lstStyle/>
+                    <a:p>
+                      <a:pPr marL="0" marR="0" lvl="0" indent="0" algn="l" defTabSz="914400" rtl="0" eaLnBrk="1" fontAlgn="auto" latinLnBrk="0" hangingPunct="1">
+                        <a:lnSpc>
+                          <a:spcPct val="100000"/>
+                        </a:lnSpc>
+                        <a:spcBef>
+                          <a:spcPts val="0"/>
+                        </a:spcBef>
+                        <a:spcAft>
+                          <a:spcPts val="0"/>
+                        </a:spcAft>
+                        <a:buClrTx/>
+                        <a:buSzTx/>
+                        <a:buFontTx/>
+                        <a:buNone/>
+                        <a:tabLst/>
+                        <a:defRPr/>
+                      </a:pPr>
+                      <a:r>
+                        <a:rPr kumimoji="0" lang="en-US" sz="1800" b="0" i="0" u="none" strike="noStrike" kern="1200" cap="none" spc="0" normalizeH="0" baseline="0" noProof="0">
+                          <a:ln>
+                            <a:noFill/>
+                          </a:ln>
+                          <a:solidFill>
+                            <a:prstClr val="black"/>
+                          </a:solidFill>
+                          <a:effectLst/>
+                          <a:uLnTx/>
+                          <a:uFillTx/>
+                          <a:latin typeface="Calibri" panose="020F0502020204030204"/>
+                          <a:ea typeface="+mn-ea"/>
+                          <a:cs typeface="+mn-cs"/>
+                        </a:rPr>
+                        <a:t>Transaction</a:t>
+                      </a:r>
+                      <a:endParaRPr kumimoji="0" lang="en-US" sz="1800" b="0" i="0" u="none" strike="noStrike" kern="1200" cap="none" spc="0" normalizeH="0" baseline="0" noProof="0" dirty="0">
+                        <a:ln>
+                          <a:noFill/>
+                        </a:ln>
+                        <a:solidFill>
+                          <a:prstClr val="black"/>
+                        </a:solidFill>
+                        <a:effectLst/>
+                        <a:uLnTx/>
+                        <a:uFillTx/>
+                        <a:latin typeface="Calibri" panose="020F0502020204030204"/>
+                        <a:ea typeface="+mn-ea"/>
+                        <a:cs typeface="+mn-cs"/>
+                      </a:endParaRPr>
+                    </a:p>
+                  </a:txBody>
+                  <a:tcPr anchor="ctr"/>
+                </a:tc>
+                <a:tc>
+                  <a:txBody>
+                    <a:bodyPr/>
+                    <a:lstStyle/>
+                    <a:p>
+                      <a:r>
+                        <a:rPr lang="en-US" dirty="0"/>
+                        <a:t>Total spent</a:t>
+                      </a:r>
+                    </a:p>
+                  </a:txBody>
+                  <a:tcPr anchor="ctr"/>
+                </a:tc>
+                <a:tc>
+                  <a:txBody>
+                    <a:bodyPr/>
+                    <a:lstStyle/>
+                    <a:p>
+                      <a:r>
+                        <a:rPr lang="en-US" dirty="0"/>
+                        <a:t>User will want to see the cumulative amount spent on all the transactions</a:t>
+                      </a:r>
+                    </a:p>
+                  </a:txBody>
+                  <a:tcPr anchor="ctr"/>
+                </a:tc>
+                <a:tc>
+                  <a:txBody>
+                    <a:bodyPr/>
+                    <a:lstStyle/>
+                    <a:p>
+                      <a:r>
+                        <a:rPr lang="en-US" dirty="0"/>
+                        <a:t>transactions = Select all transactions where id =&lt; current id</a:t>
+                      </a:r>
+                    </a:p>
+                    <a:p>
+                      <a:endParaRPr lang="en-US" dirty="0"/>
+                    </a:p>
+                    <a:p>
+                      <a:r>
+                        <a:rPr lang="en-US" dirty="0"/>
+                        <a:t>Total = 0 </a:t>
+                      </a:r>
+                    </a:p>
+                    <a:p>
+                      <a:r>
+                        <a:rPr lang="en-US" dirty="0"/>
+                        <a:t>each |transaction| in transactions </a:t>
+                      </a:r>
+                    </a:p>
+                    <a:p>
+                      <a:r>
+                        <a:rPr lang="en-US" dirty="0"/>
+                        <a:t>Total += </a:t>
+                      </a:r>
+                      <a:r>
+                        <a:rPr lang="en-US" dirty="0" err="1"/>
+                        <a:t>transaction.amount</a:t>
+                      </a:r>
+                      <a:endParaRPr lang="en-US" dirty="0"/>
+                    </a:p>
+                    <a:p>
+                      <a:endParaRPr lang="en-US" dirty="0"/>
+                    </a:p>
+                    <a:p>
+                      <a:r>
+                        <a:rPr lang="en-US" dirty="0"/>
+                        <a:t>Total should be equal to total spent</a:t>
+                      </a:r>
+                    </a:p>
+                    <a:p>
+                      <a:endParaRPr lang="en-US" dirty="0"/>
+                    </a:p>
+                    <a:p>
+                      <a:endParaRPr lang="en-US" dirty="0"/>
+                    </a:p>
+                  </a:txBody>
+                  <a:tcPr anchor="ctr"/>
+                </a:tc>
+                <a:tc>
+                  <a:txBody>
+                    <a:bodyPr/>
+                    <a:lstStyle/>
+                    <a:p>
+                      <a:endParaRPr lang="en-US" dirty="0"/>
+                    </a:p>
+                  </a:txBody>
+                  <a:tcPr anchor="ctr"/>
+                </a:tc>
+                <a:extLst>
+                  <a:ext uri="{0D108BD9-81ED-4DB2-BD59-A6C34878D82A}">
+                    <a16:rowId xmlns:a16="http://schemas.microsoft.com/office/drawing/2014/main" val="1323884526"/>
+                  </a:ext>
+                </a:extLst>
+              </a:tr>
+              <a:tr h="282986">
+                <a:tc>
+                  <a:txBody>
+                    <a:bodyPr/>
+                    <a:lstStyle/>
+                    <a:p>
+                      <a:pPr marL="0" marR="0" lvl="0" indent="0" algn="l" defTabSz="914400" rtl="0" eaLnBrk="1" fontAlgn="auto" latinLnBrk="0" hangingPunct="1">
+                        <a:lnSpc>
+                          <a:spcPct val="100000"/>
+                        </a:lnSpc>
+                        <a:spcBef>
+                          <a:spcPts val="0"/>
+                        </a:spcBef>
+                        <a:spcAft>
+                          <a:spcPts val="0"/>
+                        </a:spcAft>
+                        <a:buClrTx/>
+                        <a:buSzTx/>
+                        <a:buFontTx/>
+                        <a:buNone/>
+                        <a:tabLst/>
+                        <a:defRPr/>
+                      </a:pPr>
+                      <a:endParaRPr kumimoji="0" lang="en-US" sz="1800" b="0" i="0" u="none" strike="noStrike" kern="1200" cap="none" spc="0" normalizeH="0" baseline="0" noProof="0" dirty="0">
+                        <a:ln>
+                          <a:noFill/>
+                        </a:ln>
+                        <a:solidFill>
+                          <a:prstClr val="black"/>
+                        </a:solidFill>
+                        <a:effectLst/>
+                        <a:uLnTx/>
+                        <a:uFillTx/>
+                        <a:latin typeface="Calibri" panose="020F0502020204030204"/>
+                        <a:ea typeface="+mn-ea"/>
+                        <a:cs typeface="+mn-cs"/>
+                      </a:endParaRPr>
+                    </a:p>
+                  </a:txBody>
+                  <a:tcPr anchor="ctr"/>
+                </a:tc>
+                <a:tc>
+                  <a:txBody>
+                    <a:bodyPr/>
+                    <a:lstStyle/>
+                    <a:p>
+                      <a:endParaRPr lang="en-US" dirty="0"/>
+                    </a:p>
+                  </a:txBody>
+                  <a:tcPr anchor="ctr"/>
+                </a:tc>
+                <a:tc>
+                  <a:txBody>
+                    <a:bodyPr/>
+                    <a:lstStyle/>
+                    <a:p>
+                      <a:endParaRPr lang="en-US" dirty="0"/>
+                    </a:p>
+                  </a:txBody>
+                  <a:tcPr anchor="ctr"/>
+                </a:tc>
+                <a:tc>
+                  <a:txBody>
+                    <a:bodyPr/>
+                    <a:lstStyle/>
+                    <a:p>
+                      <a:endParaRPr lang="en-US" dirty="0"/>
+                    </a:p>
+                  </a:txBody>
+                  <a:tcPr anchor="ctr"/>
+                </a:tc>
+                <a:tc>
+                  <a:txBody>
+                    <a:bodyPr/>
+                    <a:lstStyle/>
+                    <a:p>
+                      <a:endParaRPr lang="en-US" dirty="0"/>
+                    </a:p>
+                  </a:txBody>
+                  <a:tcPr anchor="ctr"/>
+                </a:tc>
+                <a:extLst>
+                  <a:ext uri="{0D108BD9-81ED-4DB2-BD59-A6C34878D82A}">
+                    <a16:rowId xmlns:a16="http://schemas.microsoft.com/office/drawing/2014/main" val="2731388846"/>
+                  </a:ext>
+                </a:extLst>
+              </a:tr>
+              <a:tr h="370840">
+                <a:tc>
+                  <a:txBody>
+                    <a:bodyPr/>
+                    <a:lstStyle/>
+                    <a:p>
+                      <a:endParaRPr lang="en-US" dirty="0"/>
+                    </a:p>
+                  </a:txBody>
+                  <a:tcPr/>
+                </a:tc>
+                <a:tc>
+                  <a:txBody>
+                    <a:bodyPr/>
+                    <a:lstStyle/>
+                    <a:p>
+                      <a:endParaRPr lang="en-US" dirty="0"/>
+                    </a:p>
+                  </a:txBody>
+                  <a:tcPr/>
+                </a:tc>
+                <a:tc>
+                  <a:txBody>
+                    <a:bodyPr/>
+                    <a:lstStyle/>
+                    <a:p>
+                      <a:endParaRPr lang="en-US" dirty="0"/>
+                    </a:p>
+                  </a:txBody>
+                  <a:tcPr/>
+                </a:tc>
+                <a:tc>
+                  <a:txBody>
+                    <a:bodyPr/>
+                    <a:lstStyle/>
+                    <a:p>
+                      <a:endParaRPr lang="en-US" dirty="0"/>
+                    </a:p>
+                  </a:txBody>
+                  <a:tcPr anchor="ctr"/>
+                </a:tc>
+                <a:tc>
+                  <a:txBody>
+                    <a:bodyPr/>
+                    <a:lstStyle/>
+                    <a:p>
+                      <a:endParaRPr lang="en-US" dirty="0"/>
+                    </a:p>
+                  </a:txBody>
+                  <a:tcPr anchor="ctr"/>
+                </a:tc>
+                <a:extLst>
+                  <a:ext uri="{0D108BD9-81ED-4DB2-BD59-A6C34878D82A}">
+                    <a16:rowId xmlns:a16="http://schemas.microsoft.com/office/drawing/2014/main" val="3831984839"/>
+                  </a:ext>
+                </a:extLst>
+              </a:tr>
+              <a:tr h="370840">
+                <a:tc>
+                  <a:txBody>
+                    <a:bodyPr/>
+                    <a:lstStyle/>
+                    <a:p>
+                      <a:endParaRPr lang="en-US" dirty="0"/>
+                    </a:p>
+                  </a:txBody>
+                  <a:tcPr/>
+                </a:tc>
+                <a:tc>
+                  <a:txBody>
+                    <a:bodyPr/>
+                    <a:lstStyle/>
+                    <a:p>
+                      <a:endParaRPr lang="en-US" dirty="0"/>
+                    </a:p>
+                  </a:txBody>
+                  <a:tcPr/>
+                </a:tc>
+                <a:tc>
+                  <a:txBody>
+                    <a:bodyPr/>
+                    <a:lstStyle/>
+                    <a:p>
+                      <a:endParaRPr lang="en-US" dirty="0"/>
+                    </a:p>
+                  </a:txBody>
+                  <a:tcPr/>
+                </a:tc>
+                <a:tc>
+                  <a:txBody>
+                    <a:bodyPr/>
+                    <a:lstStyle/>
+                    <a:p>
+                      <a:endParaRPr lang="en-US" dirty="0"/>
+                    </a:p>
+                  </a:txBody>
+                  <a:tcPr anchor="ctr"/>
+                </a:tc>
+                <a:tc>
+                  <a:txBody>
+                    <a:bodyPr/>
+                    <a:lstStyle/>
+                    <a:p>
+                      <a:endParaRPr lang="en-US" dirty="0"/>
+                    </a:p>
+                  </a:txBody>
+                  <a:tcPr anchor="ctr"/>
+                </a:tc>
+                <a:extLst>
+                  <a:ext uri="{0D108BD9-81ED-4DB2-BD59-A6C34878D82A}">
+                    <a16:rowId xmlns:a16="http://schemas.microsoft.com/office/drawing/2014/main" val="1081334054"/>
+                  </a:ext>
+                </a:extLst>
+              </a:tr>
+              <a:tr h="370840">
+                <a:tc>
+                  <a:txBody>
+                    <a:bodyPr/>
+                    <a:lstStyle/>
+                    <a:p>
+                      <a:endParaRPr lang="en-US" dirty="0"/>
+                    </a:p>
+                  </a:txBody>
+                  <a:tcPr/>
+                </a:tc>
+                <a:tc>
+                  <a:txBody>
+                    <a:bodyPr/>
+                    <a:lstStyle/>
+                    <a:p>
+                      <a:endParaRPr lang="en-US" dirty="0"/>
+                    </a:p>
+                  </a:txBody>
+                  <a:tcPr/>
+                </a:tc>
+                <a:tc>
+                  <a:txBody>
+                    <a:bodyPr/>
+                    <a:lstStyle/>
+                    <a:p>
+                      <a:endParaRPr lang="en-US" dirty="0"/>
+                    </a:p>
+                  </a:txBody>
+                  <a:tcPr/>
+                </a:tc>
+                <a:tc>
+                  <a:txBody>
+                    <a:bodyPr/>
+                    <a:lstStyle/>
+                    <a:p>
+                      <a:endParaRPr lang="en-US" dirty="0"/>
+                    </a:p>
+                  </a:txBody>
+                  <a:tcPr anchor="ctr"/>
+                </a:tc>
+                <a:tc>
+                  <a:txBody>
+                    <a:bodyPr/>
+                    <a:lstStyle/>
+                    <a:p>
+                      <a:endParaRPr lang="en-US" dirty="0"/>
+                    </a:p>
+                  </a:txBody>
+                  <a:tcPr anchor="ctr"/>
+                </a:tc>
+                <a:extLst>
+                  <a:ext uri="{0D108BD9-81ED-4DB2-BD59-A6C34878D82A}">
+                    <a16:rowId xmlns:a16="http://schemas.microsoft.com/office/drawing/2014/main" val="2432464653"/>
+                  </a:ext>
+                </a:extLst>
+              </a:tr>
+              <a:tr h="370840">
+                <a:tc>
+                  <a:txBody>
+                    <a:bodyPr/>
+                    <a:lstStyle/>
+                    <a:p>
+                      <a:endParaRPr lang="en-US" dirty="0"/>
+                    </a:p>
+                  </a:txBody>
+                  <a:tcPr/>
+                </a:tc>
+                <a:tc>
+                  <a:txBody>
+                    <a:bodyPr/>
+                    <a:lstStyle/>
+                    <a:p>
+                      <a:endParaRPr lang="en-US" dirty="0"/>
+                    </a:p>
+                  </a:txBody>
+                  <a:tcPr/>
+                </a:tc>
+                <a:tc>
+                  <a:txBody>
+                    <a:bodyPr/>
+                    <a:lstStyle/>
+                    <a:p>
+                      <a:endParaRPr lang="en-US" dirty="0"/>
+                    </a:p>
+                  </a:txBody>
+                  <a:tcPr/>
+                </a:tc>
+                <a:tc>
+                  <a:txBody>
+                    <a:bodyPr/>
+                    <a:lstStyle/>
+                    <a:p>
+                      <a:endParaRPr lang="en-US" dirty="0"/>
+                    </a:p>
+                  </a:txBody>
+                  <a:tcPr/>
+                </a:tc>
+                <a:tc>
+                  <a:txBody>
+                    <a:bodyPr/>
+                    <a:lstStyle/>
+                    <a:p>
+                      <a:endParaRPr lang="en-US" dirty="0"/>
+                    </a:p>
+                  </a:txBody>
+                  <a:tcPr/>
+                </a:tc>
+                <a:extLst>
+                  <a:ext uri="{0D108BD9-81ED-4DB2-BD59-A6C34878D82A}">
+                    <a16:rowId xmlns:a16="http://schemas.microsoft.com/office/drawing/2014/main" val="366904803"/>
+                  </a:ext>
+                </a:extLst>
+              </a:tr>
+            </a:tbl>
+          </a:graphicData>
+        </a:graphic>
+      </p:graphicFrame>
+    </p:spTree>
+    <p:extLst>
+      <p:ext uri="{BB962C8B-B14F-4D97-AF65-F5344CB8AC3E}">
+        <p14:creationId xmlns:p14="http://schemas.microsoft.com/office/powerpoint/2010/main" val="4276030838"/>
+      </p:ext>
+    </p:extLst>
+  </p:cSld>
+  <p:clrMapOvr>
+    <a:masterClrMapping/>
+  </p:clrMapOvr>
+</p:sld>
+</file>
+
+<file path=ppt/slides/slide19.xml><?xml version="1.0" encoding="utf-8"?>
+<p:sld xmlns:a="http://schemas.openxmlformats.org/drawingml/2006/main" xmlns:r="http://schemas.openxmlformats.org/officeDocument/2006/relationships" xmlns:p="http://schemas.openxmlformats.org/presentationml/2006/main">
+  <p:cSld>
+    <p:spTree>
+      <p:nvGrpSpPr>
+        <p:cNvPr id="1" name=""/>
+        <p:cNvGrpSpPr/>
+        <p:nvPr/>
+      </p:nvGrpSpPr>
+      <p:grpSpPr>
+        <a:xfrm>
+          <a:off x="0" y="0"/>
+          <a:ext cx="0" cy="0"/>
+          <a:chOff x="0" y="0"/>
+          <a:chExt cx="0" cy="0"/>
+        </a:xfrm>
+      </p:grpSpPr>
       <p:sp>
         <p:nvSpPr>
-          <p:cNvPr id="3" name="Content Placeholder 2">
+          <p:cNvPr id="2" name="Title 1">
             <a:extLst>
               <a:ext uri="{FF2B5EF4-FFF2-40B4-BE49-F238E27FC236}">
-                <a16:creationId xmlns:a16="http://schemas.microsoft.com/office/drawing/2014/main" id="{1FC5DA40-2C2D-594D-B150-4D8418E46839}"/>
+                <a16:creationId xmlns:a16="http://schemas.microsoft.com/office/drawing/2014/main" id="{76D7CAB5-A4EF-7B43-BD1B-F0A73C0FAF29}"/>
               </a:ext>
             </a:extLst>
           </p:cNvPr>
@@ -8639,94 +9853,675 @@
             <a:spLocks noGrp="1"/>
           </p:cNvSpPr>
           <p:nvPr>
-            <p:ph idx="1"/>
+            <p:ph type="title"/>
           </p:nvPr>
         </p:nvSpPr>
-        <p:spPr/>
+        <p:spPr>
+          <a:xfrm>
+            <a:off x="838200" y="365125"/>
+            <a:ext cx="10515600" cy="266887"/>
+          </a:xfrm>
+        </p:spPr>
         <p:txBody>
           <a:bodyPr>
-            <a:normAutofit/>
+            <a:normAutofit fontScale="90000"/>
           </a:bodyPr>
           <a:lstStyle/>
           <a:p>
-            <a:pPr marL="0" indent="0">
-              <a:buNone/>
-            </a:pPr>
+            <a:pPr algn="ctr"/>
             <a:r>
-              <a:rPr lang="en-GB" dirty="0"/>
-              <a:t>Build an app that allows a user to track their spending.</a:t>
-            </a:r>
-          </a:p>
-          <a:p>
-            <a:pPr marL="0" indent="0">
-              <a:buNone/>
-            </a:pPr>
-            <a:r>
-              <a:rPr lang="en-GB" b="1" dirty="0"/>
-              <a:t>MVP</a:t>
-            </a:r>
-          </a:p>
-          <a:p>
-            <a:pPr lvl="1"/>
-            <a:r>
-              <a:rPr lang="en-GB" dirty="0"/>
-              <a:t>The app should allow the user to </a:t>
-            </a:r>
-          </a:p>
-          <a:p>
-            <a:pPr lvl="2"/>
-            <a:r>
-              <a:rPr lang="en-GB" strike="sngStrike" dirty="0"/>
-              <a:t>create</a:t>
+              <a:rPr lang="en-US" sz="2800" b="1" dirty="0"/>
+              <a:t>Function rationale – Page  </a:t>
             </a:r>
             <a:r>
-              <a:rPr lang="en-GB" dirty="0"/>
-              <a:t>, </a:t>
+              <a:rPr lang="en-US" sz="2800" b="1" dirty="0" err="1"/>
+              <a:t>budget_Transactions</a:t>
             </a:r>
-          </a:p>
-          <a:p>
-            <a:pPr lvl="2"/>
-            <a:r>
-              <a:rPr lang="en-GB" strike="sngStrike" dirty="0"/>
-              <a:t>edit</a:t>
-            </a:r>
-            <a:r>
-              <a:rPr lang="en-GB" dirty="0"/>
-              <a:t> </a:t>
-            </a:r>
-          </a:p>
-          <a:p>
-            <a:pPr lvl="2"/>
-            <a:r>
-              <a:rPr lang="en-GB" dirty="0"/>
-              <a:t>and </a:t>
-            </a:r>
-            <a:r>
-              <a:rPr lang="en-GB" strike="sngStrike" dirty="0"/>
-              <a:t>delete</a:t>
-            </a:r>
-            <a:r>
-              <a:rPr lang="en-GB" dirty="0"/>
-              <a:t> merchants, e.g. Tesco, Amazon, </a:t>
-            </a:r>
-            <a:r>
-              <a:rPr lang="en-GB" dirty="0" err="1"/>
-              <a:t>ScotRail</a:t>
-            </a:r>
-            <a:endParaRPr lang="en-GB" dirty="0"/>
-          </a:p>
-          <a:p>
-            <a:pPr marL="457200" lvl="1" indent="0">
-              <a:buNone/>
-            </a:pPr>
-            <a:endParaRPr lang="en-GB" dirty="0"/>
+            <a:endParaRPr lang="en-US" sz="2800" b="1" dirty="0"/>
           </a:p>
         </p:txBody>
       </p:sp>
+      <p:graphicFrame>
+        <p:nvGraphicFramePr>
+          <p:cNvPr id="4" name="Table 3">
+            <a:extLst>
+              <a:ext uri="{FF2B5EF4-FFF2-40B4-BE49-F238E27FC236}">
+                <a16:creationId xmlns:a16="http://schemas.microsoft.com/office/drawing/2014/main" id="{AA02A76F-4B68-E947-809B-4E0F1064ECFE}"/>
+              </a:ext>
+            </a:extLst>
+          </p:cNvPr>
+          <p:cNvGraphicFramePr>
+            <a:graphicFrameLocks noGrp="1"/>
+          </p:cNvGraphicFramePr>
+          <p:nvPr>
+            <p:extLst>
+              <p:ext uri="{D42A27DB-BD31-4B8C-83A1-F6EECF244321}">
+                <p14:modId xmlns:p14="http://schemas.microsoft.com/office/powerpoint/2010/main" val="4167481085"/>
+              </p:ext>
+            </p:extLst>
+          </p:nvPr>
+        </p:nvGraphicFramePr>
+        <p:xfrm>
+          <a:off x="85165" y="765885"/>
+          <a:ext cx="12021670" cy="6055360"/>
+        </p:xfrm>
+        <a:graphic>
+          <a:graphicData uri="http://schemas.openxmlformats.org/drawingml/2006/table">
+            <a:tbl>
+              <a:tblPr firstRow="1" bandRow="1">
+                <a:tableStyleId>{5940675A-B579-460E-94D1-54222C63F5DA}</a:tableStyleId>
+              </a:tblPr>
+              <a:tblGrid>
+                <a:gridCol w="1259541">
+                  <a:extLst>
+                    <a:ext uri="{9D8B030D-6E8A-4147-A177-3AD203B41FA5}">
+                      <a16:colId xmlns:a16="http://schemas.microsoft.com/office/drawing/2014/main" val="3310124708"/>
+                    </a:ext>
+                  </a:extLst>
+                </a:gridCol>
+                <a:gridCol w="1761565">
+                  <a:extLst>
+                    <a:ext uri="{9D8B030D-6E8A-4147-A177-3AD203B41FA5}">
+                      <a16:colId xmlns:a16="http://schemas.microsoft.com/office/drawing/2014/main" val="1695059105"/>
+                    </a:ext>
+                  </a:extLst>
+                </a:gridCol>
+                <a:gridCol w="3482788">
+                  <a:extLst>
+                    <a:ext uri="{9D8B030D-6E8A-4147-A177-3AD203B41FA5}">
+                      <a16:colId xmlns:a16="http://schemas.microsoft.com/office/drawing/2014/main" val="2644020309"/>
+                    </a:ext>
+                  </a:extLst>
+                </a:gridCol>
+                <a:gridCol w="3113442">
+                  <a:extLst>
+                    <a:ext uri="{9D8B030D-6E8A-4147-A177-3AD203B41FA5}">
+                      <a16:colId xmlns:a16="http://schemas.microsoft.com/office/drawing/2014/main" val="3698080099"/>
+                    </a:ext>
+                  </a:extLst>
+                </a:gridCol>
+                <a:gridCol w="2404334">
+                  <a:extLst>
+                    <a:ext uri="{9D8B030D-6E8A-4147-A177-3AD203B41FA5}">
+                      <a16:colId xmlns:a16="http://schemas.microsoft.com/office/drawing/2014/main" val="358479963"/>
+                    </a:ext>
+                  </a:extLst>
+                </a:gridCol>
+              </a:tblGrid>
+              <a:tr h="370840">
+                <a:tc>
+                  <a:txBody>
+                    <a:bodyPr/>
+                    <a:lstStyle/>
+                    <a:p>
+                      <a:pPr algn="ctr"/>
+                      <a:r>
+                        <a:rPr lang="en-US" b="1" dirty="0"/>
+                        <a:t>Class</a:t>
+                      </a:r>
+                    </a:p>
+                  </a:txBody>
+                  <a:tcPr/>
+                </a:tc>
+                <a:tc>
+                  <a:txBody>
+                    <a:bodyPr/>
+                    <a:lstStyle/>
+                    <a:p>
+                      <a:pPr algn="ctr"/>
+                      <a:r>
+                        <a:rPr lang="en-US" b="1" dirty="0"/>
+                        <a:t>Function Name</a:t>
+                      </a:r>
+                    </a:p>
+                  </a:txBody>
+                  <a:tcPr/>
+                </a:tc>
+                <a:tc>
+                  <a:txBody>
+                    <a:bodyPr/>
+                    <a:lstStyle/>
+                    <a:p>
+                      <a:pPr algn="ctr"/>
+                      <a:r>
+                        <a:rPr lang="en-US" b="1" dirty="0"/>
+                        <a:t>Why?</a:t>
+                      </a:r>
+                    </a:p>
+                  </a:txBody>
+                  <a:tcPr/>
+                </a:tc>
+                <a:tc>
+                  <a:txBody>
+                    <a:bodyPr/>
+                    <a:lstStyle/>
+                    <a:p>
+                      <a:pPr algn="ctr"/>
+                      <a:r>
+                        <a:rPr lang="en-US" b="1" dirty="0"/>
+                        <a:t>How?</a:t>
+                      </a:r>
+                    </a:p>
+                  </a:txBody>
+                  <a:tcPr/>
+                </a:tc>
+                <a:tc>
+                  <a:txBody>
+                    <a:bodyPr/>
+                    <a:lstStyle/>
+                    <a:p>
+                      <a:pPr algn="ctr"/>
+                      <a:r>
+                        <a:rPr lang="en-US" b="1" dirty="0"/>
+                        <a:t>Returning</a:t>
+                      </a:r>
+                    </a:p>
+                  </a:txBody>
+                  <a:tcPr/>
+                </a:tc>
+                <a:extLst>
+                  <a:ext uri="{0D108BD9-81ED-4DB2-BD59-A6C34878D82A}">
+                    <a16:rowId xmlns:a16="http://schemas.microsoft.com/office/drawing/2014/main" val="4165366467"/>
+                  </a:ext>
+                </a:extLst>
+              </a:tr>
+              <a:tr h="370840">
+                <a:tc>
+                  <a:txBody>
+                    <a:bodyPr/>
+                    <a:lstStyle/>
+                    <a:p>
+                      <a:pPr marL="0" marR="0" lvl="0" indent="0" algn="l" defTabSz="914400" rtl="0" eaLnBrk="1" fontAlgn="auto" latinLnBrk="0" hangingPunct="1">
+                        <a:lnSpc>
+                          <a:spcPct val="100000"/>
+                        </a:lnSpc>
+                        <a:spcBef>
+                          <a:spcPts val="0"/>
+                        </a:spcBef>
+                        <a:spcAft>
+                          <a:spcPts val="0"/>
+                        </a:spcAft>
+                        <a:buClrTx/>
+                        <a:buSzTx/>
+                        <a:buFontTx/>
+                        <a:buNone/>
+                        <a:tabLst/>
+                        <a:defRPr/>
+                      </a:pPr>
+                      <a:r>
+                        <a:rPr kumimoji="0" lang="en-US" sz="1800" b="0" i="0" u="none" strike="noStrike" kern="1200" cap="none" spc="0" normalizeH="0" baseline="0" noProof="0" dirty="0" err="1">
+                          <a:ln>
+                            <a:noFill/>
+                          </a:ln>
+                          <a:solidFill>
+                            <a:prstClr val="black"/>
+                          </a:solidFill>
+                          <a:effectLst/>
+                          <a:uLnTx/>
+                          <a:uFillTx/>
+                          <a:latin typeface="Calibri" panose="020F0502020204030204"/>
+                          <a:ea typeface="+mn-ea"/>
+                          <a:cs typeface="+mn-cs"/>
+                        </a:rPr>
+                        <a:t>Budget_transaction</a:t>
+                      </a:r>
+                      <a:endParaRPr kumimoji="0" lang="en-US" sz="1800" b="0" i="0" u="none" strike="noStrike" kern="1200" cap="none" spc="0" normalizeH="0" baseline="0" noProof="0" dirty="0">
+                        <a:ln>
+                          <a:noFill/>
+                        </a:ln>
+                        <a:solidFill>
+                          <a:prstClr val="black"/>
+                        </a:solidFill>
+                        <a:effectLst/>
+                        <a:uLnTx/>
+                        <a:uFillTx/>
+                        <a:latin typeface="Calibri" panose="020F0502020204030204"/>
+                        <a:ea typeface="+mn-ea"/>
+                        <a:cs typeface="+mn-cs"/>
+                      </a:endParaRPr>
+                    </a:p>
+                  </a:txBody>
+                  <a:tcPr anchor="ctr"/>
+                </a:tc>
+                <a:tc>
+                  <a:txBody>
+                    <a:bodyPr/>
+                    <a:lstStyle/>
+                    <a:p>
+                      <a:r>
+                        <a:rPr lang="en-US" dirty="0"/>
+                        <a:t>Total spent</a:t>
+                      </a:r>
+                    </a:p>
+                  </a:txBody>
+                  <a:tcPr anchor="ctr"/>
+                </a:tc>
+                <a:tc>
+                  <a:txBody>
+                    <a:bodyPr/>
+                    <a:lstStyle/>
+                    <a:p>
+                      <a:r>
+                        <a:rPr lang="en-US" dirty="0"/>
+                        <a:t>User will want to see the cumulative amount spent on all the transactions</a:t>
+                      </a:r>
+                    </a:p>
+                  </a:txBody>
+                  <a:tcPr anchor="ctr"/>
+                </a:tc>
+                <a:tc>
+                  <a:txBody>
+                    <a:bodyPr/>
+                    <a:lstStyle/>
+                    <a:p>
+                      <a:r>
+                        <a:rPr lang="en-US" dirty="0"/>
+                        <a:t>transactions = Select all from </a:t>
+                      </a:r>
+                      <a:r>
+                        <a:rPr lang="en-US" dirty="0" err="1"/>
+                        <a:t>budget_transactions</a:t>
+                      </a:r>
+                      <a:r>
+                        <a:rPr lang="en-US" dirty="0"/>
+                        <a:t> where id =&lt; current id</a:t>
+                      </a:r>
+                    </a:p>
+                    <a:p>
+                      <a:endParaRPr lang="en-US" dirty="0"/>
+                    </a:p>
+                    <a:p>
+                      <a:r>
+                        <a:rPr lang="en-US" dirty="0"/>
+                        <a:t>Total = 0 </a:t>
+                      </a:r>
+                    </a:p>
+                    <a:p>
+                      <a:r>
+                        <a:rPr lang="en-US" dirty="0"/>
+                        <a:t>each |transaction| in transactions </a:t>
+                      </a:r>
+                    </a:p>
+                    <a:p>
+                      <a:r>
+                        <a:rPr lang="en-US" dirty="0"/>
+                        <a:t>Total += </a:t>
+                      </a:r>
+                      <a:r>
+                        <a:rPr lang="en-US" dirty="0" err="1"/>
+                        <a:t>transaction.amount</a:t>
+                      </a:r>
+                      <a:endParaRPr lang="en-US" dirty="0"/>
+                    </a:p>
+                    <a:p>
+                      <a:endParaRPr lang="en-US" dirty="0"/>
+                    </a:p>
+                    <a:p>
+                      <a:r>
+                        <a:rPr lang="en-US" dirty="0"/>
+                        <a:t>Total should be equal to total spent</a:t>
+                      </a:r>
+                    </a:p>
+                    <a:p>
+                      <a:endParaRPr lang="en-US" dirty="0"/>
+                    </a:p>
+                    <a:p>
+                      <a:endParaRPr lang="en-US" dirty="0"/>
+                    </a:p>
+                  </a:txBody>
+                  <a:tcPr anchor="ctr"/>
+                </a:tc>
+                <a:tc>
+                  <a:txBody>
+                    <a:bodyPr/>
+                    <a:lstStyle/>
+                    <a:p>
+                      <a:r>
+                        <a:rPr lang="en-US" dirty="0"/>
+                        <a:t>Total (NUMERIC)</a:t>
+                      </a:r>
+                    </a:p>
+                  </a:txBody>
+                  <a:tcPr anchor="ctr"/>
+                </a:tc>
+                <a:extLst>
+                  <a:ext uri="{0D108BD9-81ED-4DB2-BD59-A6C34878D82A}">
+                    <a16:rowId xmlns:a16="http://schemas.microsoft.com/office/drawing/2014/main" val="1323884526"/>
+                  </a:ext>
+                </a:extLst>
+              </a:tr>
+              <a:tr h="282986">
+                <a:tc>
+                  <a:txBody>
+                    <a:bodyPr/>
+                    <a:lstStyle/>
+                    <a:p>
+                      <a:pPr marL="0" marR="0" lvl="0" indent="0" algn="l" defTabSz="914400" rtl="0" eaLnBrk="1" fontAlgn="auto" latinLnBrk="0" hangingPunct="1">
+                        <a:lnSpc>
+                          <a:spcPct val="100000"/>
+                        </a:lnSpc>
+                        <a:spcBef>
+                          <a:spcPts val="0"/>
+                        </a:spcBef>
+                        <a:spcAft>
+                          <a:spcPts val="0"/>
+                        </a:spcAft>
+                        <a:buClrTx/>
+                        <a:buSzTx/>
+                        <a:buFontTx/>
+                        <a:buNone/>
+                        <a:tabLst/>
+                        <a:defRPr/>
+                      </a:pPr>
+                      <a:r>
+                        <a:rPr kumimoji="0" lang="en-US" sz="1800" b="0" i="0" u="none" strike="noStrike" kern="1200" cap="none" spc="0" normalizeH="0" baseline="0" noProof="0" dirty="0" err="1">
+                          <a:ln>
+                            <a:noFill/>
+                          </a:ln>
+                          <a:solidFill>
+                            <a:prstClr val="black"/>
+                          </a:solidFill>
+                          <a:effectLst/>
+                          <a:uLnTx/>
+                          <a:uFillTx/>
+                          <a:latin typeface="+mn-lt"/>
+                          <a:ea typeface="+mn-ea"/>
+                          <a:cs typeface="+mn-cs"/>
+                        </a:rPr>
+                        <a:t>Budget_transaction</a:t>
+                      </a:r>
+                      <a:endParaRPr kumimoji="0" lang="en-US" sz="1800" b="0" i="0" u="none" strike="noStrike" kern="1200" cap="none" spc="0" normalizeH="0" baseline="0" noProof="0" dirty="0">
+                        <a:ln>
+                          <a:noFill/>
+                        </a:ln>
+                        <a:solidFill>
+                          <a:prstClr val="black"/>
+                        </a:solidFill>
+                        <a:effectLst/>
+                        <a:uLnTx/>
+                        <a:uFillTx/>
+                        <a:latin typeface="+mn-lt"/>
+                        <a:ea typeface="+mn-ea"/>
+                        <a:cs typeface="+mn-cs"/>
+                      </a:endParaRPr>
+                    </a:p>
+                    <a:p>
+                      <a:pPr marL="0" marR="0" lvl="0" indent="0" algn="l" defTabSz="914400" rtl="0" eaLnBrk="1" fontAlgn="auto" latinLnBrk="0" hangingPunct="1">
+                        <a:lnSpc>
+                          <a:spcPct val="100000"/>
+                        </a:lnSpc>
+                        <a:spcBef>
+                          <a:spcPts val="0"/>
+                        </a:spcBef>
+                        <a:spcAft>
+                          <a:spcPts val="0"/>
+                        </a:spcAft>
+                        <a:buClrTx/>
+                        <a:buSzTx/>
+                        <a:buFontTx/>
+                        <a:buNone/>
+                        <a:tabLst/>
+                        <a:defRPr/>
+                      </a:pPr>
+                      <a:endParaRPr kumimoji="0" lang="en-US" sz="1800" b="0" i="0" u="none" strike="noStrike" kern="1200" cap="none" spc="0" normalizeH="0" baseline="0" noProof="0" dirty="0">
+                        <a:ln>
+                          <a:noFill/>
+                        </a:ln>
+                        <a:solidFill>
+                          <a:prstClr val="black"/>
+                        </a:solidFill>
+                        <a:effectLst/>
+                        <a:uLnTx/>
+                        <a:uFillTx/>
+                        <a:latin typeface="Calibri" panose="020F0502020204030204"/>
+                        <a:ea typeface="+mn-ea"/>
+                        <a:cs typeface="+mn-cs"/>
+                      </a:endParaRPr>
+                    </a:p>
+                  </a:txBody>
+                  <a:tcPr anchor="ctr"/>
+                </a:tc>
+                <a:tc>
+                  <a:txBody>
+                    <a:bodyPr/>
+                    <a:lstStyle/>
+                    <a:p>
+                      <a:r>
+                        <a:rPr lang="en-US" dirty="0"/>
+                        <a:t>Remaining budget</a:t>
+                      </a:r>
+                    </a:p>
+                  </a:txBody>
+                  <a:tcPr anchor="ctr"/>
+                </a:tc>
+                <a:tc>
+                  <a:txBody>
+                    <a:bodyPr/>
+                    <a:lstStyle/>
+                    <a:p>
+                      <a:r>
+                        <a:rPr lang="en-US" dirty="0"/>
+                        <a:t>Users will want to know how much is left in a budget</a:t>
+                      </a:r>
+                    </a:p>
+                  </a:txBody>
+                  <a:tcPr anchor="ctr"/>
+                </a:tc>
+                <a:tc>
+                  <a:txBody>
+                    <a:bodyPr/>
+                    <a:lstStyle/>
+                    <a:p>
+                      <a:r>
+                        <a:rPr lang="en-US" dirty="0" err="1"/>
+                        <a:t>Budget_amount</a:t>
+                      </a:r>
+                      <a:r>
+                        <a:rPr lang="en-US" dirty="0"/>
+                        <a:t> minus total spent</a:t>
+                      </a:r>
+                    </a:p>
+                  </a:txBody>
+                  <a:tcPr anchor="ctr"/>
+                </a:tc>
+                <a:tc>
+                  <a:txBody>
+                    <a:bodyPr/>
+                    <a:lstStyle/>
+                    <a:p>
+                      <a:r>
+                        <a:rPr lang="en-US" dirty="0"/>
+                        <a:t>Remaining budget (NUMERIC)</a:t>
+                      </a:r>
+                    </a:p>
+                  </a:txBody>
+                  <a:tcPr anchor="ctr"/>
+                </a:tc>
+                <a:extLst>
+                  <a:ext uri="{0D108BD9-81ED-4DB2-BD59-A6C34878D82A}">
+                    <a16:rowId xmlns:a16="http://schemas.microsoft.com/office/drawing/2014/main" val="2731388846"/>
+                  </a:ext>
+                </a:extLst>
+              </a:tr>
+              <a:tr h="370840">
+                <a:tc>
+                  <a:txBody>
+                    <a:bodyPr/>
+                    <a:lstStyle/>
+                    <a:p>
+                      <a:endParaRPr lang="en-US" dirty="0"/>
+                    </a:p>
+                  </a:txBody>
+                  <a:tcPr/>
+                </a:tc>
+                <a:tc>
+                  <a:txBody>
+                    <a:bodyPr/>
+                    <a:lstStyle/>
+                    <a:p>
+                      <a:endParaRPr lang="en-US" dirty="0"/>
+                    </a:p>
+                  </a:txBody>
+                  <a:tcPr/>
+                </a:tc>
+                <a:tc>
+                  <a:txBody>
+                    <a:bodyPr/>
+                    <a:lstStyle/>
+                    <a:p>
+                      <a:endParaRPr lang="en-US" dirty="0"/>
+                    </a:p>
+                  </a:txBody>
+                  <a:tcPr/>
+                </a:tc>
+                <a:tc>
+                  <a:txBody>
+                    <a:bodyPr/>
+                    <a:lstStyle/>
+                    <a:p>
+                      <a:endParaRPr lang="en-US" dirty="0"/>
+                    </a:p>
+                  </a:txBody>
+                  <a:tcPr anchor="ctr"/>
+                </a:tc>
+                <a:tc>
+                  <a:txBody>
+                    <a:bodyPr/>
+                    <a:lstStyle/>
+                    <a:p>
+                      <a:endParaRPr lang="en-US" dirty="0"/>
+                    </a:p>
+                  </a:txBody>
+                  <a:tcPr anchor="ctr"/>
+                </a:tc>
+                <a:extLst>
+                  <a:ext uri="{0D108BD9-81ED-4DB2-BD59-A6C34878D82A}">
+                    <a16:rowId xmlns:a16="http://schemas.microsoft.com/office/drawing/2014/main" val="3831984839"/>
+                  </a:ext>
+                </a:extLst>
+              </a:tr>
+              <a:tr h="370840">
+                <a:tc>
+                  <a:txBody>
+                    <a:bodyPr/>
+                    <a:lstStyle/>
+                    <a:p>
+                      <a:endParaRPr lang="en-US" dirty="0"/>
+                    </a:p>
+                  </a:txBody>
+                  <a:tcPr/>
+                </a:tc>
+                <a:tc>
+                  <a:txBody>
+                    <a:bodyPr/>
+                    <a:lstStyle/>
+                    <a:p>
+                      <a:endParaRPr lang="en-US" dirty="0"/>
+                    </a:p>
+                  </a:txBody>
+                  <a:tcPr/>
+                </a:tc>
+                <a:tc>
+                  <a:txBody>
+                    <a:bodyPr/>
+                    <a:lstStyle/>
+                    <a:p>
+                      <a:endParaRPr lang="en-US" dirty="0"/>
+                    </a:p>
+                  </a:txBody>
+                  <a:tcPr/>
+                </a:tc>
+                <a:tc>
+                  <a:txBody>
+                    <a:bodyPr/>
+                    <a:lstStyle/>
+                    <a:p>
+                      <a:endParaRPr lang="en-US" dirty="0"/>
+                    </a:p>
+                  </a:txBody>
+                  <a:tcPr anchor="ctr"/>
+                </a:tc>
+                <a:tc>
+                  <a:txBody>
+                    <a:bodyPr/>
+                    <a:lstStyle/>
+                    <a:p>
+                      <a:endParaRPr lang="en-US" dirty="0"/>
+                    </a:p>
+                  </a:txBody>
+                  <a:tcPr anchor="ctr"/>
+                </a:tc>
+                <a:extLst>
+                  <a:ext uri="{0D108BD9-81ED-4DB2-BD59-A6C34878D82A}">
+                    <a16:rowId xmlns:a16="http://schemas.microsoft.com/office/drawing/2014/main" val="1081334054"/>
+                  </a:ext>
+                </a:extLst>
+              </a:tr>
+              <a:tr h="370840">
+                <a:tc>
+                  <a:txBody>
+                    <a:bodyPr/>
+                    <a:lstStyle/>
+                    <a:p>
+                      <a:endParaRPr lang="en-US" dirty="0"/>
+                    </a:p>
+                  </a:txBody>
+                  <a:tcPr/>
+                </a:tc>
+                <a:tc>
+                  <a:txBody>
+                    <a:bodyPr/>
+                    <a:lstStyle/>
+                    <a:p>
+                      <a:endParaRPr lang="en-US" dirty="0"/>
+                    </a:p>
+                  </a:txBody>
+                  <a:tcPr/>
+                </a:tc>
+                <a:tc>
+                  <a:txBody>
+                    <a:bodyPr/>
+                    <a:lstStyle/>
+                    <a:p>
+                      <a:endParaRPr lang="en-US" dirty="0"/>
+                    </a:p>
+                  </a:txBody>
+                  <a:tcPr/>
+                </a:tc>
+                <a:tc>
+                  <a:txBody>
+                    <a:bodyPr/>
+                    <a:lstStyle/>
+                    <a:p>
+                      <a:endParaRPr lang="en-US" dirty="0"/>
+                    </a:p>
+                  </a:txBody>
+                  <a:tcPr anchor="ctr"/>
+                </a:tc>
+                <a:tc>
+                  <a:txBody>
+                    <a:bodyPr/>
+                    <a:lstStyle/>
+                    <a:p>
+                      <a:endParaRPr lang="en-US" dirty="0"/>
+                    </a:p>
+                  </a:txBody>
+                  <a:tcPr anchor="ctr"/>
+                </a:tc>
+                <a:extLst>
+                  <a:ext uri="{0D108BD9-81ED-4DB2-BD59-A6C34878D82A}">
+                    <a16:rowId xmlns:a16="http://schemas.microsoft.com/office/drawing/2014/main" val="2432464653"/>
+                  </a:ext>
+                </a:extLst>
+              </a:tr>
+            </a:tbl>
+          </a:graphicData>
+        </a:graphic>
+      </p:graphicFrame>
     </p:spTree>
     <p:extLst>
       <p:ext uri="{BB962C8B-B14F-4D97-AF65-F5344CB8AC3E}">
-        <p14:creationId xmlns:p14="http://schemas.microsoft.com/office/powerpoint/2010/main" val="1801390461"/>
+        <p14:creationId xmlns:p14="http://schemas.microsoft.com/office/powerpoint/2010/main" val="3291559364"/>
       </p:ext>
     </p:extLst>
   </p:cSld>
@@ -8924,6 +10719,161 @@
     <p:extLst>
       <p:ext uri="{BB962C8B-B14F-4D97-AF65-F5344CB8AC3E}">
         <p14:creationId xmlns:p14="http://schemas.microsoft.com/office/powerpoint/2010/main" val="1324376685"/>
+      </p:ext>
+    </p:extLst>
+  </p:cSld>
+  <p:clrMapOvr>
+    <a:masterClrMapping/>
+  </p:clrMapOvr>
+</p:sld>
+</file>
+
+<file path=ppt/slides/slide20.xml><?xml version="1.0" encoding="utf-8"?>
+<p:sld xmlns:a="http://schemas.openxmlformats.org/drawingml/2006/main" xmlns:r="http://schemas.openxmlformats.org/officeDocument/2006/relationships" xmlns:p="http://schemas.openxmlformats.org/presentationml/2006/main">
+  <p:cSld>
+    <p:spTree>
+      <p:nvGrpSpPr>
+        <p:cNvPr id="1" name=""/>
+        <p:cNvGrpSpPr/>
+        <p:nvPr/>
+      </p:nvGrpSpPr>
+      <p:grpSpPr>
+        <a:xfrm>
+          <a:off x="0" y="0"/>
+          <a:ext cx="0" cy="0"/>
+          <a:chOff x="0" y="0"/>
+          <a:chExt cx="0" cy="0"/>
+        </a:xfrm>
+      </p:grpSpPr>
+      <p:sp>
+        <p:nvSpPr>
+          <p:cNvPr id="2" name="Title 1">
+            <a:extLst>
+              <a:ext uri="{FF2B5EF4-FFF2-40B4-BE49-F238E27FC236}">
+                <a16:creationId xmlns:a16="http://schemas.microsoft.com/office/drawing/2014/main" id="{D68B12F6-2D39-E846-81AC-2332B628DD2B}"/>
+              </a:ext>
+            </a:extLst>
+          </p:cNvPr>
+          <p:cNvSpPr>
+            <a:spLocks noGrp="1"/>
+          </p:cNvSpPr>
+          <p:nvPr>
+            <p:ph type="title"/>
+          </p:nvPr>
+        </p:nvSpPr>
+        <p:spPr/>
+        <p:txBody>
+          <a:bodyPr/>
+          <a:lstStyle/>
+          <a:p>
+            <a:r>
+              <a:rPr lang="en-US" dirty="0"/>
+              <a:t>Merchant Class Checklist (Back-end)</a:t>
+            </a:r>
+          </a:p>
+        </p:txBody>
+      </p:sp>
+      <p:sp>
+        <p:nvSpPr>
+          <p:cNvPr id="3" name="Content Placeholder 2">
+            <a:extLst>
+              <a:ext uri="{FF2B5EF4-FFF2-40B4-BE49-F238E27FC236}">
+                <a16:creationId xmlns:a16="http://schemas.microsoft.com/office/drawing/2014/main" id="{1FC5DA40-2C2D-594D-B150-4D8418E46839}"/>
+              </a:ext>
+            </a:extLst>
+          </p:cNvPr>
+          <p:cNvSpPr>
+            <a:spLocks noGrp="1"/>
+          </p:cNvSpPr>
+          <p:nvPr>
+            <p:ph idx="1"/>
+          </p:nvPr>
+        </p:nvSpPr>
+        <p:spPr/>
+        <p:txBody>
+          <a:bodyPr>
+            <a:normAutofit/>
+          </a:bodyPr>
+          <a:lstStyle/>
+          <a:p>
+            <a:pPr marL="0" indent="0">
+              <a:buNone/>
+            </a:pPr>
+            <a:r>
+              <a:rPr lang="en-GB" dirty="0"/>
+              <a:t>Build an app that allows a user to track their spending.</a:t>
+            </a:r>
+          </a:p>
+          <a:p>
+            <a:pPr marL="0" indent="0">
+              <a:buNone/>
+            </a:pPr>
+            <a:r>
+              <a:rPr lang="en-GB" b="1" dirty="0"/>
+              <a:t>MVP</a:t>
+            </a:r>
+          </a:p>
+          <a:p>
+            <a:pPr lvl="1"/>
+            <a:r>
+              <a:rPr lang="en-GB" dirty="0"/>
+              <a:t>The app should allow the user to </a:t>
+            </a:r>
+          </a:p>
+          <a:p>
+            <a:pPr lvl="2"/>
+            <a:r>
+              <a:rPr lang="en-GB" strike="sngStrike" dirty="0"/>
+              <a:t>create</a:t>
+            </a:r>
+            <a:r>
+              <a:rPr lang="en-GB" dirty="0"/>
+              <a:t>, </a:t>
+            </a:r>
+          </a:p>
+          <a:p>
+            <a:pPr lvl="2"/>
+            <a:r>
+              <a:rPr lang="en-GB" strike="sngStrike" dirty="0"/>
+              <a:t>edit</a:t>
+            </a:r>
+            <a:r>
+              <a:rPr lang="en-GB" dirty="0"/>
+              <a:t> </a:t>
+            </a:r>
+          </a:p>
+          <a:p>
+            <a:pPr lvl="2"/>
+            <a:r>
+              <a:rPr lang="en-GB" dirty="0"/>
+              <a:t>and </a:t>
+            </a:r>
+            <a:r>
+              <a:rPr lang="en-GB" strike="sngStrike" dirty="0"/>
+              <a:t>delete</a:t>
+            </a:r>
+            <a:r>
+              <a:rPr lang="en-GB" dirty="0"/>
+              <a:t> merchants, e.g. Tesco, Amazon, </a:t>
+            </a:r>
+            <a:r>
+              <a:rPr lang="en-GB" dirty="0" err="1"/>
+              <a:t>ScotRail</a:t>
+            </a:r>
+            <a:endParaRPr lang="en-GB" dirty="0"/>
+          </a:p>
+          <a:p>
+            <a:pPr marL="457200" lvl="1" indent="0">
+              <a:buNone/>
+            </a:pPr>
+            <a:endParaRPr lang="en-GB" dirty="0"/>
+          </a:p>
+        </p:txBody>
+      </p:sp>
+    </p:spTree>
+    <p:extLst>
+      <p:ext uri="{BB962C8B-B14F-4D97-AF65-F5344CB8AC3E}">
+        <p14:creationId xmlns:p14="http://schemas.microsoft.com/office/powerpoint/2010/main" val="1801390461"/>
       </p:ext>
     </p:extLst>
   </p:cSld>
@@ -20937,7 +22887,7 @@
         </p:nvSpPr>
         <p:spPr>
           <a:xfrm>
-            <a:off x="331694" y="-15873"/>
+            <a:off x="331694" y="91703"/>
             <a:ext cx="2913530" cy="991513"/>
           </a:xfrm>
         </p:spPr>
@@ -20972,13 +22922,13 @@
           <p:nvPr>
             <p:extLst>
               <p:ext uri="{D42A27DB-BD31-4B8C-83A1-F6EECF244321}">
-                <p14:modId xmlns:p14="http://schemas.microsoft.com/office/powerpoint/2010/main" val="1531850384"/>
+                <p14:modId xmlns:p14="http://schemas.microsoft.com/office/powerpoint/2010/main" val="1659684488"/>
               </p:ext>
             </p:extLst>
           </p:nvPr>
         </p:nvGraphicFramePr>
         <p:xfrm>
-          <a:off x="64994" y="1031240"/>
+          <a:off x="64994" y="1743931"/>
           <a:ext cx="1723465" cy="2397760"/>
         </p:xfrm>
         <a:graphic>
@@ -21534,13 +23484,13 @@
           <p:nvPr>
             <p:extLst>
               <p:ext uri="{D42A27DB-BD31-4B8C-83A1-F6EECF244321}">
-                <p14:modId xmlns:p14="http://schemas.microsoft.com/office/powerpoint/2010/main" val="4027828955"/>
+                <p14:modId xmlns:p14="http://schemas.microsoft.com/office/powerpoint/2010/main" val="2641762818"/>
               </p:ext>
             </p:extLst>
           </p:nvPr>
         </p:nvGraphicFramePr>
         <p:xfrm>
-          <a:off x="1916949" y="1031240"/>
+          <a:off x="1916949" y="1743931"/>
           <a:ext cx="1726829" cy="2397760"/>
         </p:xfrm>
         <a:graphic>
@@ -22095,14 +24045,14 @@
           <p:nvPr>
             <p:extLst>
               <p:ext uri="{D42A27DB-BD31-4B8C-83A1-F6EECF244321}">
-                <p14:modId xmlns:p14="http://schemas.microsoft.com/office/powerpoint/2010/main" val="1220126136"/>
+                <p14:modId xmlns:p14="http://schemas.microsoft.com/office/powerpoint/2010/main" val="2043618460"/>
               </p:ext>
             </p:extLst>
           </p:nvPr>
         </p:nvGraphicFramePr>
         <p:xfrm>
-          <a:off x="159124" y="3980356"/>
-          <a:ext cx="11873751" cy="2672080"/>
+          <a:off x="159124" y="4276190"/>
+          <a:ext cx="10275795" cy="2397760"/>
         </p:xfrm>
         <a:graphic>
           <a:graphicData uri="http://schemas.openxmlformats.org/drawingml/2006/table">
@@ -22111,70 +24061,56 @@
                 <a:tableStyleId>{17292A2E-F333-43FB-9621-5CBBE7FDCDCB}</a:tableStyleId>
               </a:tblPr>
               <a:tblGrid>
-                <a:gridCol w="510988">
+                <a:gridCol w="555352">
                   <a:extLst>
                     <a:ext uri="{9D8B030D-6E8A-4147-A177-3AD203B41FA5}">
                       <a16:colId xmlns:a16="http://schemas.microsoft.com/office/drawing/2014/main" val="1019678322"/>
                     </a:ext>
                   </a:extLst>
                 </a:gridCol>
-                <a:gridCol w="1425388">
+                <a:gridCol w="1549140">
                   <a:extLst>
                     <a:ext uri="{9D8B030D-6E8A-4147-A177-3AD203B41FA5}">
                       <a16:colId xmlns:a16="http://schemas.microsoft.com/office/drawing/2014/main" val="467870881"/>
                     </a:ext>
                   </a:extLst>
                 </a:gridCol>
-                <a:gridCol w="1471456">
+                <a:gridCol w="1447772">
                   <a:extLst>
                     <a:ext uri="{9D8B030D-6E8A-4147-A177-3AD203B41FA5}">
                       <a16:colId xmlns:a16="http://schemas.microsoft.com/office/drawing/2014/main" val="2715199334"/>
                     </a:ext>
                   </a:extLst>
                 </a:gridCol>
-                <a:gridCol w="1209417">
+                <a:gridCol w="954741">
                   <a:extLst>
                     <a:ext uri="{9D8B030D-6E8A-4147-A177-3AD203B41FA5}">
                       <a16:colId xmlns:a16="http://schemas.microsoft.com/office/drawing/2014/main" val="2601363651"/>
                     </a:ext>
                   </a:extLst>
                 </a:gridCol>
-                <a:gridCol w="1209417">
+                <a:gridCol w="1519518">
                   <a:extLst>
                     <a:ext uri="{9D8B030D-6E8A-4147-A177-3AD203B41FA5}">
                       <a16:colId xmlns:a16="http://schemas.microsoft.com/office/drawing/2014/main" val="3132313418"/>
                     </a:ext>
                   </a:extLst>
                 </a:gridCol>
-                <a:gridCol w="1209417">
+                <a:gridCol w="1620434">
                   <a:extLst>
                     <a:ext uri="{9D8B030D-6E8A-4147-A177-3AD203B41FA5}">
                       <a16:colId xmlns:a16="http://schemas.microsoft.com/office/drawing/2014/main" val="2343758945"/>
                     </a:ext>
                   </a:extLst>
                 </a:gridCol>
-                <a:gridCol w="1209417">
-                  <a:extLst>
-                    <a:ext uri="{9D8B030D-6E8A-4147-A177-3AD203B41FA5}">
-                      <a16:colId xmlns:a16="http://schemas.microsoft.com/office/drawing/2014/main" val="3498094520"/>
-                    </a:ext>
-                  </a:extLst>
-                </a:gridCol>
-                <a:gridCol w="1209417">
-                  <a:extLst>
-                    <a:ext uri="{9D8B030D-6E8A-4147-A177-3AD203B41FA5}">
-                      <a16:colId xmlns:a16="http://schemas.microsoft.com/office/drawing/2014/main" val="1705342594"/>
-                    </a:ext>
-                  </a:extLst>
-                </a:gridCol>
-                <a:gridCol w="1209417">
+                <a:gridCol w="1314419">
                   <a:extLst>
                     <a:ext uri="{9D8B030D-6E8A-4147-A177-3AD203B41FA5}">
                       <a16:colId xmlns:a16="http://schemas.microsoft.com/office/drawing/2014/main" val="2555784917"/>
                     </a:ext>
                   </a:extLst>
                 </a:gridCol>
-                <a:gridCol w="1209417">
+                <a:gridCol w="1314419">
                   <a:extLst>
                     <a:ext uri="{9D8B030D-6E8A-4147-A177-3AD203B41FA5}">
                       <a16:colId xmlns:a16="http://schemas.microsoft.com/office/drawing/2014/main" val="702228982"/>
@@ -22183,7 +24119,7 @@
                 </a:gridCol>
               </a:tblGrid>
               <a:tr h="370840">
-                <a:tc gridSpan="10">
+                <a:tc gridSpan="8">
                   <a:txBody>
                     <a:bodyPr/>
                     <a:lstStyle/>
@@ -22295,27 +24231,17 @@
                       <a:endParaRPr lang="en-US"/>
                     </a:p>
                   </a:txBody>
-                  <a:tcPr/>
-                </a:tc>
-                <a:tc hMerge="1">
-                  <a:txBody>
-                    <a:bodyPr/>
-                    <a:lstStyle/>
-                    <a:p>
-                      <a:endParaRPr lang="en-US"/>
-                    </a:p>
-                  </a:txBody>
-                  <a:tcPr/>
-                </a:tc>
-                <a:tc hMerge="1">
-                  <a:txBody>
-                    <a:bodyPr/>
-                    <a:lstStyle/>
-                    <a:p>
-                      <a:endParaRPr lang="en-US"/>
-                    </a:p>
-                  </a:txBody>
-                  <a:tcPr/>
+                  <a:tcPr>
+                    <a:lnL w="12700" cap="flat" cmpd="sng" algn="ctr">
+                      <a:solidFill>
+                        <a:schemeClr val="tx1"/>
+                      </a:solidFill>
+                      <a:prstDash val="solid"/>
+                      <a:round/>
+                      <a:headEnd type="none" w="med" len="med"/>
+                      <a:tailEnd type="none" w="med" len="med"/>
+                    </a:lnL>
+                  </a:tcPr>
                 </a:tc>
                 <a:tc hMerge="1">
                   <a:txBody>
@@ -22394,7 +24320,7 @@
                       <a:pPr algn="ctr"/>
                       <a:r>
                         <a:rPr lang="en-US" b="1" dirty="0"/>
-                        <a:t>Amount(£) (NUMERIC(10,2)</a:t>
+                        <a:t>Amount(£) (NUMERIC)</a:t>
                       </a:r>
                     </a:p>
                   </a:txBody>
@@ -22599,8 +24525,12 @@
                     <a:p>
                       <a:pPr algn="ctr"/>
                       <a:r>
+                        <a:rPr lang="en-US" b="1" dirty="0" err="1"/>
+                        <a:t>Time_added</a:t>
+                      </a:r>
+                      <a:r>
                         <a:rPr lang="en-US" b="1" dirty="0"/>
-                        <a:t>Time (NUMERIC(4,2)</a:t>
+                        <a:t> (NUMERIC)</a:t>
                       </a:r>
                     </a:p>
                   </a:txBody>
@@ -22651,7 +24581,7 @@
                       <a:pPr algn="ctr"/>
                       <a:r>
                         <a:rPr lang="en-US" b="1" dirty="0"/>
-                        <a:t>Day (INT)</a:t>
+                        <a:t>Total spend(£) (NUMERIC)</a:t>
                       </a:r>
                     </a:p>
                   </a:txBody>
@@ -22674,15 +24604,6 @@
                       <a:headEnd type="none" w="med" len="med"/>
                       <a:tailEnd type="none" w="med" len="med"/>
                     </a:lnR>
-                    <a:lnT w="12700" cap="flat" cmpd="sng" algn="ctr">
-                      <a:solidFill>
-                        <a:schemeClr val="tx1"/>
-                      </a:solidFill>
-                      <a:prstDash val="solid"/>
-                      <a:round/>
-                      <a:headEnd type="none" w="med" len="med"/>
-                      <a:tailEnd type="none" w="med" len="med"/>
-                    </a:lnT>
                     <a:lnB w="12700" cap="flat" cmpd="sng" algn="ctr">
                       <a:solidFill>
                         <a:schemeClr val="tx1"/>
@@ -22702,109 +24623,7 @@
                       <a:pPr algn="ctr"/>
                       <a:r>
                         <a:rPr lang="en-US" b="1" dirty="0"/>
-                        <a:t>Month (VARCHAR)</a:t>
-                      </a:r>
-                    </a:p>
-                  </a:txBody>
-                  <a:tcPr anchor="ctr">
-                    <a:lnL w="12700" cap="flat" cmpd="sng" algn="ctr">
-                      <a:solidFill>
-                        <a:schemeClr val="tx1"/>
-                      </a:solidFill>
-                      <a:prstDash val="solid"/>
-                      <a:round/>
-                      <a:headEnd type="none" w="med" len="med"/>
-                      <a:tailEnd type="none" w="med" len="med"/>
-                    </a:lnL>
-                    <a:lnR w="12700" cap="flat" cmpd="sng" algn="ctr">
-                      <a:solidFill>
-                        <a:schemeClr val="tx1"/>
-                      </a:solidFill>
-                      <a:prstDash val="solid"/>
-                      <a:round/>
-                      <a:headEnd type="none" w="med" len="med"/>
-                      <a:tailEnd type="none" w="med" len="med"/>
-                    </a:lnR>
-                    <a:lnT w="12700" cap="flat" cmpd="sng" algn="ctr">
-                      <a:solidFill>
-                        <a:schemeClr val="tx1"/>
-                      </a:solidFill>
-                      <a:prstDash val="solid"/>
-                      <a:round/>
-                      <a:headEnd type="none" w="med" len="med"/>
-                      <a:tailEnd type="none" w="med" len="med"/>
-                    </a:lnT>
-                    <a:lnB w="12700" cap="flat" cmpd="sng" algn="ctr">
-                      <a:solidFill>
-                        <a:schemeClr val="tx1"/>
-                      </a:solidFill>
-                      <a:prstDash val="solid"/>
-                      <a:round/>
-                      <a:headEnd type="none" w="med" len="med"/>
-                      <a:tailEnd type="none" w="med" len="med"/>
-                    </a:lnB>
-                  </a:tcPr>
-                </a:tc>
-                <a:tc>
-                  <a:txBody>
-                    <a:bodyPr/>
-                    <a:lstStyle/>
-                    <a:p>
-                      <a:pPr algn="ctr"/>
-                      <a:r>
-                        <a:rPr lang="en-US" b="1" dirty="0"/>
-                        <a:t>Total spend(£) (NUMERIC(10,2)</a:t>
-                      </a:r>
-                    </a:p>
-                  </a:txBody>
-                  <a:tcPr anchor="ctr">
-                    <a:lnL w="12700" cap="flat" cmpd="sng" algn="ctr">
-                      <a:solidFill>
-                        <a:schemeClr val="tx1"/>
-                      </a:solidFill>
-                      <a:prstDash val="solid"/>
-                      <a:round/>
-                      <a:headEnd type="none" w="med" len="med"/>
-                      <a:tailEnd type="none" w="med" len="med"/>
-                    </a:lnL>
-                    <a:lnR w="12700" cap="flat" cmpd="sng" algn="ctr">
-                      <a:solidFill>
-                        <a:schemeClr val="tx1"/>
-                      </a:solidFill>
-                      <a:prstDash val="solid"/>
-                      <a:round/>
-                      <a:headEnd type="none" w="med" len="med"/>
-                      <a:tailEnd type="none" w="med" len="med"/>
-                    </a:lnR>
-                    <a:lnT w="12700" cap="flat" cmpd="sng" algn="ctr">
-                      <a:solidFill>
-                        <a:schemeClr val="tx1"/>
-                      </a:solidFill>
-                      <a:prstDash val="solid"/>
-                      <a:round/>
-                      <a:headEnd type="none" w="med" len="med"/>
-                      <a:tailEnd type="none" w="med" len="med"/>
-                    </a:lnT>
-                    <a:lnB w="12700" cap="flat" cmpd="sng" algn="ctr">
-                      <a:solidFill>
-                        <a:schemeClr val="tx1"/>
-                      </a:solidFill>
-                      <a:prstDash val="solid"/>
-                      <a:round/>
-                      <a:headEnd type="none" w="med" len="med"/>
-                      <a:tailEnd type="none" w="med" len="med"/>
-                    </a:lnB>
-                  </a:tcPr>
-                </a:tc>
-                <a:tc>
-                  <a:txBody>
-                    <a:bodyPr/>
-                    <a:lstStyle/>
-                    <a:p>
-                      <a:pPr algn="ctr"/>
-                      <a:r>
-                        <a:rPr lang="en-US" b="1" dirty="0"/>
-                        <a:t>Remaining Budget(£) (NUMERIC(10,2)</a:t>
+                        <a:t>Remaining Budget(£) (NUMERIC)</a:t>
                       </a:r>
                     </a:p>
                   </a:txBody>
@@ -23168,108 +24987,6 @@
                       <a:pPr algn="ctr"/>
                       <a:r>
                         <a:rPr lang="en-US" dirty="0"/>
-                        <a:t>28</a:t>
-                      </a:r>
-                    </a:p>
-                  </a:txBody>
-                  <a:tcPr anchor="ctr">
-                    <a:lnL w="12700" cap="flat" cmpd="sng" algn="ctr">
-                      <a:solidFill>
-                        <a:schemeClr val="tx1"/>
-                      </a:solidFill>
-                      <a:prstDash val="solid"/>
-                      <a:round/>
-                      <a:headEnd type="none" w="med" len="med"/>
-                      <a:tailEnd type="none" w="med" len="med"/>
-                    </a:lnL>
-                    <a:lnR w="12700" cap="flat" cmpd="sng" algn="ctr">
-                      <a:solidFill>
-                        <a:schemeClr val="tx1"/>
-                      </a:solidFill>
-                      <a:prstDash val="solid"/>
-                      <a:round/>
-                      <a:headEnd type="none" w="med" len="med"/>
-                      <a:tailEnd type="none" w="med" len="med"/>
-                    </a:lnR>
-                    <a:lnT w="12700" cap="flat" cmpd="sng" algn="ctr">
-                      <a:solidFill>
-                        <a:schemeClr val="tx1"/>
-                      </a:solidFill>
-                      <a:prstDash val="solid"/>
-                      <a:round/>
-                      <a:headEnd type="none" w="med" len="med"/>
-                      <a:tailEnd type="none" w="med" len="med"/>
-                    </a:lnT>
-                    <a:lnB w="12700" cap="flat" cmpd="sng" algn="ctr">
-                      <a:solidFill>
-                        <a:schemeClr val="tx1"/>
-                      </a:solidFill>
-                      <a:prstDash val="solid"/>
-                      <a:round/>
-                      <a:headEnd type="none" w="med" len="med"/>
-                      <a:tailEnd type="none" w="med" len="med"/>
-                    </a:lnB>
-                  </a:tcPr>
-                </a:tc>
-                <a:tc>
-                  <a:txBody>
-                    <a:bodyPr/>
-                    <a:lstStyle/>
-                    <a:p>
-                      <a:pPr algn="ctr"/>
-                      <a:r>
-                        <a:rPr lang="en-US" dirty="0"/>
-                        <a:t>February</a:t>
-                      </a:r>
-                    </a:p>
-                  </a:txBody>
-                  <a:tcPr anchor="ctr">
-                    <a:lnL w="12700" cap="flat" cmpd="sng" algn="ctr">
-                      <a:solidFill>
-                        <a:schemeClr val="tx1"/>
-                      </a:solidFill>
-                      <a:prstDash val="solid"/>
-                      <a:round/>
-                      <a:headEnd type="none" w="med" len="med"/>
-                      <a:tailEnd type="none" w="med" len="med"/>
-                    </a:lnL>
-                    <a:lnR w="12700" cap="flat" cmpd="sng" algn="ctr">
-                      <a:solidFill>
-                        <a:schemeClr val="tx1"/>
-                      </a:solidFill>
-                      <a:prstDash val="solid"/>
-                      <a:round/>
-                      <a:headEnd type="none" w="med" len="med"/>
-                      <a:tailEnd type="none" w="med" len="med"/>
-                    </a:lnR>
-                    <a:lnT w="12700" cap="flat" cmpd="sng" algn="ctr">
-                      <a:solidFill>
-                        <a:schemeClr val="tx1"/>
-                      </a:solidFill>
-                      <a:prstDash val="solid"/>
-                      <a:round/>
-                      <a:headEnd type="none" w="med" len="med"/>
-                      <a:tailEnd type="none" w="med" len="med"/>
-                    </a:lnT>
-                    <a:lnB w="12700" cap="flat" cmpd="sng" algn="ctr">
-                      <a:solidFill>
-                        <a:schemeClr val="tx1"/>
-                      </a:solidFill>
-                      <a:prstDash val="solid"/>
-                      <a:round/>
-                      <a:headEnd type="none" w="med" len="med"/>
-                      <a:tailEnd type="none" w="med" len="med"/>
-                    </a:lnB>
-                  </a:tcPr>
-                </a:tc>
-                <a:tc>
-                  <a:txBody>
-                    <a:bodyPr/>
-                    <a:lstStyle/>
-                    <a:p>
-                      <a:pPr algn="ctr"/>
-                      <a:r>
-                        <a:rPr lang="en-US" dirty="0"/>
                         <a:t>5.00</a:t>
                       </a:r>
                     </a:p>
@@ -23685,108 +25402,6 @@
                       <a:pPr algn="ctr"/>
                       <a:r>
                         <a:rPr lang="en-US" dirty="0"/>
-                        <a:t>1</a:t>
-                      </a:r>
-                    </a:p>
-                  </a:txBody>
-                  <a:tcPr anchor="ctr">
-                    <a:lnL w="12700" cap="flat" cmpd="sng" algn="ctr">
-                      <a:solidFill>
-                        <a:schemeClr val="tx1"/>
-                      </a:solidFill>
-                      <a:prstDash val="solid"/>
-                      <a:round/>
-                      <a:headEnd type="none" w="med" len="med"/>
-                      <a:tailEnd type="none" w="med" len="med"/>
-                    </a:lnL>
-                    <a:lnR w="12700" cap="flat" cmpd="sng" algn="ctr">
-                      <a:solidFill>
-                        <a:schemeClr val="tx1"/>
-                      </a:solidFill>
-                      <a:prstDash val="solid"/>
-                      <a:round/>
-                      <a:headEnd type="none" w="med" len="med"/>
-                      <a:tailEnd type="none" w="med" len="med"/>
-                    </a:lnR>
-                    <a:lnT w="12700" cap="flat" cmpd="sng" algn="ctr">
-                      <a:solidFill>
-                        <a:schemeClr val="tx1"/>
-                      </a:solidFill>
-                      <a:prstDash val="solid"/>
-                      <a:round/>
-                      <a:headEnd type="none" w="med" len="med"/>
-                      <a:tailEnd type="none" w="med" len="med"/>
-                    </a:lnT>
-                    <a:lnB w="12700" cap="flat" cmpd="sng" algn="ctr">
-                      <a:solidFill>
-                        <a:schemeClr val="tx1"/>
-                      </a:solidFill>
-                      <a:prstDash val="solid"/>
-                      <a:round/>
-                      <a:headEnd type="none" w="med" len="med"/>
-                      <a:tailEnd type="none" w="med" len="med"/>
-                    </a:lnB>
-                  </a:tcPr>
-                </a:tc>
-                <a:tc>
-                  <a:txBody>
-                    <a:bodyPr/>
-                    <a:lstStyle/>
-                    <a:p>
-                      <a:pPr algn="ctr"/>
-                      <a:r>
-                        <a:rPr lang="en-US" dirty="0"/>
-                        <a:t>March</a:t>
-                      </a:r>
-                    </a:p>
-                  </a:txBody>
-                  <a:tcPr anchor="ctr">
-                    <a:lnL w="12700" cap="flat" cmpd="sng" algn="ctr">
-                      <a:solidFill>
-                        <a:schemeClr val="tx1"/>
-                      </a:solidFill>
-                      <a:prstDash val="solid"/>
-                      <a:round/>
-                      <a:headEnd type="none" w="med" len="med"/>
-                      <a:tailEnd type="none" w="med" len="med"/>
-                    </a:lnL>
-                    <a:lnR w="12700" cap="flat" cmpd="sng" algn="ctr">
-                      <a:solidFill>
-                        <a:schemeClr val="tx1"/>
-                      </a:solidFill>
-                      <a:prstDash val="solid"/>
-                      <a:round/>
-                      <a:headEnd type="none" w="med" len="med"/>
-                      <a:tailEnd type="none" w="med" len="med"/>
-                    </a:lnR>
-                    <a:lnT w="12700" cap="flat" cmpd="sng" algn="ctr">
-                      <a:solidFill>
-                        <a:schemeClr val="tx1"/>
-                      </a:solidFill>
-                      <a:prstDash val="solid"/>
-                      <a:round/>
-                      <a:headEnd type="none" w="med" len="med"/>
-                      <a:tailEnd type="none" w="med" len="med"/>
-                    </a:lnT>
-                    <a:lnB w="12700" cap="flat" cmpd="sng" algn="ctr">
-                      <a:solidFill>
-                        <a:schemeClr val="tx1"/>
-                      </a:solidFill>
-                      <a:prstDash val="solid"/>
-                      <a:round/>
-                      <a:headEnd type="none" w="med" len="med"/>
-                      <a:tailEnd type="none" w="med" len="med"/>
-                    </a:lnB>
-                  </a:tcPr>
-                </a:tc>
-                <a:tc>
-                  <a:txBody>
-                    <a:bodyPr/>
-                    <a:lstStyle/>
-                    <a:p>
-                      <a:pPr algn="ctr"/>
-                      <a:r>
-                        <a:rPr lang="en-US" dirty="0"/>
                         <a:t>15.00</a:t>
                       </a:r>
                     </a:p>
@@ -24152,108 +25767,6 @@
                       <a:r>
                         <a:rPr lang="en-US" dirty="0"/>
                         <a:t>10:00</a:t>
-                      </a:r>
-                    </a:p>
-                  </a:txBody>
-                  <a:tcPr anchor="ctr">
-                    <a:lnL w="12700" cap="flat" cmpd="sng" algn="ctr">
-                      <a:solidFill>
-                        <a:schemeClr val="tx1"/>
-                      </a:solidFill>
-                      <a:prstDash val="solid"/>
-                      <a:round/>
-                      <a:headEnd type="none" w="med" len="med"/>
-                      <a:tailEnd type="none" w="med" len="med"/>
-                    </a:lnL>
-                    <a:lnR w="12700" cap="flat" cmpd="sng" algn="ctr">
-                      <a:solidFill>
-                        <a:schemeClr val="tx1"/>
-                      </a:solidFill>
-                      <a:prstDash val="solid"/>
-                      <a:round/>
-                      <a:headEnd type="none" w="med" len="med"/>
-                      <a:tailEnd type="none" w="med" len="med"/>
-                    </a:lnR>
-                    <a:lnT w="12700" cap="flat" cmpd="sng" algn="ctr">
-                      <a:solidFill>
-                        <a:schemeClr val="tx1"/>
-                      </a:solidFill>
-                      <a:prstDash val="solid"/>
-                      <a:round/>
-                      <a:headEnd type="none" w="med" len="med"/>
-                      <a:tailEnd type="none" w="med" len="med"/>
-                    </a:lnT>
-                    <a:lnB w="12700" cap="flat" cmpd="sng" algn="ctr">
-                      <a:solidFill>
-                        <a:schemeClr val="tx1"/>
-                      </a:solidFill>
-                      <a:prstDash val="solid"/>
-                      <a:round/>
-                      <a:headEnd type="none" w="med" len="med"/>
-                      <a:tailEnd type="none" w="med" len="med"/>
-                    </a:lnB>
-                  </a:tcPr>
-                </a:tc>
-                <a:tc>
-                  <a:txBody>
-                    <a:bodyPr/>
-                    <a:lstStyle/>
-                    <a:p>
-                      <a:pPr algn="ctr"/>
-                      <a:r>
-                        <a:rPr lang="en-US" dirty="0"/>
-                        <a:t>2</a:t>
-                      </a:r>
-                    </a:p>
-                  </a:txBody>
-                  <a:tcPr anchor="ctr">
-                    <a:lnL w="12700" cap="flat" cmpd="sng" algn="ctr">
-                      <a:solidFill>
-                        <a:schemeClr val="tx1"/>
-                      </a:solidFill>
-                      <a:prstDash val="solid"/>
-                      <a:round/>
-                      <a:headEnd type="none" w="med" len="med"/>
-                      <a:tailEnd type="none" w="med" len="med"/>
-                    </a:lnL>
-                    <a:lnR w="12700" cap="flat" cmpd="sng" algn="ctr">
-                      <a:solidFill>
-                        <a:schemeClr val="tx1"/>
-                      </a:solidFill>
-                      <a:prstDash val="solid"/>
-                      <a:round/>
-                      <a:headEnd type="none" w="med" len="med"/>
-                      <a:tailEnd type="none" w="med" len="med"/>
-                    </a:lnR>
-                    <a:lnT w="12700" cap="flat" cmpd="sng" algn="ctr">
-                      <a:solidFill>
-                        <a:schemeClr val="tx1"/>
-                      </a:solidFill>
-                      <a:prstDash val="solid"/>
-                      <a:round/>
-                      <a:headEnd type="none" w="med" len="med"/>
-                      <a:tailEnd type="none" w="med" len="med"/>
-                    </a:lnT>
-                    <a:lnB w="12700" cap="flat" cmpd="sng" algn="ctr">
-                      <a:solidFill>
-                        <a:schemeClr val="tx1"/>
-                      </a:solidFill>
-                      <a:prstDash val="solid"/>
-                      <a:round/>
-                      <a:headEnd type="none" w="med" len="med"/>
-                      <a:tailEnd type="none" w="med" len="med"/>
-                    </a:lnB>
-                  </a:tcPr>
-                </a:tc>
-                <a:tc>
-                  <a:txBody>
-                    <a:bodyPr/>
-                    <a:lstStyle/>
-                    <a:p>
-                      <a:pPr algn="ctr"/>
-                      <a:r>
-                        <a:rPr lang="en-US" dirty="0"/>
-                        <a:t>March</a:t>
                       </a:r>
                     </a:p>
                   </a:txBody>
@@ -24424,8 +25937,8 @@
         </p:nvCxnSpPr>
         <p:spPr>
           <a:xfrm>
-            <a:off x="224303" y="3429000"/>
-            <a:ext cx="2370979" cy="1129553"/>
+            <a:off x="1167186" y="4141691"/>
+            <a:ext cx="1895895" cy="753066"/>
           </a:xfrm>
           <a:prstGeom prst="straightConnector1">
             <a:avLst/>
@@ -24466,8 +25979,8 @@
         </p:nvCxnSpPr>
         <p:spPr>
           <a:xfrm>
-            <a:off x="2151529" y="3429000"/>
-            <a:ext cx="2017059" cy="1223682"/>
+            <a:off x="2937622" y="4141691"/>
+            <a:ext cx="1230966" cy="618567"/>
           </a:xfrm>
           <a:prstGeom prst="straightConnector1">
             <a:avLst/>
@@ -24507,14 +26020,14 @@
           <p:nvPr>
             <p:extLst>
               <p:ext uri="{D42A27DB-BD31-4B8C-83A1-F6EECF244321}">
-                <p14:modId xmlns:p14="http://schemas.microsoft.com/office/powerpoint/2010/main" val="1495656828"/>
+                <p14:modId xmlns:p14="http://schemas.microsoft.com/office/powerpoint/2010/main" val="3765676294"/>
               </p:ext>
             </p:extLst>
           </p:nvPr>
         </p:nvGraphicFramePr>
         <p:xfrm>
-          <a:off x="3751731" y="191865"/>
-          <a:ext cx="2662516" cy="2123440"/>
+          <a:off x="3734796" y="72446"/>
+          <a:ext cx="7130428" cy="1483360"/>
         </p:xfrm>
         <a:graphic>
           <a:graphicData uri="http://schemas.openxmlformats.org/drawingml/2006/table">
@@ -24523,30 +26036,37 @@
                 <a:tableStyleId>{17292A2E-F333-43FB-9621-5CBBE7FDCDCB}</a:tableStyleId>
               </a:tblPr>
               <a:tblGrid>
-                <a:gridCol w="450307">
+                <a:gridCol w="748524">
                   <a:extLst>
                     <a:ext uri="{9D8B030D-6E8A-4147-A177-3AD203B41FA5}">
                       <a16:colId xmlns:a16="http://schemas.microsoft.com/office/drawing/2014/main" val="1019678322"/>
                     </a:ext>
                   </a:extLst>
                 </a:gridCol>
-                <a:gridCol w="1311256">
+                <a:gridCol w="1723118">
                   <a:extLst>
                     <a:ext uri="{9D8B030D-6E8A-4147-A177-3AD203B41FA5}">
                       <a16:colId xmlns:a16="http://schemas.microsoft.com/office/drawing/2014/main" val="702228982"/>
                     </a:ext>
                   </a:extLst>
                 </a:gridCol>
-                <a:gridCol w="900953">
+                <a:gridCol w="1261754">
                   <a:extLst>
                     <a:ext uri="{9D8B030D-6E8A-4147-A177-3AD203B41FA5}">
                       <a16:colId xmlns:a16="http://schemas.microsoft.com/office/drawing/2014/main" val="3039201924"/>
                     </a:ext>
                   </a:extLst>
                 </a:gridCol>
+                <a:gridCol w="3397032">
+                  <a:extLst>
+                    <a:ext uri="{9D8B030D-6E8A-4147-A177-3AD203B41FA5}">
+                      <a16:colId xmlns:a16="http://schemas.microsoft.com/office/drawing/2014/main" val="3962337497"/>
+                    </a:ext>
+                  </a:extLst>
+                </a:gridCol>
               </a:tblGrid>
               <a:tr h="370840">
-                <a:tc gridSpan="3">
+                <a:tc gridSpan="4">
                   <a:txBody>
                     <a:bodyPr/>
                     <a:lstStyle/>
@@ -24658,6 +26178,57 @@
                     </a:lnB>
                     <a:solidFill>
                       <a:srgbClr val="002060"/>
+                    </a:solidFill>
+                  </a:tcPr>
+                </a:tc>
+                <a:tc hMerge="1">
+                  <a:txBody>
+                    <a:bodyPr/>
+                    <a:lstStyle/>
+                    <a:p>
+                      <a:pPr algn="ctr"/>
+                      <a:endParaRPr lang="en-US" dirty="0"/>
+                    </a:p>
+                  </a:txBody>
+                  <a:tcPr anchor="ctr">
+                    <a:lnL w="12700" cap="flat" cmpd="sng" algn="ctr">
+                      <a:solidFill>
+                        <a:schemeClr val="tx1"/>
+                      </a:solidFill>
+                      <a:prstDash val="solid"/>
+                      <a:round/>
+                      <a:headEnd type="none" w="med" len="med"/>
+                      <a:tailEnd type="none" w="med" len="med"/>
+                    </a:lnL>
+                    <a:lnR w="12700" cap="flat" cmpd="sng" algn="ctr">
+                      <a:solidFill>
+                        <a:schemeClr val="tx1"/>
+                      </a:solidFill>
+                      <a:prstDash val="solid"/>
+                      <a:round/>
+                      <a:headEnd type="none" w="med" len="med"/>
+                      <a:tailEnd type="none" w="med" len="med"/>
+                    </a:lnR>
+                    <a:lnT w="12700" cap="flat" cmpd="sng" algn="ctr">
+                      <a:solidFill>
+                        <a:schemeClr val="tx1"/>
+                      </a:solidFill>
+                      <a:prstDash val="solid"/>
+                      <a:round/>
+                      <a:headEnd type="none" w="med" len="med"/>
+                      <a:tailEnd type="none" w="med" len="med"/>
+                    </a:lnT>
+                    <a:lnB w="12700" cap="flat" cmpd="sng" algn="ctr">
+                      <a:solidFill>
+                        <a:schemeClr val="tx1"/>
+                      </a:solidFill>
+                      <a:prstDash val="solid"/>
+                      <a:round/>
+                      <a:headEnd type="none" w="med" len="med"/>
+                      <a:tailEnd type="none" w="med" len="med"/>
+                    </a:lnB>
+                    <a:solidFill>
+                      <a:srgbClr val="206593"/>
                     </a:solidFill>
                   </a:tcPr>
                 </a:tc>
@@ -24821,6 +26392,61 @@
                     </a:lnB>
                   </a:tcPr>
                 </a:tc>
+                <a:tc>
+                  <a:txBody>
+                    <a:bodyPr/>
+                    <a:lstStyle/>
+                    <a:p>
+                      <a:pPr algn="ctr"/>
+                      <a:r>
+                        <a:rPr lang="en-US" b="1" dirty="0" err="1"/>
+                        <a:t>Remaining_budget</a:t>
+                      </a:r>
+                      <a:r>
+                        <a:rPr lang="en-US" b="1" dirty="0"/>
+                        <a:t>(£) (NUMERIC)</a:t>
+                      </a:r>
+                    </a:p>
+                  </a:txBody>
+                  <a:tcPr anchor="ctr">
+                    <a:lnL w="12700" cap="flat" cmpd="sng" algn="ctr">
+                      <a:solidFill>
+                        <a:schemeClr val="tx1"/>
+                      </a:solidFill>
+                      <a:prstDash val="solid"/>
+                      <a:round/>
+                      <a:headEnd type="none" w="med" len="med"/>
+                      <a:tailEnd type="none" w="med" len="med"/>
+                    </a:lnL>
+                    <a:lnR w="12700" cap="flat" cmpd="sng" algn="ctr">
+                      <a:solidFill>
+                        <a:schemeClr val="tx1"/>
+                      </a:solidFill>
+                      <a:prstDash val="solid"/>
+                      <a:round/>
+                      <a:headEnd type="none" w="med" len="med"/>
+                      <a:tailEnd type="none" w="med" len="med"/>
+                    </a:lnR>
+                    <a:lnT w="12700" cap="flat" cmpd="sng" algn="ctr">
+                      <a:solidFill>
+                        <a:schemeClr val="tx1"/>
+                      </a:solidFill>
+                      <a:prstDash val="solid"/>
+                      <a:round/>
+                      <a:headEnd type="none" w="med" len="med"/>
+                      <a:tailEnd type="none" w="med" len="med"/>
+                    </a:lnT>
+                    <a:lnB w="12700" cap="flat" cmpd="sng" algn="ctr">
+                      <a:solidFill>
+                        <a:schemeClr val="tx1"/>
+                      </a:solidFill>
+                      <a:prstDash val="solid"/>
+                      <a:round/>
+                      <a:headEnd type="none" w="med" len="med"/>
+                      <a:tailEnd type="none" w="med" len="med"/>
+                    </a:lnB>
+                  </a:tcPr>
+                </a:tc>
                 <a:extLst>
                   <a:ext uri="{0D108BD9-81ED-4DB2-BD59-A6C34878D82A}">
                     <a16:rowId xmlns:a16="http://schemas.microsoft.com/office/drawing/2014/main" val="2556437728"/>
@@ -24981,6 +26607,57 @@
                     </a:lnB>
                   </a:tcPr>
                 </a:tc>
+                <a:tc>
+                  <a:txBody>
+                    <a:bodyPr/>
+                    <a:lstStyle/>
+                    <a:p>
+                      <a:pPr algn="ctr"/>
+                      <a:r>
+                        <a:rPr lang="en-US" dirty="0"/>
+                        <a:t>495.00</a:t>
+                      </a:r>
+                    </a:p>
+                  </a:txBody>
+                  <a:tcPr anchor="ctr">
+                    <a:lnL w="12700" cap="flat" cmpd="sng" algn="ctr">
+                      <a:solidFill>
+                        <a:schemeClr val="tx1"/>
+                      </a:solidFill>
+                      <a:prstDash val="solid"/>
+                      <a:round/>
+                      <a:headEnd type="none" w="med" len="med"/>
+                      <a:tailEnd type="none" w="med" len="med"/>
+                    </a:lnL>
+                    <a:lnR w="12700" cap="flat" cmpd="sng" algn="ctr">
+                      <a:solidFill>
+                        <a:schemeClr val="tx1"/>
+                      </a:solidFill>
+                      <a:prstDash val="solid"/>
+                      <a:round/>
+                      <a:headEnd type="none" w="med" len="med"/>
+                      <a:tailEnd type="none" w="med" len="med"/>
+                    </a:lnR>
+                    <a:lnT w="12700" cap="flat" cmpd="sng" algn="ctr">
+                      <a:solidFill>
+                        <a:schemeClr val="tx1"/>
+                      </a:solidFill>
+                      <a:prstDash val="solid"/>
+                      <a:round/>
+                      <a:headEnd type="none" w="med" len="med"/>
+                      <a:tailEnd type="none" w="med" len="med"/>
+                    </a:lnT>
+                    <a:lnB w="12700" cap="flat" cmpd="sng" algn="ctr">
+                      <a:solidFill>
+                        <a:schemeClr val="tx1"/>
+                      </a:solidFill>
+                      <a:prstDash val="solid"/>
+                      <a:round/>
+                      <a:headEnd type="none" w="med" len="med"/>
+                      <a:tailEnd type="none" w="med" len="med"/>
+                    </a:lnB>
+                  </a:tcPr>
+                </a:tc>
                 <a:extLst>
                   <a:ext uri="{0D108BD9-81ED-4DB2-BD59-A6C34878D82A}">
                     <a16:rowId xmlns:a16="http://schemas.microsoft.com/office/drawing/2014/main" val="466209325"/>
@@ -25141,169 +26818,60 @@
                     </a:lnB>
                   </a:tcPr>
                 </a:tc>
+                <a:tc>
+                  <a:txBody>
+                    <a:bodyPr/>
+                    <a:lstStyle/>
+                    <a:p>
+                      <a:pPr algn="ctr"/>
+                      <a:r>
+                        <a:rPr lang="en-US" dirty="0"/>
+                        <a:t>485.00</a:t>
+                      </a:r>
+                    </a:p>
+                  </a:txBody>
+                  <a:tcPr anchor="ctr">
+                    <a:lnL w="12700" cap="flat" cmpd="sng" algn="ctr">
+                      <a:solidFill>
+                        <a:schemeClr val="tx1"/>
+                      </a:solidFill>
+                      <a:prstDash val="solid"/>
+                      <a:round/>
+                      <a:headEnd type="none" w="med" len="med"/>
+                      <a:tailEnd type="none" w="med" len="med"/>
+                    </a:lnL>
+                    <a:lnR w="12700" cap="flat" cmpd="sng" algn="ctr">
+                      <a:solidFill>
+                        <a:schemeClr val="tx1"/>
+                      </a:solidFill>
+                      <a:prstDash val="solid"/>
+                      <a:round/>
+                      <a:headEnd type="none" w="med" len="med"/>
+                      <a:tailEnd type="none" w="med" len="med"/>
+                    </a:lnR>
+                    <a:lnT w="12700" cap="flat" cmpd="sng" algn="ctr">
+                      <a:solidFill>
+                        <a:schemeClr val="tx1"/>
+                      </a:solidFill>
+                      <a:prstDash val="solid"/>
+                      <a:round/>
+                      <a:headEnd type="none" w="med" len="med"/>
+                      <a:tailEnd type="none" w="med" len="med"/>
+                    </a:lnT>
+                    <a:lnB w="12700" cap="flat" cmpd="sng" algn="ctr">
+                      <a:solidFill>
+                        <a:schemeClr val="tx1"/>
+                      </a:solidFill>
+                      <a:prstDash val="solid"/>
+                      <a:round/>
+                      <a:headEnd type="none" w="med" len="med"/>
+                      <a:tailEnd type="none" w="med" len="med"/>
+                    </a:lnB>
+                  </a:tcPr>
+                </a:tc>
                 <a:extLst>
                   <a:ext uri="{0D108BD9-81ED-4DB2-BD59-A6C34878D82A}">
                     <a16:rowId xmlns:a16="http://schemas.microsoft.com/office/drawing/2014/main" val="3843750482"/>
-                  </a:ext>
-                </a:extLst>
-              </a:tr>
-              <a:tr h="370840">
-                <a:tc>
-                  <a:txBody>
-                    <a:bodyPr/>
-                    <a:lstStyle/>
-                    <a:p>
-                      <a:pPr algn="ctr"/>
-                      <a:r>
-                        <a:rPr lang="en-US" dirty="0"/>
-                        <a:t>3</a:t>
-                      </a:r>
-                    </a:p>
-                  </a:txBody>
-                  <a:tcPr anchor="ctr">
-                    <a:lnL w="12700" cap="flat" cmpd="sng" algn="ctr">
-                      <a:solidFill>
-                        <a:schemeClr val="tx1"/>
-                      </a:solidFill>
-                      <a:prstDash val="solid"/>
-                      <a:round/>
-                      <a:headEnd type="none" w="med" len="med"/>
-                      <a:tailEnd type="none" w="med" len="med"/>
-                    </a:lnL>
-                    <a:lnR w="12700" cap="flat" cmpd="sng" algn="ctr">
-                      <a:solidFill>
-                        <a:schemeClr val="tx1"/>
-                      </a:solidFill>
-                      <a:prstDash val="solid"/>
-                      <a:round/>
-                      <a:headEnd type="none" w="med" len="med"/>
-                      <a:tailEnd type="none" w="med" len="med"/>
-                    </a:lnR>
-                    <a:lnT w="12700" cap="flat" cmpd="sng" algn="ctr">
-                      <a:solidFill>
-                        <a:schemeClr val="tx1"/>
-                      </a:solidFill>
-                      <a:prstDash val="solid"/>
-                      <a:round/>
-                      <a:headEnd type="none" w="med" len="med"/>
-                      <a:tailEnd type="none" w="med" len="med"/>
-                    </a:lnT>
-                    <a:lnB w="12700" cap="flat" cmpd="sng" algn="ctr">
-                      <a:solidFill>
-                        <a:schemeClr val="tx1"/>
-                      </a:solidFill>
-                      <a:prstDash val="solid"/>
-                      <a:round/>
-                      <a:headEnd type="none" w="med" len="med"/>
-                      <a:tailEnd type="none" w="med" len="med"/>
-                    </a:lnB>
-                  </a:tcPr>
-                </a:tc>
-                <a:tc>
-                  <a:txBody>
-                    <a:bodyPr/>
-                    <a:lstStyle/>
-                    <a:p>
-                      <a:pPr algn="ctr"/>
-                      <a:r>
-                        <a:rPr lang="en-US" dirty="0"/>
-                        <a:t>1</a:t>
-                      </a:r>
-                    </a:p>
-                  </a:txBody>
-                  <a:tcPr anchor="ctr">
-                    <a:lnL w="12700" cap="flat" cmpd="sng" algn="ctr">
-                      <a:solidFill>
-                        <a:schemeClr val="tx1"/>
-                      </a:solidFill>
-                      <a:prstDash val="solid"/>
-                      <a:round/>
-                      <a:headEnd type="none" w="med" len="med"/>
-                      <a:tailEnd type="none" w="med" len="med"/>
-                    </a:lnL>
-                    <a:lnR w="12700" cap="flat" cmpd="sng" algn="ctr">
-                      <a:solidFill>
-                        <a:schemeClr val="tx1"/>
-                      </a:solidFill>
-                      <a:prstDash val="solid"/>
-                      <a:round/>
-                      <a:headEnd type="none" w="med" len="med"/>
-                      <a:tailEnd type="none" w="med" len="med"/>
-                    </a:lnR>
-                    <a:lnT w="12700" cap="flat" cmpd="sng" algn="ctr">
-                      <a:solidFill>
-                        <a:schemeClr val="tx1"/>
-                      </a:solidFill>
-                      <a:prstDash val="solid"/>
-                      <a:round/>
-                      <a:headEnd type="none" w="med" len="med"/>
-                      <a:tailEnd type="none" w="med" len="med"/>
-                    </a:lnT>
-                    <a:lnB w="12700" cap="flat" cmpd="sng" algn="ctr">
-                      <a:solidFill>
-                        <a:schemeClr val="tx1"/>
-                      </a:solidFill>
-                      <a:prstDash val="solid"/>
-                      <a:round/>
-                      <a:headEnd type="none" w="med" len="med"/>
-                      <a:tailEnd type="none" w="med" len="med"/>
-                    </a:lnB>
-                  </a:tcPr>
-                </a:tc>
-                <a:tc>
-                  <a:txBody>
-                    <a:bodyPr/>
-                    <a:lstStyle/>
-                    <a:p>
-                      <a:pPr algn="ctr"/>
-                      <a:r>
-                        <a:rPr lang="en-US" dirty="0"/>
-                        <a:t>3</a:t>
-                      </a:r>
-                    </a:p>
-                  </a:txBody>
-                  <a:tcPr anchor="ctr">
-                    <a:lnL w="12700" cap="flat" cmpd="sng" algn="ctr">
-                      <a:solidFill>
-                        <a:schemeClr val="tx1"/>
-                      </a:solidFill>
-                      <a:prstDash val="solid"/>
-                      <a:round/>
-                      <a:headEnd type="none" w="med" len="med"/>
-                      <a:tailEnd type="none" w="med" len="med"/>
-                    </a:lnL>
-                    <a:lnR w="12700" cap="flat" cmpd="sng" algn="ctr">
-                      <a:solidFill>
-                        <a:schemeClr val="tx1"/>
-                      </a:solidFill>
-                      <a:prstDash val="solid"/>
-                      <a:round/>
-                      <a:headEnd type="none" w="med" len="med"/>
-                      <a:tailEnd type="none" w="med" len="med"/>
-                    </a:lnR>
-                    <a:lnT w="12700" cap="flat" cmpd="sng" algn="ctr">
-                      <a:solidFill>
-                        <a:schemeClr val="tx1"/>
-                      </a:solidFill>
-                      <a:prstDash val="solid"/>
-                      <a:round/>
-                      <a:headEnd type="none" w="med" len="med"/>
-                      <a:tailEnd type="none" w="med" len="med"/>
-                    </a:lnT>
-                    <a:lnB w="12700" cap="flat" cmpd="sng" algn="ctr">
-                      <a:solidFill>
-                        <a:schemeClr val="tx1"/>
-                      </a:solidFill>
-                      <a:prstDash val="solid"/>
-                      <a:round/>
-                      <a:headEnd type="none" w="med" len="med"/>
-                      <a:tailEnd type="none" w="med" len="med"/>
-                    </a:lnB>
-                  </a:tcPr>
-                </a:tc>
-                <a:extLst>
-                  <a:ext uri="{0D108BD9-81ED-4DB2-BD59-A6C34878D82A}">
-                    <a16:rowId xmlns:a16="http://schemas.microsoft.com/office/drawing/2014/main" val="1822218103"/>
                   </a:ext>
                 </a:extLst>
               </a:tr>
@@ -25326,14 +26894,14 @@
           <p:nvPr>
             <p:extLst>
               <p:ext uri="{D42A27DB-BD31-4B8C-83A1-F6EECF244321}">
-                <p14:modId xmlns:p14="http://schemas.microsoft.com/office/powerpoint/2010/main" val="4148091791"/>
+                <p14:modId xmlns:p14="http://schemas.microsoft.com/office/powerpoint/2010/main" val="2709835615"/>
               </p:ext>
             </p:extLst>
           </p:nvPr>
         </p:nvGraphicFramePr>
         <p:xfrm>
-          <a:off x="6520707" y="1025262"/>
-          <a:ext cx="5568201" cy="2199640"/>
+          <a:off x="5251205" y="1995441"/>
+          <a:ext cx="6781671" cy="1925320"/>
         </p:xfrm>
         <a:graphic>
           <a:graphicData uri="http://schemas.openxmlformats.org/drawingml/2006/table">
@@ -25342,35 +26910,35 @@
                 <a:tableStyleId>{17292A2E-F333-43FB-9621-5CBBE7FDCDCB}</a:tableStyleId>
               </a:tblPr>
               <a:tblGrid>
-                <a:gridCol w="514366">
+                <a:gridCol w="626461">
                   <a:extLst>
                     <a:ext uri="{9D8B030D-6E8A-4147-A177-3AD203B41FA5}">
                       <a16:colId xmlns:a16="http://schemas.microsoft.com/office/drawing/2014/main" val="1019678322"/>
                     </a:ext>
                   </a:extLst>
                 </a:gridCol>
-                <a:gridCol w="1340165">
+                <a:gridCol w="1632226">
                   <a:extLst>
                     <a:ext uri="{9D8B030D-6E8A-4147-A177-3AD203B41FA5}">
                       <a16:colId xmlns:a16="http://schemas.microsoft.com/office/drawing/2014/main" val="702228982"/>
                     </a:ext>
                   </a:extLst>
                 </a:gridCol>
-                <a:gridCol w="986777">
+                <a:gridCol w="1835814">
                   <a:extLst>
                     <a:ext uri="{9D8B030D-6E8A-4147-A177-3AD203B41FA5}">
                       <a16:colId xmlns:a16="http://schemas.microsoft.com/office/drawing/2014/main" val="3039201924"/>
                     </a:ext>
                   </a:extLst>
                 </a:gridCol>
-                <a:gridCol w="1403050">
+                <a:gridCol w="1385047">
                   <a:extLst>
                     <a:ext uri="{9D8B030D-6E8A-4147-A177-3AD203B41FA5}">
                       <a16:colId xmlns:a16="http://schemas.microsoft.com/office/drawing/2014/main" val="3459712493"/>
                     </a:ext>
                   </a:extLst>
                 </a:gridCol>
-                <a:gridCol w="1323843">
+                <a:gridCol w="1302123">
                   <a:extLst>
                     <a:ext uri="{9D8B030D-6E8A-4147-A177-3AD203B41FA5}">
                       <a16:colId xmlns:a16="http://schemas.microsoft.com/office/drawing/2014/main" val="1171233005"/>
@@ -25662,7 +27230,7 @@
                       <a:pPr algn="ctr"/>
                       <a:r>
                         <a:rPr lang="en-US" b="1" dirty="0"/>
-                        <a:t>Budget name (£) (VARCHAR)</a:t>
+                        <a:t>Budget name  (VARCHAR)</a:t>
                       </a:r>
                     </a:p>
                   </a:txBody>
@@ -25713,7 +27281,7 @@
                       <a:pPr algn="ctr"/>
                       <a:r>
                         <a:rPr lang="en-US" b="1" dirty="0"/>
-                        <a:t>Budget Amount (£) (INT)</a:t>
+                        <a:t>Budget Amount (£) (NUMERIC)</a:t>
                       </a:r>
                     </a:p>
                   </a:txBody>
@@ -26155,8 +27723,8 @@
         </p:nvCxnSpPr>
         <p:spPr>
           <a:xfrm flipH="1">
-            <a:off x="331694" y="2315305"/>
-            <a:ext cx="4529169" cy="2337377"/>
+            <a:off x="331695" y="1555806"/>
+            <a:ext cx="4965326" cy="3204452"/>
           </a:xfrm>
           <a:prstGeom prst="straightConnector1">
             <a:avLst/>
@@ -26197,15 +27765,15 @@
         </p:nvCxnSpPr>
         <p:spPr>
           <a:xfrm flipV="1">
-            <a:off x="5912224" y="1879600"/>
-            <a:ext cx="759509" cy="435706"/>
+            <a:off x="5563722" y="1555807"/>
+            <a:ext cx="1321172" cy="979761"/>
           </a:xfrm>
           <a:prstGeom prst="straightConnector1">
             <a:avLst/>
           </a:prstGeom>
           <a:ln w="38100">
-            <a:headEnd type="none"/>
-            <a:tailEnd type="triangle"/>
+            <a:headEnd type="triangle"/>
+            <a:tailEnd type="none"/>
           </a:ln>
         </p:spPr>
         <p:style>

</xml_diff>

<commit_message>
update function added and tested in transaction class
</commit_message>
<xml_diff>
--- a/Plans_Project_Management/Budget_App_Plan_08Nov2018.pptx
+++ b/Plans_Project_Management/Budget_App_Plan_08Nov2018.pptx
@@ -4380,14 +4380,14 @@
           <p:nvPr>
             <p:extLst>
               <p:ext uri="{D42A27DB-BD31-4B8C-83A1-F6EECF244321}">
-                <p14:modId xmlns:p14="http://schemas.microsoft.com/office/powerpoint/2010/main" val="3347654519"/>
+                <p14:modId xmlns:p14="http://schemas.microsoft.com/office/powerpoint/2010/main" val="123140852"/>
               </p:ext>
             </p:extLst>
           </p:nvPr>
         </p:nvGraphicFramePr>
         <p:xfrm>
           <a:off x="5674657" y="464175"/>
-          <a:ext cx="3630706" cy="5561794"/>
+          <a:ext cx="3630706" cy="5795701"/>
         </p:xfrm>
         <a:graphic>
           <a:graphicData uri="http://schemas.openxmlformats.org/drawingml/2006/table">
@@ -4498,17 +4498,22 @@
                     </a:p>
                     <a:p>
                       <a:r>
-                        <a:rPr lang="en-US" dirty="0"/>
+                        <a:rPr lang="en-US" strike="sngStrike" dirty="0"/>
                         <a:t>@</a:t>
                       </a:r>
                       <a:r>
-                        <a:rPr lang="en-US" dirty="0" err="1"/>
+                        <a:rPr lang="en-US" strike="sngStrike" dirty="0" err="1"/>
                         <a:t>total_spent</a:t>
                       </a:r>
                       <a:r>
-                        <a:rPr lang="en-US" dirty="0"/>
-                        <a:t>(numeric)</a:t>
-                      </a:r>
+                        <a:rPr lang="en-US" strike="sngStrike" dirty="0"/>
+                        <a:t>(numeric) </a:t>
+                      </a:r>
+                      <a:r>
+                        <a:rPr lang="en-US" strike="noStrike" dirty="0"/>
+                        <a:t>total spend can be calculated in the html and shouldn’t be a column in the database</a:t>
+                      </a:r>
+                      <a:endParaRPr lang="en-US" strike="sngStrike" dirty="0"/>
                     </a:p>
                   </a:txBody>
                   <a:tcPr/>
@@ -4642,14 +4647,14 @@
           <p:nvPr>
             <p:extLst>
               <p:ext uri="{D42A27DB-BD31-4B8C-83A1-F6EECF244321}">
-                <p14:modId xmlns:p14="http://schemas.microsoft.com/office/powerpoint/2010/main" val="872058982"/>
+                <p14:modId xmlns:p14="http://schemas.microsoft.com/office/powerpoint/2010/main" val="2258900445"/>
               </p:ext>
             </p:extLst>
           </p:nvPr>
         </p:nvGraphicFramePr>
         <p:xfrm>
-          <a:off x="9701303" y="464174"/>
-          <a:ext cx="2203824" cy="6385556"/>
+          <a:off x="9701303" y="464175"/>
+          <a:ext cx="2203824" cy="6253372"/>
         </p:xfrm>
         <a:graphic>
           <a:graphicData uri="http://schemas.openxmlformats.org/drawingml/2006/table">
@@ -4666,7 +4671,7 @@
                   </a:extLst>
                 </a:gridCol>
               </a:tblGrid>
-              <a:tr h="525733">
+              <a:tr h="351254">
                 <a:tc>
                   <a:txBody>
                     <a:bodyPr/>
@@ -4691,7 +4696,7 @@
                   </a:ext>
                 </a:extLst>
               </a:tr>
-              <a:tr h="2787066">
+              <a:tr h="3775982">
                 <a:tc>
                   <a:txBody>
                     <a:bodyPr/>
@@ -4782,20 +4787,22 @@
                         <a:defRPr/>
                       </a:pPr>
                       <a:r>
-                        <a:rPr lang="en-US" dirty="0"/>
+                        <a:rPr lang="en-US" strike="sngStrike" dirty="0"/>
                         <a:t>@</a:t>
                       </a:r>
                       <a:r>
-                        <a:rPr lang="en-US" dirty="0" err="1"/>
+                        <a:rPr lang="en-US" strike="sngStrike" dirty="0" err="1"/>
                         <a:t>remaining_budget</a:t>
                       </a:r>
                       <a:r>
-                        <a:rPr lang="en-US" dirty="0"/>
-                        <a:t>(numeric)</a:t>
-                      </a:r>
-                    </a:p>
-                    <a:p>
-                      <a:endParaRPr lang="en-US" dirty="0"/>
+                        <a:rPr lang="en-US" strike="sngStrike" dirty="0"/>
+                        <a:t>(numeric) </a:t>
+                      </a:r>
+                      <a:r>
+                        <a:rPr lang="en-US" strike="noStrike" dirty="0"/>
+                        <a:t>remaining budget can be calculated in the html and shouldn’t be a column in the database</a:t>
+                      </a:r>
+                      <a:endParaRPr lang="en-US" strike="sngStrike" dirty="0"/>
                     </a:p>
                   </a:txBody>
                   <a:tcPr/>
@@ -4806,7 +4813,7 @@
                   </a:ext>
                 </a:extLst>
               </a:tr>
-              <a:tr h="3025183">
+              <a:tr h="1955692">
                 <a:tc>
                   <a:txBody>
                     <a:bodyPr/>
@@ -4870,9 +4877,6 @@
                         <a:rPr lang="en-US" dirty="0"/>
                         <a:t>delete</a:t>
                       </a:r>
-                    </a:p>
-                    <a:p>
-                      <a:endParaRPr lang="en-US" dirty="0"/>
                     </a:p>
                   </a:txBody>
                   <a:tcPr/>
@@ -4968,7 +4972,7 @@
           <p:nvPr>
             <p:extLst>
               <p:ext uri="{D42A27DB-BD31-4B8C-83A1-F6EECF244321}">
-                <p14:modId xmlns:p14="http://schemas.microsoft.com/office/powerpoint/2010/main" val="2797195984"/>
+                <p14:modId xmlns:p14="http://schemas.microsoft.com/office/powerpoint/2010/main" val="838700762"/>
               </p:ext>
             </p:extLst>
           </p:nvPr>
@@ -5046,18 +5050,15 @@
                       </a:r>
                       <a:r>
                         <a:rPr lang="en-US" dirty="0" err="1"/>
-                        <a:t>budget_id</a:t>
-                      </a:r>
-                      <a:endParaRPr lang="en-US" dirty="0"/>
-                    </a:p>
-                    <a:p>
-                      <a:r>
-                        <a:rPr lang="en-US" dirty="0"/>
-                        <a:t>@</a:t>
-                      </a:r>
-                      <a:r>
-                        <a:rPr lang="en-US" dirty="0" err="1"/>
-                        <a:t>remaining_budget</a:t>
+                        <a:t>budget</a:t>
+                      </a:r>
+                      <a:r>
+                        <a:rPr lang="en-US" err="1"/>
+                        <a:t>_</a:t>
+                      </a:r>
+                      <a:r>
+                        <a:rPr lang="en-US"/>
+                        <a:t>id</a:t>
                       </a:r>
                       <a:endParaRPr lang="en-US" dirty="0"/>
                     </a:p>

</xml_diff>

<commit_message>
all mvp bugs sorted
</commit_message>
<xml_diff>
--- a/Plans_Project_Management/Budget_App_Plan_08Nov2018.pptx
+++ b/Plans_Project_Management/Budget_App_Plan_08Nov2018.pptx
@@ -25,6 +25,12 @@
     <p:sldId id="274" r:id="rId19"/>
     <p:sldId id="275" r:id="rId20"/>
     <p:sldId id="269" r:id="rId21"/>
+    <p:sldId id="276" r:id="rId22"/>
+    <p:sldId id="277" r:id="rId23"/>
+    <p:sldId id="278" r:id="rId24"/>
+    <p:sldId id="281" r:id="rId25"/>
+    <p:sldId id="280" r:id="rId26"/>
+    <p:sldId id="279" r:id="rId27"/>
   </p:sldIdLst>
   <p:sldSz cx="12192000" cy="6858000"/>
   <p:notesSz cx="6858000" cy="9144000"/>
@@ -4380,14 +4386,14 @@
           <p:nvPr>
             <p:extLst>
               <p:ext uri="{D42A27DB-BD31-4B8C-83A1-F6EECF244321}">
-                <p14:modId xmlns:p14="http://schemas.microsoft.com/office/powerpoint/2010/main" val="123140852"/>
+                <p14:modId xmlns:p14="http://schemas.microsoft.com/office/powerpoint/2010/main" val="2671433756"/>
               </p:ext>
             </p:extLst>
           </p:nvPr>
         </p:nvGraphicFramePr>
         <p:xfrm>
           <a:off x="5674657" y="464175"/>
-          <a:ext cx="3630706" cy="5795701"/>
+          <a:ext cx="3630706" cy="5521381"/>
         </p:xfrm>
         <a:graphic>
           <a:graphicData uri="http://schemas.openxmlformats.org/drawingml/2006/table">
@@ -4557,16 +4563,6 @@
                       <a:r>
                         <a:rPr lang="en-US" dirty="0"/>
                         <a:t>Calculate total spent</a:t>
-                      </a:r>
-                    </a:p>
-                    <a:p>
-                      <a:pPr marL="285750" indent="-285750" algn="l">
-                        <a:buFontTx/>
-                        <a:buChar char="-"/>
-                      </a:pPr>
-                      <a:r>
-                        <a:rPr lang="en-US" dirty="0"/>
-                        <a:t>Calculate remaining budget</a:t>
                       </a:r>
                     </a:p>
                     <a:p>
@@ -4972,14 +4968,14 @@
           <p:nvPr>
             <p:extLst>
               <p:ext uri="{D42A27DB-BD31-4B8C-83A1-F6EECF244321}">
-                <p14:modId xmlns:p14="http://schemas.microsoft.com/office/powerpoint/2010/main" val="838700762"/>
+                <p14:modId xmlns:p14="http://schemas.microsoft.com/office/powerpoint/2010/main" val="2931287289"/>
               </p:ext>
             </p:extLst>
           </p:nvPr>
         </p:nvGraphicFramePr>
         <p:xfrm>
           <a:off x="484092" y="1044239"/>
-          <a:ext cx="3630706" cy="5561794"/>
+          <a:ext cx="3630706" cy="5013154"/>
         </p:xfrm>
         <a:graphic>
           <a:graphicData uri="http://schemas.openxmlformats.org/drawingml/2006/table">
@@ -5050,15 +5046,7 @@
                       </a:r>
                       <a:r>
                         <a:rPr lang="en-US" dirty="0" err="1"/>
-                        <a:t>budget</a:t>
-                      </a:r>
-                      <a:r>
-                        <a:rPr lang="en-US" err="1"/>
-                        <a:t>_</a:t>
-                      </a:r>
-                      <a:r>
-                        <a:rPr lang="en-US"/>
-                        <a:t>id</a:t>
+                        <a:t>budget_id</a:t>
                       </a:r>
                       <a:endParaRPr lang="en-US" dirty="0"/>
                     </a:p>
@@ -5084,52 +5072,6 @@
                       <a:r>
                         <a:rPr lang="en-US" dirty="0"/>
                         <a:t>Initialize</a:t>
-                      </a:r>
-                    </a:p>
-                    <a:p>
-                      <a:pPr marL="285750" marR="0" lvl="0" indent="-285750" algn="l" defTabSz="914400" rtl="0" eaLnBrk="1" fontAlgn="auto" latinLnBrk="0" hangingPunct="1">
-                        <a:lnSpc>
-                          <a:spcPct val="100000"/>
-                        </a:lnSpc>
-                        <a:spcBef>
-                          <a:spcPts val="0"/>
-                        </a:spcBef>
-                        <a:spcAft>
-                          <a:spcPts val="0"/>
-                        </a:spcAft>
-                        <a:buClrTx/>
-                        <a:buSzTx/>
-                        <a:buFontTx/>
-                        <a:buChar char="-"/>
-                        <a:tabLst/>
-                        <a:defRPr/>
-                      </a:pPr>
-                      <a:r>
-                        <a:rPr lang="en-US" dirty="0"/>
-                        <a:t>Calculate total spent</a:t>
-                      </a:r>
-                    </a:p>
-                    <a:p>
-                      <a:pPr marL="285750" marR="0" lvl="0" indent="-285750" algn="l" defTabSz="914400" rtl="0" eaLnBrk="1" fontAlgn="auto" latinLnBrk="0" hangingPunct="1">
-                        <a:lnSpc>
-                          <a:spcPct val="100000"/>
-                        </a:lnSpc>
-                        <a:spcBef>
-                          <a:spcPts val="0"/>
-                        </a:spcBef>
-                        <a:spcAft>
-                          <a:spcPts val="0"/>
-                        </a:spcAft>
-                        <a:buClrTx/>
-                        <a:buSzTx/>
-                        <a:buFontTx/>
-                        <a:buChar char="-"/>
-                        <a:tabLst/>
-                        <a:defRPr/>
-                      </a:pPr>
-                      <a:r>
-                        <a:rPr lang="en-US" dirty="0"/>
-                        <a:t>Calculate remaining budget</a:t>
                       </a:r>
                     </a:p>
                     <a:p>
@@ -10875,6 +10817,653 @@
     <p:extLst>
       <p:ext uri="{BB962C8B-B14F-4D97-AF65-F5344CB8AC3E}">
         <p14:creationId xmlns:p14="http://schemas.microsoft.com/office/powerpoint/2010/main" val="1801390461"/>
+      </p:ext>
+    </p:extLst>
+  </p:cSld>
+  <p:clrMapOvr>
+    <a:masterClrMapping/>
+  </p:clrMapOvr>
+</p:sld>
+</file>
+
+<file path=ppt/slides/slide21.xml><?xml version="1.0" encoding="utf-8"?>
+<p:sld xmlns:a="http://schemas.openxmlformats.org/drawingml/2006/main" xmlns:r="http://schemas.openxmlformats.org/officeDocument/2006/relationships" xmlns:p="http://schemas.openxmlformats.org/presentationml/2006/main">
+  <p:cSld>
+    <p:spTree>
+      <p:nvGrpSpPr>
+        <p:cNvPr id="1" name=""/>
+        <p:cNvGrpSpPr/>
+        <p:nvPr/>
+      </p:nvGrpSpPr>
+      <p:grpSpPr>
+        <a:xfrm>
+          <a:off x="0" y="0"/>
+          <a:ext cx="0" cy="0"/>
+          <a:chOff x="0" y="0"/>
+          <a:chExt cx="0" cy="0"/>
+        </a:xfrm>
+      </p:grpSpPr>
+      <p:pic>
+        <p:nvPicPr>
+          <p:cNvPr id="6" name="Picture 5">
+            <a:extLst>
+              <a:ext uri="{FF2B5EF4-FFF2-40B4-BE49-F238E27FC236}">
+                <a16:creationId xmlns:a16="http://schemas.microsoft.com/office/drawing/2014/main" id="{139DA6A7-C8FA-A94B-BD83-A3C563944AF0}"/>
+              </a:ext>
+            </a:extLst>
+          </p:cNvPr>
+          <p:cNvPicPr>
+            <a:picLocks noChangeAspect="1"/>
+          </p:cNvPicPr>
+          <p:nvPr/>
+        </p:nvPicPr>
+        <p:blipFill>
+          <a:blip r:embed="rId2"/>
+          <a:stretch>
+            <a:fillRect/>
+          </a:stretch>
+        </p:blipFill>
+        <p:spPr>
+          <a:xfrm>
+            <a:off x="5902421" y="0"/>
+            <a:ext cx="5308050" cy="6858000"/>
+          </a:xfrm>
+          <a:prstGeom prst="rect">
+            <a:avLst/>
+          </a:prstGeom>
+        </p:spPr>
+      </p:pic>
+      <p:pic>
+        <p:nvPicPr>
+          <p:cNvPr id="7" name="Picture 6">
+            <a:extLst>
+              <a:ext uri="{FF2B5EF4-FFF2-40B4-BE49-F238E27FC236}">
+                <a16:creationId xmlns:a16="http://schemas.microsoft.com/office/drawing/2014/main" id="{97BC172A-3271-C545-9AF5-C224085D3540}"/>
+              </a:ext>
+            </a:extLst>
+          </p:cNvPr>
+          <p:cNvPicPr>
+            <a:picLocks noChangeAspect="1"/>
+          </p:cNvPicPr>
+          <p:nvPr/>
+        </p:nvPicPr>
+        <p:blipFill rotWithShape="1">
+          <a:blip r:embed="rId2"/>
+          <a:srcRect l="34425" t="14400" r="10449" b="50000"/>
+          <a:stretch/>
+        </p:blipFill>
+        <p:spPr>
+          <a:xfrm>
+            <a:off x="2048255" y="128016"/>
+            <a:ext cx="2926081" cy="2441448"/>
+          </a:xfrm>
+          <a:prstGeom prst="rect">
+            <a:avLst/>
+          </a:prstGeom>
+        </p:spPr>
+      </p:pic>
+      <p:pic>
+        <p:nvPicPr>
+          <p:cNvPr id="8" name="Picture 7">
+            <a:extLst>
+              <a:ext uri="{FF2B5EF4-FFF2-40B4-BE49-F238E27FC236}">
+                <a16:creationId xmlns:a16="http://schemas.microsoft.com/office/drawing/2014/main" id="{C8CFDD76-18FD-FB49-8D0D-825C895821D6}"/>
+              </a:ext>
+            </a:extLst>
+          </p:cNvPr>
+          <p:cNvPicPr>
+            <a:picLocks noChangeAspect="1"/>
+          </p:cNvPicPr>
+          <p:nvPr/>
+        </p:nvPicPr>
+        <p:blipFill rotWithShape="1">
+          <a:blip r:embed="rId2"/>
+          <a:srcRect l="47747" t="15000" r="12976" b="55666"/>
+          <a:stretch/>
+        </p:blipFill>
+        <p:spPr>
+          <a:xfrm>
+            <a:off x="2450592" y="3108960"/>
+            <a:ext cx="2084832" cy="2011680"/>
+          </a:xfrm>
+          <a:prstGeom prst="rect">
+            <a:avLst/>
+          </a:prstGeom>
+        </p:spPr>
+      </p:pic>
+    </p:spTree>
+    <p:extLst>
+      <p:ext uri="{BB962C8B-B14F-4D97-AF65-F5344CB8AC3E}">
+        <p14:creationId xmlns:p14="http://schemas.microsoft.com/office/powerpoint/2010/main" val="838521671"/>
+      </p:ext>
+    </p:extLst>
+  </p:cSld>
+  <p:clrMapOvr>
+    <a:masterClrMapping/>
+  </p:clrMapOvr>
+</p:sld>
+</file>
+
+<file path=ppt/slides/slide22.xml><?xml version="1.0" encoding="utf-8"?>
+<p:sld xmlns:a="http://schemas.openxmlformats.org/drawingml/2006/main" xmlns:r="http://schemas.openxmlformats.org/officeDocument/2006/relationships" xmlns:p="http://schemas.openxmlformats.org/presentationml/2006/main">
+  <p:cSld>
+    <p:spTree>
+      <p:nvGrpSpPr>
+        <p:cNvPr id="1" name=""/>
+        <p:cNvGrpSpPr/>
+        <p:nvPr/>
+      </p:nvGrpSpPr>
+      <p:grpSpPr>
+        <a:xfrm>
+          <a:off x="0" y="0"/>
+          <a:ext cx="0" cy="0"/>
+          <a:chOff x="0" y="0"/>
+          <a:chExt cx="0" cy="0"/>
+        </a:xfrm>
+      </p:grpSpPr>
+      <p:pic>
+        <p:nvPicPr>
+          <p:cNvPr id="4" name="Picture 3">
+            <a:extLst>
+              <a:ext uri="{FF2B5EF4-FFF2-40B4-BE49-F238E27FC236}">
+                <a16:creationId xmlns:a16="http://schemas.microsoft.com/office/drawing/2014/main" id="{B4B62569-CBB4-5947-81BD-D41F5DE099B6}"/>
+              </a:ext>
+            </a:extLst>
+          </p:cNvPr>
+          <p:cNvPicPr>
+            <a:picLocks noChangeAspect="1"/>
+          </p:cNvPicPr>
+          <p:nvPr/>
+        </p:nvPicPr>
+        <p:blipFill rotWithShape="1">
+          <a:blip r:embed="rId2"/>
+          <a:srcRect l="9447" t="23813" r="14366" b="25336"/>
+          <a:stretch/>
+        </p:blipFill>
+        <p:spPr>
+          <a:xfrm flipH="1">
+            <a:off x="493776" y="1474724"/>
+            <a:ext cx="4572000" cy="3051556"/>
+          </a:xfrm>
+          <a:prstGeom prst="rect">
+            <a:avLst/>
+          </a:prstGeom>
+        </p:spPr>
+      </p:pic>
+      <p:pic>
+        <p:nvPicPr>
+          <p:cNvPr id="5" name="Picture 4">
+            <a:extLst>
+              <a:ext uri="{FF2B5EF4-FFF2-40B4-BE49-F238E27FC236}">
+                <a16:creationId xmlns:a16="http://schemas.microsoft.com/office/drawing/2014/main" id="{E6DB89C1-3996-014E-8C1E-8A307B9FB67D}"/>
+              </a:ext>
+            </a:extLst>
+          </p:cNvPr>
+          <p:cNvPicPr>
+            <a:picLocks noChangeAspect="1"/>
+          </p:cNvPicPr>
+          <p:nvPr/>
+        </p:nvPicPr>
+        <p:blipFill>
+          <a:blip r:embed="rId3"/>
+          <a:stretch>
+            <a:fillRect/>
+          </a:stretch>
+        </p:blipFill>
+        <p:spPr>
+          <a:xfrm>
+            <a:off x="6462270" y="714502"/>
+            <a:ext cx="4572000" cy="4572000"/>
+          </a:xfrm>
+          <a:prstGeom prst="rect">
+            <a:avLst/>
+          </a:prstGeom>
+        </p:spPr>
+      </p:pic>
+    </p:spTree>
+    <p:extLst>
+      <p:ext uri="{BB962C8B-B14F-4D97-AF65-F5344CB8AC3E}">
+        <p14:creationId xmlns:p14="http://schemas.microsoft.com/office/powerpoint/2010/main" val="3470246340"/>
+      </p:ext>
+    </p:extLst>
+  </p:cSld>
+  <p:clrMapOvr>
+    <a:masterClrMapping/>
+  </p:clrMapOvr>
+</p:sld>
+</file>
+
+<file path=ppt/slides/slide23.xml><?xml version="1.0" encoding="utf-8"?>
+<p:sld xmlns:a="http://schemas.openxmlformats.org/drawingml/2006/main" xmlns:r="http://schemas.openxmlformats.org/officeDocument/2006/relationships" xmlns:p="http://schemas.openxmlformats.org/presentationml/2006/main">
+  <p:cSld>
+    <p:spTree>
+      <p:nvGrpSpPr>
+        <p:cNvPr id="1" name=""/>
+        <p:cNvGrpSpPr/>
+        <p:nvPr/>
+      </p:nvGrpSpPr>
+      <p:grpSpPr>
+        <a:xfrm>
+          <a:off x="0" y="0"/>
+          <a:ext cx="0" cy="0"/>
+          <a:chOff x="0" y="0"/>
+          <a:chExt cx="0" cy="0"/>
+        </a:xfrm>
+      </p:grpSpPr>
+      <p:pic>
+        <p:nvPicPr>
+          <p:cNvPr id="8" name="Picture 7">
+            <a:extLst>
+              <a:ext uri="{FF2B5EF4-FFF2-40B4-BE49-F238E27FC236}">
+                <a16:creationId xmlns:a16="http://schemas.microsoft.com/office/drawing/2014/main" id="{681F779A-C181-7F41-9DAF-07BAF33AC925}"/>
+              </a:ext>
+            </a:extLst>
+          </p:cNvPr>
+          <p:cNvPicPr>
+            <a:picLocks noChangeAspect="1"/>
+          </p:cNvPicPr>
+          <p:nvPr/>
+        </p:nvPicPr>
+        <p:blipFill rotWithShape="1">
+          <a:blip r:embed="rId2">
+            <a:extLst>
+              <a:ext uri="{BEBA8EAE-BF5A-486C-A8C5-ECC9F3942E4B}">
+                <a14:imgProps xmlns:a14="http://schemas.microsoft.com/office/drawing/2010/main">
+                  <a14:imgLayer r:embed="rId3">
+                    <a14:imgEffect>
+                      <a14:backgroundRemoval t="10000" b="90000" l="10000" r="90000"/>
+                    </a14:imgEffect>
+                  </a14:imgLayer>
+                </a14:imgProps>
+              </a:ext>
+            </a:extLst>
+          </a:blip>
+          <a:srcRect t="25038" b="23912"/>
+          <a:stretch/>
+        </p:blipFill>
+        <p:spPr>
+          <a:xfrm flipH="1">
+            <a:off x="1491038" y="1170433"/>
+            <a:ext cx="1361281" cy="694944"/>
+          </a:xfrm>
+          <a:prstGeom prst="rect">
+            <a:avLst/>
+          </a:prstGeom>
+        </p:spPr>
+      </p:pic>
+    </p:spTree>
+    <p:extLst>
+      <p:ext uri="{BB962C8B-B14F-4D97-AF65-F5344CB8AC3E}">
+        <p14:creationId xmlns:p14="http://schemas.microsoft.com/office/powerpoint/2010/main" val="440666513"/>
+      </p:ext>
+    </p:extLst>
+  </p:cSld>
+  <p:clrMapOvr>
+    <a:masterClrMapping/>
+  </p:clrMapOvr>
+</p:sld>
+</file>
+
+<file path=ppt/slides/slide24.xml><?xml version="1.0" encoding="utf-8"?>
+<p:sld xmlns:a="http://schemas.openxmlformats.org/drawingml/2006/main" xmlns:r="http://schemas.openxmlformats.org/officeDocument/2006/relationships" xmlns:p="http://schemas.openxmlformats.org/presentationml/2006/main">
+  <p:cSld>
+    <p:spTree>
+      <p:nvGrpSpPr>
+        <p:cNvPr id="1" name=""/>
+        <p:cNvGrpSpPr/>
+        <p:nvPr/>
+      </p:nvGrpSpPr>
+      <p:grpSpPr>
+        <a:xfrm>
+          <a:off x="0" y="0"/>
+          <a:ext cx="0" cy="0"/>
+          <a:chOff x="0" y="0"/>
+          <a:chExt cx="0" cy="0"/>
+        </a:xfrm>
+      </p:grpSpPr>
+      <p:sp>
+        <p:nvSpPr>
+          <p:cNvPr id="4" name="Rectangle 3">
+            <a:extLst>
+              <a:ext uri="{FF2B5EF4-FFF2-40B4-BE49-F238E27FC236}">
+                <a16:creationId xmlns:a16="http://schemas.microsoft.com/office/drawing/2014/main" id="{E7F6D30D-1F3A-2B4C-BF67-6988DC260C76}"/>
+              </a:ext>
+            </a:extLst>
+          </p:cNvPr>
+          <p:cNvSpPr/>
+          <p:nvPr/>
+        </p:nvSpPr>
+        <p:spPr>
+          <a:xfrm>
+            <a:off x="640080" y="828393"/>
+            <a:ext cx="9875520" cy="646331"/>
+          </a:xfrm>
+          <a:prstGeom prst="rect">
+            <a:avLst/>
+          </a:prstGeom>
+        </p:spPr>
+        <p:txBody>
+          <a:bodyPr wrap="square">
+            <a:spAutoFit/>
+          </a:bodyPr>
+          <a:lstStyle/>
+          <a:p>
+            <a:pPr algn="ctr"/>
+            <a:r>
+              <a:rPr lang="en-GB" b="1" dirty="0">
+                <a:solidFill>
+                  <a:srgbClr val="053E45"/>
+                </a:solidFill>
+                <a:latin typeface="Josefin Sans"/>
+              </a:rPr>
+              <a:t>Budgee is a spending and budgeting app that is uniquely different from all other existing budget apps, and more better because reasons!</a:t>
+            </a:r>
+            <a:endParaRPr lang="en-GB" b="1" i="0" u="none" strike="noStrike" dirty="0">
+              <a:solidFill>
+                <a:srgbClr val="053E45"/>
+              </a:solidFill>
+              <a:effectLst/>
+              <a:latin typeface="Josefin Sans"/>
+            </a:endParaRPr>
+          </a:p>
+        </p:txBody>
+      </p:sp>
+      <p:pic>
+        <p:nvPicPr>
+          <p:cNvPr id="6" name="Picture 5">
+            <a:extLst>
+              <a:ext uri="{FF2B5EF4-FFF2-40B4-BE49-F238E27FC236}">
+                <a16:creationId xmlns:a16="http://schemas.microsoft.com/office/drawing/2014/main" id="{C4F49158-14AF-704C-AB71-FCCBEC620773}"/>
+              </a:ext>
+            </a:extLst>
+          </p:cNvPr>
+          <p:cNvPicPr>
+            <a:picLocks noChangeAspect="1"/>
+          </p:cNvPicPr>
+          <p:nvPr/>
+        </p:nvPicPr>
+        <p:blipFill rotWithShape="1">
+          <a:blip r:embed="rId2"/>
+          <a:srcRect l="9447" t="23813" r="14366" b="25336"/>
+          <a:stretch/>
+        </p:blipFill>
+        <p:spPr>
+          <a:xfrm flipH="1">
+            <a:off x="493776" y="1474724"/>
+            <a:ext cx="4572000" cy="3051556"/>
+          </a:xfrm>
+          <a:prstGeom prst="rect">
+            <a:avLst/>
+          </a:prstGeom>
+        </p:spPr>
+      </p:pic>
+    </p:spTree>
+    <p:extLst>
+      <p:ext uri="{BB962C8B-B14F-4D97-AF65-F5344CB8AC3E}">
+        <p14:creationId xmlns:p14="http://schemas.microsoft.com/office/powerpoint/2010/main" val="2320068346"/>
+      </p:ext>
+    </p:extLst>
+  </p:cSld>
+  <p:clrMapOvr>
+    <a:masterClrMapping/>
+  </p:clrMapOvr>
+</p:sld>
+</file>
+
+<file path=ppt/slides/slide25.xml><?xml version="1.0" encoding="utf-8"?>
+<p:sld xmlns:a="http://schemas.openxmlformats.org/drawingml/2006/main" xmlns:r="http://schemas.openxmlformats.org/officeDocument/2006/relationships" xmlns:p="http://schemas.openxmlformats.org/presentationml/2006/main">
+  <p:cSld>
+    <p:spTree>
+      <p:nvGrpSpPr>
+        <p:cNvPr id="1" name=""/>
+        <p:cNvGrpSpPr/>
+        <p:nvPr/>
+      </p:nvGrpSpPr>
+      <p:grpSpPr>
+        <a:xfrm>
+          <a:off x="0" y="0"/>
+          <a:ext cx="0" cy="0"/>
+          <a:chOff x="0" y="0"/>
+          <a:chExt cx="0" cy="0"/>
+        </a:xfrm>
+      </p:grpSpPr>
+      <p:grpSp>
+        <p:nvGrpSpPr>
+          <p:cNvPr id="2" name="Group 1">
+            <a:extLst>
+              <a:ext uri="{FF2B5EF4-FFF2-40B4-BE49-F238E27FC236}">
+                <a16:creationId xmlns:a16="http://schemas.microsoft.com/office/drawing/2014/main" id="{3105A4FB-8C10-7F4D-8C3D-C4E62166992F}"/>
+              </a:ext>
+            </a:extLst>
+          </p:cNvPr>
+          <p:cNvGrpSpPr/>
+          <p:nvPr/>
+        </p:nvGrpSpPr>
+        <p:grpSpPr>
+          <a:xfrm>
+            <a:off x="3360717" y="2743200"/>
+            <a:ext cx="8827479" cy="3547872"/>
+            <a:chOff x="3360717" y="2743200"/>
+            <a:chExt cx="8827479" cy="3547872"/>
+          </a:xfrm>
+        </p:grpSpPr>
+        <p:pic>
+          <p:nvPicPr>
+            <p:cNvPr id="5" name="Picture 4">
+              <a:extLst>
+                <a:ext uri="{FF2B5EF4-FFF2-40B4-BE49-F238E27FC236}">
+                  <a16:creationId xmlns:a16="http://schemas.microsoft.com/office/drawing/2014/main" id="{0A935236-AC1B-9846-8503-21792A84E829}"/>
+                </a:ext>
+              </a:extLst>
+            </p:cNvPr>
+            <p:cNvPicPr>
+              <a:picLocks noChangeAspect="1"/>
+            </p:cNvPicPr>
+            <p:nvPr/>
+          </p:nvPicPr>
+          <p:blipFill rotWithShape="1">
+            <a:blip r:embed="rId2"/>
+            <a:srcRect t="15629" b="6770"/>
+            <a:stretch/>
+          </p:blipFill>
+          <p:spPr>
+            <a:xfrm>
+              <a:off x="7616196" y="2743200"/>
+              <a:ext cx="4572000" cy="3547872"/>
+            </a:xfrm>
+            <a:prstGeom prst="rect">
+              <a:avLst/>
+            </a:prstGeom>
+          </p:spPr>
+        </p:pic>
+        <p:sp>
+          <p:nvSpPr>
+            <p:cNvPr id="4" name="Rectangle 3">
+              <a:extLst>
+                <a:ext uri="{FF2B5EF4-FFF2-40B4-BE49-F238E27FC236}">
+                  <a16:creationId xmlns:a16="http://schemas.microsoft.com/office/drawing/2014/main" id="{E7F6D30D-1F3A-2B4C-BF67-6988DC260C76}"/>
+                </a:ext>
+              </a:extLst>
+            </p:cNvPr>
+            <p:cNvSpPr/>
+            <p:nvPr/>
+          </p:nvSpPr>
+          <p:spPr>
+            <a:xfrm>
+              <a:off x="3360717" y="3440143"/>
+              <a:ext cx="4112979" cy="1200329"/>
+            </a:xfrm>
+            <a:prstGeom prst="rect">
+              <a:avLst/>
+            </a:prstGeom>
+          </p:spPr>
+          <p:txBody>
+            <a:bodyPr wrap="square">
+              <a:spAutoFit/>
+            </a:bodyPr>
+            <a:lstStyle/>
+            <a:p>
+              <a:pPr algn="ctr"/>
+              <a:r>
+                <a:rPr lang="en-GB" b="1" dirty="0">
+                  <a:solidFill>
+                    <a:srgbClr val="053E45"/>
+                  </a:solidFill>
+                  <a:latin typeface="Josefin Sans"/>
+                </a:rPr>
+                <a:t>Budgee is a spending and budgeting app that is uniquely different from all other existing budget apps, and more better because reasons!</a:t>
+              </a:r>
+              <a:endParaRPr lang="en-GB" b="1" i="0" u="none" strike="noStrike" dirty="0">
+                <a:solidFill>
+                  <a:srgbClr val="053E45"/>
+                </a:solidFill>
+                <a:effectLst/>
+                <a:latin typeface="Josefin Sans"/>
+              </a:endParaRPr>
+            </a:p>
+          </p:txBody>
+        </p:sp>
+      </p:grpSp>
+    </p:spTree>
+    <p:extLst>
+      <p:ext uri="{BB962C8B-B14F-4D97-AF65-F5344CB8AC3E}">
+        <p14:creationId xmlns:p14="http://schemas.microsoft.com/office/powerpoint/2010/main" val="2228157793"/>
+      </p:ext>
+    </p:extLst>
+  </p:cSld>
+  <p:clrMapOvr>
+    <a:masterClrMapping/>
+  </p:clrMapOvr>
+</p:sld>
+</file>
+
+<file path=ppt/slides/slide26.xml><?xml version="1.0" encoding="utf-8"?>
+<p:sld xmlns:a="http://schemas.openxmlformats.org/drawingml/2006/main" xmlns:r="http://schemas.openxmlformats.org/officeDocument/2006/relationships" xmlns:p="http://schemas.openxmlformats.org/presentationml/2006/main">
+  <p:cSld>
+    <p:spTree>
+      <p:nvGrpSpPr>
+        <p:cNvPr id="1" name=""/>
+        <p:cNvGrpSpPr/>
+        <p:nvPr/>
+      </p:nvGrpSpPr>
+      <p:grpSpPr>
+        <a:xfrm>
+          <a:off x="0" y="0"/>
+          <a:ext cx="0" cy="0"/>
+          <a:chOff x="0" y="0"/>
+          <a:chExt cx="0" cy="0"/>
+        </a:xfrm>
+      </p:grpSpPr>
+      <p:sp>
+        <p:nvSpPr>
+          <p:cNvPr id="4" name="Rectangle 3">
+            <a:extLst>
+              <a:ext uri="{FF2B5EF4-FFF2-40B4-BE49-F238E27FC236}">
+                <a16:creationId xmlns:a16="http://schemas.microsoft.com/office/drawing/2014/main" id="{E7F6D30D-1F3A-2B4C-BF67-6988DC260C76}"/>
+              </a:ext>
+            </a:extLst>
+          </p:cNvPr>
+          <p:cNvSpPr/>
+          <p:nvPr/>
+        </p:nvSpPr>
+        <p:spPr>
+          <a:xfrm>
+            <a:off x="749808" y="4997303"/>
+            <a:ext cx="9875520" cy="646331"/>
+          </a:xfrm>
+          <a:prstGeom prst="rect">
+            <a:avLst/>
+          </a:prstGeom>
+        </p:spPr>
+        <p:txBody>
+          <a:bodyPr wrap="square">
+            <a:spAutoFit/>
+          </a:bodyPr>
+          <a:lstStyle/>
+          <a:p>
+            <a:pPr algn="ctr"/>
+            <a:r>
+              <a:rPr lang="en-GB" b="1" dirty="0">
+                <a:solidFill>
+                  <a:srgbClr val="053E45"/>
+                </a:solidFill>
+                <a:latin typeface="Josefin Sans"/>
+              </a:rPr>
+              <a:t>Budgee is a spending and budgeting app that is uniquely different from all other existing budget apps, and more better because reasons!</a:t>
+            </a:r>
+            <a:endParaRPr lang="en-GB" b="1" i="0" u="none" strike="noStrike" dirty="0">
+              <a:solidFill>
+                <a:srgbClr val="053E45"/>
+              </a:solidFill>
+              <a:effectLst/>
+              <a:latin typeface="Josefin Sans"/>
+            </a:endParaRPr>
+          </a:p>
+        </p:txBody>
+      </p:sp>
+      <p:pic>
+        <p:nvPicPr>
+          <p:cNvPr id="5" name="Picture 4">
+            <a:extLst>
+              <a:ext uri="{FF2B5EF4-FFF2-40B4-BE49-F238E27FC236}">
+                <a16:creationId xmlns:a16="http://schemas.microsoft.com/office/drawing/2014/main" id="{0A935236-AC1B-9846-8503-21792A84E829}"/>
+              </a:ext>
+            </a:extLst>
+          </p:cNvPr>
+          <p:cNvPicPr>
+            <a:picLocks noChangeAspect="1"/>
+          </p:cNvPicPr>
+          <p:nvPr/>
+        </p:nvPicPr>
+        <p:blipFill>
+          <a:blip r:embed="rId2"/>
+          <a:stretch>
+            <a:fillRect/>
+          </a:stretch>
+        </p:blipFill>
+        <p:spPr>
+          <a:xfrm>
+            <a:off x="7620000" y="-19628"/>
+            <a:ext cx="4572000" cy="4572000"/>
+          </a:xfrm>
+          <a:prstGeom prst="rect">
+            <a:avLst/>
+          </a:prstGeom>
+        </p:spPr>
+      </p:pic>
+      <p:pic>
+        <p:nvPicPr>
+          <p:cNvPr id="6" name="Picture 5">
+            <a:extLst>
+              <a:ext uri="{FF2B5EF4-FFF2-40B4-BE49-F238E27FC236}">
+                <a16:creationId xmlns:a16="http://schemas.microsoft.com/office/drawing/2014/main" id="{C4F49158-14AF-704C-AB71-FCCBEC620773}"/>
+              </a:ext>
+            </a:extLst>
+          </p:cNvPr>
+          <p:cNvPicPr>
+            <a:picLocks noChangeAspect="1"/>
+          </p:cNvPicPr>
+          <p:nvPr/>
+        </p:nvPicPr>
+        <p:blipFill rotWithShape="1">
+          <a:blip r:embed="rId3"/>
+          <a:srcRect l="9447" t="23813" r="14366" b="25336"/>
+          <a:stretch/>
+        </p:blipFill>
+        <p:spPr>
+          <a:xfrm flipH="1">
+            <a:off x="493776" y="1474724"/>
+            <a:ext cx="4572000" cy="3051556"/>
+          </a:xfrm>
+          <a:prstGeom prst="rect">
+            <a:avLst/>
+          </a:prstGeom>
+        </p:spPr>
+      </p:pic>
+    </p:spTree>
+    <p:extLst>
+      <p:ext uri="{BB962C8B-B14F-4D97-AF65-F5344CB8AC3E}">
+        <p14:creationId xmlns:p14="http://schemas.microsoft.com/office/powerpoint/2010/main" val="1755050907"/>
       </p:ext>
     </p:extLst>
   </p:cSld>

</xml_diff>